<commit_message>
Moved example files to new folder (removed candidate from folder name); minor updates to spec doc for XL part; minor updates to figures pptx
</commit_message>
<xml_diff>
--- a/specification_document/specdoc1_2/NewFeaturesInMzid12.pptx
+++ b/specification_document/specdoc1_2/NewFeaturesInMzid12.pptx
@@ -111,6 +111,22 @@
       </a:defRPr>
     </a:lvl9pPr>
   </p:defaultTextStyle>
+  <p:extLst>
+    <p:ext uri="{EFAFB233-063F-42B5-8137-9DF3F51BA10A}">
+      <p15:sldGuideLst xmlns:p15="http://schemas.microsoft.com/office/powerpoint/2012/main">
+        <p15:guide id="1" orient="horz" pos="5103">
+          <p15:clr>
+            <a:srgbClr val="A4A3A4"/>
+          </p15:clr>
+        </p15:guide>
+        <p15:guide id="2" pos="2880">
+          <p15:clr>
+            <a:srgbClr val="A4A3A4"/>
+          </p15:clr>
+        </p15:guide>
+      </p15:sldGuideLst>
+    </p:ext>
+  </p:extLst>
 </p:presentation>
 </file>
 
@@ -197,7 +213,7 @@
             <a:fld id="{943B0BE5-311A-4B0A-9A39-DE24DD4BA79D}" type="datetimeFigureOut">
               <a:rPr lang="en-GB" smtClean="0"/>
               <a:pPr/>
-              <a:t>09/04/2015</a:t>
+              <a:t>25/04/2016</a:t>
             </a:fld>
             <a:endParaRPr lang="en-GB"/>
           </a:p>
@@ -548,6 +564,11 @@
         </p:txBody>
       </p:sp>
     </p:spTree>
+    <p:extLst>
+      <p:ext uri="{BB962C8B-B14F-4D97-AF65-F5344CB8AC3E}">
+        <p14:creationId xmlns:p14="http://schemas.microsoft.com/office/powerpoint/2010/main" val="543247860"/>
+      </p:ext>
+    </p:extLst>
   </p:cSld>
   <p:clrMapOvr>
     <a:masterClrMapping/>
@@ -737,7 +758,7 @@
             <a:fld id="{A71EF3F3-5BE8-4F69-8C8F-88D570AA2740}" type="datetimeFigureOut">
               <a:rPr lang="en-GB" smtClean="0"/>
               <a:pPr/>
-              <a:t>09/04/2015</a:t>
+              <a:t>25/04/2016</a:t>
             </a:fld>
             <a:endParaRPr lang="en-GB"/>
           </a:p>
@@ -904,7 +925,7 @@
             <a:fld id="{A71EF3F3-5BE8-4F69-8C8F-88D570AA2740}" type="datetimeFigureOut">
               <a:rPr lang="en-GB" smtClean="0"/>
               <a:pPr/>
-              <a:t>09/04/2015</a:t>
+              <a:t>25/04/2016</a:t>
             </a:fld>
             <a:endParaRPr lang="en-GB"/>
           </a:p>
@@ -1081,7 +1102,7 @@
             <a:fld id="{A71EF3F3-5BE8-4F69-8C8F-88D570AA2740}" type="datetimeFigureOut">
               <a:rPr lang="en-GB" smtClean="0"/>
               <a:pPr/>
-              <a:t>09/04/2015</a:t>
+              <a:t>25/04/2016</a:t>
             </a:fld>
             <a:endParaRPr lang="en-GB"/>
           </a:p>
@@ -1248,7 +1269,7 @@
             <a:fld id="{A71EF3F3-5BE8-4F69-8C8F-88D570AA2740}" type="datetimeFigureOut">
               <a:rPr lang="en-GB" smtClean="0"/>
               <a:pPr/>
-              <a:t>09/04/2015</a:t>
+              <a:t>25/04/2016</a:t>
             </a:fld>
             <a:endParaRPr lang="en-GB"/>
           </a:p>
@@ -1491,7 +1512,7 @@
             <a:fld id="{A71EF3F3-5BE8-4F69-8C8F-88D570AA2740}" type="datetimeFigureOut">
               <a:rPr lang="en-GB" smtClean="0"/>
               <a:pPr/>
-              <a:t>09/04/2015</a:t>
+              <a:t>25/04/2016</a:t>
             </a:fld>
             <a:endParaRPr lang="en-GB"/>
           </a:p>
@@ -1776,7 +1797,7 @@
             <a:fld id="{A71EF3F3-5BE8-4F69-8C8F-88D570AA2740}" type="datetimeFigureOut">
               <a:rPr lang="en-GB" smtClean="0"/>
               <a:pPr/>
-              <a:t>09/04/2015</a:t>
+              <a:t>25/04/2016</a:t>
             </a:fld>
             <a:endParaRPr lang="en-GB"/>
           </a:p>
@@ -2195,7 +2216,7 @@
             <a:fld id="{A71EF3F3-5BE8-4F69-8C8F-88D570AA2740}" type="datetimeFigureOut">
               <a:rPr lang="en-GB" smtClean="0"/>
               <a:pPr/>
-              <a:t>09/04/2015</a:t>
+              <a:t>25/04/2016</a:t>
             </a:fld>
             <a:endParaRPr lang="en-GB"/>
           </a:p>
@@ -2310,7 +2331,7 @@
             <a:fld id="{A71EF3F3-5BE8-4F69-8C8F-88D570AA2740}" type="datetimeFigureOut">
               <a:rPr lang="en-GB" smtClean="0"/>
               <a:pPr/>
-              <a:t>09/04/2015</a:t>
+              <a:t>25/04/2016</a:t>
             </a:fld>
             <a:endParaRPr lang="en-GB"/>
           </a:p>
@@ -2402,7 +2423,7 @@
             <a:fld id="{A71EF3F3-5BE8-4F69-8C8F-88D570AA2740}" type="datetimeFigureOut">
               <a:rPr lang="en-GB" smtClean="0"/>
               <a:pPr/>
-              <a:t>09/04/2015</a:t>
+              <a:t>25/04/2016</a:t>
             </a:fld>
             <a:endParaRPr lang="en-GB"/>
           </a:p>
@@ -2676,7 +2697,7 @@
             <a:fld id="{A71EF3F3-5BE8-4F69-8C8F-88D570AA2740}" type="datetimeFigureOut">
               <a:rPr lang="en-GB" smtClean="0"/>
               <a:pPr/>
-              <a:t>09/04/2015</a:t>
+              <a:t>25/04/2016</a:t>
             </a:fld>
             <a:endParaRPr lang="en-GB"/>
           </a:p>
@@ -2926,7 +2947,7 @@
             <a:fld id="{A71EF3F3-5BE8-4F69-8C8F-88D570AA2740}" type="datetimeFigureOut">
               <a:rPr lang="en-GB" smtClean="0"/>
               <a:pPr/>
-              <a:t>09/04/2015</a:t>
+              <a:t>25/04/2016</a:t>
             </a:fld>
             <a:endParaRPr lang="en-GB"/>
           </a:p>
@@ -3136,7 +3157,7 @@
             <a:fld id="{A71EF3F3-5BE8-4F69-8C8F-88D570AA2740}" type="datetimeFigureOut">
               <a:rPr lang="en-GB" smtClean="0"/>
               <a:pPr/>
-              <a:t>09/04/2015</a:t>
+              <a:t>25/04/2016</a:t>
             </a:fld>
             <a:endParaRPr lang="en-GB"/>
           </a:p>
@@ -4568,14 +4589,7 @@
                 <a:latin typeface="+mj-lt"/>
                 <a:cs typeface="Courier New" pitchFamily="49" charset="0"/>
               </a:rPr>
-              <a:t> accession="</a:t>
-            </a:r>
-            <a:r>
-              <a:rPr lang="en-GB" sz="800" dirty="0" smtClean="0">
-                <a:latin typeface="+mj-lt"/>
-                <a:cs typeface="Courier New" pitchFamily="49" charset="0"/>
-              </a:rPr>
-              <a:t>MS:1002500" </a:t>
+              <a:t> accession="MS:1002500" </a:t>
             </a:r>
             <a:r>
               <a:rPr lang="en-GB" sz="800" dirty="0" err="1" smtClean="0">
@@ -4978,14 +4992,7 @@
                 <a:latin typeface="+mj-lt"/>
                 <a:cs typeface="Courier New" pitchFamily="49" charset="0"/>
               </a:rPr>
-              <a:t> accession="</a:t>
-            </a:r>
-            <a:r>
-              <a:rPr lang="en-GB" sz="800" dirty="0" smtClean="0">
-                <a:latin typeface="+mj-lt"/>
-                <a:cs typeface="Courier New" pitchFamily="49" charset="0"/>
-              </a:rPr>
-              <a:t>MS:1002520" </a:t>
+              <a:t> accession="MS:1002520" </a:t>
             </a:r>
             <a:r>
               <a:rPr lang="en-GB" sz="800" dirty="0" err="1" smtClean="0">
@@ -5098,14 +5105,7 @@
                 <a:latin typeface="+mj-lt"/>
                 <a:cs typeface="Courier New" pitchFamily="49" charset="0"/>
               </a:rPr>
-              <a:t> accession="</a:t>
-            </a:r>
-            <a:r>
-              <a:rPr lang="en-GB" sz="800" dirty="0" smtClean="0">
-                <a:latin typeface="+mj-lt"/>
-                <a:cs typeface="Courier New" pitchFamily="49" charset="0"/>
-              </a:rPr>
-              <a:t>MS:1002500" </a:t>
+              <a:t> accession="MS:1002500" </a:t>
             </a:r>
             <a:r>
               <a:rPr lang="en-GB" sz="800" dirty="0" err="1" smtClean="0">
@@ -5309,8 +5309,8 @@
         </p:nvSpPr>
         <p:spPr>
           <a:xfrm>
-            <a:off x="251520" y="972220"/>
-            <a:ext cx="7632218" cy="4924425"/>
+            <a:off x="107504" y="1044228"/>
+            <a:ext cx="7632218" cy="4761820"/>
           </a:xfrm>
           <a:prstGeom prst="rect">
             <a:avLst/>
@@ -5325,7 +5325,7 @@
         </p:spPr>
         <p:txBody>
           <a:bodyPr wrap="none" rtlCol="0">
-            <a:spAutoFit/>
+            <a:noAutofit/>
           </a:bodyPr>
           <a:lstStyle/>
           <a:p>
@@ -6279,7 +6279,7 @@
         </p:nvSpPr>
         <p:spPr>
           <a:xfrm>
-            <a:off x="4752528" y="1840324"/>
+            <a:off x="4608512" y="1984339"/>
             <a:ext cx="317716" cy="369332"/>
           </a:xfrm>
           <a:prstGeom prst="rect">
@@ -6309,7 +6309,7 @@
         </p:nvSpPr>
         <p:spPr>
           <a:xfrm>
-            <a:off x="5040560" y="5008676"/>
+            <a:off x="4896544" y="5152691"/>
             <a:ext cx="309700" cy="369332"/>
           </a:xfrm>
           <a:prstGeom prst="rect">
@@ -6339,7 +6339,7 @@
         </p:nvSpPr>
         <p:spPr>
           <a:xfrm>
-            <a:off x="4553744" y="5292700"/>
+            <a:off x="4409728" y="5436715"/>
             <a:ext cx="308098" cy="369332"/>
           </a:xfrm>
           <a:prstGeom prst="rect">
@@ -6460,13 +6460,13 @@
           <p:nvPr>
             <p:extLst>
               <p:ext uri="{D42A27DB-BD31-4B8C-83A1-F6EECF244321}">
-                <p14:modId xmlns:p14="http://schemas.microsoft.com/office/powerpoint/2010/main" val="2574417118"/>
+                <p14:modId xmlns:p14="http://schemas.microsoft.com/office/powerpoint/2010/main" val="3591021730"/>
               </p:ext>
             </p:extLst>
           </p:nvPr>
         </p:nvGraphicFramePr>
         <p:xfrm>
-          <a:off x="251520" y="9185140"/>
+          <a:off x="179512" y="8749084"/>
           <a:ext cx="8640960" cy="3845560"/>
         </p:xfrm>
         <a:graphic>
@@ -6905,7 +6905,7 @@
         </p:nvSpPr>
         <p:spPr>
           <a:xfrm>
-            <a:off x="323528" y="2772420"/>
+            <a:off x="323528" y="2628404"/>
             <a:ext cx="5832648" cy="2308324"/>
           </a:xfrm>
           <a:prstGeom prst="rect">
@@ -7093,14 +7093,7 @@
                 <a:latin typeface="Courier New" pitchFamily="49" charset="0"/>
                 <a:cs typeface="Courier New" pitchFamily="49" charset="0"/>
               </a:rPr>
-              <a:t>  </a:t>
-            </a:r>
-            <a:r>
-              <a:rPr lang="en-GB" sz="800" dirty="0" smtClean="0">
-                <a:latin typeface="Courier New" pitchFamily="49" charset="0"/>
-                <a:cs typeface="Courier New" pitchFamily="49" charset="0"/>
-              </a:rPr>
-              <a:t>&lt;/Peptide&gt;  </a:t>
+              <a:t>  &lt;/Peptide&gt;  </a:t>
             </a:r>
           </a:p>
           <a:p>
@@ -7303,21 +7296,7 @@
                 <a:latin typeface="Courier New" pitchFamily="49" charset="0"/>
                 <a:cs typeface="Courier New" pitchFamily="49" charset="0"/>
               </a:rPr>
-              <a:t>="79.966331" location</a:t>
-            </a:r>
-            <a:r>
-              <a:rPr lang="en-GB" sz="800" dirty="0" smtClean="0">
-                <a:latin typeface="Courier New" pitchFamily="49" charset="0"/>
-                <a:cs typeface="Courier New" pitchFamily="49" charset="0"/>
-              </a:rPr>
-              <a:t>="8" </a:t>
-            </a:r>
-            <a:r>
-              <a:rPr lang="en-GB" sz="800" dirty="0" smtClean="0">
-                <a:latin typeface="Courier New" pitchFamily="49" charset="0"/>
-                <a:cs typeface="Courier New" pitchFamily="49" charset="0"/>
-              </a:rPr>
-              <a:t>residues="Y"&gt;</a:t>
+              <a:t>="79.966331" location="8" residues="Y"&gt;</a:t>
             </a:r>
           </a:p>
           <a:p>
@@ -7440,8 +7419,8 @@
         </p:nvSpPr>
         <p:spPr>
           <a:xfrm>
-            <a:off x="323528" y="5220692"/>
-            <a:ext cx="6408712" cy="3416320"/>
+            <a:off x="323528" y="5071105"/>
+            <a:ext cx="6408712" cy="2062103"/>
           </a:xfrm>
           <a:prstGeom prst="rect">
             <a:avLst/>
@@ -7478,7 +7457,7 @@
             </a:r>
             <a:r>
               <a:rPr lang="en-GB" sz="800" dirty="0"/>
-              <a:t>="SID_1" </a:t>
+              <a:t>="qExactive01819.mgf" </a:t>
             </a:r>
             <a:r>
               <a:rPr lang="en-GB" sz="800" dirty="0" err="1"/>
@@ -7486,14 +7465,13 @@
             </a:r>
             <a:r>
               <a:rPr lang="en-GB" sz="800" dirty="0"/>
-              <a:t>="index=137" id="SIR_1"&gt;</a:t>
-            </a:r>
-            <a:br>
-              <a:rPr lang="en-GB" sz="800" dirty="0"/>
-            </a:br>
-            <a:r>
-              <a:rPr lang="en-GB" sz="800" dirty="0"/>
-              <a:t>        &lt;</a:t>
+              <a:t>="index=2727" id="SIR_4207"&gt;</a:t>
+            </a:r>
+          </a:p>
+          <a:p>
+            <a:r>
+              <a:rPr lang="en-GB" sz="800" dirty="0"/>
+              <a:t>  &lt;</a:t>
             </a:r>
             <a:r>
               <a:rPr lang="en-GB" sz="800" dirty="0" err="1"/>
@@ -7509,7 +7487,7 @@
             </a:r>
             <a:r>
               <a:rPr lang="en-GB" sz="800" dirty="0"/>
-              <a:t>="false" rank="1" </a:t>
+              <a:t>="true" rank="1"  </a:t>
             </a:r>
             <a:r>
               <a:rPr lang="en-GB" sz="800" dirty="0" err="1"/>
@@ -7517,7 +7495,13 @@
             </a:r>
             <a:r>
               <a:rPr lang="en-GB" sz="800" dirty="0"/>
-              <a:t>="KYYGNVVYYIGER_p@2|3" </a:t>
+              <a:t>="DNSTMGYMMAK_15.99491461956_15.99491461956" </a:t>
+            </a:r>
+          </a:p>
+          <a:p>
+            <a:r>
+              <a:rPr lang="en-GB" sz="800" dirty="0"/>
+              <a:t>      </a:t>
             </a:r>
             <a:r>
               <a:rPr lang="en-GB" sz="800" dirty="0" err="1"/>
@@ -7525,7 +7509,7 @@
             </a:r>
             <a:r>
               <a:rPr lang="en-GB" sz="800" dirty="0"/>
-              <a:t>="582.954" </a:t>
+              <a:t>="640.751423992447"  </a:t>
             </a:r>
             <a:r>
               <a:rPr lang="en-GB" sz="800" dirty="0" err="1"/>
@@ -7533,7 +7517,13 @@
             </a:r>
             <a:r>
               <a:rPr lang="en-GB" sz="800" dirty="0"/>
-              <a:t>="582.931" </a:t>
+              <a:t>="640.751992494115" </a:t>
+            </a:r>
+          </a:p>
+          <a:p>
+            <a:r>
+              <a:rPr lang="en-GB" sz="800" dirty="0"/>
+              <a:t>      </a:t>
             </a:r>
             <a:r>
               <a:rPr lang="en-GB" sz="800" dirty="0" err="1"/>
@@ -7541,14 +7531,13 @@
             </a:r>
             <a:r>
               <a:rPr lang="en-GB" sz="800" dirty="0"/>
-              <a:t>="3" id="SII_1_1"&gt;</a:t>
-            </a:r>
-            <a:br>
-              <a:rPr lang="en-GB" sz="800" dirty="0"/>
-            </a:br>
-            <a:r>
-              <a:rPr lang="en-GB" sz="800" dirty="0"/>
-              <a:t>            &lt;</a:t>
+              <a:t>="2" id="SII_4207_1"&gt;</a:t>
+            </a:r>
+          </a:p>
+          <a:p>
+            <a:r>
+              <a:rPr lang="en-GB" sz="800" dirty="0"/>
+              <a:t>    &lt;</a:t>
             </a:r>
             <a:r>
               <a:rPr lang="en-GB" sz="800" dirty="0" err="1"/>
@@ -7564,14 +7553,13 @@
             </a:r>
             <a:r>
               <a:rPr lang="en-GB" sz="800" dirty="0"/>
-              <a:t>="PE1_2_0"/&gt;</a:t>
-            </a:r>
-            <a:br>
-              <a:rPr lang="en-GB" sz="800" dirty="0"/>
-            </a:br>
-            <a:r>
-              <a:rPr lang="en-GB" sz="800" dirty="0"/>
-              <a:t>            &lt;</a:t>
+              <a:t>="PepEv_9145"/&gt;</a:t>
+            </a:r>
+          </a:p>
+          <a:p>
+            <a:r>
+              <a:rPr lang="en-GB" sz="800" dirty="0"/>
+              <a:t>    &lt;</a:t>
             </a:r>
             <a:r>
               <a:rPr lang="en-GB" sz="800" dirty="0" err="1"/>
@@ -7579,7 +7567,7 @@
             </a:r>
             <a:r>
               <a:rPr lang="en-GB" sz="800" dirty="0"/>
-              <a:t> accession="MS:1001328" </a:t>
+              <a:t> </a:t>
             </a:r>
             <a:r>
               <a:rPr lang="en-GB" sz="800" dirty="0" err="1"/>
@@ -7587,22 +7575,21 @@
             </a:r>
             <a:r>
               <a:rPr lang="en-GB" sz="800" dirty="0"/>
-              <a:t>="PSI-MS" value="0.0560993822629918" name="</a:t>
+              <a:t>="PSI-MS" accession="MS:1001969" name="</a:t>
             </a:r>
             <a:r>
               <a:rPr lang="en-GB" sz="800" dirty="0" err="1"/>
-              <a:t>OMSSA:evalue</a:t>
-            </a:r>
-            <a:r>
-              <a:rPr lang="en-GB" sz="800" dirty="0"/>
-              <a:t>"/&gt;</a:t>
-            </a:r>
-            <a:br>
-              <a:rPr lang="en-GB" sz="800" dirty="0"/>
-            </a:br>
-            <a:r>
-              <a:rPr lang="en-GB" sz="800" dirty="0"/>
-              <a:t>            &lt;</a:t>
+              <a:t>phosphoRS</a:t>
+            </a:r>
+            <a:r>
+              <a:rPr lang="en-GB" sz="800" dirty="0"/>
+              <a:t> score" value="1:66.66666666:5:false"/&gt;</a:t>
+            </a:r>
+          </a:p>
+          <a:p>
+            <a:r>
+              <a:rPr lang="en-GB" sz="800" dirty="0"/>
+              <a:t>    &lt;</a:t>
             </a:r>
             <a:r>
               <a:rPr lang="en-GB" sz="800" dirty="0" err="1"/>
@@ -7610,7 +7597,7 @@
             </a:r>
             <a:r>
               <a:rPr lang="en-GB" sz="800" dirty="0"/>
-              <a:t> accession="MS:1001329" </a:t>
+              <a:t> </a:t>
             </a:r>
             <a:r>
               <a:rPr lang="en-GB" sz="800" dirty="0" err="1"/>
@@ -7618,22 +7605,21 @@
             </a:r>
             <a:r>
               <a:rPr lang="en-GB" sz="800" dirty="0"/>
-              <a:t>="PSI-MS" value="1.34757103682421E-5" name="</a:t>
+              <a:t>="PSI-MS" accession="MS:1001969" name="</a:t>
             </a:r>
             <a:r>
               <a:rPr lang="en-GB" sz="800" dirty="0" err="1"/>
-              <a:t>OMSSA:pvalue</a:t>
-            </a:r>
-            <a:r>
-              <a:rPr lang="en-GB" sz="800" dirty="0"/>
-              <a:t>"/&gt;</a:t>
-            </a:r>
-            <a:br>
-              <a:rPr lang="en-GB" sz="800" dirty="0"/>
-            </a:br>
-            <a:r>
-              <a:rPr lang="en-GB" sz="800" dirty="0"/>
-              <a:t>            &lt;</a:t>
+              <a:t>phosphoRS</a:t>
+            </a:r>
+            <a:r>
+              <a:rPr lang="en-GB" sz="800" dirty="0"/>
+              <a:t> score" value="1:66.66666666:8:false"/&gt;</a:t>
+            </a:r>
+          </a:p>
+          <a:p>
+            <a:r>
+              <a:rPr lang="en-GB" sz="800" dirty="0"/>
+              <a:t>    &lt;</a:t>
             </a:r>
             <a:r>
               <a:rPr lang="en-GB" sz="800" dirty="0" err="1"/>
@@ -7641,7 +7627,7 @@
             </a:r>
             <a:r>
               <a:rPr lang="en-GB" sz="800" dirty="0"/>
-              <a:t> accession="MS:1002380" </a:t>
+              <a:t> </a:t>
             </a:r>
             <a:r>
               <a:rPr lang="en-GB" sz="800" dirty="0" err="1"/>
@@ -7649,30 +7635,31 @@
             </a:r>
             <a:r>
               <a:rPr lang="en-GB" sz="800" dirty="0"/>
-              <a:t>="PSI-MS" value="</a:t>
-            </a:r>
+              <a:t>="PSI-MS" accession="MS:1001969" name="</a:t>
+            </a:r>
+            <a:r>
+              <a:rPr lang="en-GB" sz="800" dirty="0" err="1"/>
+              <a:t>phosphoRS</a:t>
+            </a:r>
+            <a:r>
+              <a:rPr lang="en-GB" sz="800" dirty="0"/>
+              <a:t> score" value="1:66.66666666:9:false"/&gt;</a:t>
+            </a:r>
+          </a:p>
+          <a:p>
             <a:r>
               <a:rPr lang="en-GB" sz="800" dirty="0" smtClean="0"/>
-              <a:t>1:0.03:2|3:true</a:t>
-            </a:r>
-            <a:r>
-              <a:rPr lang="en-GB" sz="800" dirty="0"/>
-              <a:t>" name</a:t>
+              <a:t>    </a:t>
+            </a:r>
+          </a:p>
+          <a:p>
+            <a:r>
+              <a:rPr lang="en-GB" sz="800" dirty="0"/>
+              <a:t> </a:t>
             </a:r>
             <a:r>
               <a:rPr lang="en-GB" sz="800" dirty="0" smtClean="0"/>
-              <a:t>="modification rescored by false localization rate"/&gt; </a:t>
-            </a:r>
-            <a:r>
-              <a:rPr lang="en-GB" sz="800" dirty="0"/>
-              <a:t/>
-            </a:r>
-            <a:br>
-              <a:rPr lang="en-GB" sz="800" dirty="0"/>
-            </a:br>
-            <a:r>
-              <a:rPr lang="en-GB" sz="800" dirty="0"/>
-              <a:t>            &lt;</a:t>
+              <a:t>   &lt;</a:t>
             </a:r>
             <a:r>
               <a:rPr lang="en-GB" sz="800" dirty="0" err="1"/>
@@ -7680,7 +7667,7 @@
             </a:r>
             <a:r>
               <a:rPr lang="en-GB" sz="800" dirty="0"/>
-              <a:t> accession="MS:1002380" </a:t>
+              <a:t> </a:t>
             </a:r>
             <a:r>
               <a:rPr lang="en-GB" sz="800" dirty="0" err="1"/>
@@ -7688,44 +7675,13 @@
             </a:r>
             <a:r>
               <a:rPr lang="en-GB" sz="800" dirty="0"/>
-              <a:t>="PSI-MS" value="</a:t>
-            </a:r>
-            <a:r>
-              <a:rPr lang="en-GB" sz="800" dirty="0" smtClean="0"/>
-              <a:t>1:0.97:8|9:false</a:t>
-            </a:r>
-            <a:r>
-              <a:rPr lang="en-GB" sz="800" dirty="0"/>
-              <a:t>" name</a:t>
-            </a:r>
-            <a:r>
-              <a:rPr lang="en-GB" sz="800" dirty="0" smtClean="0"/>
-              <a:t>="modification rescored by false localization rate"/&gt; </a:t>
-            </a:r>
-            <a:r>
-              <a:rPr lang="en-GB" sz="800" dirty="0"/>
-              <a:t/>
-            </a:r>
-            <a:br>
-              <a:rPr lang="en-GB" sz="800" dirty="0"/>
-            </a:br>
-            <a:r>
-              <a:rPr lang="en-GB" sz="800" dirty="0"/>
-              <a:t>            &lt;!-- </a:t>
-            </a:r>
-            <a:br>
-              <a:rPr lang="en-GB" sz="800" dirty="0"/>
-            </a:br>
-            <a:r>
-              <a:rPr lang="en-GB" sz="800" dirty="0"/>
-              <a:t>            Example alternative if position 2 had more evidence than position 3:</a:t>
-            </a:r>
-            <a:br>
-              <a:rPr lang="en-GB" sz="800" dirty="0"/>
-            </a:br>
-            <a:r>
-              <a:rPr lang="en-GB" sz="800" dirty="0"/>
-              <a:t>            &lt;</a:t>
+              <a:t>="PSI-MS" accession="MS:1002539" name="D-score" value="1:62.37587272987858:5:false"/&gt;</a:t>
+            </a:r>
+          </a:p>
+          <a:p>
+            <a:r>
+              <a:rPr lang="en-GB" sz="800" dirty="0"/>
+              <a:t>    &lt;</a:t>
             </a:r>
             <a:r>
               <a:rPr lang="en-GB" sz="800" dirty="0" err="1"/>
@@ -7733,7 +7689,7 @@
             </a:r>
             <a:r>
               <a:rPr lang="en-GB" sz="800" dirty="0"/>
-              <a:t> accession="MS:1002380" </a:t>
+              <a:t> </a:t>
             </a:r>
             <a:r>
               <a:rPr lang="en-GB" sz="800" dirty="0" err="1"/>
@@ -7741,30 +7697,13 @@
             </a:r>
             <a:r>
               <a:rPr lang="en-GB" sz="800" dirty="0"/>
-              <a:t>="PSI-MS" value="</a:t>
-            </a:r>
-            <a:r>
-              <a:rPr lang="en-GB" sz="800" dirty="0" smtClean="0"/>
-              <a:t>1:0.01:2:true</a:t>
-            </a:r>
-            <a:r>
-              <a:rPr lang="en-GB" sz="800" dirty="0"/>
-              <a:t>" name</a:t>
-            </a:r>
-            <a:r>
-              <a:rPr lang="en-GB" sz="800" dirty="0" smtClean="0"/>
-              <a:t>="modification rescored by false localization rate"/&gt; </a:t>
-            </a:r>
-            <a:r>
-              <a:rPr lang="en-GB" sz="800" dirty="0"/>
-              <a:t/>
-            </a:r>
-            <a:br>
-              <a:rPr lang="en-GB" sz="800" dirty="0"/>
-            </a:br>
-            <a:r>
-              <a:rPr lang="en-GB" sz="800" dirty="0"/>
-              <a:t>            &lt;</a:t>
+              <a:t>="PSI-MS" accession="MS:1002539" name="D-score" value="1:14.141586139372523:8:false"/&gt;</a:t>
+            </a:r>
+          </a:p>
+          <a:p>
+            <a:r>
+              <a:rPr lang="en-GB" sz="800" dirty="0"/>
+              <a:t>    &lt;</a:t>
             </a:r>
             <a:r>
               <a:rPr lang="en-GB" sz="800" dirty="0" err="1"/>
@@ -7772,7 +7711,7 @@
             </a:r>
             <a:r>
               <a:rPr lang="en-GB" sz="800" dirty="0"/>
-              <a:t> accession="MS:1002380" </a:t>
+              <a:t> </a:t>
             </a:r>
             <a:r>
               <a:rPr lang="en-GB" sz="800" dirty="0" err="1"/>
@@ -7780,37 +7719,19 @@
             </a:r>
             <a:r>
               <a:rPr lang="en-GB" sz="800" dirty="0"/>
-              <a:t>="PSI-MS" value="</a:t>
-            </a:r>
-            <a:r>
-              <a:rPr lang="en-GB" sz="800" dirty="0" smtClean="0"/>
-              <a:t>1:0.4:3:true</a:t>
-            </a:r>
-            <a:r>
-              <a:rPr lang="en-GB" sz="800" dirty="0"/>
-              <a:t>" name</a:t>
-            </a:r>
-            <a:r>
-              <a:rPr lang="en-GB" sz="800" dirty="0" smtClean="0"/>
-              <a:t>="modification rescored by false localization rate"/&gt;</a:t>
-            </a:r>
-            <a:r>
-              <a:rPr lang="en-GB" sz="800" dirty="0"/>
-              <a:t/>
-            </a:r>
-            <a:br>
-              <a:rPr lang="en-GB" sz="800" dirty="0"/>
-            </a:br>
-            <a:r>
-              <a:rPr lang="en-GB" sz="800" dirty="0"/>
-              <a:t>            --&gt;         </a:t>
-            </a:r>
-            <a:br>
-              <a:rPr lang="en-GB" sz="800" dirty="0"/>
-            </a:br>
-            <a:r>
-              <a:rPr lang="en-GB" sz="800" dirty="0"/>
-              <a:t>        &lt;/</a:t>
+              <a:t>="PSI-MS" accession="MS:1002539" name="D-score" value="1:36.626793239964236:9:false"/&gt;</a:t>
+            </a:r>
+          </a:p>
+          <a:p>
+            <a:r>
+              <a:rPr lang="en-GB" sz="800" dirty="0"/>
+              <a:t>    &lt;!--  Other PSM-level scores not shown...  --&gt;</a:t>
+            </a:r>
+          </a:p>
+          <a:p>
+            <a:r>
+              <a:rPr lang="en-GB" sz="800" dirty="0"/>
+              <a:t>  &lt;/</a:t>
             </a:r>
             <a:r>
               <a:rPr lang="en-GB" sz="800" dirty="0" err="1"/>
@@ -7818,37 +7739,19 @@
             </a:r>
             <a:r>
               <a:rPr lang="en-GB" sz="800" dirty="0"/>
-              <a:t>&gt;      </a:t>
-            </a:r>
-            <a:br>
-              <a:rPr lang="en-GB" sz="800" dirty="0"/>
-            </a:br>
-            <a:r>
-              <a:rPr lang="en-GB" sz="800" dirty="0"/>
-              <a:t>        &lt;</a:t>
-            </a:r>
-            <a:r>
-              <a:rPr lang="en-GB" sz="800" dirty="0" err="1"/>
-              <a:t>cvParam</a:t>
-            </a:r>
-            <a:r>
-              <a:rPr lang="en-GB" sz="800" dirty="0"/>
-              <a:t> accession="MS:1000796" </a:t>
-            </a:r>
-            <a:r>
-              <a:rPr lang="en-GB" sz="800" dirty="0" err="1"/>
-              <a:t>cvRef</a:t>
-            </a:r>
-            <a:r>
-              <a:rPr lang="en-GB" sz="800" dirty="0"/>
-              <a:t>="PSI-MS" value="55.574.579.3.dta" name="spectrum title"/&gt;</a:t>
-            </a:r>
-            <a:br>
-              <a:rPr lang="en-GB" sz="800" dirty="0"/>
-            </a:br>
-            <a:r>
-              <a:rPr lang="en-GB" sz="800" dirty="0"/>
-              <a:t>    &lt;/</a:t>
+              <a:t>&gt;</a:t>
+            </a:r>
+          </a:p>
+          <a:p>
+            <a:r>
+              <a:rPr lang="en-GB" sz="800" dirty="0"/>
+              <a:t>  &lt;!--  Other ranked identifications not shown...  --&gt;</a:t>
+            </a:r>
+          </a:p>
+          <a:p>
+            <a:r>
+              <a:rPr lang="en-GB" sz="800" dirty="0"/>
+              <a:t>&lt;/</a:t>
             </a:r>
             <a:r>
               <a:rPr lang="en-GB" sz="800" dirty="0" err="1"/>
@@ -7858,312 +7761,6 @@
               <a:rPr lang="en-GB" sz="800" dirty="0"/>
               <a:t>&gt;</a:t>
             </a:r>
-            <a:br>
-              <a:rPr lang="en-GB" sz="800" dirty="0"/>
-            </a:br>
-            <a:r>
-              <a:rPr lang="en-GB" sz="800" dirty="0"/>
-              <a:t>    &lt;</a:t>
-            </a:r>
-            <a:r>
-              <a:rPr lang="en-GB" sz="800" dirty="0" err="1"/>
-              <a:t>SpectrumIdentificationResult</a:t>
-            </a:r>
-            <a:r>
-              <a:rPr lang="en-GB" sz="800" dirty="0"/>
-              <a:t> </a:t>
-            </a:r>
-            <a:r>
-              <a:rPr lang="en-GB" sz="800" dirty="0" err="1"/>
-              <a:t>spectraData_ref</a:t>
-            </a:r>
-            <a:r>
-              <a:rPr lang="en-GB" sz="800" dirty="0"/>
-              <a:t>="SID_1" </a:t>
-            </a:r>
-            <a:r>
-              <a:rPr lang="en-GB" sz="800" dirty="0" err="1"/>
-              <a:t>spectrumID</a:t>
-            </a:r>
-            <a:r>
-              <a:rPr lang="en-GB" sz="800" dirty="0"/>
-              <a:t>="index=136" id="SIR_2"&gt;</a:t>
-            </a:r>
-            <a:br>
-              <a:rPr lang="en-GB" sz="800" dirty="0"/>
-            </a:br>
-            <a:r>
-              <a:rPr lang="en-GB" sz="800" dirty="0"/>
-              <a:t>        &lt;</a:t>
-            </a:r>
-            <a:r>
-              <a:rPr lang="en-GB" sz="800" dirty="0" err="1"/>
-              <a:t>SpectrumIdentificationItem</a:t>
-            </a:r>
-            <a:r>
-              <a:rPr lang="en-GB" sz="800" dirty="0"/>
-              <a:t> </a:t>
-            </a:r>
-            <a:r>
-              <a:rPr lang="en-GB" sz="800" dirty="0" err="1"/>
-              <a:t>passThreshold</a:t>
-            </a:r>
-            <a:r>
-              <a:rPr lang="en-GB" sz="800" dirty="0"/>
-              <a:t>="false" rank="1" </a:t>
-            </a:r>
-            <a:r>
-              <a:rPr lang="en-GB" sz="800" dirty="0" err="1"/>
-              <a:t>peptide_ref</a:t>
-            </a:r>
-            <a:r>
-              <a:rPr lang="en-GB" sz="800" dirty="0"/>
-              <a:t>="KYYGNVVYYIGER_p@2|3_p@8|9" </a:t>
-            </a:r>
-            <a:r>
-              <a:rPr lang="en-GB" sz="800" dirty="0" err="1"/>
-              <a:t>calculatedMassToCharge</a:t>
-            </a:r>
-            <a:r>
-              <a:rPr lang="en-GB" sz="800" dirty="0"/>
-              <a:t>="588.316" </a:t>
-            </a:r>
-            <a:r>
-              <a:rPr lang="en-GB" sz="800" dirty="0" err="1"/>
-              <a:t>experimentalMassToCharge</a:t>
-            </a:r>
-            <a:r>
-              <a:rPr lang="en-GB" sz="800" dirty="0"/>
-              <a:t>="588.4" </a:t>
-            </a:r>
-            <a:r>
-              <a:rPr lang="en-GB" sz="800" dirty="0" err="1"/>
-              <a:t>chargeState</a:t>
-            </a:r>
-            <a:r>
-              <a:rPr lang="en-GB" sz="800" dirty="0"/>
-              <a:t>="3" id="SII_2_1"&gt;</a:t>
-            </a:r>
-            <a:br>
-              <a:rPr lang="en-GB" sz="800" dirty="0"/>
-            </a:br>
-            <a:r>
-              <a:rPr lang="en-GB" sz="800" dirty="0"/>
-              <a:t>            &lt;</a:t>
-            </a:r>
-            <a:r>
-              <a:rPr lang="en-GB" sz="800" dirty="0" err="1"/>
-              <a:t>PeptideEvidenceRef</a:t>
-            </a:r>
-            <a:r>
-              <a:rPr lang="en-GB" sz="800" dirty="0"/>
-              <a:t> </a:t>
-            </a:r>
-            <a:r>
-              <a:rPr lang="en-GB" sz="800" dirty="0" err="1"/>
-              <a:t>peptideEvidence_ref</a:t>
-            </a:r>
-            <a:r>
-              <a:rPr lang="en-GB" sz="800" dirty="0"/>
-              <a:t>="PE2_2_4"/&gt;</a:t>
-            </a:r>
-            <a:br>
-              <a:rPr lang="en-GB" sz="800" dirty="0"/>
-            </a:br>
-            <a:r>
-              <a:rPr lang="en-GB" sz="800" dirty="0"/>
-              <a:t>            &lt;</a:t>
-            </a:r>
-            <a:r>
-              <a:rPr lang="en-GB" sz="800" dirty="0" err="1"/>
-              <a:t>cvParam</a:t>
-            </a:r>
-            <a:r>
-              <a:rPr lang="en-GB" sz="800" dirty="0"/>
-              <a:t> accession="MS:1001328" </a:t>
-            </a:r>
-            <a:r>
-              <a:rPr lang="en-GB" sz="800" dirty="0" err="1"/>
-              <a:t>cvRef</a:t>
-            </a:r>
-            <a:r>
-              <a:rPr lang="en-GB" sz="800" dirty="0"/>
-              <a:t>="PSI-MS" value="5.92798649659846" name="</a:t>
-            </a:r>
-            <a:r>
-              <a:rPr lang="en-GB" sz="800" dirty="0" err="1"/>
-              <a:t>OMSSA:evalue</a:t>
-            </a:r>
-            <a:r>
-              <a:rPr lang="en-GB" sz="800" dirty="0"/>
-              <a:t>"/&gt;</a:t>
-            </a:r>
-            <a:br>
-              <a:rPr lang="en-GB" sz="800" dirty="0"/>
-            </a:br>
-            <a:r>
-              <a:rPr lang="en-GB" sz="800" dirty="0"/>
-              <a:t>            &lt;</a:t>
-            </a:r>
-            <a:r>
-              <a:rPr lang="en-GB" sz="800" dirty="0" err="1"/>
-              <a:t>cvParam</a:t>
-            </a:r>
-            <a:r>
-              <a:rPr lang="en-GB" sz="800" dirty="0"/>
-              <a:t> accession="MS:1001329" </a:t>
-            </a:r>
-            <a:r>
-              <a:rPr lang="en-GB" sz="800" dirty="0" err="1"/>
-              <a:t>cvRef</a:t>
-            </a:r>
-            <a:r>
-              <a:rPr lang="en-GB" sz="800" dirty="0"/>
-              <a:t>="PSI-MS" value="0.00145794060418064" name="</a:t>
-            </a:r>
-            <a:r>
-              <a:rPr lang="en-GB" sz="800" dirty="0" err="1"/>
-              <a:t>OMSSA:pvalue</a:t>
-            </a:r>
-            <a:r>
-              <a:rPr lang="en-GB" sz="800" dirty="0"/>
-              <a:t>"/&gt;</a:t>
-            </a:r>
-            <a:br>
-              <a:rPr lang="en-GB" sz="800" dirty="0"/>
-            </a:br>
-            <a:r>
-              <a:rPr lang="en-GB" sz="800" dirty="0"/>
-              <a:t>            &lt;</a:t>
-            </a:r>
-            <a:r>
-              <a:rPr lang="en-GB" sz="800" dirty="0" err="1"/>
-              <a:t>cvParam</a:t>
-            </a:r>
-            <a:r>
-              <a:rPr lang="en-GB" sz="800" dirty="0"/>
-              <a:t> accession="MS:1002380" </a:t>
-            </a:r>
-            <a:r>
-              <a:rPr lang="en-GB" sz="800" dirty="0" err="1"/>
-              <a:t>cvRef</a:t>
-            </a:r>
-            <a:r>
-              <a:rPr lang="en-GB" sz="800" dirty="0"/>
-              <a:t>="PSI-MS" value="</a:t>
-            </a:r>
-            <a:r>
-              <a:rPr lang="en-GB" sz="800" dirty="0" smtClean="0"/>
-              <a:t>1:0.03:2|3:true</a:t>
-            </a:r>
-            <a:r>
-              <a:rPr lang="en-GB" sz="800" dirty="0"/>
-              <a:t>" name</a:t>
-            </a:r>
-            <a:r>
-              <a:rPr lang="en-GB" sz="800" dirty="0" smtClean="0"/>
-              <a:t>="modification rescored by false localization rate"/&gt; </a:t>
-            </a:r>
-            <a:r>
-              <a:rPr lang="en-GB" sz="800" dirty="0"/>
-              <a:t/>
-            </a:r>
-            <a:br>
-              <a:rPr lang="en-GB" sz="800" dirty="0"/>
-            </a:br>
-            <a:r>
-              <a:rPr lang="en-GB" sz="800" dirty="0"/>
-              <a:t>            &lt;</a:t>
-            </a:r>
-            <a:r>
-              <a:rPr lang="en-GB" sz="800" dirty="0" err="1"/>
-              <a:t>cvParam</a:t>
-            </a:r>
-            <a:r>
-              <a:rPr lang="en-GB" sz="800" dirty="0"/>
-              <a:t> accession="MS:1002380" </a:t>
-            </a:r>
-            <a:r>
-              <a:rPr lang="en-GB" sz="800" dirty="0" err="1"/>
-              <a:t>cvRef</a:t>
-            </a:r>
-            <a:r>
-              <a:rPr lang="en-GB" sz="800" dirty="0"/>
-              <a:t>="PSI-MS" value="</a:t>
-            </a:r>
-            <a:r>
-              <a:rPr lang="en-GB" sz="800" dirty="0" smtClean="0"/>
-              <a:t>2:0.01:8|9:true</a:t>
-            </a:r>
-            <a:r>
-              <a:rPr lang="en-GB" sz="800" dirty="0"/>
-              <a:t>" name</a:t>
-            </a:r>
-            <a:r>
-              <a:rPr lang="en-GB" sz="800" dirty="0" smtClean="0"/>
-              <a:t>="modification rescored by false localization rate"/&gt;</a:t>
-            </a:r>
-            <a:r>
-              <a:rPr lang="en-GB" sz="800" dirty="0"/>
-              <a:t/>
-            </a:r>
-            <a:br>
-              <a:rPr lang="en-GB" sz="800" dirty="0"/>
-            </a:br>
-            <a:r>
-              <a:rPr lang="en-GB" sz="800" dirty="0"/>
-              <a:t>        &lt;/</a:t>
-            </a:r>
-            <a:r>
-              <a:rPr lang="en-GB" sz="800" dirty="0" err="1"/>
-              <a:t>SpectrumIdentificationItem</a:t>
-            </a:r>
-            <a:r>
-              <a:rPr lang="en-GB" sz="800" dirty="0"/>
-              <a:t>&gt;</a:t>
-            </a:r>
-            <a:br>
-              <a:rPr lang="en-GB" sz="800" dirty="0"/>
-            </a:br>
-            <a:r>
-              <a:rPr lang="en-GB" sz="800" dirty="0"/>
-              <a:t>        &lt;</a:t>
-            </a:r>
-            <a:r>
-              <a:rPr lang="en-GB" sz="800" dirty="0" err="1"/>
-              <a:t>cvParam</a:t>
-            </a:r>
-            <a:r>
-              <a:rPr lang="en-GB" sz="800" dirty="0"/>
-              <a:t> accession="MS:1000796" </a:t>
-            </a:r>
-            <a:r>
-              <a:rPr lang="en-GB" sz="800" dirty="0" err="1"/>
-              <a:t>cvRef</a:t>
-            </a:r>
-            <a:r>
-              <a:rPr lang="en-GB" sz="800" dirty="0"/>
-              <a:t>="PSI-MS" value="55.567.572.3.dta" name="spectrum title"/&gt;</a:t>
-            </a:r>
-            <a:br>
-              <a:rPr lang="en-GB" sz="800" dirty="0"/>
-            </a:br>
-            <a:r>
-              <a:rPr lang="en-GB" sz="800" dirty="0"/>
-              <a:t>    &lt;/</a:t>
-            </a:r>
-            <a:r>
-              <a:rPr lang="en-GB" sz="800" dirty="0" err="1"/>
-              <a:t>SpectrumIdentificationResult</a:t>
-            </a:r>
-            <a:r>
-              <a:rPr lang="en-GB" sz="800" dirty="0"/>
-              <a:t>&gt;</a:t>
-            </a:r>
-            <a:endParaRPr lang="en-GB" sz="800" dirty="0" smtClean="0">
-              <a:latin typeface="Courier New" pitchFamily="49" charset="0"/>
-              <a:cs typeface="Courier New" pitchFamily="49" charset="0"/>
-            </a:endParaRPr>
           </a:p>
         </p:txBody>
       </p:sp>
@@ -8176,13 +7773,13 @@
           <p:nvPr>
             <p:extLst>
               <p:ext uri="{D42A27DB-BD31-4B8C-83A1-F6EECF244321}">
-                <p14:modId xmlns:p14="http://schemas.microsoft.com/office/powerpoint/2010/main" val="3296369240"/>
+                <p14:modId xmlns:p14="http://schemas.microsoft.com/office/powerpoint/2010/main" val="978503157"/>
               </p:ext>
             </p:extLst>
           </p:nvPr>
         </p:nvGraphicFramePr>
         <p:xfrm>
-          <a:off x="251520" y="9253140"/>
+          <a:off x="423291" y="8104034"/>
           <a:ext cx="6516217" cy="5405120"/>
         </p:xfrm>
         <a:graphic>
@@ -8413,23 +8010,7 @@
                             <a:schemeClr val="tx1"/>
                           </a:solidFill>
                         </a:rPr>
-                        <a:t> </a:t>
-                      </a:r>
-                      <a:r>
-                        <a:rPr lang="en-GB" sz="1200" baseline="0" dirty="0" smtClean="0">
-                          <a:solidFill>
-                            <a:schemeClr val="tx1"/>
-                          </a:solidFill>
-                        </a:rPr>
-                        <a:t>used as a unique identifier to </a:t>
-                      </a:r>
-                      <a:r>
-                        <a:rPr lang="en-GB" sz="1200" baseline="0" dirty="0" smtClean="0">
-                          <a:solidFill>
-                            <a:schemeClr val="tx1"/>
-                          </a:solidFill>
-                        </a:rPr>
-                        <a:t>be referenced  by Feature F.</a:t>
+                        <a:t> used as a unique identifier to be referenced  by Feature F.</a:t>
                       </a:r>
                       <a:endParaRPr lang="en-GB" sz="1200" dirty="0">
                         <a:solidFill>
@@ -8483,13 +8064,8 @@
                       </a:r>
                       <a:r>
                         <a:rPr lang="en-GB" sz="1200" i="0" baseline="0" dirty="0" smtClean="0"/>
-                        <a:t> for the location score. The value slot takes the following format </a:t>
-                      </a:r>
-                      <a:r>
-                        <a:rPr lang="en-GB" sz="1200" i="0" baseline="0" dirty="0" smtClean="0"/>
-                        <a:t>MOD_INDEX:SCORE:POSITION:PASS_THRESHOLD</a:t>
-                      </a:r>
-                      <a:endParaRPr lang="en-GB" sz="1200" i="0" baseline="0" dirty="0" smtClean="0"/>
+                        <a:t> for the location score. The value slot takes the following format MOD_INDEX:SCORE:POSITION:PASS_THRESHOLD</a:t>
+                      </a:r>
                     </a:p>
                     <a:p>
                       <a:endParaRPr lang="en-GB" sz="1200" i="0" baseline="0" dirty="0" smtClean="0"/>
@@ -9117,7 +8693,7 @@
         </p:nvSpPr>
         <p:spPr>
           <a:xfrm>
-            <a:off x="5364088" y="2934380"/>
+            <a:off x="5364088" y="2790364"/>
             <a:ext cx="309700" cy="369332"/>
           </a:xfrm>
           <a:prstGeom prst="rect">
@@ -9147,7 +8723,7 @@
         </p:nvSpPr>
         <p:spPr>
           <a:xfrm>
-            <a:off x="6335690" y="6534780"/>
+            <a:off x="5203308" y="5689363"/>
             <a:ext cx="296876" cy="369332"/>
           </a:xfrm>
           <a:prstGeom prst="rect">
@@ -9177,7 +8753,7 @@
         </p:nvSpPr>
         <p:spPr>
           <a:xfrm>
-            <a:off x="6335690" y="7398876"/>
+            <a:off x="2507143" y="6723568"/>
             <a:ext cx="296876" cy="369332"/>
           </a:xfrm>
           <a:prstGeom prst="rect">
@@ -9207,7 +8783,7 @@
         </p:nvSpPr>
         <p:spPr>
           <a:xfrm>
-            <a:off x="5368900" y="4142442"/>
+            <a:off x="5368900" y="3998426"/>
             <a:ext cx="327334" cy="369332"/>
           </a:xfrm>
           <a:prstGeom prst="rect">
@@ -9237,7 +8813,7 @@
         </p:nvSpPr>
         <p:spPr>
           <a:xfrm>
-            <a:off x="251520" y="324148"/>
+            <a:off x="318257" y="26740"/>
             <a:ext cx="3317639" cy="338554"/>
           </a:xfrm>
           <a:prstGeom prst="rect">
@@ -9261,38 +8837,38 @@
           </a:p>
         </p:txBody>
       </p:sp>
-      <p:sp>
-        <p:nvSpPr>
-          <p:cNvPr id="2" name="TextBox 1"/>
-          <p:cNvSpPr txBox="1"/>
+      <p:pic>
+        <p:nvPicPr>
+          <p:cNvPr id="16" name="Picture 3"/>
+          <p:cNvPicPr>
+            <a:picLocks noChangeAspect="1" noChangeArrowheads="1"/>
+          </p:cNvPicPr>
           <p:nvPr/>
-        </p:nvSpPr>
-        <p:spPr>
+        </p:nvPicPr>
+        <p:blipFill>
+          <a:blip r:embed="rId2" cstate="print"/>
+          <a:srcRect/>
+          <a:stretch>
+            <a:fillRect/>
+          </a:stretch>
+        </p:blipFill>
+        <p:spPr bwMode="auto">
           <a:xfrm>
-            <a:off x="6300192" y="2556396"/>
-            <a:ext cx="2682145" cy="215444"/>
+            <a:off x="395536" y="7234363"/>
+            <a:ext cx="4520091" cy="768516"/>
           </a:xfrm>
           <a:prstGeom prst="rect">
             <a:avLst/>
           </a:prstGeom>
           <a:noFill/>
+          <a:ln w="9525">
+            <a:noFill/>
+            <a:miter lim="800000"/>
+            <a:headEnd/>
+            <a:tailEnd/>
+          </a:ln>
         </p:spPr>
-        <p:txBody>
-          <a:bodyPr wrap="none" rtlCol="0">
-            <a:spAutoFit/>
-          </a:bodyPr>
-          <a:lstStyle/>
-          <a:p>
-            <a:r>
-              <a:rPr lang="en-GB" sz="800" dirty="0" smtClean="0">
-                <a:latin typeface="Courier New" pitchFamily="49" charset="0"/>
-                <a:cs typeface="Courier New" pitchFamily="49" charset="0"/>
-              </a:rPr>
-              <a:t>OR explicitly “no mod scoring threshold”?</a:t>
-            </a:r>
-          </a:p>
-        </p:txBody>
-      </p:sp>
+      </p:pic>
     </p:spTree>
   </p:cSld>
   <p:clrMapOvr>
@@ -9909,14 +9485,7 @@
                 <a:latin typeface="Courier New" pitchFamily="49" charset="0"/>
                 <a:cs typeface="Courier New" pitchFamily="49" charset="0"/>
               </a:rPr>
-              <a:t> accession="</a:t>
-            </a:r>
-            <a:r>
-              <a:rPr lang="en-GB" sz="800" dirty="0" smtClean="0">
-                <a:latin typeface="Courier New" pitchFamily="49" charset="0"/>
-                <a:cs typeface="Courier New" pitchFamily="49" charset="0"/>
-              </a:rPr>
-              <a:t>MS:1002511" </a:t>
+              <a:t> accession="MS:1002511" </a:t>
             </a:r>
             <a:r>
               <a:rPr lang="en-GB" sz="800" dirty="0" err="1" smtClean="0">
@@ -10147,14 +9716,7 @@
                 <a:latin typeface="Courier New" pitchFamily="49" charset="0"/>
                 <a:cs typeface="Courier New" pitchFamily="49" charset="0"/>
               </a:rPr>
-              <a:t>      </a:t>
-            </a:r>
-            <a:r>
-              <a:rPr lang="en-GB" sz="800" dirty="0" smtClean="0">
-                <a:latin typeface="Courier New" pitchFamily="49" charset="0"/>
-                <a:cs typeface="Courier New" pitchFamily="49" charset="0"/>
-              </a:rPr>
-              <a:t>&lt;</a:t>
+              <a:t>      &lt;</a:t>
             </a:r>
             <a:r>
               <a:rPr lang="en-GB" sz="800" dirty="0" err="1">
@@ -10657,7 +10219,21 @@
                 <a:latin typeface="Courier New" pitchFamily="49" charset="0"/>
                 <a:cs typeface="Courier New" pitchFamily="49" charset="0"/>
               </a:rPr>
-              <a:t>="PSI-MS" name="crosslinking search"/&gt;</a:t>
+              <a:t>="PSI-MS" name="</a:t>
+            </a:r>
+            <a:r>
+              <a:rPr lang="en-GB" sz="800" b="1" dirty="0" smtClean="0">
+                <a:latin typeface="Courier New" pitchFamily="49" charset="0"/>
+                <a:cs typeface="Courier New" pitchFamily="49" charset="0"/>
+              </a:rPr>
+              <a:t>cross-linking </a:t>
+            </a:r>
+            <a:r>
+              <a:rPr lang="en-GB" sz="800" b="1" dirty="0" smtClean="0">
+                <a:latin typeface="Courier New" pitchFamily="49" charset="0"/>
+                <a:cs typeface="Courier New" pitchFamily="49" charset="0"/>
+              </a:rPr>
+              <a:t>search"/&gt;</a:t>
             </a:r>
           </a:p>
           <a:p>
@@ -11070,11 +10646,7 @@
                       </a:r>
                       <a:r>
                         <a:rPr lang="en-GB" sz="1200" i="0" baseline="0" dirty="0" smtClean="0"/>
-                        <a:t>&gt; elements with the same rank value. Both MUST have the </a:t>
-                      </a:r>
-                      <a:r>
-                        <a:rPr lang="en-GB" sz="1200" i="0" baseline="0" dirty="0" smtClean="0"/>
-                        <a:t>“cross-link spectrum identification item” </a:t>
+                        <a:t>&gt; elements with the same rank value. Both MUST have the “cross-link spectrum identification item” </a:t>
                       </a:r>
                       <a:r>
                         <a:rPr lang="en-GB" sz="1200" i="0" baseline="0" dirty="0" err="1" smtClean="0"/>
@@ -11287,7 +10859,7 @@
         <p:spPr>
           <a:xfrm>
             <a:off x="251520" y="324148"/>
-            <a:ext cx="3861057" cy="338554"/>
+            <a:ext cx="3923575" cy="338554"/>
           </a:xfrm>
           <a:prstGeom prst="rect">
             <a:avLst/>
@@ -11308,18 +10880,18 @@
               <a:t>Guidelines for </a:t>
             </a:r>
             <a:r>
-              <a:rPr lang="en-GB" sz="1600" b="1" dirty="0" err="1" smtClean="0">
-                <a:latin typeface="+mj-lt"/>
-                <a:cs typeface="Courier New" pitchFamily="49" charset="0"/>
-              </a:rPr>
-              <a:t>crosslinking</a:t>
-            </a:r>
-            <a:r>
               <a:rPr lang="en-GB" sz="1600" b="1" dirty="0" smtClean="0">
                 <a:latin typeface="+mj-lt"/>
                 <a:cs typeface="Courier New" pitchFamily="49" charset="0"/>
               </a:rPr>
-              <a:t> results encoding</a:t>
+              <a:t>cross-linking </a:t>
+            </a:r>
+            <a:r>
+              <a:rPr lang="en-GB" sz="1600" b="1" dirty="0" smtClean="0">
+                <a:latin typeface="+mj-lt"/>
+                <a:cs typeface="Courier New" pitchFamily="49" charset="0"/>
+              </a:rPr>
+              <a:t>results encoding</a:t>
             </a:r>
           </a:p>
         </p:txBody>

</xml_diff>

<commit_message>
Added proteogenomics encoding to the documentation
</commit_message>
<xml_diff>
--- a/specification_document/specdoc1_2/NewFeaturesInMzid12.pptx
+++ b/specification_document/specdoc1_2/NewFeaturesInMzid12.pptx
@@ -5,7 +5,7 @@
     <p:sldMasterId id="2147483648" r:id="rId1"/>
   </p:sldMasterIdLst>
   <p:notesMasterIdLst>
-    <p:notesMasterId r:id="rId7"/>
+    <p:notesMasterId r:id="rId8"/>
   </p:notesMasterIdLst>
   <p:sldIdLst>
     <p:sldId id="259" r:id="rId2"/>
@@ -13,6 +13,7 @@
     <p:sldId id="256" r:id="rId4"/>
     <p:sldId id="257" r:id="rId5"/>
     <p:sldId id="258" r:id="rId6"/>
+    <p:sldId id="261" r:id="rId7"/>
   </p:sldIdLst>
   <p:sldSz cx="9144000" cy="16202025"/>
   <p:notesSz cx="6858000" cy="9144000"/>
@@ -9923,6 +9924,33 @@
                 <a:latin typeface="Courier New" pitchFamily="49" charset="0"/>
                 <a:cs typeface="Courier New" pitchFamily="49" charset="0"/>
               </a:rPr>
+              <a:t>&gt;</a:t>
+            </a:r>
+            <a:endParaRPr lang="en-GB" sz="800" dirty="0" smtClean="0">
+              <a:latin typeface="Courier New" pitchFamily="49" charset="0"/>
+              <a:cs typeface="Courier New" pitchFamily="49" charset="0"/>
+            </a:endParaRPr>
+          </a:p>
+          <a:p>
+            <a:r>
+              <a:rPr lang="en-GB" sz="800" dirty="0" smtClean="0">
+                <a:latin typeface="Courier New" pitchFamily="49" charset="0"/>
+                <a:cs typeface="Courier New" pitchFamily="49" charset="0"/>
+              </a:rPr>
+              <a:t>  &lt;</a:t>
+            </a:r>
+            <a:r>
+              <a:rPr lang="en-GB" sz="800" dirty="0" err="1" smtClean="0">
+                <a:latin typeface="Courier New" pitchFamily="49" charset="0"/>
+                <a:cs typeface="Courier New" pitchFamily="49" charset="0"/>
+              </a:rPr>
+              <a:t>SpectrumIdentificationProtocol</a:t>
+            </a:r>
+            <a:r>
+              <a:rPr lang="en-GB" sz="800" dirty="0" smtClean="0">
+                <a:latin typeface="Courier New" pitchFamily="49" charset="0"/>
+                <a:cs typeface="Courier New" pitchFamily="49" charset="0"/>
+              </a:rPr>
               <a:t> </a:t>
             </a:r>
             <a:r>
@@ -9930,43 +9958,6 @@
                 <a:latin typeface="Courier New" pitchFamily="49" charset="0"/>
                 <a:cs typeface="Courier New" pitchFamily="49" charset="0"/>
               </a:rPr>
-              <a:t>xmlns</a:t>
-            </a:r>
-            <a:r>
-              <a:rPr lang="en-GB" sz="800" dirty="0" smtClean="0">
-                <a:latin typeface="Courier New" pitchFamily="49" charset="0"/>
-                <a:cs typeface="Courier New" pitchFamily="49" charset="0"/>
-              </a:rPr>
-              <a:t>="http://psidev.info/psi/pi/mzIdentML/1.1"&gt;</a:t>
-            </a:r>
-          </a:p>
-          <a:p>
-            <a:r>
-              <a:rPr lang="en-GB" sz="800" dirty="0" smtClean="0">
-                <a:latin typeface="Courier New" pitchFamily="49" charset="0"/>
-                <a:cs typeface="Courier New" pitchFamily="49" charset="0"/>
-              </a:rPr>
-              <a:t>  &lt;</a:t>
-            </a:r>
-            <a:r>
-              <a:rPr lang="en-GB" sz="800" dirty="0" err="1" smtClean="0">
-                <a:latin typeface="Courier New" pitchFamily="49" charset="0"/>
-                <a:cs typeface="Courier New" pitchFamily="49" charset="0"/>
-              </a:rPr>
-              <a:t>SpectrumIdentificationProtocol</a:t>
-            </a:r>
-            <a:r>
-              <a:rPr lang="en-GB" sz="800" dirty="0" smtClean="0">
-                <a:latin typeface="Courier New" pitchFamily="49" charset="0"/>
-                <a:cs typeface="Courier New" pitchFamily="49" charset="0"/>
-              </a:rPr>
-              <a:t> </a:t>
-            </a:r>
-            <a:r>
-              <a:rPr lang="en-GB" sz="800" dirty="0" err="1" smtClean="0">
-                <a:latin typeface="Courier New" pitchFamily="49" charset="0"/>
-                <a:cs typeface="Courier New" pitchFamily="49" charset="0"/>
-              </a:rPr>
               <a:t>analysisSoftware_ref</a:t>
             </a:r>
             <a:r>
@@ -10219,21 +10210,7 @@
                 <a:latin typeface="Courier New" pitchFamily="49" charset="0"/>
                 <a:cs typeface="Courier New" pitchFamily="49" charset="0"/>
               </a:rPr>
-              <a:t>="PSI-MS" name="</a:t>
-            </a:r>
-            <a:r>
-              <a:rPr lang="en-GB" sz="800" b="1" dirty="0" smtClean="0">
-                <a:latin typeface="Courier New" pitchFamily="49" charset="0"/>
-                <a:cs typeface="Courier New" pitchFamily="49" charset="0"/>
-              </a:rPr>
-              <a:t>cross-linking </a:t>
-            </a:r>
-            <a:r>
-              <a:rPr lang="en-GB" sz="800" b="1" dirty="0" smtClean="0">
-                <a:latin typeface="Courier New" pitchFamily="49" charset="0"/>
-                <a:cs typeface="Courier New" pitchFamily="49" charset="0"/>
-              </a:rPr>
-              <a:t>search"/&gt;</a:t>
+              <a:t>="PSI-MS" name="cross-linking search"/&gt;</a:t>
             </a:r>
           </a:p>
           <a:p>
@@ -10393,7 +10370,7 @@
           <p:nvPr>
             <p:extLst>
               <p:ext uri="{D42A27DB-BD31-4B8C-83A1-F6EECF244321}">
-                <p14:modId xmlns:p14="http://schemas.microsoft.com/office/powerpoint/2010/main" val="1394033648"/>
+                <p14:modId xmlns:p14="http://schemas.microsoft.com/office/powerpoint/2010/main" val="2928940166"/>
               </p:ext>
             </p:extLst>
           </p:nvPr>
@@ -10467,12 +10444,12 @@
                         <a:t>If a </a:t>
                       </a:r>
                       <a:r>
-                        <a:rPr lang="en-GB" sz="1200" dirty="0" err="1" smtClean="0"/>
-                        <a:t>crosslinking</a:t>
-                      </a:r>
-                      <a:r>
                         <a:rPr lang="en-GB" sz="1200" dirty="0" smtClean="0"/>
-                        <a:t> search </a:t>
+                        <a:t>cross-linking </a:t>
+                      </a:r>
+                      <a:r>
+                        <a:rPr lang="en-GB" sz="1200" dirty="0" smtClean="0"/>
+                        <a:t>search </a:t>
                       </a:r>
                       <a:r>
                         <a:rPr lang="en-GB" sz="1200" baseline="0" dirty="0" smtClean="0"/>
@@ -10521,12 +10498,28 @@
                         <a:t> of </a:t>
                       </a:r>
                       <a:r>
-                        <a:rPr lang="en-GB" sz="1200" baseline="0" dirty="0" err="1" smtClean="0"/>
-                        <a:t>crosslinked</a:t>
-                      </a:r>
-                      <a:r>
                         <a:rPr lang="en-GB" sz="1200" baseline="0" dirty="0" smtClean="0"/>
-                        <a:t> peptides has been identified, one peptide’s Modification element MUST be flagged as “crosslink donor” and one MUST be flagged as “crosslink receiver”. The export software SHOULD use the following rules to choose the crosslink donor as the: longer peptide, then higher peptide neutral mass, then alphabetical order. The crosslink donor Modification element MUST have the attribute </a:t>
+                        <a:t>cross-linked </a:t>
+                      </a:r>
+                      <a:r>
+                        <a:rPr lang="en-GB" sz="1200" baseline="0" dirty="0" smtClean="0"/>
+                        <a:t>peptides has been identified, one peptide’s Modification element MUST be flagged as “</a:t>
+                      </a:r>
+                      <a:r>
+                        <a:rPr lang="en-GB" sz="1200" baseline="0" dirty="0" smtClean="0"/>
+                        <a:t>cross-link </a:t>
+                      </a:r>
+                      <a:r>
+                        <a:rPr lang="en-GB" sz="1200" baseline="0" dirty="0" smtClean="0"/>
+                        <a:t>donor” and one MUST be flagged as “</a:t>
+                      </a:r>
+                      <a:r>
+                        <a:rPr lang="en-GB" sz="1200" baseline="0" dirty="0" smtClean="0"/>
+                        <a:t>cross-link </a:t>
+                      </a:r>
+                      <a:r>
+                        <a:rPr lang="en-GB" sz="1200" baseline="0" dirty="0" smtClean="0"/>
+                        <a:t>receiver”. The export software SHOULD use the following rules to choose the crosslink donor as the: longer peptide, then higher peptide neutral mass, then alphabetical order. The crosslink donor Modification element MUST have the attribute </a:t>
                       </a:r>
                       <a:r>
                         <a:rPr lang="en-GB" sz="1200" baseline="0" dirty="0" err="1" smtClean="0"/>
@@ -10799,7 +10792,7 @@
         <p:spPr>
           <a:xfrm>
             <a:off x="467544" y="10900613"/>
-            <a:ext cx="5069849" cy="584775"/>
+            <a:ext cx="3612271" cy="830997"/>
           </a:xfrm>
           <a:prstGeom prst="rect">
             <a:avLst/>
@@ -10820,29 +10813,27 @@
             </a:r>
           </a:p>
           <a:p>
+            <a:pPr marL="285750" indent="-285750">
+              <a:buFontTx/>
+              <a:buChar char="-"/>
+            </a:pPr>
             <a:r>
               <a:rPr lang="en-GB" sz="1600" dirty="0" smtClean="0">
                 <a:cs typeface="Courier New" pitchFamily="49" charset="0"/>
               </a:rPr>
-              <a:t>- We need to get </a:t>
-            </a:r>
-            <a:r>
-              <a:rPr lang="en-GB" sz="1600" dirty="0" err="1" smtClean="0">
-                <a:cs typeface="Courier New" pitchFamily="49" charset="0"/>
-              </a:rPr>
-              <a:t>xlink</a:t>
-            </a:r>
+              <a:t>Plan to create XL CV</a:t>
+            </a:r>
+          </a:p>
+          <a:p>
+            <a:pPr marL="285750" indent="-285750">
+              <a:buFontTx/>
+              <a:buChar char="-"/>
+            </a:pPr>
             <a:r>
               <a:rPr lang="en-GB" sz="1600" dirty="0" smtClean="0">
                 <a:cs typeface="Courier New" pitchFamily="49" charset="0"/>
               </a:rPr>
-              <a:t> mod terms into PSI-MOD or </a:t>
-            </a:r>
-            <a:r>
-              <a:rPr lang="en-GB" sz="1600" dirty="0" err="1" smtClean="0">
-                <a:cs typeface="Courier New" pitchFamily="49" charset="0"/>
-              </a:rPr>
-              <a:t>Unimod</a:t>
+              <a:t>Add protein-level interaction example</a:t>
             </a:r>
             <a:endParaRPr lang="en-GB" sz="1600" dirty="0" smtClean="0">
               <a:cs typeface="Courier New" pitchFamily="49" charset="0"/>
@@ -10877,21 +10868,7 @@
                 <a:latin typeface="+mj-lt"/>
                 <a:cs typeface="Courier New" pitchFamily="49" charset="0"/>
               </a:rPr>
-              <a:t>Guidelines for </a:t>
-            </a:r>
-            <a:r>
-              <a:rPr lang="en-GB" sz="1600" b="1" dirty="0" smtClean="0">
-                <a:latin typeface="+mj-lt"/>
-                <a:cs typeface="Courier New" pitchFamily="49" charset="0"/>
-              </a:rPr>
-              <a:t>cross-linking </a:t>
-            </a:r>
-            <a:r>
-              <a:rPr lang="en-GB" sz="1600" b="1" dirty="0" smtClean="0">
-                <a:latin typeface="+mj-lt"/>
-                <a:cs typeface="Courier New" pitchFamily="49" charset="0"/>
-              </a:rPr>
-              <a:t>results encoding</a:t>
+              <a:t>Guidelines for cross-linking results encoding</a:t>
             </a:r>
           </a:p>
         </p:txBody>
@@ -10908,6 +10885,2027 @@
       </p:par>
     </p:tnLst>
   </p:timing>
+</p:sld>
+</file>
+
+<file path=ppt/slides/slide6.xml><?xml version="1.0" encoding="utf-8"?>
+<p:sld xmlns:a="http://schemas.openxmlformats.org/drawingml/2006/main" xmlns:r="http://schemas.openxmlformats.org/officeDocument/2006/relationships" xmlns:p="http://schemas.openxmlformats.org/presentationml/2006/main">
+  <p:cSld>
+    <p:spTree>
+      <p:nvGrpSpPr>
+        <p:cNvPr id="1" name=""/>
+        <p:cNvGrpSpPr/>
+        <p:nvPr/>
+      </p:nvGrpSpPr>
+      <p:grpSpPr>
+        <a:xfrm>
+          <a:off x="0" y="0"/>
+          <a:ext cx="0" cy="0"/>
+          <a:chOff x="0" y="0"/>
+          <a:chExt cx="0" cy="0"/>
+        </a:xfrm>
+      </p:grpSpPr>
+      <p:sp>
+        <p:nvSpPr>
+          <p:cNvPr id="3" name="TextBox 2"/>
+          <p:cNvSpPr txBox="1"/>
+          <p:nvPr/>
+        </p:nvSpPr>
+        <p:spPr>
+          <a:xfrm>
+            <a:off x="251520" y="324148"/>
+            <a:ext cx="4241097" cy="338554"/>
+          </a:xfrm>
+          <a:prstGeom prst="rect">
+            <a:avLst/>
+          </a:prstGeom>
+          <a:noFill/>
+        </p:spPr>
+        <p:txBody>
+          <a:bodyPr wrap="none" rtlCol="0">
+            <a:spAutoFit/>
+          </a:bodyPr>
+          <a:lstStyle/>
+          <a:p>
+            <a:r>
+              <a:rPr lang="en-GB" sz="1600" b="1" dirty="0" smtClean="0">
+                <a:latin typeface="+mj-lt"/>
+                <a:cs typeface="Courier New" pitchFamily="49" charset="0"/>
+              </a:rPr>
+              <a:t>Guidelines for </a:t>
+            </a:r>
+            <a:r>
+              <a:rPr lang="en-GB" sz="1600" b="1" dirty="0" smtClean="0">
+                <a:latin typeface="+mj-lt"/>
+                <a:cs typeface="Courier New" pitchFamily="49" charset="0"/>
+              </a:rPr>
+              <a:t>encoding </a:t>
+            </a:r>
+            <a:r>
+              <a:rPr lang="en-GB" sz="1600" b="1" dirty="0" err="1" smtClean="0">
+                <a:latin typeface="+mj-lt"/>
+                <a:cs typeface="Courier New" pitchFamily="49" charset="0"/>
+              </a:rPr>
+              <a:t>proteogenomics</a:t>
+            </a:r>
+            <a:r>
+              <a:rPr lang="en-GB" sz="1600" b="1" dirty="0" smtClean="0">
+                <a:latin typeface="+mj-lt"/>
+                <a:cs typeface="Courier New" pitchFamily="49" charset="0"/>
+              </a:rPr>
+              <a:t> results</a:t>
+            </a:r>
+            <a:endParaRPr lang="en-GB" sz="1600" b="1" dirty="0" smtClean="0">
+              <a:latin typeface="+mj-lt"/>
+              <a:cs typeface="Courier New" pitchFamily="49" charset="0"/>
+            </a:endParaRPr>
+          </a:p>
+        </p:txBody>
+      </p:sp>
+      <p:sp>
+        <p:nvSpPr>
+          <p:cNvPr id="4" name="Rectangle 3"/>
+          <p:cNvSpPr/>
+          <p:nvPr/>
+        </p:nvSpPr>
+        <p:spPr>
+          <a:xfrm>
+            <a:off x="395536" y="819493"/>
+            <a:ext cx="5958408" cy="1446550"/>
+          </a:xfrm>
+          <a:prstGeom prst="rect">
+            <a:avLst/>
+          </a:prstGeom>
+          <a:ln w="22225">
+            <a:solidFill>
+              <a:schemeClr val="tx1"/>
+            </a:solidFill>
+            <a:prstDash val="sysDot"/>
+          </a:ln>
+        </p:spPr>
+        <p:txBody>
+          <a:bodyPr wrap="square">
+            <a:spAutoFit/>
+          </a:bodyPr>
+          <a:lstStyle/>
+          <a:p>
+            <a:r>
+              <a:rPr lang="en-GB" sz="800" dirty="0">
+                <a:latin typeface="Courier New" panose="02070309020205020404" pitchFamily="49" charset="0"/>
+                <a:cs typeface="Courier New" panose="02070309020205020404" pitchFamily="49" charset="0"/>
+              </a:rPr>
+              <a:t>&lt;</a:t>
+            </a:r>
+            <a:r>
+              <a:rPr lang="en-GB" sz="800" dirty="0" err="1">
+                <a:latin typeface="Courier New" panose="02070309020205020404" pitchFamily="49" charset="0"/>
+                <a:cs typeface="Courier New" panose="02070309020205020404" pitchFamily="49" charset="0"/>
+              </a:rPr>
+              <a:t>SpectrumIdentificationProtocol</a:t>
+            </a:r>
+            <a:r>
+              <a:rPr lang="en-GB" sz="800" dirty="0">
+                <a:latin typeface="Courier New" panose="02070309020205020404" pitchFamily="49" charset="0"/>
+                <a:cs typeface="Courier New" panose="02070309020205020404" pitchFamily="49" charset="0"/>
+              </a:rPr>
+              <a:t> </a:t>
+            </a:r>
+            <a:r>
+              <a:rPr lang="en-GB" sz="800" dirty="0" err="1">
+                <a:latin typeface="Courier New" panose="02070309020205020404" pitchFamily="49" charset="0"/>
+                <a:cs typeface="Courier New" panose="02070309020205020404" pitchFamily="49" charset="0"/>
+              </a:rPr>
+              <a:t>analysisSoftware_ref</a:t>
+            </a:r>
+            <a:r>
+              <a:rPr lang="en-GB" sz="800" dirty="0">
+                <a:latin typeface="Courier New" panose="02070309020205020404" pitchFamily="49" charset="0"/>
+                <a:cs typeface="Courier New" panose="02070309020205020404" pitchFamily="49" charset="0"/>
+              </a:rPr>
+              <a:t>="</a:t>
+            </a:r>
+            <a:r>
+              <a:rPr lang="en-GB" sz="800" dirty="0" err="1">
+                <a:latin typeface="Courier New" panose="02070309020205020404" pitchFamily="49" charset="0"/>
+                <a:cs typeface="Courier New" panose="02070309020205020404" pitchFamily="49" charset="0"/>
+              </a:rPr>
+              <a:t>ID_software</a:t>
+            </a:r>
+            <a:r>
+              <a:rPr lang="en-GB" sz="800" dirty="0">
+                <a:latin typeface="Courier New" panose="02070309020205020404" pitchFamily="49" charset="0"/>
+                <a:cs typeface="Courier New" panose="02070309020205020404" pitchFamily="49" charset="0"/>
+              </a:rPr>
+              <a:t>" id="SearchProtocol_1"&gt;</a:t>
+            </a:r>
+          </a:p>
+          <a:p>
+            <a:r>
+              <a:rPr lang="en-GB" sz="800" dirty="0">
+                <a:latin typeface="Courier New" panose="02070309020205020404" pitchFamily="49" charset="0"/>
+                <a:cs typeface="Courier New" panose="02070309020205020404" pitchFamily="49" charset="0"/>
+              </a:rPr>
+              <a:t>    &lt;</a:t>
+            </a:r>
+            <a:r>
+              <a:rPr lang="en-GB" sz="800" dirty="0" err="1">
+                <a:latin typeface="Courier New" panose="02070309020205020404" pitchFamily="49" charset="0"/>
+                <a:cs typeface="Courier New" panose="02070309020205020404" pitchFamily="49" charset="0"/>
+              </a:rPr>
+              <a:t>SearchType</a:t>
+            </a:r>
+            <a:r>
+              <a:rPr lang="en-GB" sz="800" dirty="0">
+                <a:latin typeface="Courier New" panose="02070309020205020404" pitchFamily="49" charset="0"/>
+                <a:cs typeface="Courier New" panose="02070309020205020404" pitchFamily="49" charset="0"/>
+              </a:rPr>
+              <a:t>&gt;</a:t>
+            </a:r>
+          </a:p>
+          <a:p>
+            <a:r>
+              <a:rPr lang="en-GB" sz="800" dirty="0">
+                <a:latin typeface="Courier New" panose="02070309020205020404" pitchFamily="49" charset="0"/>
+                <a:cs typeface="Courier New" panose="02070309020205020404" pitchFamily="49" charset="0"/>
+              </a:rPr>
+              <a:t>      &lt;</a:t>
+            </a:r>
+            <a:r>
+              <a:rPr lang="en-GB" sz="800" dirty="0" err="1">
+                <a:latin typeface="Courier New" panose="02070309020205020404" pitchFamily="49" charset="0"/>
+                <a:cs typeface="Courier New" panose="02070309020205020404" pitchFamily="49" charset="0"/>
+              </a:rPr>
+              <a:t>cvParam</a:t>
+            </a:r>
+            <a:r>
+              <a:rPr lang="en-GB" sz="800" dirty="0">
+                <a:latin typeface="Courier New" panose="02070309020205020404" pitchFamily="49" charset="0"/>
+                <a:cs typeface="Courier New" panose="02070309020205020404" pitchFamily="49" charset="0"/>
+              </a:rPr>
+              <a:t> </a:t>
+            </a:r>
+            <a:r>
+              <a:rPr lang="en-GB" sz="800" dirty="0" err="1">
+                <a:latin typeface="Courier New" panose="02070309020205020404" pitchFamily="49" charset="0"/>
+                <a:cs typeface="Courier New" panose="02070309020205020404" pitchFamily="49" charset="0"/>
+              </a:rPr>
+              <a:t>cvRef</a:t>
+            </a:r>
+            <a:r>
+              <a:rPr lang="en-GB" sz="800" dirty="0">
+                <a:latin typeface="Courier New" panose="02070309020205020404" pitchFamily="49" charset="0"/>
+                <a:cs typeface="Courier New" panose="02070309020205020404" pitchFamily="49" charset="0"/>
+              </a:rPr>
+              <a:t>="PSI-MS" accession="MS:1001083" name="</a:t>
+            </a:r>
+            <a:r>
+              <a:rPr lang="en-GB" sz="800" dirty="0" err="1">
+                <a:latin typeface="Courier New" panose="02070309020205020404" pitchFamily="49" charset="0"/>
+                <a:cs typeface="Courier New" panose="02070309020205020404" pitchFamily="49" charset="0"/>
+              </a:rPr>
+              <a:t>ms-ms</a:t>
+            </a:r>
+            <a:r>
+              <a:rPr lang="en-GB" sz="800" dirty="0">
+                <a:latin typeface="Courier New" panose="02070309020205020404" pitchFamily="49" charset="0"/>
+                <a:cs typeface="Courier New" panose="02070309020205020404" pitchFamily="49" charset="0"/>
+              </a:rPr>
+              <a:t> search"/&gt;</a:t>
+            </a:r>
+          </a:p>
+          <a:p>
+            <a:r>
+              <a:rPr lang="en-GB" sz="800" dirty="0">
+                <a:latin typeface="Courier New" panose="02070309020205020404" pitchFamily="49" charset="0"/>
+                <a:cs typeface="Courier New" panose="02070309020205020404" pitchFamily="49" charset="0"/>
+              </a:rPr>
+              <a:t>    &lt;/</a:t>
+            </a:r>
+            <a:r>
+              <a:rPr lang="en-GB" sz="800" dirty="0" err="1">
+                <a:latin typeface="Courier New" panose="02070309020205020404" pitchFamily="49" charset="0"/>
+                <a:cs typeface="Courier New" panose="02070309020205020404" pitchFamily="49" charset="0"/>
+              </a:rPr>
+              <a:t>SearchType</a:t>
+            </a:r>
+            <a:r>
+              <a:rPr lang="en-GB" sz="800" dirty="0">
+                <a:latin typeface="Courier New" panose="02070309020205020404" pitchFamily="49" charset="0"/>
+                <a:cs typeface="Courier New" panose="02070309020205020404" pitchFamily="49" charset="0"/>
+              </a:rPr>
+              <a:t>&gt;</a:t>
+            </a:r>
+          </a:p>
+          <a:p>
+            <a:r>
+              <a:rPr lang="en-GB" sz="800" dirty="0">
+                <a:latin typeface="Courier New" panose="02070309020205020404" pitchFamily="49" charset="0"/>
+                <a:cs typeface="Courier New" panose="02070309020205020404" pitchFamily="49" charset="0"/>
+              </a:rPr>
+              <a:t>    &lt;</a:t>
+            </a:r>
+            <a:r>
+              <a:rPr lang="en-GB" sz="800" dirty="0" err="1">
+                <a:latin typeface="Courier New" panose="02070309020205020404" pitchFamily="49" charset="0"/>
+                <a:cs typeface="Courier New" panose="02070309020205020404" pitchFamily="49" charset="0"/>
+              </a:rPr>
+              <a:t>AdditionalSearchParams</a:t>
+            </a:r>
+            <a:r>
+              <a:rPr lang="en-GB" sz="800" dirty="0">
+                <a:latin typeface="Courier New" panose="02070309020205020404" pitchFamily="49" charset="0"/>
+                <a:cs typeface="Courier New" panose="02070309020205020404" pitchFamily="49" charset="0"/>
+              </a:rPr>
+              <a:t>&gt;</a:t>
+            </a:r>
+          </a:p>
+          <a:p>
+            <a:r>
+              <a:rPr lang="en-GB" sz="800" dirty="0">
+                <a:latin typeface="Courier New" panose="02070309020205020404" pitchFamily="49" charset="0"/>
+                <a:cs typeface="Courier New" panose="02070309020205020404" pitchFamily="49" charset="0"/>
+              </a:rPr>
+              <a:t>      &lt;</a:t>
+            </a:r>
+            <a:r>
+              <a:rPr lang="en-GB" sz="800" dirty="0" err="1">
+                <a:latin typeface="Courier New" panose="02070309020205020404" pitchFamily="49" charset="0"/>
+                <a:cs typeface="Courier New" panose="02070309020205020404" pitchFamily="49" charset="0"/>
+              </a:rPr>
+              <a:t>cvParam</a:t>
+            </a:r>
+            <a:r>
+              <a:rPr lang="en-GB" sz="800" dirty="0">
+                <a:latin typeface="Courier New" panose="02070309020205020404" pitchFamily="49" charset="0"/>
+                <a:cs typeface="Courier New" panose="02070309020205020404" pitchFamily="49" charset="0"/>
+              </a:rPr>
+              <a:t> </a:t>
+            </a:r>
+            <a:r>
+              <a:rPr lang="en-GB" sz="800" dirty="0" err="1">
+                <a:latin typeface="Courier New" panose="02070309020205020404" pitchFamily="49" charset="0"/>
+                <a:cs typeface="Courier New" panose="02070309020205020404" pitchFamily="49" charset="0"/>
+              </a:rPr>
+              <a:t>cvRef</a:t>
+            </a:r>
+            <a:r>
+              <a:rPr lang="en-GB" sz="800" dirty="0">
+                <a:latin typeface="Courier New" panose="02070309020205020404" pitchFamily="49" charset="0"/>
+                <a:cs typeface="Courier New" panose="02070309020205020404" pitchFamily="49" charset="0"/>
+              </a:rPr>
+              <a:t>="PSI-MS" accession="MS:1001211" name="parent mass type mono"/&gt;</a:t>
+            </a:r>
+          </a:p>
+          <a:p>
+            <a:r>
+              <a:rPr lang="en-GB" sz="800" dirty="0">
+                <a:latin typeface="Courier New" panose="02070309020205020404" pitchFamily="49" charset="0"/>
+                <a:cs typeface="Courier New" panose="02070309020205020404" pitchFamily="49" charset="0"/>
+              </a:rPr>
+              <a:t>      &lt;</a:t>
+            </a:r>
+            <a:r>
+              <a:rPr lang="en-GB" sz="800" dirty="0" err="1">
+                <a:latin typeface="Courier New" panose="02070309020205020404" pitchFamily="49" charset="0"/>
+                <a:cs typeface="Courier New" panose="02070309020205020404" pitchFamily="49" charset="0"/>
+              </a:rPr>
+              <a:t>cvParam</a:t>
+            </a:r>
+            <a:r>
+              <a:rPr lang="en-GB" sz="800" dirty="0">
+                <a:latin typeface="Courier New" panose="02070309020205020404" pitchFamily="49" charset="0"/>
+                <a:cs typeface="Courier New" panose="02070309020205020404" pitchFamily="49" charset="0"/>
+              </a:rPr>
+              <a:t> </a:t>
+            </a:r>
+            <a:r>
+              <a:rPr lang="en-GB" sz="800" dirty="0" err="1">
+                <a:latin typeface="Courier New" panose="02070309020205020404" pitchFamily="49" charset="0"/>
+                <a:cs typeface="Courier New" panose="02070309020205020404" pitchFamily="49" charset="0"/>
+              </a:rPr>
+              <a:t>cvRef</a:t>
+            </a:r>
+            <a:r>
+              <a:rPr lang="en-GB" sz="800" dirty="0">
+                <a:latin typeface="Courier New" panose="02070309020205020404" pitchFamily="49" charset="0"/>
+                <a:cs typeface="Courier New" panose="02070309020205020404" pitchFamily="49" charset="0"/>
+              </a:rPr>
+              <a:t>="PSI-MS" accession="MS:1001256" name="fragment mass type mono"/&gt;</a:t>
+            </a:r>
+          </a:p>
+          <a:p>
+            <a:r>
+              <a:rPr lang="en-GB" sz="800" dirty="0">
+                <a:latin typeface="Courier New" panose="02070309020205020404" pitchFamily="49" charset="0"/>
+                <a:cs typeface="Courier New" panose="02070309020205020404" pitchFamily="49" charset="0"/>
+              </a:rPr>
+              <a:t>      &lt;</a:t>
+            </a:r>
+            <a:r>
+              <a:rPr lang="en-GB" sz="800" dirty="0" err="1">
+                <a:latin typeface="Courier New" panose="02070309020205020404" pitchFamily="49" charset="0"/>
+                <a:cs typeface="Courier New" panose="02070309020205020404" pitchFamily="49" charset="0"/>
+              </a:rPr>
+              <a:t>cvParam</a:t>
+            </a:r>
+            <a:r>
+              <a:rPr lang="en-GB" sz="800" dirty="0">
+                <a:latin typeface="Courier New" panose="02070309020205020404" pitchFamily="49" charset="0"/>
+                <a:cs typeface="Courier New" panose="02070309020205020404" pitchFamily="49" charset="0"/>
+              </a:rPr>
+              <a:t> </a:t>
+            </a:r>
+            <a:r>
+              <a:rPr lang="en-GB" sz="800" dirty="0" err="1">
+                <a:latin typeface="Courier New" panose="02070309020205020404" pitchFamily="49" charset="0"/>
+                <a:cs typeface="Courier New" panose="02070309020205020404" pitchFamily="49" charset="0"/>
+              </a:rPr>
+              <a:t>cvRef</a:t>
+            </a:r>
+            <a:r>
+              <a:rPr lang="en-GB" sz="800" dirty="0">
+                <a:latin typeface="Courier New" panose="02070309020205020404" pitchFamily="49" charset="0"/>
+                <a:cs typeface="Courier New" panose="02070309020205020404" pitchFamily="49" charset="0"/>
+              </a:rPr>
+              <a:t>="PSI-MS" accession="MS:1002490" name="peptide-level scoring"/&gt;</a:t>
+            </a:r>
+          </a:p>
+          <a:p>
+            <a:r>
+              <a:rPr lang="en-GB" sz="800" dirty="0">
+                <a:latin typeface="Courier New" panose="02070309020205020404" pitchFamily="49" charset="0"/>
+                <a:cs typeface="Courier New" panose="02070309020205020404" pitchFamily="49" charset="0"/>
+              </a:rPr>
+              <a:t>      &lt;</a:t>
+            </a:r>
+            <a:r>
+              <a:rPr lang="en-GB" sz="800" dirty="0" err="1">
+                <a:latin typeface="Courier New" panose="02070309020205020404" pitchFamily="49" charset="0"/>
+                <a:cs typeface="Courier New" panose="02070309020205020404" pitchFamily="49" charset="0"/>
+              </a:rPr>
+              <a:t>cvParam</a:t>
+            </a:r>
+            <a:r>
+              <a:rPr lang="en-GB" sz="800" dirty="0">
+                <a:latin typeface="Courier New" panose="02070309020205020404" pitchFamily="49" charset="0"/>
+                <a:cs typeface="Courier New" panose="02070309020205020404" pitchFamily="49" charset="0"/>
+              </a:rPr>
+              <a:t> </a:t>
+            </a:r>
+            <a:r>
+              <a:rPr lang="en-GB" sz="800" dirty="0" err="1">
+                <a:latin typeface="Courier New" panose="02070309020205020404" pitchFamily="49" charset="0"/>
+                <a:cs typeface="Courier New" panose="02070309020205020404" pitchFamily="49" charset="0"/>
+              </a:rPr>
+              <a:t>cvRef</a:t>
+            </a:r>
+            <a:r>
+              <a:rPr lang="en-GB" sz="800" dirty="0">
+                <a:latin typeface="Courier New" panose="02070309020205020404" pitchFamily="49" charset="0"/>
+                <a:cs typeface="Courier New" panose="02070309020205020404" pitchFamily="49" charset="0"/>
+              </a:rPr>
+              <a:t>="PSI-MS" accession="MS:1002496" name="group PSMs by sequence"/&gt;</a:t>
+            </a:r>
+          </a:p>
+          <a:p>
+            <a:r>
+              <a:rPr lang="en-GB" sz="800" dirty="0">
+                <a:latin typeface="Courier New" panose="02070309020205020404" pitchFamily="49" charset="0"/>
+                <a:cs typeface="Courier New" panose="02070309020205020404" pitchFamily="49" charset="0"/>
+              </a:rPr>
+              <a:t>      </a:t>
+            </a:r>
+            <a:r>
+              <a:rPr lang="en-GB" sz="800" b="1" dirty="0">
+                <a:latin typeface="Courier New" panose="02070309020205020404" pitchFamily="49" charset="0"/>
+                <a:cs typeface="Courier New" panose="02070309020205020404" pitchFamily="49" charset="0"/>
+              </a:rPr>
+              <a:t>&lt;</a:t>
+            </a:r>
+            <a:r>
+              <a:rPr lang="en-GB" sz="800" b="1" dirty="0" err="1">
+                <a:latin typeface="Courier New" panose="02070309020205020404" pitchFamily="49" charset="0"/>
+                <a:cs typeface="Courier New" panose="02070309020205020404" pitchFamily="49" charset="0"/>
+              </a:rPr>
+              <a:t>cvParam</a:t>
+            </a:r>
+            <a:r>
+              <a:rPr lang="en-GB" sz="800" b="1" dirty="0">
+                <a:latin typeface="Courier New" panose="02070309020205020404" pitchFamily="49" charset="0"/>
+                <a:cs typeface="Courier New" panose="02070309020205020404" pitchFamily="49" charset="0"/>
+              </a:rPr>
+              <a:t> </a:t>
+            </a:r>
+            <a:r>
+              <a:rPr lang="en-GB" sz="800" b="1" dirty="0" err="1">
+                <a:latin typeface="Courier New" panose="02070309020205020404" pitchFamily="49" charset="0"/>
+                <a:cs typeface="Courier New" panose="02070309020205020404" pitchFamily="49" charset="0"/>
+              </a:rPr>
+              <a:t>cvRef</a:t>
+            </a:r>
+            <a:r>
+              <a:rPr lang="en-GB" sz="800" b="1" dirty="0">
+                <a:latin typeface="Courier New" panose="02070309020205020404" pitchFamily="49" charset="0"/>
+                <a:cs typeface="Courier New" panose="02070309020205020404" pitchFamily="49" charset="0"/>
+              </a:rPr>
+              <a:t>="PSI-MS" accession="MS:1002635" name="</a:t>
+            </a:r>
+            <a:r>
+              <a:rPr lang="en-GB" sz="800" b="1" dirty="0" err="1">
+                <a:latin typeface="Courier New" panose="02070309020205020404" pitchFamily="49" charset="0"/>
+                <a:cs typeface="Courier New" panose="02070309020205020404" pitchFamily="49" charset="0"/>
+              </a:rPr>
+              <a:t>proteogenomics</a:t>
+            </a:r>
+            <a:r>
+              <a:rPr lang="en-GB" sz="800" b="1" dirty="0">
+                <a:latin typeface="Courier New" panose="02070309020205020404" pitchFamily="49" charset="0"/>
+                <a:cs typeface="Courier New" panose="02070309020205020404" pitchFamily="49" charset="0"/>
+              </a:rPr>
+              <a:t> search"/&gt;</a:t>
+            </a:r>
+          </a:p>
+          <a:p>
+            <a:r>
+              <a:rPr lang="en-GB" sz="800" dirty="0">
+                <a:latin typeface="Courier New" panose="02070309020205020404" pitchFamily="49" charset="0"/>
+                <a:cs typeface="Courier New" panose="02070309020205020404" pitchFamily="49" charset="0"/>
+              </a:rPr>
+              <a:t>    &lt;/</a:t>
+            </a:r>
+            <a:r>
+              <a:rPr lang="en-GB" sz="800" dirty="0" err="1">
+                <a:latin typeface="Courier New" panose="02070309020205020404" pitchFamily="49" charset="0"/>
+                <a:cs typeface="Courier New" panose="02070309020205020404" pitchFamily="49" charset="0"/>
+              </a:rPr>
+              <a:t>AdditionalSearchParams</a:t>
+            </a:r>
+            <a:r>
+              <a:rPr lang="en-GB" sz="800" dirty="0">
+                <a:latin typeface="Courier New" panose="02070309020205020404" pitchFamily="49" charset="0"/>
+                <a:cs typeface="Courier New" panose="02070309020205020404" pitchFamily="49" charset="0"/>
+              </a:rPr>
+              <a:t>&gt;</a:t>
+            </a:r>
+          </a:p>
+        </p:txBody>
+      </p:sp>
+      <p:sp>
+        <p:nvSpPr>
+          <p:cNvPr id="5" name="Rectangle 4"/>
+          <p:cNvSpPr/>
+          <p:nvPr/>
+        </p:nvSpPr>
+        <p:spPr>
+          <a:xfrm>
+            <a:off x="395536" y="2367082"/>
+            <a:ext cx="6657442" cy="1446550"/>
+          </a:xfrm>
+          <a:prstGeom prst="rect">
+            <a:avLst/>
+          </a:prstGeom>
+          <a:noFill/>
+          <a:ln w="22225">
+            <a:solidFill>
+              <a:schemeClr val="tx1"/>
+            </a:solidFill>
+            <a:prstDash val="sysDot"/>
+          </a:ln>
+        </p:spPr>
+        <p:txBody>
+          <a:bodyPr wrap="square">
+            <a:spAutoFit/>
+          </a:bodyPr>
+          <a:lstStyle/>
+          <a:p>
+            <a:r>
+              <a:rPr lang="en-GB" sz="800" dirty="0">
+                <a:latin typeface="Courier New" panose="02070309020205020404" pitchFamily="49" charset="0"/>
+                <a:cs typeface="Courier New" panose="02070309020205020404" pitchFamily="49" charset="0"/>
+              </a:rPr>
+              <a:t> &lt;</a:t>
+            </a:r>
+            <a:r>
+              <a:rPr lang="en-GB" sz="800" dirty="0" err="1">
+                <a:latin typeface="Courier New" panose="02070309020205020404" pitchFamily="49" charset="0"/>
+                <a:cs typeface="Courier New" panose="02070309020205020404" pitchFamily="49" charset="0"/>
+              </a:rPr>
+              <a:t>PeptideEvidence</a:t>
+            </a:r>
+            <a:r>
+              <a:rPr lang="en-GB" sz="800" dirty="0">
+                <a:latin typeface="Courier New" panose="02070309020205020404" pitchFamily="49" charset="0"/>
+                <a:cs typeface="Courier New" panose="02070309020205020404" pitchFamily="49" charset="0"/>
+              </a:rPr>
+              <a:t> </a:t>
+            </a:r>
+            <a:r>
+              <a:rPr lang="en-GB" sz="800" dirty="0" err="1">
+                <a:latin typeface="Courier New" panose="02070309020205020404" pitchFamily="49" charset="0"/>
+                <a:cs typeface="Courier New" panose="02070309020205020404" pitchFamily="49" charset="0"/>
+              </a:rPr>
+              <a:t>dBSequence_ref</a:t>
+            </a:r>
+            <a:r>
+              <a:rPr lang="en-GB" sz="800" dirty="0">
+                <a:latin typeface="Courier New" panose="02070309020205020404" pitchFamily="49" charset="0"/>
+                <a:cs typeface="Courier New" panose="02070309020205020404" pitchFamily="49" charset="0"/>
+              </a:rPr>
+              <a:t>="dbseq_generic|A_ENSP00000354925|" </a:t>
+            </a:r>
+            <a:r>
+              <a:rPr lang="en-GB" sz="800" dirty="0" err="1">
+                <a:latin typeface="Courier New" panose="02070309020205020404" pitchFamily="49" charset="0"/>
+                <a:cs typeface="Courier New" panose="02070309020205020404" pitchFamily="49" charset="0"/>
+              </a:rPr>
+              <a:t>peptide_ref</a:t>
+            </a:r>
+            <a:r>
+              <a:rPr lang="en-GB" sz="800" dirty="0">
+                <a:latin typeface="Courier New" panose="02070309020205020404" pitchFamily="49" charset="0"/>
+                <a:cs typeface="Courier New" panose="02070309020205020404" pitchFamily="49" charset="0"/>
+              </a:rPr>
+              <a:t>="DVLEGDSSEDR_" start="23" end="33" pre="A" post="A" </a:t>
+            </a:r>
+            <a:r>
+              <a:rPr lang="en-GB" sz="800" dirty="0" err="1">
+                <a:latin typeface="Courier New" panose="02070309020205020404" pitchFamily="49" charset="0"/>
+                <a:cs typeface="Courier New" panose="02070309020205020404" pitchFamily="49" charset="0"/>
+              </a:rPr>
+              <a:t>isDecoy</a:t>
+            </a:r>
+            <a:r>
+              <a:rPr lang="en-GB" sz="800" dirty="0">
+                <a:latin typeface="Courier New" panose="02070309020205020404" pitchFamily="49" charset="0"/>
+                <a:cs typeface="Courier New" panose="02070309020205020404" pitchFamily="49" charset="0"/>
+              </a:rPr>
+              <a:t>="false" id="DVLEGDSSEDR_generic|A_ENSP00000354925|_23_33"&gt;</a:t>
+            </a:r>
+          </a:p>
+          <a:p>
+            <a:r>
+              <a:rPr lang="en-GB" sz="800" b="1" dirty="0">
+                <a:latin typeface="Courier New" panose="02070309020205020404" pitchFamily="49" charset="0"/>
+                <a:cs typeface="Courier New" panose="02070309020205020404" pitchFamily="49" charset="0"/>
+              </a:rPr>
+              <a:t>    &lt;</a:t>
+            </a:r>
+            <a:r>
+              <a:rPr lang="en-GB" sz="800" b="1" dirty="0" err="1">
+                <a:latin typeface="Courier New" panose="02070309020205020404" pitchFamily="49" charset="0"/>
+                <a:cs typeface="Courier New" panose="02070309020205020404" pitchFamily="49" charset="0"/>
+              </a:rPr>
+              <a:t>cvParam</a:t>
+            </a:r>
+            <a:r>
+              <a:rPr lang="en-GB" sz="800" b="1" dirty="0">
+                <a:latin typeface="Courier New" panose="02070309020205020404" pitchFamily="49" charset="0"/>
+                <a:cs typeface="Courier New" panose="02070309020205020404" pitchFamily="49" charset="0"/>
+              </a:rPr>
+              <a:t> </a:t>
+            </a:r>
+            <a:r>
+              <a:rPr lang="en-GB" sz="800" b="1" dirty="0" err="1">
+                <a:latin typeface="Courier New" panose="02070309020205020404" pitchFamily="49" charset="0"/>
+                <a:cs typeface="Courier New" panose="02070309020205020404" pitchFamily="49" charset="0"/>
+              </a:rPr>
+              <a:t>cvRef</a:t>
+            </a:r>
+            <a:r>
+              <a:rPr lang="en-GB" sz="800" b="1" dirty="0">
+                <a:latin typeface="Courier New" panose="02070309020205020404" pitchFamily="49" charset="0"/>
+                <a:cs typeface="Courier New" panose="02070309020205020404" pitchFamily="49" charset="0"/>
+              </a:rPr>
+              <a:t>="PSI-MS" accession="MS:1002637" name="chromosome name" value="1"/&gt;</a:t>
+            </a:r>
+          </a:p>
+          <a:p>
+            <a:r>
+              <a:rPr lang="en-GB" sz="800" b="1" dirty="0">
+                <a:latin typeface="Courier New" panose="02070309020205020404" pitchFamily="49" charset="0"/>
+                <a:cs typeface="Courier New" panose="02070309020205020404" pitchFamily="49" charset="0"/>
+              </a:rPr>
+              <a:t>    &lt;</a:t>
+            </a:r>
+            <a:r>
+              <a:rPr lang="en-GB" sz="800" b="1" dirty="0" err="1">
+                <a:latin typeface="Courier New" panose="02070309020205020404" pitchFamily="49" charset="0"/>
+                <a:cs typeface="Courier New" panose="02070309020205020404" pitchFamily="49" charset="0"/>
+              </a:rPr>
+              <a:t>cvParam</a:t>
+            </a:r>
+            <a:r>
+              <a:rPr lang="en-GB" sz="800" b="1" dirty="0">
+                <a:latin typeface="Courier New" panose="02070309020205020404" pitchFamily="49" charset="0"/>
+                <a:cs typeface="Courier New" panose="02070309020205020404" pitchFamily="49" charset="0"/>
+              </a:rPr>
+              <a:t> </a:t>
+            </a:r>
+            <a:r>
+              <a:rPr lang="en-GB" sz="800" b="1" dirty="0" err="1">
+                <a:latin typeface="Courier New" panose="02070309020205020404" pitchFamily="49" charset="0"/>
+                <a:cs typeface="Courier New" panose="02070309020205020404" pitchFamily="49" charset="0"/>
+              </a:rPr>
+              <a:t>cvRef</a:t>
+            </a:r>
+            <a:r>
+              <a:rPr lang="en-GB" sz="800" b="1" dirty="0">
+                <a:latin typeface="Courier New" panose="02070309020205020404" pitchFamily="49" charset="0"/>
+                <a:cs typeface="Courier New" panose="02070309020205020404" pitchFamily="49" charset="0"/>
+              </a:rPr>
+              <a:t>="PSI-MS" accession="MS:1002638" name="chromosome strand" value="+"/&gt;</a:t>
+            </a:r>
+          </a:p>
+          <a:p>
+            <a:r>
+              <a:rPr lang="en-GB" sz="800" b="1" dirty="0">
+                <a:latin typeface="Courier New" panose="02070309020205020404" pitchFamily="49" charset="0"/>
+                <a:cs typeface="Courier New" panose="02070309020205020404" pitchFamily="49" charset="0"/>
+              </a:rPr>
+              <a:t>    &lt;</a:t>
+            </a:r>
+            <a:r>
+              <a:rPr lang="en-GB" sz="800" b="1" dirty="0" err="1">
+                <a:latin typeface="Courier New" panose="02070309020205020404" pitchFamily="49" charset="0"/>
+                <a:cs typeface="Courier New" panose="02070309020205020404" pitchFamily="49" charset="0"/>
+              </a:rPr>
+              <a:t>cvParam</a:t>
+            </a:r>
+            <a:r>
+              <a:rPr lang="en-GB" sz="800" b="1" dirty="0">
+                <a:latin typeface="Courier New" panose="02070309020205020404" pitchFamily="49" charset="0"/>
+                <a:cs typeface="Courier New" panose="02070309020205020404" pitchFamily="49" charset="0"/>
+              </a:rPr>
+              <a:t> </a:t>
+            </a:r>
+            <a:r>
+              <a:rPr lang="en-GB" sz="800" b="1" dirty="0" err="1">
+                <a:latin typeface="Courier New" panose="02070309020205020404" pitchFamily="49" charset="0"/>
+                <a:cs typeface="Courier New" panose="02070309020205020404" pitchFamily="49" charset="0"/>
+              </a:rPr>
+              <a:t>cvRef</a:t>
+            </a:r>
+            <a:r>
+              <a:rPr lang="en-GB" sz="800" b="1" dirty="0">
+                <a:latin typeface="Courier New" panose="02070309020205020404" pitchFamily="49" charset="0"/>
+                <a:cs typeface="Courier New" panose="02070309020205020404" pitchFamily="49" charset="0"/>
+              </a:rPr>
+              <a:t>="PSI-MS" accession="MS:1002639" name="peptide start on chromosome" value="156646123"/&gt;</a:t>
+            </a:r>
+          </a:p>
+          <a:p>
+            <a:r>
+              <a:rPr lang="en-GB" sz="800" b="1" dirty="0">
+                <a:latin typeface="Courier New" panose="02070309020205020404" pitchFamily="49" charset="0"/>
+                <a:cs typeface="Courier New" panose="02070309020205020404" pitchFamily="49" charset="0"/>
+              </a:rPr>
+              <a:t>    &lt;</a:t>
+            </a:r>
+            <a:r>
+              <a:rPr lang="en-GB" sz="800" b="1" dirty="0" err="1">
+                <a:latin typeface="Courier New" panose="02070309020205020404" pitchFamily="49" charset="0"/>
+                <a:cs typeface="Courier New" panose="02070309020205020404" pitchFamily="49" charset="0"/>
+              </a:rPr>
+              <a:t>cvParam</a:t>
+            </a:r>
+            <a:r>
+              <a:rPr lang="en-GB" sz="800" b="1" dirty="0">
+                <a:latin typeface="Courier New" panose="02070309020205020404" pitchFamily="49" charset="0"/>
+                <a:cs typeface="Courier New" panose="02070309020205020404" pitchFamily="49" charset="0"/>
+              </a:rPr>
+              <a:t> </a:t>
+            </a:r>
+            <a:r>
+              <a:rPr lang="en-GB" sz="800" b="1" dirty="0" err="1">
+                <a:latin typeface="Courier New" panose="02070309020205020404" pitchFamily="49" charset="0"/>
+                <a:cs typeface="Courier New" panose="02070309020205020404" pitchFamily="49" charset="0"/>
+              </a:rPr>
+              <a:t>cvRef</a:t>
+            </a:r>
+            <a:r>
+              <a:rPr lang="en-GB" sz="800" b="1" dirty="0">
+                <a:latin typeface="Courier New" panose="02070309020205020404" pitchFamily="49" charset="0"/>
+                <a:cs typeface="Courier New" panose="02070309020205020404" pitchFamily="49" charset="0"/>
+              </a:rPr>
+              <a:t>="PSI-MS" accession="MS:1002640" name="peptide end on chromosome" value="156646808"/&gt;</a:t>
+            </a:r>
+          </a:p>
+          <a:p>
+            <a:r>
+              <a:rPr lang="en-GB" sz="800" b="1" dirty="0">
+                <a:latin typeface="Courier New" panose="02070309020205020404" pitchFamily="49" charset="0"/>
+                <a:cs typeface="Courier New" panose="02070309020205020404" pitchFamily="49" charset="0"/>
+              </a:rPr>
+              <a:t>    &lt;</a:t>
+            </a:r>
+            <a:r>
+              <a:rPr lang="en-GB" sz="800" b="1" dirty="0" err="1">
+                <a:latin typeface="Courier New" panose="02070309020205020404" pitchFamily="49" charset="0"/>
+                <a:cs typeface="Courier New" panose="02070309020205020404" pitchFamily="49" charset="0"/>
+              </a:rPr>
+              <a:t>cvParam</a:t>
+            </a:r>
+            <a:r>
+              <a:rPr lang="en-GB" sz="800" b="1" dirty="0">
+                <a:latin typeface="Courier New" panose="02070309020205020404" pitchFamily="49" charset="0"/>
+                <a:cs typeface="Courier New" panose="02070309020205020404" pitchFamily="49" charset="0"/>
+              </a:rPr>
+              <a:t> </a:t>
+            </a:r>
+            <a:r>
+              <a:rPr lang="en-GB" sz="800" b="1" dirty="0" err="1">
+                <a:latin typeface="Courier New" panose="02070309020205020404" pitchFamily="49" charset="0"/>
+                <a:cs typeface="Courier New" panose="02070309020205020404" pitchFamily="49" charset="0"/>
+              </a:rPr>
+              <a:t>cvRef</a:t>
+            </a:r>
+            <a:r>
+              <a:rPr lang="en-GB" sz="800" b="1" dirty="0">
+                <a:latin typeface="Courier New" panose="02070309020205020404" pitchFamily="49" charset="0"/>
+                <a:cs typeface="Courier New" panose="02070309020205020404" pitchFamily="49" charset="0"/>
+              </a:rPr>
+              <a:t>="PSI-MS" accession="MS:1002641" name="peptide exon count" value="2"/&gt;</a:t>
+            </a:r>
+          </a:p>
+          <a:p>
+            <a:r>
+              <a:rPr lang="en-GB" sz="800" b="1" dirty="0">
+                <a:latin typeface="Courier New" panose="02070309020205020404" pitchFamily="49" charset="0"/>
+                <a:cs typeface="Courier New" panose="02070309020205020404" pitchFamily="49" charset="0"/>
+              </a:rPr>
+              <a:t>    &lt;</a:t>
+            </a:r>
+            <a:r>
+              <a:rPr lang="en-GB" sz="800" b="1" dirty="0" err="1">
+                <a:latin typeface="Courier New" panose="02070309020205020404" pitchFamily="49" charset="0"/>
+                <a:cs typeface="Courier New" panose="02070309020205020404" pitchFamily="49" charset="0"/>
+              </a:rPr>
+              <a:t>cvParam</a:t>
+            </a:r>
+            <a:r>
+              <a:rPr lang="en-GB" sz="800" b="1" dirty="0">
+                <a:latin typeface="Courier New" panose="02070309020205020404" pitchFamily="49" charset="0"/>
+                <a:cs typeface="Courier New" panose="02070309020205020404" pitchFamily="49" charset="0"/>
+              </a:rPr>
+              <a:t> </a:t>
+            </a:r>
+            <a:r>
+              <a:rPr lang="en-GB" sz="800" b="1" dirty="0" err="1">
+                <a:latin typeface="Courier New" panose="02070309020205020404" pitchFamily="49" charset="0"/>
+                <a:cs typeface="Courier New" panose="02070309020205020404" pitchFamily="49" charset="0"/>
+              </a:rPr>
+              <a:t>cvRef</a:t>
+            </a:r>
+            <a:r>
+              <a:rPr lang="en-GB" sz="800" b="1" dirty="0">
+                <a:latin typeface="Courier New" panose="02070309020205020404" pitchFamily="49" charset="0"/>
+                <a:cs typeface="Courier New" panose="02070309020205020404" pitchFamily="49" charset="0"/>
+              </a:rPr>
+              <a:t>="PSI-MS" accession="MS:1002642" name="peptide exon nucleotide sizes" value="</a:t>
+            </a:r>
+            <a:r>
+              <a:rPr lang="en-GB" sz="800" b="1" dirty="0" smtClean="0">
+                <a:latin typeface="Courier New" panose="02070309020205020404" pitchFamily="49" charset="0"/>
+                <a:cs typeface="Courier New" panose="02070309020205020404" pitchFamily="49" charset="0"/>
+              </a:rPr>
+              <a:t>25,8"/&gt;</a:t>
+            </a:r>
+            <a:endParaRPr lang="en-GB" sz="800" b="1" dirty="0">
+              <a:latin typeface="Courier New" panose="02070309020205020404" pitchFamily="49" charset="0"/>
+              <a:cs typeface="Courier New" panose="02070309020205020404" pitchFamily="49" charset="0"/>
+            </a:endParaRPr>
+          </a:p>
+          <a:p>
+            <a:r>
+              <a:rPr lang="en-GB" sz="800" b="1" dirty="0">
+                <a:latin typeface="Courier New" panose="02070309020205020404" pitchFamily="49" charset="0"/>
+                <a:cs typeface="Courier New" panose="02070309020205020404" pitchFamily="49" charset="0"/>
+              </a:rPr>
+              <a:t>    &lt;</a:t>
+            </a:r>
+            <a:r>
+              <a:rPr lang="en-GB" sz="800" b="1" dirty="0" err="1">
+                <a:latin typeface="Courier New" panose="02070309020205020404" pitchFamily="49" charset="0"/>
+                <a:cs typeface="Courier New" panose="02070309020205020404" pitchFamily="49" charset="0"/>
+              </a:rPr>
+              <a:t>cvParam</a:t>
+            </a:r>
+            <a:r>
+              <a:rPr lang="en-GB" sz="800" b="1" dirty="0">
+                <a:latin typeface="Courier New" panose="02070309020205020404" pitchFamily="49" charset="0"/>
+                <a:cs typeface="Courier New" panose="02070309020205020404" pitchFamily="49" charset="0"/>
+              </a:rPr>
+              <a:t> </a:t>
+            </a:r>
+            <a:r>
+              <a:rPr lang="en-GB" sz="800" b="1" dirty="0" err="1">
+                <a:latin typeface="Courier New" panose="02070309020205020404" pitchFamily="49" charset="0"/>
+                <a:cs typeface="Courier New" panose="02070309020205020404" pitchFamily="49" charset="0"/>
+              </a:rPr>
+              <a:t>cvRef</a:t>
+            </a:r>
+            <a:r>
+              <a:rPr lang="en-GB" sz="800" b="1" dirty="0">
+                <a:latin typeface="Courier New" panose="02070309020205020404" pitchFamily="49" charset="0"/>
+                <a:cs typeface="Courier New" panose="02070309020205020404" pitchFamily="49" charset="0"/>
+              </a:rPr>
+              <a:t>="PSI-MS" accession="MS:1002643" name="peptide start positions on chromosome" value="</a:t>
+            </a:r>
+            <a:r>
+              <a:rPr lang="en-GB" sz="800" b="1" dirty="0" smtClean="0">
+                <a:latin typeface="Courier New" panose="02070309020205020404" pitchFamily="49" charset="0"/>
+                <a:cs typeface="Courier New" panose="02070309020205020404" pitchFamily="49" charset="0"/>
+              </a:rPr>
+              <a:t>156646122,156646800"/&gt;</a:t>
+            </a:r>
+            <a:endParaRPr lang="en-GB" sz="800" b="1" dirty="0">
+              <a:latin typeface="Courier New" panose="02070309020205020404" pitchFamily="49" charset="0"/>
+              <a:cs typeface="Courier New" panose="02070309020205020404" pitchFamily="49" charset="0"/>
+            </a:endParaRPr>
+          </a:p>
+          <a:p>
+            <a:r>
+              <a:rPr lang="en-GB" sz="800" dirty="0">
+                <a:latin typeface="Courier New" panose="02070309020205020404" pitchFamily="49" charset="0"/>
+                <a:cs typeface="Courier New" panose="02070309020205020404" pitchFamily="49" charset="0"/>
+              </a:rPr>
+              <a:t>  &lt;/</a:t>
+            </a:r>
+            <a:r>
+              <a:rPr lang="en-GB" sz="800" dirty="0" err="1">
+                <a:latin typeface="Courier New" panose="02070309020205020404" pitchFamily="49" charset="0"/>
+                <a:cs typeface="Courier New" panose="02070309020205020404" pitchFamily="49" charset="0"/>
+              </a:rPr>
+              <a:t>PeptideEvidence</a:t>
+            </a:r>
+            <a:r>
+              <a:rPr lang="en-GB" sz="800" dirty="0">
+                <a:latin typeface="Courier New" panose="02070309020205020404" pitchFamily="49" charset="0"/>
+                <a:cs typeface="Courier New" panose="02070309020205020404" pitchFamily="49" charset="0"/>
+              </a:rPr>
+              <a:t>&gt;</a:t>
+            </a:r>
+            <a:endParaRPr lang="en-GB" sz="800" dirty="0">
+              <a:latin typeface="Courier New" pitchFamily="49" charset="0"/>
+              <a:cs typeface="Courier New" pitchFamily="49" charset="0"/>
+            </a:endParaRPr>
+          </a:p>
+        </p:txBody>
+      </p:sp>
+      <p:sp>
+        <p:nvSpPr>
+          <p:cNvPr id="6" name="TextBox 5"/>
+          <p:cNvSpPr txBox="1"/>
+          <p:nvPr/>
+        </p:nvSpPr>
+        <p:spPr>
+          <a:xfrm>
+            <a:off x="6404906" y="963509"/>
+            <a:ext cx="327334" cy="369332"/>
+          </a:xfrm>
+          <a:prstGeom prst="rect">
+            <a:avLst/>
+          </a:prstGeom>
+          <a:noFill/>
+        </p:spPr>
+        <p:txBody>
+          <a:bodyPr wrap="none" rtlCol="0">
+            <a:spAutoFit/>
+          </a:bodyPr>
+          <a:lstStyle/>
+          <a:p>
+            <a:r>
+              <a:rPr lang="en-GB" dirty="0" smtClean="0"/>
+              <a:t>A</a:t>
+            </a:r>
+            <a:endParaRPr lang="en-GB" dirty="0"/>
+          </a:p>
+        </p:txBody>
+      </p:sp>
+      <p:sp>
+        <p:nvSpPr>
+          <p:cNvPr id="7" name="TextBox 6"/>
+          <p:cNvSpPr txBox="1"/>
+          <p:nvPr/>
+        </p:nvSpPr>
+        <p:spPr>
+          <a:xfrm>
+            <a:off x="6422540" y="2511098"/>
+            <a:ext cx="309700" cy="369332"/>
+          </a:xfrm>
+          <a:prstGeom prst="rect">
+            <a:avLst/>
+          </a:prstGeom>
+          <a:noFill/>
+        </p:spPr>
+        <p:txBody>
+          <a:bodyPr wrap="none" rtlCol="0">
+            <a:spAutoFit/>
+          </a:bodyPr>
+          <a:lstStyle/>
+          <a:p>
+            <a:r>
+              <a:rPr lang="en-GB" dirty="0"/>
+              <a:t>B</a:t>
+            </a:r>
+          </a:p>
+        </p:txBody>
+      </p:sp>
+      <p:sp>
+        <p:nvSpPr>
+          <p:cNvPr id="8" name="TextBox 7"/>
+          <p:cNvSpPr txBox="1"/>
+          <p:nvPr/>
+        </p:nvSpPr>
+        <p:spPr>
+          <a:xfrm>
+            <a:off x="395536" y="3979228"/>
+            <a:ext cx="6657442" cy="1446550"/>
+          </a:xfrm>
+          <a:prstGeom prst="rect">
+            <a:avLst/>
+          </a:prstGeom>
+          <a:noFill/>
+          <a:ln w="22225">
+            <a:solidFill>
+              <a:schemeClr val="tx1"/>
+            </a:solidFill>
+            <a:prstDash val="sysDot"/>
+          </a:ln>
+        </p:spPr>
+        <p:txBody>
+          <a:bodyPr wrap="square" rtlCol="0">
+            <a:spAutoFit/>
+          </a:bodyPr>
+          <a:lstStyle/>
+          <a:p>
+            <a:r>
+              <a:rPr lang="en-GB" sz="800" dirty="0">
+                <a:latin typeface="Courier New" panose="02070309020205020404" pitchFamily="49" charset="0"/>
+                <a:cs typeface="Courier New" panose="02070309020205020404" pitchFamily="49" charset="0"/>
+              </a:rPr>
+              <a:t> &lt;</a:t>
+            </a:r>
+            <a:r>
+              <a:rPr lang="en-GB" sz="800" dirty="0" err="1">
+                <a:latin typeface="Courier New" panose="02070309020205020404" pitchFamily="49" charset="0"/>
+                <a:cs typeface="Courier New" panose="02070309020205020404" pitchFamily="49" charset="0"/>
+              </a:rPr>
+              <a:t>SearchDatabase</a:t>
+            </a:r>
+            <a:r>
+              <a:rPr lang="en-GB" sz="800" dirty="0">
+                <a:latin typeface="Courier New" panose="02070309020205020404" pitchFamily="49" charset="0"/>
+                <a:cs typeface="Courier New" panose="02070309020205020404" pitchFamily="49" charset="0"/>
+              </a:rPr>
+              <a:t> </a:t>
+            </a:r>
+            <a:r>
+              <a:rPr lang="en-GB" sz="800" dirty="0" err="1">
+                <a:latin typeface="Courier New" panose="02070309020205020404" pitchFamily="49" charset="0"/>
+                <a:cs typeface="Courier New" panose="02070309020205020404" pitchFamily="49" charset="0"/>
+              </a:rPr>
+              <a:t>numDatabaseSequences</a:t>
+            </a:r>
+            <a:r>
+              <a:rPr lang="en-GB" sz="800" dirty="0">
+                <a:latin typeface="Courier New" panose="02070309020205020404" pitchFamily="49" charset="0"/>
+                <a:cs typeface="Courier New" panose="02070309020205020404" pitchFamily="49" charset="0"/>
+              </a:rPr>
+              <a:t>="299106" location="PXD000764_34939_combined_concatenated_target_decoy.fasta" id="SearchDB_1"&gt;</a:t>
+            </a:r>
+          </a:p>
+          <a:p>
+            <a:r>
+              <a:rPr lang="en-GB" sz="800" dirty="0">
+                <a:latin typeface="Courier New" panose="02070309020205020404" pitchFamily="49" charset="0"/>
+                <a:cs typeface="Courier New" panose="02070309020205020404" pitchFamily="49" charset="0"/>
+              </a:rPr>
+              <a:t>    &lt;</a:t>
+            </a:r>
+            <a:r>
+              <a:rPr lang="en-GB" sz="800" dirty="0" err="1">
+                <a:latin typeface="Courier New" panose="02070309020205020404" pitchFamily="49" charset="0"/>
+                <a:cs typeface="Courier New" panose="02070309020205020404" pitchFamily="49" charset="0"/>
+              </a:rPr>
+              <a:t>FileFormat</a:t>
+            </a:r>
+            <a:r>
+              <a:rPr lang="en-GB" sz="800" dirty="0">
+                <a:latin typeface="Courier New" panose="02070309020205020404" pitchFamily="49" charset="0"/>
+                <a:cs typeface="Courier New" panose="02070309020205020404" pitchFamily="49" charset="0"/>
+              </a:rPr>
+              <a:t>&gt;</a:t>
+            </a:r>
+          </a:p>
+          <a:p>
+            <a:r>
+              <a:rPr lang="en-GB" sz="800" dirty="0">
+                <a:latin typeface="Courier New" panose="02070309020205020404" pitchFamily="49" charset="0"/>
+                <a:cs typeface="Courier New" panose="02070309020205020404" pitchFamily="49" charset="0"/>
+              </a:rPr>
+              <a:t>      &lt;</a:t>
+            </a:r>
+            <a:r>
+              <a:rPr lang="en-GB" sz="800" dirty="0" err="1">
+                <a:latin typeface="Courier New" panose="02070309020205020404" pitchFamily="49" charset="0"/>
+                <a:cs typeface="Courier New" panose="02070309020205020404" pitchFamily="49" charset="0"/>
+              </a:rPr>
+              <a:t>cvParam</a:t>
+            </a:r>
+            <a:r>
+              <a:rPr lang="en-GB" sz="800" dirty="0">
+                <a:latin typeface="Courier New" panose="02070309020205020404" pitchFamily="49" charset="0"/>
+                <a:cs typeface="Courier New" panose="02070309020205020404" pitchFamily="49" charset="0"/>
+              </a:rPr>
+              <a:t> </a:t>
+            </a:r>
+            <a:r>
+              <a:rPr lang="en-GB" sz="800" dirty="0" err="1">
+                <a:latin typeface="Courier New" panose="02070309020205020404" pitchFamily="49" charset="0"/>
+                <a:cs typeface="Courier New" panose="02070309020205020404" pitchFamily="49" charset="0"/>
+              </a:rPr>
+              <a:t>cvRef</a:t>
+            </a:r>
+            <a:r>
+              <a:rPr lang="en-GB" sz="800" dirty="0">
+                <a:latin typeface="Courier New" panose="02070309020205020404" pitchFamily="49" charset="0"/>
+                <a:cs typeface="Courier New" panose="02070309020205020404" pitchFamily="49" charset="0"/>
+              </a:rPr>
+              <a:t>="PSI-MS" accession="MS:1001348" name="FASTA format"/&gt;</a:t>
+            </a:r>
+          </a:p>
+          <a:p>
+            <a:r>
+              <a:rPr lang="en-GB" sz="800" dirty="0">
+                <a:latin typeface="Courier New" panose="02070309020205020404" pitchFamily="49" charset="0"/>
+                <a:cs typeface="Courier New" panose="02070309020205020404" pitchFamily="49" charset="0"/>
+              </a:rPr>
+              <a:t>    &lt;/</a:t>
+            </a:r>
+            <a:r>
+              <a:rPr lang="en-GB" sz="800" dirty="0" err="1">
+                <a:latin typeface="Courier New" panose="02070309020205020404" pitchFamily="49" charset="0"/>
+                <a:cs typeface="Courier New" panose="02070309020205020404" pitchFamily="49" charset="0"/>
+              </a:rPr>
+              <a:t>FileFormat</a:t>
+            </a:r>
+            <a:r>
+              <a:rPr lang="en-GB" sz="800" dirty="0">
+                <a:latin typeface="Courier New" panose="02070309020205020404" pitchFamily="49" charset="0"/>
+                <a:cs typeface="Courier New" panose="02070309020205020404" pitchFamily="49" charset="0"/>
+              </a:rPr>
+              <a:t>&gt;</a:t>
+            </a:r>
+          </a:p>
+          <a:p>
+            <a:r>
+              <a:rPr lang="en-GB" sz="800" dirty="0">
+                <a:latin typeface="Courier New" panose="02070309020205020404" pitchFamily="49" charset="0"/>
+                <a:cs typeface="Courier New" panose="02070309020205020404" pitchFamily="49" charset="0"/>
+              </a:rPr>
+              <a:t>    &lt;</a:t>
+            </a:r>
+            <a:r>
+              <a:rPr lang="en-GB" sz="800" dirty="0" err="1">
+                <a:latin typeface="Courier New" panose="02070309020205020404" pitchFamily="49" charset="0"/>
+                <a:cs typeface="Courier New" panose="02070309020205020404" pitchFamily="49" charset="0"/>
+              </a:rPr>
+              <a:t>DatabaseName</a:t>
+            </a:r>
+            <a:r>
+              <a:rPr lang="en-GB" sz="800" dirty="0">
+                <a:latin typeface="Courier New" panose="02070309020205020404" pitchFamily="49" charset="0"/>
+                <a:cs typeface="Courier New" panose="02070309020205020404" pitchFamily="49" charset="0"/>
+              </a:rPr>
+              <a:t>&gt;</a:t>
+            </a:r>
+          </a:p>
+          <a:p>
+            <a:r>
+              <a:rPr lang="en-GB" sz="800" dirty="0">
+                <a:latin typeface="Courier New" panose="02070309020205020404" pitchFamily="49" charset="0"/>
+                <a:cs typeface="Courier New" panose="02070309020205020404" pitchFamily="49" charset="0"/>
+              </a:rPr>
+              <a:t>      &lt;</a:t>
+            </a:r>
+            <a:r>
+              <a:rPr lang="en-GB" sz="800" dirty="0" err="1">
+                <a:latin typeface="Courier New" panose="02070309020205020404" pitchFamily="49" charset="0"/>
+                <a:cs typeface="Courier New" panose="02070309020205020404" pitchFamily="49" charset="0"/>
+              </a:rPr>
+              <a:t>userParam</a:t>
+            </a:r>
+            <a:r>
+              <a:rPr lang="en-GB" sz="800" dirty="0">
+                <a:latin typeface="Courier New" panose="02070309020205020404" pitchFamily="49" charset="0"/>
+                <a:cs typeface="Courier New" panose="02070309020205020404" pitchFamily="49" charset="0"/>
+              </a:rPr>
+              <a:t> name="PXD000764_34939_combined_concatenated_target_decoy.fasta"&gt;&lt;/</a:t>
+            </a:r>
+            <a:r>
+              <a:rPr lang="en-GB" sz="800" dirty="0" err="1">
+                <a:latin typeface="Courier New" panose="02070309020205020404" pitchFamily="49" charset="0"/>
+                <a:cs typeface="Courier New" panose="02070309020205020404" pitchFamily="49" charset="0"/>
+              </a:rPr>
+              <a:t>userParam</a:t>
+            </a:r>
+            <a:r>
+              <a:rPr lang="en-GB" sz="800" dirty="0">
+                <a:latin typeface="Courier New" panose="02070309020205020404" pitchFamily="49" charset="0"/>
+                <a:cs typeface="Courier New" panose="02070309020205020404" pitchFamily="49" charset="0"/>
+              </a:rPr>
+              <a:t>&gt;      </a:t>
+            </a:r>
+          </a:p>
+          <a:p>
+            <a:r>
+              <a:rPr lang="en-GB" sz="800" dirty="0">
+                <a:latin typeface="Courier New" panose="02070309020205020404" pitchFamily="49" charset="0"/>
+                <a:cs typeface="Courier New" panose="02070309020205020404" pitchFamily="49" charset="0"/>
+              </a:rPr>
+              <a:t>    &lt;/</a:t>
+            </a:r>
+            <a:r>
+              <a:rPr lang="en-GB" sz="800" dirty="0" err="1">
+                <a:latin typeface="Courier New" panose="02070309020205020404" pitchFamily="49" charset="0"/>
+                <a:cs typeface="Courier New" panose="02070309020205020404" pitchFamily="49" charset="0"/>
+              </a:rPr>
+              <a:t>DatabaseName</a:t>
+            </a:r>
+            <a:r>
+              <a:rPr lang="en-GB" sz="800" dirty="0">
+                <a:latin typeface="Courier New" panose="02070309020205020404" pitchFamily="49" charset="0"/>
+                <a:cs typeface="Courier New" panose="02070309020205020404" pitchFamily="49" charset="0"/>
+              </a:rPr>
+              <a:t>&gt;</a:t>
+            </a:r>
+          </a:p>
+          <a:p>
+            <a:r>
+              <a:rPr lang="en-GB" sz="800" b="1" dirty="0">
+                <a:latin typeface="Courier New" panose="02070309020205020404" pitchFamily="49" charset="0"/>
+                <a:cs typeface="Courier New" panose="02070309020205020404" pitchFamily="49" charset="0"/>
+              </a:rPr>
+              <a:t>    &lt;</a:t>
+            </a:r>
+            <a:r>
+              <a:rPr lang="en-GB" sz="800" b="1" dirty="0" err="1">
+                <a:latin typeface="Courier New" panose="02070309020205020404" pitchFamily="49" charset="0"/>
+                <a:cs typeface="Courier New" panose="02070309020205020404" pitchFamily="49" charset="0"/>
+              </a:rPr>
+              <a:t>cvParam</a:t>
+            </a:r>
+            <a:r>
+              <a:rPr lang="en-GB" sz="800" b="1" dirty="0">
+                <a:latin typeface="Courier New" panose="02070309020205020404" pitchFamily="49" charset="0"/>
+                <a:cs typeface="Courier New" panose="02070309020205020404" pitchFamily="49" charset="0"/>
+              </a:rPr>
+              <a:t> </a:t>
+            </a:r>
+            <a:r>
+              <a:rPr lang="en-GB" sz="800" b="1" dirty="0" err="1">
+                <a:latin typeface="Courier New" panose="02070309020205020404" pitchFamily="49" charset="0"/>
+                <a:cs typeface="Courier New" panose="02070309020205020404" pitchFamily="49" charset="0"/>
+              </a:rPr>
+              <a:t>cvRef</a:t>
+            </a:r>
+            <a:r>
+              <a:rPr lang="en-GB" sz="800" b="1" dirty="0">
+                <a:latin typeface="Courier New" panose="02070309020205020404" pitchFamily="49" charset="0"/>
+                <a:cs typeface="Courier New" panose="02070309020205020404" pitchFamily="49" charset="0"/>
+              </a:rPr>
+              <a:t>="PSI-MS" accession="MS:1002644" name="genome reference version" value="Homo_sapiens.GRCh38.77.gff3"/&gt;</a:t>
+            </a:r>
+          </a:p>
+          <a:p>
+            <a:r>
+              <a:rPr lang="en-GB" sz="800" dirty="0">
+                <a:latin typeface="Courier New" panose="02070309020205020404" pitchFamily="49" charset="0"/>
+                <a:cs typeface="Courier New" panose="02070309020205020404" pitchFamily="49" charset="0"/>
+              </a:rPr>
+              <a:t>  &lt;/</a:t>
+            </a:r>
+            <a:r>
+              <a:rPr lang="en-GB" sz="800" dirty="0" err="1">
+                <a:latin typeface="Courier New" panose="02070309020205020404" pitchFamily="49" charset="0"/>
+                <a:cs typeface="Courier New" panose="02070309020205020404" pitchFamily="49" charset="0"/>
+              </a:rPr>
+              <a:t>SearchDatabase</a:t>
+            </a:r>
+            <a:r>
+              <a:rPr lang="en-GB" sz="800" dirty="0">
+                <a:latin typeface="Courier New" panose="02070309020205020404" pitchFamily="49" charset="0"/>
+                <a:cs typeface="Courier New" panose="02070309020205020404" pitchFamily="49" charset="0"/>
+              </a:rPr>
+              <a:t>&gt;</a:t>
+            </a:r>
+            <a:endParaRPr lang="en-GB" sz="800" dirty="0" smtClean="0">
+              <a:latin typeface="Courier New" pitchFamily="49" charset="0"/>
+              <a:cs typeface="Courier New" pitchFamily="49" charset="0"/>
+            </a:endParaRPr>
+          </a:p>
+        </p:txBody>
+      </p:sp>
+      <p:graphicFrame>
+        <p:nvGraphicFramePr>
+          <p:cNvPr id="10" name="Table 9"/>
+          <p:cNvGraphicFramePr>
+            <a:graphicFrameLocks noGrp="1"/>
+          </p:cNvGraphicFramePr>
+          <p:nvPr>
+            <p:extLst>
+              <p:ext uri="{D42A27DB-BD31-4B8C-83A1-F6EECF244321}">
+                <p14:modId xmlns:p14="http://schemas.microsoft.com/office/powerpoint/2010/main" val="1636924488"/>
+              </p:ext>
+            </p:extLst>
+          </p:nvPr>
+        </p:nvGraphicFramePr>
+        <p:xfrm>
+          <a:off x="395536" y="5559128"/>
+          <a:ext cx="6657442" cy="2941320"/>
+        </p:xfrm>
+        <a:graphic>
+          <a:graphicData uri="http://schemas.openxmlformats.org/drawingml/2006/table">
+            <a:tbl>
+              <a:tblPr firstRow="1" bandRow="1">
+                <a:tableStyleId>{5C22544A-7EE6-4342-B048-85BDC9FD1C3A}</a:tableStyleId>
+              </a:tblPr>
+              <a:tblGrid>
+                <a:gridCol w="698385"/>
+                <a:gridCol w="5959057"/>
+              </a:tblGrid>
+              <a:tr h="370840">
+                <a:tc>
+                  <a:txBody>
+                    <a:bodyPr/>
+                    <a:lstStyle/>
+                    <a:p>
+                      <a:r>
+                        <a:rPr lang="en-GB" sz="1200" dirty="0" smtClean="0"/>
+                        <a:t>Feature </a:t>
+                      </a:r>
+                      <a:endParaRPr lang="en-GB" sz="1200" dirty="0"/>
+                    </a:p>
+                  </a:txBody>
+                  <a:tcPr/>
+                </a:tc>
+                <a:tc>
+                  <a:txBody>
+                    <a:bodyPr/>
+                    <a:lstStyle/>
+                    <a:p>
+                      <a:r>
+                        <a:rPr lang="en-GB" sz="1200" dirty="0" smtClean="0"/>
+                        <a:t>Explanation</a:t>
+                      </a:r>
+                      <a:endParaRPr lang="en-GB" sz="1200" dirty="0"/>
+                    </a:p>
+                  </a:txBody>
+                  <a:tcPr/>
+                </a:tc>
+              </a:tr>
+              <a:tr h="370840">
+                <a:tc>
+                  <a:txBody>
+                    <a:bodyPr/>
+                    <a:lstStyle/>
+                    <a:p>
+                      <a:r>
+                        <a:rPr lang="en-GB" sz="1200" dirty="0" smtClean="0"/>
+                        <a:t>A</a:t>
+                      </a:r>
+                      <a:endParaRPr lang="en-GB" sz="1200" dirty="0"/>
+                    </a:p>
+                  </a:txBody>
+                  <a:tcPr/>
+                </a:tc>
+                <a:tc>
+                  <a:txBody>
+                    <a:bodyPr/>
+                    <a:lstStyle/>
+                    <a:p>
+                      <a:r>
+                        <a:rPr lang="en-GB" sz="1200" dirty="0" smtClean="0"/>
+                        <a:t>If a </a:t>
+                      </a:r>
+                      <a:r>
+                        <a:rPr lang="en-GB" sz="1200" dirty="0" err="1" smtClean="0"/>
+                        <a:t>proteogenomics</a:t>
+                      </a:r>
+                      <a:r>
+                        <a:rPr lang="en-GB" sz="1200" dirty="0" smtClean="0"/>
+                        <a:t> </a:t>
+                      </a:r>
+                      <a:r>
+                        <a:rPr lang="en-GB" sz="1200" dirty="0" smtClean="0"/>
+                        <a:t>search </a:t>
+                      </a:r>
+                      <a:r>
+                        <a:rPr lang="en-GB" sz="1200" baseline="0" dirty="0" smtClean="0"/>
+                        <a:t>has been performed, this </a:t>
+                      </a:r>
+                      <a:r>
+                        <a:rPr lang="en-GB" sz="1200" baseline="0" dirty="0" err="1" smtClean="0"/>
+                        <a:t>cvParam</a:t>
+                      </a:r>
+                      <a:r>
+                        <a:rPr lang="en-GB" sz="1200" baseline="0" dirty="0" smtClean="0"/>
+                        <a:t> MUST be present</a:t>
+                      </a:r>
+                      <a:r>
+                        <a:rPr lang="en-GB" sz="1200" baseline="0" dirty="0" smtClean="0"/>
+                        <a:t>.</a:t>
+                      </a:r>
+                      <a:endParaRPr lang="en-GB" sz="1200" dirty="0"/>
+                    </a:p>
+                  </a:txBody>
+                  <a:tcPr/>
+                </a:tc>
+              </a:tr>
+              <a:tr h="370840">
+                <a:tc>
+                  <a:txBody>
+                    <a:bodyPr/>
+                    <a:lstStyle/>
+                    <a:p>
+                      <a:r>
+                        <a:rPr lang="en-GB" sz="1200" dirty="0" smtClean="0">
+                          <a:latin typeface="+mj-lt"/>
+                        </a:rPr>
+                        <a:t>B</a:t>
+                      </a:r>
+                      <a:endParaRPr lang="en-GB" sz="1200" dirty="0">
+                        <a:latin typeface="+mj-lt"/>
+                      </a:endParaRPr>
+                    </a:p>
+                  </a:txBody>
+                  <a:tcPr/>
+                </a:tc>
+                <a:tc>
+                  <a:txBody>
+                    <a:bodyPr/>
+                    <a:lstStyle/>
+                    <a:p>
+                      <a:r>
+                        <a:rPr lang="en-GB" sz="1200" dirty="0" smtClean="0">
+                          <a:latin typeface="+mj-lt"/>
+                        </a:rPr>
+                        <a:t>These</a:t>
+                      </a:r>
+                      <a:r>
+                        <a:rPr lang="en-GB" sz="1200" baseline="0" dirty="0" smtClean="0">
+                          <a:latin typeface="+mj-lt"/>
+                        </a:rPr>
+                        <a:t> seven cv terms MUST be present on every </a:t>
+                      </a:r>
+                      <a:r>
+                        <a:rPr lang="en-GB" sz="1200" baseline="0" dirty="0" err="1" smtClean="0">
+                          <a:latin typeface="+mj-lt"/>
+                        </a:rPr>
+                        <a:t>PeptideEvidence</a:t>
+                      </a:r>
+                      <a:r>
+                        <a:rPr lang="en-GB" sz="1200" baseline="0" dirty="0" smtClean="0">
+                          <a:latin typeface="+mj-lt"/>
+                        </a:rPr>
+                        <a:t>, unless </a:t>
+                      </a:r>
+                      <a:r>
+                        <a:rPr lang="en-GB" sz="1200" baseline="0" dirty="0" err="1" smtClean="0">
+                          <a:latin typeface="+mj-lt"/>
+                        </a:rPr>
+                        <a:t>isDecoy</a:t>
+                      </a:r>
+                      <a:r>
+                        <a:rPr lang="en-GB" sz="1200" baseline="0" dirty="0" smtClean="0">
+                          <a:latin typeface="+mj-lt"/>
+                        </a:rPr>
+                        <a:t>=“true”, in which case they are optional.  In this example, peptide DVLEGDSSEDR crosses an exon boundary. The N-terminal region of the peptide is mapped to positions 156646123 – </a:t>
+                      </a:r>
+                      <a:r>
+                        <a:rPr lang="en-GB" sz="1200" b="0" dirty="0" smtClean="0">
+                          <a:latin typeface="+mj-lt"/>
+                          <a:cs typeface="Courier New" panose="02070309020205020404" pitchFamily="49" charset="0"/>
+                        </a:rPr>
+                        <a:t>156646148 (start + 25</a:t>
+                      </a:r>
+                      <a:r>
+                        <a:rPr lang="en-GB" sz="1200" b="0" baseline="0" dirty="0" smtClean="0">
+                          <a:latin typeface="+mj-lt"/>
+                          <a:cs typeface="Courier New" panose="02070309020205020404" pitchFamily="49" charset="0"/>
+                        </a:rPr>
+                        <a:t> from peptide exon nucleotide sizes). The C-terminal region of the peptide is mapped from 156646800 to 156646808 (second value of “peptide start positions on chromosome” + 8). Definitions of terms are provided below</a:t>
+                      </a:r>
+                      <a:endParaRPr lang="en-GB" sz="1200" b="0" dirty="0">
+                        <a:latin typeface="+mj-lt"/>
+                      </a:endParaRPr>
+                    </a:p>
+                  </a:txBody>
+                  <a:tcPr/>
+                </a:tc>
+              </a:tr>
+              <a:tr h="370840">
+                <a:tc>
+                  <a:txBody>
+                    <a:bodyPr/>
+                    <a:lstStyle/>
+                    <a:p>
+                      <a:r>
+                        <a:rPr lang="en-GB" sz="1200" dirty="0" smtClean="0"/>
+                        <a:t>C</a:t>
+                      </a:r>
+                      <a:endParaRPr lang="en-GB" sz="1200" dirty="0"/>
+                    </a:p>
+                  </a:txBody>
+                  <a:tcPr/>
+                </a:tc>
+                <a:tc>
+                  <a:txBody>
+                    <a:bodyPr/>
+                    <a:lstStyle/>
+                    <a:p>
+                      <a:r>
+                        <a:rPr lang="en-GB" sz="1200" dirty="0" smtClean="0"/>
+                        <a:t>Additional CV terms MAY be added at a later date to encode</a:t>
+                      </a:r>
+                      <a:r>
+                        <a:rPr lang="en-GB" sz="1200" baseline="0" dirty="0" smtClean="0"/>
+                        <a:t> classifications of peptide types, such as “novel junction”, “novel N-terminus” and so on. Such information MAY be encoded on </a:t>
+                      </a:r>
+                      <a:r>
+                        <a:rPr lang="en-GB" sz="1200" baseline="0" dirty="0" err="1" smtClean="0"/>
+                        <a:t>SpectrumIdentificationItem</a:t>
+                      </a:r>
+                      <a:r>
+                        <a:rPr lang="en-GB" sz="1200" baseline="0" dirty="0" smtClean="0"/>
+                        <a:t>, using the peptide-level scores type of encoding.</a:t>
+                      </a:r>
+                      <a:endParaRPr lang="en-GB" sz="1200" dirty="0">
+                        <a:solidFill>
+                          <a:srgbClr val="C00000"/>
+                        </a:solidFill>
+                      </a:endParaRPr>
+                    </a:p>
+                  </a:txBody>
+                  <a:tcPr/>
+                </a:tc>
+              </a:tr>
+              <a:tr h="370840">
+                <a:tc>
+                  <a:txBody>
+                    <a:bodyPr/>
+                    <a:lstStyle/>
+                    <a:p>
+                      <a:r>
+                        <a:rPr lang="en-GB" sz="1200" dirty="0" smtClean="0"/>
+                        <a:t>D</a:t>
+                      </a:r>
+                      <a:endParaRPr lang="en-GB" sz="1200" dirty="0"/>
+                    </a:p>
+                  </a:txBody>
+                  <a:tcPr/>
+                </a:tc>
+                <a:tc>
+                  <a:txBody>
+                    <a:bodyPr/>
+                    <a:lstStyle/>
+                    <a:p>
+                      <a:r>
+                        <a:rPr lang="en-GB" sz="1200" i="0" baseline="0" dirty="0" smtClean="0"/>
+                        <a:t>The </a:t>
+                      </a:r>
+                      <a:r>
+                        <a:rPr lang="en-GB" sz="1200" i="0" baseline="0" dirty="0" err="1" smtClean="0"/>
+                        <a:t>SearchDatabase</a:t>
+                      </a:r>
+                      <a:r>
+                        <a:rPr lang="en-GB" sz="1200" i="0" baseline="0" dirty="0" smtClean="0"/>
+                        <a:t> MUST store the genome reference version. </a:t>
+                      </a:r>
+                      <a:r>
+                        <a:rPr lang="en-GB" sz="1200" i="0" baseline="0" dirty="0" smtClean="0">
+                          <a:solidFill>
+                            <a:srgbClr val="C00000"/>
+                          </a:solidFill>
+                        </a:rPr>
+                        <a:t>STILL UNDER DISCUSSION.</a:t>
+                      </a:r>
+                      <a:endParaRPr lang="en-GB" sz="1200" i="0" baseline="0" dirty="0" smtClean="0">
+                        <a:solidFill>
+                          <a:srgbClr val="C00000"/>
+                        </a:solidFill>
+                      </a:endParaRPr>
+                    </a:p>
+                  </a:txBody>
+                  <a:tcPr/>
+                </a:tc>
+              </a:tr>
+            </a:tbl>
+          </a:graphicData>
+        </a:graphic>
+      </p:graphicFrame>
+      <p:sp>
+        <p:nvSpPr>
+          <p:cNvPr id="11" name="TextBox 10"/>
+          <p:cNvSpPr txBox="1"/>
+          <p:nvPr/>
+        </p:nvSpPr>
+        <p:spPr>
+          <a:xfrm>
+            <a:off x="6413723" y="3476546"/>
+            <a:ext cx="309700" cy="369332"/>
+          </a:xfrm>
+          <a:prstGeom prst="rect">
+            <a:avLst/>
+          </a:prstGeom>
+          <a:noFill/>
+        </p:spPr>
+        <p:txBody>
+          <a:bodyPr wrap="none" rtlCol="0">
+            <a:spAutoFit/>
+          </a:bodyPr>
+          <a:lstStyle/>
+          <a:p>
+            <a:r>
+              <a:rPr lang="en-GB" dirty="0" smtClean="0"/>
+              <a:t>C</a:t>
+            </a:r>
+            <a:endParaRPr lang="en-GB" dirty="0"/>
+          </a:p>
+        </p:txBody>
+      </p:sp>
+      <p:sp>
+        <p:nvSpPr>
+          <p:cNvPr id="12" name="TextBox 11"/>
+          <p:cNvSpPr txBox="1"/>
+          <p:nvPr/>
+        </p:nvSpPr>
+        <p:spPr>
+          <a:xfrm>
+            <a:off x="6404906" y="3989894"/>
+            <a:ext cx="327334" cy="369332"/>
+          </a:xfrm>
+          <a:prstGeom prst="rect">
+            <a:avLst/>
+          </a:prstGeom>
+          <a:noFill/>
+        </p:spPr>
+        <p:txBody>
+          <a:bodyPr wrap="none" rtlCol="0">
+            <a:spAutoFit/>
+          </a:bodyPr>
+          <a:lstStyle/>
+          <a:p>
+            <a:r>
+              <a:rPr lang="en-GB" dirty="0" smtClean="0"/>
+              <a:t>D</a:t>
+            </a:r>
+            <a:endParaRPr lang="en-GB" dirty="0"/>
+          </a:p>
+        </p:txBody>
+      </p:sp>
+      <p:graphicFrame>
+        <p:nvGraphicFramePr>
+          <p:cNvPr id="13" name="Table 12"/>
+          <p:cNvGraphicFramePr>
+            <a:graphicFrameLocks noGrp="1"/>
+          </p:cNvGraphicFramePr>
+          <p:nvPr>
+            <p:extLst>
+              <p:ext uri="{D42A27DB-BD31-4B8C-83A1-F6EECF244321}">
+                <p14:modId xmlns:p14="http://schemas.microsoft.com/office/powerpoint/2010/main" val="33994465"/>
+              </p:ext>
+            </p:extLst>
+          </p:nvPr>
+        </p:nvGraphicFramePr>
+        <p:xfrm>
+          <a:off x="395536" y="8643074"/>
+          <a:ext cx="6624736" cy="4312920"/>
+        </p:xfrm>
+        <a:graphic>
+          <a:graphicData uri="http://schemas.openxmlformats.org/drawingml/2006/table">
+            <a:tbl>
+              <a:tblPr firstRow="1" bandRow="1">
+                <a:tableStyleId>{5C22544A-7EE6-4342-B048-85BDC9FD1C3A}</a:tableStyleId>
+              </a:tblPr>
+              <a:tblGrid>
+                <a:gridCol w="2088233"/>
+                <a:gridCol w="4536503"/>
+              </a:tblGrid>
+              <a:tr h="370840">
+                <a:tc>
+                  <a:txBody>
+                    <a:bodyPr/>
+                    <a:lstStyle/>
+                    <a:p>
+                      <a:r>
+                        <a:rPr lang="en-GB" sz="1200" dirty="0" smtClean="0"/>
+                        <a:t>CV term</a:t>
+                      </a:r>
+                      <a:endParaRPr lang="en-GB" sz="1200" dirty="0"/>
+                    </a:p>
+                  </a:txBody>
+                  <a:tcPr/>
+                </a:tc>
+                <a:tc>
+                  <a:txBody>
+                    <a:bodyPr/>
+                    <a:lstStyle/>
+                    <a:p>
+                      <a:r>
+                        <a:rPr lang="en-GB" sz="1200" dirty="0" smtClean="0"/>
+                        <a:t>Definition</a:t>
+                      </a:r>
+                      <a:endParaRPr lang="en-GB" sz="1200" dirty="0"/>
+                    </a:p>
+                  </a:txBody>
+                  <a:tcPr/>
+                </a:tc>
+              </a:tr>
+              <a:tr h="370840">
+                <a:tc>
+                  <a:txBody>
+                    <a:bodyPr/>
+                    <a:lstStyle/>
+                    <a:p>
+                      <a:r>
+                        <a:rPr lang="en-GB" sz="1200" kern="1200" baseline="0" dirty="0" smtClean="0">
+                          <a:solidFill>
+                            <a:schemeClr val="dk1"/>
+                          </a:solidFill>
+                          <a:latin typeface="+mn-lt"/>
+                          <a:ea typeface="+mn-ea"/>
+                          <a:cs typeface="+mn-cs"/>
+                        </a:rPr>
+                        <a:t>chromosome name </a:t>
+                      </a:r>
+                      <a:endParaRPr lang="en-GB" sz="1200" dirty="0"/>
+                    </a:p>
+                  </a:txBody>
+                  <a:tcPr/>
+                </a:tc>
+                <a:tc>
+                  <a:txBody>
+                    <a:bodyPr/>
+                    <a:lstStyle/>
+                    <a:p>
+                      <a:pPr marL="0" marR="0" indent="0" algn="l" defTabSz="914400" rtl="0" eaLnBrk="1" fontAlgn="auto" latinLnBrk="0" hangingPunct="1">
+                        <a:lnSpc>
+                          <a:spcPct val="100000"/>
+                        </a:lnSpc>
+                        <a:spcBef>
+                          <a:spcPts val="0"/>
+                        </a:spcBef>
+                        <a:spcAft>
+                          <a:spcPts val="0"/>
+                        </a:spcAft>
+                        <a:buClrTx/>
+                        <a:buSzTx/>
+                        <a:buFontTx/>
+                        <a:buNone/>
+                        <a:tabLst/>
+                        <a:defRPr/>
+                      </a:pPr>
+                      <a:r>
+                        <a:rPr lang="en-GB" sz="1200" dirty="0" smtClean="0"/>
+                        <a:t>The name or number of the chromosome to which a given peptide has been mapped.</a:t>
+                      </a:r>
+                      <a:endParaRPr lang="en-GB" sz="1200" dirty="0"/>
+                    </a:p>
+                  </a:txBody>
+                  <a:tcPr/>
+                </a:tc>
+              </a:tr>
+              <a:tr h="370840">
+                <a:tc>
+                  <a:txBody>
+                    <a:bodyPr/>
+                    <a:lstStyle/>
+                    <a:p>
+                      <a:r>
+                        <a:rPr lang="en-GB" sz="1200" dirty="0" smtClean="0"/>
+                        <a:t>chromosome strand</a:t>
+                      </a:r>
+                      <a:endParaRPr lang="en-GB" sz="1200" dirty="0"/>
+                    </a:p>
+                  </a:txBody>
+                  <a:tcPr/>
+                </a:tc>
+                <a:tc>
+                  <a:txBody>
+                    <a:bodyPr/>
+                    <a:lstStyle/>
+                    <a:p>
+                      <a:pPr marL="0" marR="0" indent="0" algn="l" defTabSz="914400" rtl="0" eaLnBrk="1" fontAlgn="auto" latinLnBrk="0" hangingPunct="1">
+                        <a:lnSpc>
+                          <a:spcPct val="100000"/>
+                        </a:lnSpc>
+                        <a:spcBef>
+                          <a:spcPts val="0"/>
+                        </a:spcBef>
+                        <a:spcAft>
+                          <a:spcPts val="0"/>
+                        </a:spcAft>
+                        <a:buClrTx/>
+                        <a:buSzTx/>
+                        <a:buFontTx/>
+                        <a:buNone/>
+                        <a:tabLst/>
+                        <a:defRPr/>
+                      </a:pPr>
+                      <a:r>
+                        <a:rPr lang="en-GB" sz="1200" dirty="0" smtClean="0"/>
+                        <a:t>The strand (‘+’ or ‘-’) to which the peptide has been mapped.</a:t>
+                      </a:r>
+                      <a:endParaRPr lang="en-GB" sz="1200" dirty="0"/>
+                    </a:p>
+                  </a:txBody>
+                  <a:tcPr/>
+                </a:tc>
+              </a:tr>
+              <a:tr h="370840">
+                <a:tc>
+                  <a:txBody>
+                    <a:bodyPr/>
+                    <a:lstStyle/>
+                    <a:p>
+                      <a:r>
+                        <a:rPr lang="en-GB" sz="1200" b="0" kern="1200" dirty="0" smtClean="0">
+                          <a:solidFill>
+                            <a:schemeClr val="dk1"/>
+                          </a:solidFill>
+                          <a:latin typeface="+mn-lt"/>
+                          <a:ea typeface="+mn-ea"/>
+                          <a:cs typeface="Courier New" panose="02070309020205020404" pitchFamily="49" charset="0"/>
+                        </a:rPr>
+                        <a:t>peptide start on chromosome</a:t>
+                      </a:r>
+                      <a:endParaRPr lang="en-GB" sz="1200" dirty="0"/>
+                    </a:p>
+                  </a:txBody>
+                  <a:tcPr/>
+                </a:tc>
+                <a:tc>
+                  <a:txBody>
+                    <a:bodyPr/>
+                    <a:lstStyle/>
+                    <a:p>
+                      <a:pPr marL="0" marR="0" indent="0" algn="l" defTabSz="914400" rtl="0" eaLnBrk="1" fontAlgn="auto" latinLnBrk="0" hangingPunct="1">
+                        <a:lnSpc>
+                          <a:spcPct val="100000"/>
+                        </a:lnSpc>
+                        <a:spcBef>
+                          <a:spcPts val="0"/>
+                        </a:spcBef>
+                        <a:spcAft>
+                          <a:spcPts val="0"/>
+                        </a:spcAft>
+                        <a:buClrTx/>
+                        <a:buSzTx/>
+                        <a:buFontTx/>
+                        <a:buNone/>
+                        <a:tabLst/>
+                        <a:defRPr/>
+                      </a:pPr>
+                      <a:r>
+                        <a:rPr lang="en-GB" sz="1200" dirty="0" smtClean="0"/>
+                        <a:t>The overall start position on the chromosome to which a peptide has been mapped i.e. the position of the first base of the first codon, using a zero-based counting system. </a:t>
+                      </a:r>
+                      <a:r>
+                        <a:rPr lang="en-GB" sz="1200" dirty="0" smtClean="0">
+                          <a:solidFill>
+                            <a:srgbClr val="C00000"/>
+                          </a:solidFill>
+                        </a:rPr>
+                        <a:t>MAY BE DELETED AS REDUNDANT</a:t>
+                      </a:r>
+                      <a:endParaRPr lang="en-GB" sz="1200" dirty="0">
+                        <a:solidFill>
+                          <a:srgbClr val="C00000"/>
+                        </a:solidFill>
+                      </a:endParaRPr>
+                    </a:p>
+                  </a:txBody>
+                  <a:tcPr/>
+                </a:tc>
+              </a:tr>
+              <a:tr h="370840">
+                <a:tc>
+                  <a:txBody>
+                    <a:bodyPr/>
+                    <a:lstStyle/>
+                    <a:p>
+                      <a:r>
+                        <a:rPr lang="en-GB" sz="1200" b="0" kern="1200" dirty="0" smtClean="0">
+                          <a:solidFill>
+                            <a:schemeClr val="dk1"/>
+                          </a:solidFill>
+                          <a:latin typeface="+mn-lt"/>
+                          <a:ea typeface="+mn-ea"/>
+                          <a:cs typeface="Courier New" panose="02070309020205020404" pitchFamily="49" charset="0"/>
+                        </a:rPr>
+                        <a:t>peptide end on chromosome</a:t>
+                      </a:r>
+                      <a:endParaRPr lang="en-GB" sz="1200" dirty="0"/>
+                    </a:p>
+                  </a:txBody>
+                  <a:tcPr/>
+                </a:tc>
+                <a:tc>
+                  <a:txBody>
+                    <a:bodyPr/>
+                    <a:lstStyle/>
+                    <a:p>
+                      <a:pPr marL="0" marR="0" indent="0" algn="l" defTabSz="914400" rtl="0" eaLnBrk="1" fontAlgn="auto" latinLnBrk="0" hangingPunct="1">
+                        <a:lnSpc>
+                          <a:spcPct val="100000"/>
+                        </a:lnSpc>
+                        <a:spcBef>
+                          <a:spcPts val="0"/>
+                        </a:spcBef>
+                        <a:spcAft>
+                          <a:spcPts val="0"/>
+                        </a:spcAft>
+                        <a:buClrTx/>
+                        <a:buSzTx/>
+                        <a:buFontTx/>
+                        <a:buNone/>
+                        <a:tabLst/>
+                        <a:defRPr/>
+                      </a:pPr>
+                      <a:r>
+                        <a:rPr lang="en-GB" sz="1200" b="0" kern="1200" dirty="0" smtClean="0">
+                          <a:solidFill>
+                            <a:schemeClr val="dk1"/>
+                          </a:solidFill>
+                          <a:latin typeface="+mn-lt"/>
+                          <a:ea typeface="+mn-ea"/>
+                          <a:cs typeface="Courier New" panose="02070309020205020404" pitchFamily="49" charset="0"/>
+                        </a:rPr>
+                        <a:t>Overall end position on chromosome (zero-based</a:t>
+                      </a:r>
+                      <a:r>
+                        <a:rPr lang="en-GB" sz="1200" b="0" kern="1200" baseline="0" dirty="0" smtClean="0">
+                          <a:solidFill>
+                            <a:schemeClr val="dk1"/>
+                          </a:solidFill>
+                          <a:latin typeface="+mn-lt"/>
+                          <a:ea typeface="+mn-ea"/>
+                          <a:cs typeface="Courier New" panose="02070309020205020404" pitchFamily="49" charset="0"/>
+                        </a:rPr>
+                        <a:t> coordinate) i.e. last base of last codon.</a:t>
+                      </a:r>
+                      <a:endParaRPr lang="en-GB" sz="1200" dirty="0"/>
+                    </a:p>
+                  </a:txBody>
+                  <a:tcPr/>
+                </a:tc>
+              </a:tr>
+              <a:tr h="370840">
+                <a:tc>
+                  <a:txBody>
+                    <a:bodyPr/>
+                    <a:lstStyle/>
+                    <a:p>
+                      <a:r>
+                        <a:rPr lang="en-GB" sz="1200" dirty="0" smtClean="0"/>
+                        <a:t>peptide exon count</a:t>
+                      </a:r>
+                      <a:endParaRPr lang="en-GB" sz="1200" dirty="0"/>
+                    </a:p>
+                  </a:txBody>
+                  <a:tcPr/>
+                </a:tc>
+                <a:tc>
+                  <a:txBody>
+                    <a:bodyPr/>
+                    <a:lstStyle/>
+                    <a:p>
+                      <a:r>
+                        <a:rPr lang="en-GB" sz="1200" dirty="0" smtClean="0"/>
+                        <a:t>The number of exons to which the peptide has been mapped.</a:t>
+                      </a:r>
+                      <a:endParaRPr lang="en-GB" sz="1200" dirty="0"/>
+                    </a:p>
+                  </a:txBody>
+                  <a:tcPr/>
+                </a:tc>
+              </a:tr>
+              <a:tr h="370840">
+                <a:tc>
+                  <a:txBody>
+                    <a:bodyPr/>
+                    <a:lstStyle/>
+                    <a:p>
+                      <a:r>
+                        <a:rPr lang="en-GB" sz="1200" dirty="0" smtClean="0"/>
+                        <a:t>peptide exon nucleotide sizes</a:t>
+                      </a:r>
+                      <a:endParaRPr lang="en-GB" sz="1200" dirty="0"/>
+                    </a:p>
+                  </a:txBody>
+                  <a:tcPr/>
+                </a:tc>
+                <a:tc>
+                  <a:txBody>
+                    <a:bodyPr/>
+                    <a:lstStyle/>
+                    <a:p>
+                      <a:r>
+                        <a:rPr lang="en-GB" sz="1200" dirty="0" smtClean="0"/>
+                        <a:t>A comma separated list of the number of DNA bases within each exon to which a peptide has been mapped. Assuming standard operation of a search engine, the peptide exon sizes should sum to exactly three times the peptide length.</a:t>
+                      </a:r>
+                      <a:endParaRPr lang="en-GB" sz="1200" dirty="0"/>
+                    </a:p>
+                  </a:txBody>
+                  <a:tcPr/>
+                </a:tc>
+              </a:tr>
+              <a:tr h="0">
+                <a:tc>
+                  <a:txBody>
+                    <a:bodyPr/>
+                    <a:lstStyle/>
+                    <a:p>
+                      <a:r>
+                        <a:rPr lang="en-GB" sz="1200" dirty="0" smtClean="0"/>
+                        <a:t>peptide start positions on chromosome</a:t>
+                      </a:r>
+                      <a:endParaRPr lang="en-GB" sz="1200" dirty="0"/>
+                    </a:p>
+                  </a:txBody>
+                  <a:tcPr/>
+                </a:tc>
+                <a:tc>
+                  <a:txBody>
+                    <a:bodyPr/>
+                    <a:lstStyle/>
+                    <a:p>
+                      <a:r>
+                        <a:rPr lang="en-GB" sz="1200" dirty="0" smtClean="0"/>
+                        <a:t>A comma separated list of start positions within exons to which the peptide has been mapped, relative to peptide-chromosome start, assuming a zero-based counting system. The first value MUST match the value in peptide start on chromosome</a:t>
+                      </a:r>
+                      <a:endParaRPr lang="en-GB" sz="1200" dirty="0"/>
+                    </a:p>
+                  </a:txBody>
+                  <a:tcPr/>
+                </a:tc>
+              </a:tr>
+            </a:tbl>
+          </a:graphicData>
+        </a:graphic>
+      </p:graphicFrame>
+    </p:spTree>
+    <p:extLst>
+      <p:ext uri="{BB962C8B-B14F-4D97-AF65-F5344CB8AC3E}">
+        <p14:creationId xmlns:p14="http://schemas.microsoft.com/office/powerpoint/2010/main" val="436251738"/>
+      </p:ext>
+    </p:extLst>
+  </p:cSld>
+  <p:clrMapOvr>
+    <a:masterClrMapping/>
+  </p:clrMapOvr>
 </p:sld>
 </file>
 

</xml_diff>

<commit_message>
Updated the XL encoding in the spec doc, and various minor updates to spec doc (general cleaning)
</commit_message>
<xml_diff>
--- a/specification_document/specdoc1_2/NewFeaturesInMzid12.pptx
+++ b/specification_document/specdoc1_2/NewFeaturesInMzid12.pptx
@@ -5,7 +5,7 @@
     <p:sldMasterId id="2147483648" r:id="rId1"/>
   </p:sldMasterIdLst>
   <p:notesMasterIdLst>
-    <p:notesMasterId r:id="rId8"/>
+    <p:notesMasterId r:id="rId9"/>
   </p:notesMasterIdLst>
   <p:sldIdLst>
     <p:sldId id="259" r:id="rId2"/>
@@ -13,7 +13,8 @@
     <p:sldId id="256" r:id="rId4"/>
     <p:sldId id="257" r:id="rId5"/>
     <p:sldId id="258" r:id="rId6"/>
-    <p:sldId id="261" r:id="rId7"/>
+    <p:sldId id="262" r:id="rId7"/>
+    <p:sldId id="261" r:id="rId8"/>
   </p:sldIdLst>
   <p:sldSz cx="9144000" cy="16202025"/>
   <p:notesSz cx="6858000" cy="9144000"/>
@@ -214,7 +215,7 @@
             <a:fld id="{943B0BE5-311A-4B0A-9A39-DE24DD4BA79D}" type="datetimeFigureOut">
               <a:rPr lang="en-GB" smtClean="0"/>
               <a:pPr/>
-              <a:t>25/04/2016</a:t>
+              <a:t>04/05/2016</a:t>
             </a:fld>
             <a:endParaRPr lang="en-GB"/>
           </a:p>
@@ -759,7 +760,7 @@
             <a:fld id="{A71EF3F3-5BE8-4F69-8C8F-88D570AA2740}" type="datetimeFigureOut">
               <a:rPr lang="en-GB" smtClean="0"/>
               <a:pPr/>
-              <a:t>25/04/2016</a:t>
+              <a:t>04/05/2016</a:t>
             </a:fld>
             <a:endParaRPr lang="en-GB"/>
           </a:p>
@@ -926,7 +927,7 @@
             <a:fld id="{A71EF3F3-5BE8-4F69-8C8F-88D570AA2740}" type="datetimeFigureOut">
               <a:rPr lang="en-GB" smtClean="0"/>
               <a:pPr/>
-              <a:t>25/04/2016</a:t>
+              <a:t>04/05/2016</a:t>
             </a:fld>
             <a:endParaRPr lang="en-GB"/>
           </a:p>
@@ -1103,7 +1104,7 @@
             <a:fld id="{A71EF3F3-5BE8-4F69-8C8F-88D570AA2740}" type="datetimeFigureOut">
               <a:rPr lang="en-GB" smtClean="0"/>
               <a:pPr/>
-              <a:t>25/04/2016</a:t>
+              <a:t>04/05/2016</a:t>
             </a:fld>
             <a:endParaRPr lang="en-GB"/>
           </a:p>
@@ -1270,7 +1271,7 @@
             <a:fld id="{A71EF3F3-5BE8-4F69-8C8F-88D570AA2740}" type="datetimeFigureOut">
               <a:rPr lang="en-GB" smtClean="0"/>
               <a:pPr/>
-              <a:t>25/04/2016</a:t>
+              <a:t>04/05/2016</a:t>
             </a:fld>
             <a:endParaRPr lang="en-GB"/>
           </a:p>
@@ -1513,7 +1514,7 @@
             <a:fld id="{A71EF3F3-5BE8-4F69-8C8F-88D570AA2740}" type="datetimeFigureOut">
               <a:rPr lang="en-GB" smtClean="0"/>
               <a:pPr/>
-              <a:t>25/04/2016</a:t>
+              <a:t>04/05/2016</a:t>
             </a:fld>
             <a:endParaRPr lang="en-GB"/>
           </a:p>
@@ -1798,7 +1799,7 @@
             <a:fld id="{A71EF3F3-5BE8-4F69-8C8F-88D570AA2740}" type="datetimeFigureOut">
               <a:rPr lang="en-GB" smtClean="0"/>
               <a:pPr/>
-              <a:t>25/04/2016</a:t>
+              <a:t>04/05/2016</a:t>
             </a:fld>
             <a:endParaRPr lang="en-GB"/>
           </a:p>
@@ -2217,7 +2218,7 @@
             <a:fld id="{A71EF3F3-5BE8-4F69-8C8F-88D570AA2740}" type="datetimeFigureOut">
               <a:rPr lang="en-GB" smtClean="0"/>
               <a:pPr/>
-              <a:t>25/04/2016</a:t>
+              <a:t>04/05/2016</a:t>
             </a:fld>
             <a:endParaRPr lang="en-GB"/>
           </a:p>
@@ -2332,7 +2333,7 @@
             <a:fld id="{A71EF3F3-5BE8-4F69-8C8F-88D570AA2740}" type="datetimeFigureOut">
               <a:rPr lang="en-GB" smtClean="0"/>
               <a:pPr/>
-              <a:t>25/04/2016</a:t>
+              <a:t>04/05/2016</a:t>
             </a:fld>
             <a:endParaRPr lang="en-GB"/>
           </a:p>
@@ -2424,7 +2425,7 @@
             <a:fld id="{A71EF3F3-5BE8-4F69-8C8F-88D570AA2740}" type="datetimeFigureOut">
               <a:rPr lang="en-GB" smtClean="0"/>
               <a:pPr/>
-              <a:t>25/04/2016</a:t>
+              <a:t>04/05/2016</a:t>
             </a:fld>
             <a:endParaRPr lang="en-GB"/>
           </a:p>
@@ -2698,7 +2699,7 @@
             <a:fld id="{A71EF3F3-5BE8-4F69-8C8F-88D570AA2740}" type="datetimeFigureOut">
               <a:rPr lang="en-GB" smtClean="0"/>
               <a:pPr/>
-              <a:t>25/04/2016</a:t>
+              <a:t>04/05/2016</a:t>
             </a:fld>
             <a:endParaRPr lang="en-GB"/>
           </a:p>
@@ -2948,7 +2949,7 @@
             <a:fld id="{A71EF3F3-5BE8-4F69-8C8F-88D570AA2740}" type="datetimeFigureOut">
               <a:rPr lang="en-GB" smtClean="0"/>
               <a:pPr/>
-              <a:t>25/04/2016</a:t>
+              <a:t>04/05/2016</a:t>
             </a:fld>
             <a:endParaRPr lang="en-GB"/>
           </a:p>
@@ -3158,7 +3159,7 @@
             <a:fld id="{A71EF3F3-5BE8-4F69-8C8F-88D570AA2740}" type="datetimeFigureOut">
               <a:rPr lang="en-GB" smtClean="0"/>
               <a:pPr/>
-              <a:t>25/04/2016</a:t>
+              <a:t>04/05/2016</a:t>
             </a:fld>
             <a:endParaRPr lang="en-GB"/>
           </a:p>
@@ -9018,59 +9019,42 @@
                 <a:latin typeface="Courier New" pitchFamily="49" charset="0"/>
                 <a:cs typeface="Courier New" pitchFamily="49" charset="0"/>
               </a:rPr>
-              <a:t> accession</a:t>
-            </a:r>
-            <a:r>
-              <a:rPr lang="en-GB" sz="800" smtClean="0">
+              <a:t> accession="XL:00002" </a:t>
+            </a:r>
+            <a:r>
+              <a:rPr lang="en-GB" sz="800" dirty="0" err="1" smtClean="0">
+                <a:latin typeface="Courier New" pitchFamily="49" charset="0"/>
+                <a:cs typeface="Courier New" pitchFamily="49" charset="0"/>
+              </a:rPr>
+              <a:t>cvRef</a:t>
+            </a:r>
+            <a:r>
+              <a:rPr lang="en-GB" sz="800" dirty="0">
+                <a:latin typeface="Courier New" pitchFamily="49" charset="0"/>
+                <a:cs typeface="Courier New" pitchFamily="49" charset="0"/>
+              </a:rPr>
+              <a:t>=" PSI-MS " </a:t>
+            </a:r>
+            <a:r>
+              <a:rPr lang="en-GB" sz="800" dirty="0" smtClean="0">
+                <a:latin typeface="Courier New" pitchFamily="49" charset="0"/>
+                <a:cs typeface="Courier New" pitchFamily="49" charset="0"/>
+              </a:rPr>
+              <a:t>name</a:t>
+            </a:r>
+            <a:r>
+              <a:rPr lang="en-GB" sz="800" dirty="0">
                 <a:latin typeface="Courier New" pitchFamily="49" charset="0"/>
                 <a:cs typeface="Courier New" pitchFamily="49" charset="0"/>
               </a:rPr>
               <a:t>="</a:t>
             </a:r>
             <a:r>
-              <a:rPr lang="en-GB" sz="800" smtClean="0">
-                <a:solidFill>
-                  <a:srgbClr val="C00000"/>
-                </a:solidFill>
-                <a:latin typeface="Courier New" pitchFamily="49" charset="0"/>
-                <a:cs typeface="Courier New" pitchFamily="49" charset="0"/>
-              </a:rPr>
-              <a:t>MS:100XXX</a:t>
-            </a:r>
-            <a:r>
-              <a:rPr lang="en-GB" sz="800" dirty="0" smtClean="0">
-                <a:latin typeface="Courier New" pitchFamily="49" charset="0"/>
-                <a:cs typeface="Courier New" pitchFamily="49" charset="0"/>
-              </a:rPr>
-              <a:t>" </a:t>
-            </a:r>
-            <a:r>
               <a:rPr lang="en-GB" sz="800" dirty="0" err="1" smtClean="0">
                 <a:latin typeface="Courier New" pitchFamily="49" charset="0"/>
                 <a:cs typeface="Courier New" pitchFamily="49" charset="0"/>
               </a:rPr>
-              <a:t>cvRef</a:t>
-            </a:r>
-            <a:r>
-              <a:rPr lang="en-GB" sz="800" dirty="0">
-                <a:latin typeface="Courier New" pitchFamily="49" charset="0"/>
-                <a:cs typeface="Courier New" pitchFamily="49" charset="0"/>
-              </a:rPr>
-              <a:t>=" PSI-MS " </a:t>
-            </a:r>
-            <a:r>
-              <a:rPr lang="en-GB" sz="800" dirty="0" smtClean="0">
-                <a:latin typeface="Courier New" pitchFamily="49" charset="0"/>
-                <a:cs typeface="Courier New" pitchFamily="49" charset="0"/>
-              </a:rPr>
-              <a:t>name="</a:t>
-            </a:r>
-            <a:r>
-              <a:rPr lang="en-GB" sz="800" dirty="0" err="1" smtClean="0">
-                <a:latin typeface="Courier New" pitchFamily="49" charset="0"/>
-                <a:cs typeface="Courier New" pitchFamily="49" charset="0"/>
-              </a:rPr>
-              <a:t>xlink:dss</a:t>
+              <a:t>Xlink:DSS</a:t>
             </a:r>
             <a:r>
               <a:rPr lang="en-GB" sz="800" dirty="0" smtClean="0">
@@ -9412,13 +9396,55 @@
                 <a:latin typeface="Courier New" pitchFamily="49" charset="0"/>
                 <a:cs typeface="Courier New" pitchFamily="49" charset="0"/>
               </a:rPr>
-              <a:t>="345.6" </a:t>
+              <a:t>=</a:t>
+            </a:r>
+            <a:r>
+              <a:rPr lang="en-GB" sz="800" dirty="0">
+                <a:latin typeface="Courier New" pitchFamily="49" charset="0"/>
+                <a:cs typeface="Courier New" pitchFamily="49" charset="0"/>
+              </a:rPr>
+              <a:t> </a:t>
+            </a:r>
+            <a:r>
+              <a:rPr lang="en-GB" sz="800" dirty="0" smtClean="0">
+                <a:latin typeface="Courier New" pitchFamily="49" charset="0"/>
+                <a:cs typeface="Courier New" pitchFamily="49" charset="0"/>
+              </a:rPr>
+              <a:t>“XXX" </a:t>
             </a:r>
             <a:r>
               <a:rPr lang="en-GB" sz="800" dirty="0" err="1" smtClean="0">
                 <a:latin typeface="Courier New" pitchFamily="49" charset="0"/>
                 <a:cs typeface="Courier New" pitchFamily="49" charset="0"/>
               </a:rPr>
+              <a:t>calculatedMassToCharge</a:t>
+            </a:r>
+            <a:r>
+              <a:rPr lang="en-GB" sz="800" dirty="0" smtClean="0">
+                <a:latin typeface="Courier New" pitchFamily="49" charset="0"/>
+                <a:cs typeface="Courier New" pitchFamily="49" charset="0"/>
+              </a:rPr>
+              <a:t>=“</a:t>
+            </a:r>
+            <a:r>
+              <a:rPr lang="en-GB" sz="800" b="1" dirty="0" smtClean="0">
+                <a:latin typeface="Courier New" pitchFamily="49" charset="0"/>
+                <a:cs typeface="Courier New" pitchFamily="49" charset="0"/>
+              </a:rPr>
+              <a:t>XXX</a:t>
+            </a:r>
+            <a:r>
+              <a:rPr lang="en-GB" sz="800" dirty="0" smtClean="0">
+                <a:latin typeface="Courier New" pitchFamily="49" charset="0"/>
+                <a:cs typeface="Courier New" pitchFamily="49" charset="0"/>
+              </a:rPr>
+              <a:t>" </a:t>
+            </a:r>
+            <a:r>
+              <a:rPr lang="en-GB" sz="800" dirty="0" err="1" smtClean="0">
+                <a:latin typeface="Courier New" pitchFamily="49" charset="0"/>
+                <a:cs typeface="Courier New" pitchFamily="49" charset="0"/>
+              </a:rPr>
               <a:t>chargeState</a:t>
             </a:r>
             <a:r>
@@ -9426,7 +9452,14 @@
                 <a:latin typeface="Courier New" pitchFamily="49" charset="0"/>
                 <a:cs typeface="Courier New" pitchFamily="49" charset="0"/>
               </a:rPr>
-              <a:t>="3" id="SII_1_1"&gt;</a:t>
+              <a:t>=“X" </a:t>
+            </a:r>
+            <a:r>
+              <a:rPr lang="en-GB" sz="800" dirty="0" smtClean="0">
+                <a:latin typeface="Courier New" pitchFamily="49" charset="0"/>
+                <a:cs typeface="Courier New" pitchFamily="49" charset="0"/>
+              </a:rPr>
+              <a:t>id="SII_1_1"&gt;</a:t>
             </a:r>
           </a:p>
           <a:p>
@@ -9657,13 +9690,58 @@
                 <a:latin typeface="Courier New" pitchFamily="49" charset="0"/>
                 <a:cs typeface="Courier New" pitchFamily="49" charset="0"/>
               </a:rPr>
-              <a:t>="647.6" </a:t>
+              <a:t>=“</a:t>
+            </a:r>
+            <a:r>
+              <a:rPr lang="en-GB" sz="800" dirty="0" smtClean="0">
+                <a:solidFill>
+                  <a:srgbClr val="FF0000"/>
+                </a:solidFill>
+                <a:latin typeface="Courier New" pitchFamily="49" charset="0"/>
+                <a:cs typeface="Courier New" pitchFamily="49" charset="0"/>
+              </a:rPr>
+              <a:t>XXX</a:t>
+            </a:r>
+            <a:r>
+              <a:rPr lang="en-GB" sz="800" dirty="0" smtClean="0">
+                <a:latin typeface="Courier New" pitchFamily="49" charset="0"/>
+                <a:cs typeface="Courier New" pitchFamily="49" charset="0"/>
+              </a:rPr>
+              <a:t>“ </a:t>
             </a:r>
             <a:r>
               <a:rPr lang="en-GB" sz="800" dirty="0" err="1" smtClean="0">
                 <a:latin typeface="Courier New" pitchFamily="49" charset="0"/>
                 <a:cs typeface="Courier New" pitchFamily="49" charset="0"/>
               </a:rPr>
+              <a:t>calculatedMassToCharge</a:t>
+            </a:r>
+            <a:r>
+              <a:rPr lang="en-GB" sz="800" dirty="0" smtClean="0">
+                <a:latin typeface="Courier New" pitchFamily="49" charset="0"/>
+                <a:cs typeface="Courier New" pitchFamily="49" charset="0"/>
+              </a:rPr>
+              <a:t>=“</a:t>
+            </a:r>
+            <a:r>
+              <a:rPr lang="en-GB" sz="800" b="1" dirty="0" smtClean="0">
+                <a:latin typeface="Courier New" pitchFamily="49" charset="0"/>
+                <a:cs typeface="Courier New" pitchFamily="49" charset="0"/>
+              </a:rPr>
+              <a:t>XXX</a:t>
+            </a:r>
+            <a:r>
+              <a:rPr lang="en-GB" sz="800" dirty="0" smtClean="0">
+                <a:latin typeface="Courier New" pitchFamily="49" charset="0"/>
+                <a:cs typeface="Courier New" pitchFamily="49" charset="0"/>
+              </a:rPr>
+              <a:t>" </a:t>
+            </a:r>
+            <a:r>
+              <a:rPr lang="en-GB" sz="800" dirty="0" err="1" smtClean="0">
+                <a:latin typeface="Courier New" pitchFamily="49" charset="0"/>
+                <a:cs typeface="Courier New" pitchFamily="49" charset="0"/>
+              </a:rPr>
               <a:t>chargeState</a:t>
             </a:r>
             <a:r>
@@ -9671,7 +9749,14 @@
                 <a:latin typeface="Courier New" pitchFamily="49" charset="0"/>
                 <a:cs typeface="Courier New" pitchFamily="49" charset="0"/>
               </a:rPr>
-              <a:t>="3" id="SII_1_2"&gt;</a:t>
+              <a:t>=“X" </a:t>
+            </a:r>
+            <a:r>
+              <a:rPr lang="en-GB" sz="800" dirty="0" smtClean="0">
+                <a:latin typeface="Courier New" pitchFamily="49" charset="0"/>
+                <a:cs typeface="Courier New" pitchFamily="49" charset="0"/>
+              </a:rPr>
+              <a:t>id="SII_1_2"&gt;</a:t>
             </a:r>
           </a:p>
           <a:p>
@@ -9887,7 +9972,7 @@
         <p:spPr>
           <a:xfrm>
             <a:off x="395536" y="819493"/>
-            <a:ext cx="5958408" cy="1323439"/>
+            <a:ext cx="5760640" cy="1323439"/>
           </a:xfrm>
           <a:prstGeom prst="rect">
             <a:avLst/>
@@ -9926,10 +10011,6 @@
               </a:rPr>
               <a:t>&gt;</a:t>
             </a:r>
-            <a:endParaRPr lang="en-GB" sz="800" dirty="0" smtClean="0">
-              <a:latin typeface="Courier New" pitchFamily="49" charset="0"/>
-              <a:cs typeface="Courier New" pitchFamily="49" charset="0"/>
-            </a:endParaRPr>
           </a:p>
           <a:p>
             <a:r>
@@ -10250,7 +10331,7 @@
         </p:nvSpPr>
         <p:spPr>
           <a:xfrm>
-            <a:off x="6404906" y="963509"/>
+            <a:off x="5436096" y="478036"/>
             <a:ext cx="327334" cy="369332"/>
           </a:xfrm>
           <a:prstGeom prst="rect">
@@ -10370,14 +10451,14 @@
           <p:nvPr>
             <p:extLst>
               <p:ext uri="{D42A27DB-BD31-4B8C-83A1-F6EECF244321}">
-                <p14:modId xmlns:p14="http://schemas.microsoft.com/office/powerpoint/2010/main" val="2928940166"/>
+                <p14:modId xmlns:p14="http://schemas.microsoft.com/office/powerpoint/2010/main" val="3903563875"/>
               </p:ext>
             </p:extLst>
           </p:nvPr>
         </p:nvGraphicFramePr>
         <p:xfrm>
           <a:off x="395536" y="6220093"/>
-          <a:ext cx="6516217" cy="4582160"/>
+          <a:ext cx="6516217" cy="5679440"/>
         </p:xfrm>
         <a:graphic>
           <a:graphicData uri="http://schemas.openxmlformats.org/drawingml/2006/table">
@@ -10441,15 +10522,7 @@
                     <a:p>
                       <a:r>
                         <a:rPr lang="en-GB" sz="1200" dirty="0" smtClean="0"/>
-                        <a:t>If a </a:t>
-                      </a:r>
-                      <a:r>
-                        <a:rPr lang="en-GB" sz="1200" dirty="0" smtClean="0"/>
-                        <a:t>cross-linking </a:t>
-                      </a:r>
-                      <a:r>
-                        <a:rPr lang="en-GB" sz="1200" dirty="0" smtClean="0"/>
-                        <a:t>search </a:t>
+                        <a:t>If a cross-linking search </a:t>
                       </a:r>
                       <a:r>
                         <a:rPr lang="en-GB" sz="1200" baseline="0" dirty="0" smtClean="0"/>
@@ -10495,31 +10568,7 @@
                       </a:r>
                       <a:r>
                         <a:rPr lang="en-GB" sz="1200" baseline="0" dirty="0" smtClean="0"/>
-                        <a:t> of </a:t>
-                      </a:r>
-                      <a:r>
-                        <a:rPr lang="en-GB" sz="1200" baseline="0" dirty="0" smtClean="0"/>
-                        <a:t>cross-linked </a:t>
-                      </a:r>
-                      <a:r>
-                        <a:rPr lang="en-GB" sz="1200" baseline="0" dirty="0" smtClean="0"/>
-                        <a:t>peptides has been identified, one peptide’s Modification element MUST be flagged as “</a:t>
-                      </a:r>
-                      <a:r>
-                        <a:rPr lang="en-GB" sz="1200" baseline="0" dirty="0" smtClean="0"/>
-                        <a:t>cross-link </a:t>
-                      </a:r>
-                      <a:r>
-                        <a:rPr lang="en-GB" sz="1200" baseline="0" dirty="0" smtClean="0"/>
-                        <a:t>donor” and one MUST be flagged as “</a:t>
-                      </a:r>
-                      <a:r>
-                        <a:rPr lang="en-GB" sz="1200" baseline="0" dirty="0" smtClean="0"/>
-                        <a:t>cross-link </a:t>
-                      </a:r>
-                      <a:r>
-                        <a:rPr lang="en-GB" sz="1200" baseline="0" dirty="0" smtClean="0"/>
-                        <a:t>receiver”. The export software SHOULD use the following rules to choose the crosslink donor as the: longer peptide, then higher peptide neutral mass, then alphabetical order. The crosslink donor Modification element MUST have the attribute </a:t>
+                        <a:t> of cross-linked peptides has been identified, one peptide’s Modification element MUST be flagged as “cross-link donor” and one MUST be flagged as “cross-link receiver”. The export software SHOULD use the following rules to choose the crosslink donor as the: longer peptide, then higher peptide neutral mass, then alphabetical order. The cross-link donor Modification element MUST have the attribute </a:t>
                       </a:r>
                       <a:r>
                         <a:rPr lang="en-GB" sz="1200" baseline="0" dirty="0" err="1" smtClean="0"/>
@@ -10527,7 +10576,7 @@
                       </a:r>
                       <a:r>
                         <a:rPr lang="en-GB" sz="1200" baseline="0" dirty="0" smtClean="0"/>
-                        <a:t> = the mass gain from the crosslink reagent. The crosslink receiver peptide’s Modification element MUST have </a:t>
+                        <a:t> = the mass gain from the crosslink reagent. The cross-link receiver peptide’s Modification element MUST have </a:t>
                       </a:r>
                       <a:r>
                         <a:rPr lang="en-GB" sz="1200" baseline="0" dirty="0" err="1" smtClean="0"/>
@@ -10565,11 +10614,19 @@
                     <a:p>
                       <a:r>
                         <a:rPr lang="en-GB" sz="1200" dirty="0" smtClean="0"/>
-                        <a:t>The crosslink</a:t>
+                        <a:t>The </a:t>
+                      </a:r>
+                      <a:r>
+                        <a:rPr lang="en-GB" sz="1200" dirty="0" smtClean="0"/>
+                        <a:t>cross-link</a:t>
                       </a:r>
                       <a:r>
                         <a:rPr lang="en-GB" sz="1200" baseline="0" dirty="0" smtClean="0"/>
-                        <a:t> donor peptide’s Modification element  MUST have a suitably sourced </a:t>
+                        <a:t> </a:t>
+                      </a:r>
+                      <a:r>
+                        <a:rPr lang="en-GB" sz="1200" baseline="0" dirty="0" smtClean="0"/>
+                        <a:t>donor peptide’s Modification element  MUST have a suitably sourced </a:t>
                       </a:r>
                       <a:r>
                         <a:rPr lang="en-GB" sz="1200" baseline="0" dirty="0" err="1" smtClean="0"/>
@@ -10577,7 +10634,15 @@
                       </a:r>
                       <a:r>
                         <a:rPr lang="en-GB" sz="1200" baseline="0" dirty="0" smtClean="0"/>
-                        <a:t> for the crosslink. The crosslink receiver peptide’s Modification element  MUST not have a </a:t>
+                        <a:t> for the crosslink. The </a:t>
+                      </a:r>
+                      <a:r>
+                        <a:rPr lang="en-GB" sz="1200" baseline="0" dirty="0" smtClean="0"/>
+                        <a:t>cross-link acceptor </a:t>
+                      </a:r>
+                      <a:r>
+                        <a:rPr lang="en-GB" sz="1200" baseline="0" dirty="0" smtClean="0"/>
+                        <a:t>peptide’s Modification element  MUST not have a </a:t>
                       </a:r>
                       <a:r>
                         <a:rPr lang="en-GB" sz="1200" baseline="0" dirty="0" err="1" smtClean="0"/>
@@ -10623,15 +10688,19 @@
                       </a:r>
                       <a:r>
                         <a:rPr lang="en-GB" sz="1200" i="0" baseline="0" dirty="0" smtClean="0"/>
-                        <a:t> a </a:t>
-                      </a:r>
-                      <a:r>
-                        <a:rPr lang="en-GB" sz="1200" i="0" baseline="0" dirty="0" err="1" smtClean="0"/>
-                        <a:t>crosslinked</a:t>
+                        <a:t> </a:t>
+                      </a:r>
+                      <a:r>
+                        <a:rPr lang="en-GB" sz="1200" i="0" baseline="0" smtClean="0"/>
+                        <a:t>a </a:t>
+                      </a:r>
+                      <a:r>
+                        <a:rPr lang="en-GB" sz="1200" i="0" baseline="0" smtClean="0"/>
+                        <a:t>cross-linked </a:t>
                       </a:r>
                       <a:r>
                         <a:rPr lang="en-GB" sz="1200" i="0" baseline="0" dirty="0" smtClean="0"/>
-                        <a:t> pair of peptides has been identified, there MUST be two &lt;</a:t>
+                        <a:t>pair of peptides has been identified, there MUST be two &lt;</a:t>
                       </a:r>
                       <a:r>
                         <a:rPr lang="en-GB" sz="1200" i="0" baseline="0" dirty="0" err="1" smtClean="0"/>
@@ -10655,8 +10724,94 @@
                       </a:r>
                       <a:r>
                         <a:rPr lang="en-GB" sz="1200" i="0" baseline="0" dirty="0" smtClean="0"/>
-                        <a:t>&gt; to group these two elements together.</a:t>
-                      </a:r>
+                        <a:t>&gt; to group these two elements together. </a:t>
+                      </a:r>
+                    </a:p>
+                    <a:p>
+                      <a:endParaRPr lang="en-GB" sz="1200" i="0" baseline="0" dirty="0" smtClean="0"/>
+                    </a:p>
+                    <a:p>
+                      <a:r>
+                        <a:rPr lang="en-GB" sz="1200" i="0" baseline="0" dirty="0" smtClean="0">
+                          <a:solidFill>
+                            <a:srgbClr val="FF0000"/>
+                          </a:solidFill>
+                        </a:rPr>
+                        <a:t>New proposal 04/05/2016:</a:t>
+                      </a:r>
+                    </a:p>
+                    <a:p>
+                      <a:pPr marL="171450" indent="-171450">
+                        <a:buFontTx/>
+                        <a:buChar char="-"/>
+                      </a:pPr>
+                      <a:r>
+                        <a:rPr lang="en-GB" sz="1200" i="0" baseline="0" dirty="0" err="1" smtClean="0">
+                          <a:solidFill>
+                            <a:srgbClr val="C00000"/>
+                          </a:solidFill>
+                        </a:rPr>
+                        <a:t>experimentalMassToCharge</a:t>
+                      </a:r>
+                      <a:r>
+                        <a:rPr lang="en-GB" sz="1200" i="0" baseline="0" dirty="0" smtClean="0">
+                          <a:solidFill>
+                            <a:srgbClr val="C00000"/>
+                          </a:solidFill>
+                        </a:rPr>
+                        <a:t>, </a:t>
+                      </a:r>
+                      <a:r>
+                        <a:rPr lang="en-GB" sz="1200" i="0" baseline="0" dirty="0" err="1" smtClean="0">
+                          <a:solidFill>
+                            <a:srgbClr val="C00000"/>
+                          </a:solidFill>
+                        </a:rPr>
+                        <a:t>calculateMassToCharge</a:t>
+                      </a:r>
+                      <a:r>
+                        <a:rPr lang="en-GB" sz="1200" i="0" baseline="0" dirty="0" smtClean="0">
+                          <a:solidFill>
+                            <a:srgbClr val="C00000"/>
+                          </a:solidFill>
+                        </a:rPr>
+                        <a:t> and </a:t>
+                      </a:r>
+                      <a:r>
+                        <a:rPr lang="en-GB" sz="1200" i="0" baseline="0" dirty="0" err="1" smtClean="0">
+                          <a:solidFill>
+                            <a:srgbClr val="C00000"/>
+                          </a:solidFill>
+                        </a:rPr>
+                        <a:t>chargeState</a:t>
+                      </a:r>
+                      <a:r>
+                        <a:rPr lang="en-GB" sz="1200" i="0" baseline="0" dirty="0" smtClean="0">
+                          <a:solidFill>
+                            <a:srgbClr val="C00000"/>
+                          </a:solidFill>
+                        </a:rPr>
+                        <a:t> MUST be identical over both SII elements, indicating the overall values for the pair.</a:t>
+                      </a:r>
+                    </a:p>
+                    <a:p>
+                      <a:pPr marL="171450" indent="-171450">
+                        <a:buFontTx/>
+                        <a:buChar char="-"/>
+                      </a:pPr>
+                      <a:r>
+                        <a:rPr lang="en-GB" sz="1200" i="0" baseline="0" dirty="0" smtClean="0">
+                          <a:solidFill>
+                            <a:srgbClr val="C00000"/>
+                          </a:solidFill>
+                        </a:rPr>
+                        <a:t>Add optional CV term for “calculated peptide chain neutral mass” – this could actually be put on Peptide or on SII</a:t>
+                      </a:r>
+                      <a:endParaRPr lang="en-GB" sz="1200" i="0" baseline="0" dirty="0" smtClean="0">
+                        <a:solidFill>
+                          <a:srgbClr val="C00000"/>
+                        </a:solidFill>
+                      </a:endParaRPr>
                     </a:p>
                   </a:txBody>
                   <a:tcPr/>
@@ -10785,64 +10940,6 @@
       </p:sp>
       <p:sp>
         <p:nvSpPr>
-          <p:cNvPr id="14" name="TextBox 13"/>
-          <p:cNvSpPr txBox="1"/>
-          <p:nvPr/>
-        </p:nvSpPr>
-        <p:spPr>
-          <a:xfrm>
-            <a:off x="467544" y="10900613"/>
-            <a:ext cx="3612271" cy="830997"/>
-          </a:xfrm>
-          <a:prstGeom prst="rect">
-            <a:avLst/>
-          </a:prstGeom>
-          <a:noFill/>
-        </p:spPr>
-        <p:txBody>
-          <a:bodyPr wrap="none" rtlCol="0">
-            <a:spAutoFit/>
-          </a:bodyPr>
-          <a:lstStyle/>
-          <a:p>
-            <a:r>
-              <a:rPr lang="en-GB" sz="1600" b="1" dirty="0" smtClean="0">
-                <a:cs typeface="Courier New" pitchFamily="49" charset="0"/>
-              </a:rPr>
-              <a:t>Important notes</a:t>
-            </a:r>
-          </a:p>
-          <a:p>
-            <a:pPr marL="285750" indent="-285750">
-              <a:buFontTx/>
-              <a:buChar char="-"/>
-            </a:pPr>
-            <a:r>
-              <a:rPr lang="en-GB" sz="1600" dirty="0" smtClean="0">
-                <a:cs typeface="Courier New" pitchFamily="49" charset="0"/>
-              </a:rPr>
-              <a:t>Plan to create XL CV</a:t>
-            </a:r>
-          </a:p>
-          <a:p>
-            <a:pPr marL="285750" indent="-285750">
-              <a:buFontTx/>
-              <a:buChar char="-"/>
-            </a:pPr>
-            <a:r>
-              <a:rPr lang="en-GB" sz="1600" dirty="0" smtClean="0">
-                <a:cs typeface="Courier New" pitchFamily="49" charset="0"/>
-              </a:rPr>
-              <a:t>Add protein-level interaction example</a:t>
-            </a:r>
-            <a:endParaRPr lang="en-GB" sz="1600" dirty="0" smtClean="0">
-              <a:cs typeface="Courier New" pitchFamily="49" charset="0"/>
-            </a:endParaRPr>
-          </a:p>
-        </p:txBody>
-      </p:sp>
-      <p:sp>
-        <p:nvSpPr>
           <p:cNvPr id="15" name="TextBox 14"/>
           <p:cNvSpPr txBox="1"/>
           <p:nvPr/>
@@ -10873,6 +10970,115 @@
           </a:p>
         </p:txBody>
       </p:sp>
+      <p:sp>
+        <p:nvSpPr>
+          <p:cNvPr id="4" name="Rectangle 3"/>
+          <p:cNvSpPr/>
+          <p:nvPr/>
+        </p:nvSpPr>
+        <p:spPr>
+          <a:xfrm>
+            <a:off x="6435021" y="941438"/>
+            <a:ext cx="1563248" cy="369332"/>
+          </a:xfrm>
+          <a:prstGeom prst="rect">
+            <a:avLst/>
+          </a:prstGeom>
+        </p:spPr>
+        <p:txBody>
+          <a:bodyPr wrap="none">
+            <a:spAutoFit/>
+          </a:bodyPr>
+          <a:lstStyle/>
+          <a:p>
+            <a:r>
+              <a:rPr lang="en-GB" dirty="0">
+                <a:latin typeface="Courier New" pitchFamily="49" charset="0"/>
+                <a:cs typeface="Courier New" pitchFamily="49" charset="0"/>
+              </a:rPr>
+              <a:t>AAFTKQAADK</a:t>
+            </a:r>
+            <a:endParaRPr lang="en-GB" dirty="0"/>
+          </a:p>
+        </p:txBody>
+      </p:sp>
+      <p:sp>
+        <p:nvSpPr>
+          <p:cNvPr id="8" name="Rectangle 7"/>
+          <p:cNvSpPr/>
+          <p:nvPr/>
+        </p:nvSpPr>
+        <p:spPr>
+          <a:xfrm>
+            <a:off x="6314962" y="1426910"/>
+            <a:ext cx="1425390" cy="369332"/>
+          </a:xfrm>
+          <a:prstGeom prst="rect">
+            <a:avLst/>
+          </a:prstGeom>
+        </p:spPr>
+        <p:txBody>
+          <a:bodyPr wrap="none">
+            <a:spAutoFit/>
+          </a:bodyPr>
+          <a:lstStyle/>
+          <a:p>
+            <a:r>
+              <a:rPr lang="en-GB" dirty="0">
+                <a:latin typeface="Courier New" pitchFamily="49" charset="0"/>
+                <a:cs typeface="Courier New" pitchFamily="49" charset="0"/>
+              </a:rPr>
+              <a:t>AMYPPKEDR</a:t>
+            </a:r>
+            <a:endParaRPr lang="en-GB" dirty="0"/>
+          </a:p>
+        </p:txBody>
+      </p:sp>
+      <p:sp>
+        <p:nvSpPr>
+          <p:cNvPr id="16" name="Rectangle 15"/>
+          <p:cNvSpPr/>
+          <p:nvPr/>
+        </p:nvSpPr>
+        <p:spPr>
+          <a:xfrm>
+            <a:off x="7092280" y="1260252"/>
+            <a:ext cx="109136" cy="220960"/>
+          </a:xfrm>
+          <a:prstGeom prst="rect">
+            <a:avLst/>
+          </a:prstGeom>
+        </p:spPr>
+        <p:style>
+          <a:lnRef idx="2">
+            <a:schemeClr val="dk1">
+              <a:shade val="50000"/>
+            </a:schemeClr>
+          </a:lnRef>
+          <a:fillRef idx="1">
+            <a:schemeClr val="dk1"/>
+          </a:fillRef>
+          <a:effectRef idx="0">
+            <a:schemeClr val="dk1"/>
+          </a:effectRef>
+          <a:fontRef idx="minor">
+            <a:schemeClr val="lt1"/>
+          </a:fontRef>
+        </p:style>
+        <p:txBody>
+          <a:bodyPr wrap="square" rtlCol="0" anchor="ctr">
+            <a:spAutoFit/>
+          </a:bodyPr>
+          <a:lstStyle/>
+          <a:p>
+            <a:pPr algn="ctr"/>
+            <a:endParaRPr lang="en-GB" sz="800" dirty="0" smtClean="0">
+              <a:latin typeface="Courier New" pitchFamily="49" charset="0"/>
+              <a:cs typeface="Courier New" pitchFamily="49" charset="0"/>
+            </a:endParaRPr>
+          </a:p>
+        </p:txBody>
+      </p:sp>
     </p:spTree>
   </p:cSld>
   <p:clrMapOvr>
@@ -10889,6 +11095,1476 @@
 </file>
 
 <file path=ppt/slides/slide6.xml><?xml version="1.0" encoding="utf-8"?>
+<p:sld xmlns:a="http://schemas.openxmlformats.org/drawingml/2006/main" xmlns:r="http://schemas.openxmlformats.org/officeDocument/2006/relationships" xmlns:p="http://schemas.openxmlformats.org/presentationml/2006/main">
+  <p:cSld>
+    <p:spTree>
+      <p:nvGrpSpPr>
+        <p:cNvPr id="1" name=""/>
+        <p:cNvGrpSpPr/>
+        <p:nvPr/>
+      </p:nvGrpSpPr>
+      <p:grpSpPr>
+        <a:xfrm>
+          <a:off x="0" y="0"/>
+          <a:ext cx="0" cy="0"/>
+          <a:chOff x="0" y="0"/>
+          <a:chExt cx="0" cy="0"/>
+        </a:xfrm>
+      </p:grpSpPr>
+      <p:sp>
+        <p:nvSpPr>
+          <p:cNvPr id="2" name="Rectangle 1"/>
+          <p:cNvSpPr/>
+          <p:nvPr/>
+        </p:nvSpPr>
+        <p:spPr>
+          <a:xfrm>
+            <a:off x="132911" y="309165"/>
+            <a:ext cx="4166461" cy="2179193"/>
+          </a:xfrm>
+          <a:prstGeom prst="rect">
+            <a:avLst/>
+          </a:prstGeom>
+        </p:spPr>
+        <p:style>
+          <a:lnRef idx="2">
+            <a:schemeClr val="accent1">
+              <a:shade val="50000"/>
+            </a:schemeClr>
+          </a:lnRef>
+          <a:fillRef idx="1">
+            <a:schemeClr val="accent1"/>
+          </a:fillRef>
+          <a:effectRef idx="0">
+            <a:schemeClr val="accent1"/>
+          </a:effectRef>
+          <a:fontRef idx="minor">
+            <a:schemeClr val="lt1"/>
+          </a:fontRef>
+        </p:style>
+        <p:txBody>
+          <a:bodyPr rtlCol="0" anchor="t" anchorCtr="0"/>
+          <a:lstStyle/>
+          <a:p>
+            <a:r>
+              <a:rPr lang="en-GB" dirty="0" smtClean="0">
+                <a:solidFill>
+                  <a:schemeClr val="bg1"/>
+                </a:solidFill>
+              </a:rPr>
+              <a:t>PAG 1</a:t>
+            </a:r>
+          </a:p>
+          <a:p>
+            <a:endParaRPr lang="en-GB" dirty="0">
+              <a:solidFill>
+                <a:schemeClr val="bg1"/>
+              </a:solidFill>
+            </a:endParaRPr>
+          </a:p>
+        </p:txBody>
+      </p:sp>
+      <p:sp>
+        <p:nvSpPr>
+          <p:cNvPr id="3" name="Oval 2"/>
+          <p:cNvSpPr/>
+          <p:nvPr/>
+        </p:nvSpPr>
+        <p:spPr>
+          <a:xfrm>
+            <a:off x="5718638" y="1034842"/>
+            <a:ext cx="720080" cy="936104"/>
+          </a:xfrm>
+          <a:prstGeom prst="ellipse">
+            <a:avLst/>
+          </a:prstGeom>
+        </p:spPr>
+        <p:style>
+          <a:lnRef idx="1">
+            <a:schemeClr val="accent4"/>
+          </a:lnRef>
+          <a:fillRef idx="2">
+            <a:schemeClr val="accent4"/>
+          </a:fillRef>
+          <a:effectRef idx="1">
+            <a:schemeClr val="accent4"/>
+          </a:effectRef>
+          <a:fontRef idx="minor">
+            <a:schemeClr val="dk1"/>
+          </a:fontRef>
+        </p:style>
+        <p:txBody>
+          <a:bodyPr rtlCol="0" anchor="ctr"/>
+          <a:lstStyle/>
+          <a:p>
+            <a:pPr algn="ctr"/>
+            <a:endParaRPr lang="en-GB"/>
+          </a:p>
+        </p:txBody>
+      </p:sp>
+      <p:sp>
+        <p:nvSpPr>
+          <p:cNvPr id="4" name="Oval 3"/>
+          <p:cNvSpPr/>
+          <p:nvPr/>
+        </p:nvSpPr>
+        <p:spPr>
+          <a:xfrm>
+            <a:off x="6613838" y="731372"/>
+            <a:ext cx="720080" cy="936104"/>
+          </a:xfrm>
+          <a:prstGeom prst="ellipse">
+            <a:avLst/>
+          </a:prstGeom>
+        </p:spPr>
+        <p:style>
+          <a:lnRef idx="1">
+            <a:schemeClr val="accent2"/>
+          </a:lnRef>
+          <a:fillRef idx="2">
+            <a:schemeClr val="accent2"/>
+          </a:fillRef>
+          <a:effectRef idx="1">
+            <a:schemeClr val="accent2"/>
+          </a:effectRef>
+          <a:fontRef idx="minor">
+            <a:schemeClr val="dk1"/>
+          </a:fontRef>
+        </p:style>
+        <p:txBody>
+          <a:bodyPr rtlCol="0" anchor="ctr"/>
+          <a:lstStyle/>
+          <a:p>
+            <a:pPr algn="ctr"/>
+            <a:endParaRPr lang="en-GB"/>
+          </a:p>
+        </p:txBody>
+      </p:sp>
+      <p:sp>
+        <p:nvSpPr>
+          <p:cNvPr id="5" name="TextBox 4"/>
+          <p:cNvSpPr txBox="1"/>
+          <p:nvPr/>
+        </p:nvSpPr>
+        <p:spPr>
+          <a:xfrm>
+            <a:off x="4504744" y="925618"/>
+            <a:ext cx="1557414" cy="646331"/>
+          </a:xfrm>
+          <a:prstGeom prst="rect">
+            <a:avLst/>
+          </a:prstGeom>
+          <a:noFill/>
+        </p:spPr>
+        <p:txBody>
+          <a:bodyPr wrap="none" rtlCol="0">
+            <a:spAutoFit/>
+          </a:bodyPr>
+          <a:lstStyle/>
+          <a:p>
+            <a:r>
+              <a:rPr lang="en-GB" dirty="0" err="1" smtClean="0"/>
+              <a:t>Prot</a:t>
+            </a:r>
+            <a:r>
+              <a:rPr lang="en-GB" dirty="0" smtClean="0"/>
+              <a:t> A.1 or A.2</a:t>
+            </a:r>
+          </a:p>
+          <a:p>
+            <a:r>
+              <a:rPr lang="en-GB" dirty="0" smtClean="0"/>
+              <a:t>(ambiguous)</a:t>
+            </a:r>
+            <a:endParaRPr lang="en-GB" dirty="0"/>
+          </a:p>
+        </p:txBody>
+      </p:sp>
+      <p:sp>
+        <p:nvSpPr>
+          <p:cNvPr id="6" name="TextBox 5"/>
+          <p:cNvSpPr txBox="1"/>
+          <p:nvPr/>
+        </p:nvSpPr>
+        <p:spPr>
+          <a:xfrm>
+            <a:off x="7223018" y="1482810"/>
+            <a:ext cx="931152" cy="369332"/>
+          </a:xfrm>
+          <a:prstGeom prst="rect">
+            <a:avLst/>
+          </a:prstGeom>
+          <a:noFill/>
+        </p:spPr>
+        <p:txBody>
+          <a:bodyPr wrap="none" rtlCol="0">
+            <a:spAutoFit/>
+          </a:bodyPr>
+          <a:lstStyle/>
+          <a:p>
+            <a:r>
+              <a:rPr lang="en-GB" dirty="0" err="1" smtClean="0"/>
+              <a:t>Prot</a:t>
+            </a:r>
+            <a:r>
+              <a:rPr lang="en-GB" dirty="0" smtClean="0"/>
+              <a:t> B.1</a:t>
+            </a:r>
+            <a:endParaRPr lang="en-GB" dirty="0"/>
+          </a:p>
+        </p:txBody>
+      </p:sp>
+      <p:sp>
+        <p:nvSpPr>
+          <p:cNvPr id="7" name="Oval 6"/>
+          <p:cNvSpPr/>
+          <p:nvPr/>
+        </p:nvSpPr>
+        <p:spPr>
+          <a:xfrm>
+            <a:off x="6423517" y="2135528"/>
+            <a:ext cx="720080" cy="936104"/>
+          </a:xfrm>
+          <a:prstGeom prst="ellipse">
+            <a:avLst/>
+          </a:prstGeom>
+        </p:spPr>
+        <p:style>
+          <a:lnRef idx="1">
+            <a:schemeClr val="accent3"/>
+          </a:lnRef>
+          <a:fillRef idx="2">
+            <a:schemeClr val="accent3"/>
+          </a:fillRef>
+          <a:effectRef idx="1">
+            <a:schemeClr val="accent3"/>
+          </a:effectRef>
+          <a:fontRef idx="minor">
+            <a:schemeClr val="dk1"/>
+          </a:fontRef>
+        </p:style>
+        <p:txBody>
+          <a:bodyPr rtlCol="0" anchor="ctr"/>
+          <a:lstStyle/>
+          <a:p>
+            <a:pPr algn="ctr"/>
+            <a:endParaRPr lang="en-GB"/>
+          </a:p>
+        </p:txBody>
+      </p:sp>
+      <p:sp>
+        <p:nvSpPr>
+          <p:cNvPr id="8" name="TextBox 7"/>
+          <p:cNvSpPr txBox="1"/>
+          <p:nvPr/>
+        </p:nvSpPr>
+        <p:spPr>
+          <a:xfrm>
+            <a:off x="6897062" y="2906575"/>
+            <a:ext cx="929550" cy="369332"/>
+          </a:xfrm>
+          <a:prstGeom prst="rect">
+            <a:avLst/>
+          </a:prstGeom>
+          <a:noFill/>
+        </p:spPr>
+        <p:txBody>
+          <a:bodyPr wrap="none" rtlCol="0">
+            <a:spAutoFit/>
+          </a:bodyPr>
+          <a:lstStyle/>
+          <a:p>
+            <a:r>
+              <a:rPr lang="en-GB" dirty="0" err="1" smtClean="0"/>
+              <a:t>Prot</a:t>
+            </a:r>
+            <a:r>
+              <a:rPr lang="en-GB" dirty="0" smtClean="0"/>
+              <a:t> C.1</a:t>
+            </a:r>
+            <a:endParaRPr lang="en-GB" dirty="0"/>
+          </a:p>
+        </p:txBody>
+      </p:sp>
+      <p:cxnSp>
+        <p:nvCxnSpPr>
+          <p:cNvPr id="9" name="Straight Connector 8"/>
+          <p:cNvCxnSpPr/>
+          <p:nvPr/>
+        </p:nvCxnSpPr>
+        <p:spPr>
+          <a:xfrm flipV="1">
+            <a:off x="6181790" y="1100704"/>
+            <a:ext cx="601767" cy="332746"/>
+          </a:xfrm>
+          <a:prstGeom prst="line">
+            <a:avLst/>
+          </a:prstGeom>
+        </p:spPr>
+        <p:style>
+          <a:lnRef idx="1">
+            <a:schemeClr val="accent1"/>
+          </a:lnRef>
+          <a:fillRef idx="0">
+            <a:schemeClr val="accent1"/>
+          </a:fillRef>
+          <a:effectRef idx="0">
+            <a:schemeClr val="accent1"/>
+          </a:effectRef>
+          <a:fontRef idx="minor">
+            <a:schemeClr val="tx1"/>
+          </a:fontRef>
+        </p:style>
+      </p:cxnSp>
+      <p:cxnSp>
+        <p:nvCxnSpPr>
+          <p:cNvPr id="10" name="Straight Connector 9"/>
+          <p:cNvCxnSpPr/>
+          <p:nvPr/>
+        </p:nvCxnSpPr>
+        <p:spPr>
+          <a:xfrm flipV="1">
+            <a:off x="6225395" y="1367957"/>
+            <a:ext cx="554782" cy="250159"/>
+          </a:xfrm>
+          <a:prstGeom prst="line">
+            <a:avLst/>
+          </a:prstGeom>
+        </p:spPr>
+        <p:style>
+          <a:lnRef idx="1">
+            <a:schemeClr val="accent1"/>
+          </a:lnRef>
+          <a:fillRef idx="0">
+            <a:schemeClr val="accent1"/>
+          </a:fillRef>
+          <a:effectRef idx="0">
+            <a:schemeClr val="accent1"/>
+          </a:effectRef>
+          <a:fontRef idx="minor">
+            <a:schemeClr val="tx1"/>
+          </a:fontRef>
+        </p:style>
+      </p:cxnSp>
+      <p:cxnSp>
+        <p:nvCxnSpPr>
+          <p:cNvPr id="11" name="Straight Connector 10"/>
+          <p:cNvCxnSpPr/>
+          <p:nvPr/>
+        </p:nvCxnSpPr>
+        <p:spPr>
+          <a:xfrm>
+            <a:off x="6078678" y="1832058"/>
+            <a:ext cx="535160" cy="656300"/>
+          </a:xfrm>
+          <a:prstGeom prst="line">
+            <a:avLst/>
+          </a:prstGeom>
+        </p:spPr>
+        <p:style>
+          <a:lnRef idx="1">
+            <a:schemeClr val="accent1"/>
+          </a:lnRef>
+          <a:fillRef idx="0">
+            <a:schemeClr val="accent1"/>
+          </a:fillRef>
+          <a:effectRef idx="0">
+            <a:schemeClr val="accent1"/>
+          </a:effectRef>
+          <a:fontRef idx="minor">
+            <a:schemeClr val="tx1"/>
+          </a:fontRef>
+        </p:style>
+      </p:cxnSp>
+      <p:cxnSp>
+        <p:nvCxnSpPr>
+          <p:cNvPr id="12" name="Straight Connector 11"/>
+          <p:cNvCxnSpPr>
+            <a:stCxn id="3" idx="5"/>
+          </p:cNvCxnSpPr>
+          <p:nvPr/>
+        </p:nvCxnSpPr>
+        <p:spPr>
+          <a:xfrm>
+            <a:off x="6333265" y="1833857"/>
+            <a:ext cx="328966" cy="440559"/>
+          </a:xfrm>
+          <a:prstGeom prst="line">
+            <a:avLst/>
+          </a:prstGeom>
+        </p:spPr>
+        <p:style>
+          <a:lnRef idx="1">
+            <a:schemeClr val="accent1"/>
+          </a:lnRef>
+          <a:fillRef idx="0">
+            <a:schemeClr val="accent1"/>
+          </a:fillRef>
+          <a:effectRef idx="0">
+            <a:schemeClr val="accent1"/>
+          </a:effectRef>
+          <a:fontRef idx="minor">
+            <a:schemeClr val="tx1"/>
+          </a:fontRef>
+        </p:style>
+      </p:cxnSp>
+      <p:sp>
+        <p:nvSpPr>
+          <p:cNvPr id="13" name="TextBox 12"/>
+          <p:cNvSpPr txBox="1"/>
+          <p:nvPr/>
+        </p:nvSpPr>
+        <p:spPr>
+          <a:xfrm>
+            <a:off x="410940" y="684188"/>
+            <a:ext cx="3801019" cy="830997"/>
+          </a:xfrm>
+          <a:prstGeom prst="rect">
+            <a:avLst/>
+          </a:prstGeom>
+        </p:spPr>
+        <p:style>
+          <a:lnRef idx="1">
+            <a:schemeClr val="accent1"/>
+          </a:lnRef>
+          <a:fillRef idx="2">
+            <a:schemeClr val="accent1"/>
+          </a:fillRef>
+          <a:effectRef idx="1">
+            <a:schemeClr val="accent1"/>
+          </a:effectRef>
+          <a:fontRef idx="minor">
+            <a:schemeClr val="dk1"/>
+          </a:fontRef>
+        </p:style>
+        <p:txBody>
+          <a:bodyPr wrap="square" rtlCol="0">
+            <a:spAutoFit/>
+          </a:bodyPr>
+          <a:lstStyle/>
+          <a:p>
+            <a:r>
+              <a:rPr lang="en-GB" sz="1200" dirty="0" smtClean="0"/>
+              <a:t>PDH 1.1</a:t>
+            </a:r>
+          </a:p>
+          <a:p>
+            <a:r>
+              <a:rPr lang="en-GB" sz="1200" dirty="0" smtClean="0"/>
+              <a:t> accession = </a:t>
+            </a:r>
+            <a:r>
+              <a:rPr lang="en-GB" sz="1200" dirty="0" err="1" smtClean="0"/>
+              <a:t>Prot</a:t>
+            </a:r>
+            <a:r>
+              <a:rPr lang="en-GB" sz="1200" dirty="0" smtClean="0"/>
+              <a:t> A.1</a:t>
+            </a:r>
+          </a:p>
+          <a:p>
+            <a:r>
+              <a:rPr lang="en-GB" sz="1200" dirty="0" smtClean="0"/>
+              <a:t> name=“interaction FDR” value=“1001.a:256:0.001:TRUE</a:t>
+            </a:r>
+          </a:p>
+          <a:p>
+            <a:r>
+              <a:rPr lang="en-GB" sz="1200" dirty="0" smtClean="0"/>
+              <a:t> name</a:t>
+            </a:r>
+            <a:r>
+              <a:rPr lang="en-GB" sz="1200" dirty="0"/>
+              <a:t>=“interaction FDR” value=“</a:t>
+            </a:r>
+            <a:r>
+              <a:rPr lang="en-GB" sz="1200" dirty="0" smtClean="0"/>
+              <a:t>1002.a:478:0.07:FALSE</a:t>
+            </a:r>
+            <a:endParaRPr lang="en-GB" sz="1200" dirty="0"/>
+          </a:p>
+        </p:txBody>
+      </p:sp>
+      <p:sp>
+        <p:nvSpPr>
+          <p:cNvPr id="14" name="TextBox 13"/>
+          <p:cNvSpPr txBox="1"/>
+          <p:nvPr/>
+        </p:nvSpPr>
+        <p:spPr>
+          <a:xfrm>
+            <a:off x="5622075" y="264834"/>
+            <a:ext cx="1305165" cy="646331"/>
+          </a:xfrm>
+          <a:prstGeom prst="rect">
+            <a:avLst/>
+          </a:prstGeom>
+          <a:noFill/>
+        </p:spPr>
+        <p:txBody>
+          <a:bodyPr wrap="none" rtlCol="0">
+            <a:spAutoFit/>
+          </a:bodyPr>
+          <a:lstStyle/>
+          <a:p>
+            <a:r>
+              <a:rPr lang="en-GB" i="1" dirty="0" smtClean="0"/>
+              <a:t>ID = 1001</a:t>
+            </a:r>
+          </a:p>
+          <a:p>
+            <a:r>
+              <a:rPr lang="en-GB" i="1" dirty="0" smtClean="0"/>
+              <a:t>FDR = 0.001</a:t>
+            </a:r>
+            <a:endParaRPr lang="en-GB" i="1" dirty="0"/>
+          </a:p>
+        </p:txBody>
+      </p:sp>
+      <p:sp>
+        <p:nvSpPr>
+          <p:cNvPr id="15" name="TextBox 14"/>
+          <p:cNvSpPr txBox="1"/>
+          <p:nvPr/>
+        </p:nvSpPr>
+        <p:spPr>
+          <a:xfrm>
+            <a:off x="5086512" y="2153723"/>
+            <a:ext cx="1188146" cy="646331"/>
+          </a:xfrm>
+          <a:prstGeom prst="rect">
+            <a:avLst/>
+          </a:prstGeom>
+          <a:noFill/>
+        </p:spPr>
+        <p:txBody>
+          <a:bodyPr wrap="none" rtlCol="0">
+            <a:spAutoFit/>
+          </a:bodyPr>
+          <a:lstStyle/>
+          <a:p>
+            <a:r>
+              <a:rPr lang="en-GB" i="1" dirty="0" smtClean="0"/>
+              <a:t>ID = 1002</a:t>
+            </a:r>
+          </a:p>
+          <a:p>
+            <a:r>
+              <a:rPr lang="en-GB" i="1" dirty="0" smtClean="0"/>
+              <a:t>FDR = 0.07</a:t>
+            </a:r>
+            <a:endParaRPr lang="en-GB" i="1" dirty="0"/>
+          </a:p>
+        </p:txBody>
+      </p:sp>
+      <p:sp>
+        <p:nvSpPr>
+          <p:cNvPr id="16" name="Rectangle 15"/>
+          <p:cNvSpPr/>
+          <p:nvPr/>
+        </p:nvSpPr>
+        <p:spPr>
+          <a:xfrm>
+            <a:off x="121924" y="2574705"/>
+            <a:ext cx="4166461" cy="1133819"/>
+          </a:xfrm>
+          <a:prstGeom prst="rect">
+            <a:avLst/>
+          </a:prstGeom>
+        </p:spPr>
+        <p:style>
+          <a:lnRef idx="2">
+            <a:schemeClr val="accent1">
+              <a:shade val="50000"/>
+            </a:schemeClr>
+          </a:lnRef>
+          <a:fillRef idx="1">
+            <a:schemeClr val="accent1"/>
+          </a:fillRef>
+          <a:effectRef idx="0">
+            <a:schemeClr val="accent1"/>
+          </a:effectRef>
+          <a:fontRef idx="minor">
+            <a:schemeClr val="lt1"/>
+          </a:fontRef>
+        </p:style>
+        <p:txBody>
+          <a:bodyPr rtlCol="0" anchor="t" anchorCtr="0"/>
+          <a:lstStyle/>
+          <a:p>
+            <a:r>
+              <a:rPr lang="en-GB" dirty="0" smtClean="0">
+                <a:solidFill>
+                  <a:schemeClr val="bg1"/>
+                </a:solidFill>
+              </a:rPr>
+              <a:t>PAG 2</a:t>
+            </a:r>
+          </a:p>
+          <a:p>
+            <a:r>
+              <a:rPr lang="en-GB" dirty="0">
+                <a:solidFill>
+                  <a:schemeClr val="bg1"/>
+                </a:solidFill>
+              </a:rPr>
+              <a:t> </a:t>
+            </a:r>
+            <a:r>
+              <a:rPr lang="en-GB" dirty="0" smtClean="0">
+                <a:solidFill>
+                  <a:schemeClr val="bg1"/>
+                </a:solidFill>
+              </a:rPr>
+              <a:t>     </a:t>
+            </a:r>
+            <a:endParaRPr lang="en-GB" dirty="0">
+              <a:solidFill>
+                <a:schemeClr val="bg1"/>
+              </a:solidFill>
+            </a:endParaRPr>
+          </a:p>
+        </p:txBody>
+      </p:sp>
+      <p:sp>
+        <p:nvSpPr>
+          <p:cNvPr id="20" name="TextBox 19"/>
+          <p:cNvSpPr txBox="1"/>
+          <p:nvPr/>
+        </p:nvSpPr>
+        <p:spPr>
+          <a:xfrm>
+            <a:off x="4381351" y="3420492"/>
+            <a:ext cx="4655145" cy="2677656"/>
+          </a:xfrm>
+          <a:prstGeom prst="rect">
+            <a:avLst/>
+          </a:prstGeom>
+          <a:noFill/>
+        </p:spPr>
+        <p:txBody>
+          <a:bodyPr wrap="square" rtlCol="0">
+            <a:spAutoFit/>
+          </a:bodyPr>
+          <a:lstStyle/>
+          <a:p>
+            <a:r>
+              <a:rPr lang="en-GB" sz="1400" b="1" dirty="0" smtClean="0"/>
+              <a:t>Explanation</a:t>
+            </a:r>
+          </a:p>
+          <a:p>
+            <a:r>
+              <a:rPr lang="en-GB" sz="1400" dirty="0" smtClean="0"/>
+              <a:t>IDs on Proteins are to name and describe the overall interaction evidence (potentially based off multiple peptides) for the pairwise interaction.</a:t>
+            </a:r>
+          </a:p>
+          <a:p>
+            <a:endParaRPr lang="en-GB" sz="1400" dirty="0"/>
+          </a:p>
+          <a:p>
+            <a:r>
+              <a:rPr lang="en-GB" sz="1400" dirty="0" smtClean="0"/>
+              <a:t>In </a:t>
+            </a:r>
+            <a:r>
+              <a:rPr lang="en-GB" sz="1400" dirty="0" err="1" smtClean="0"/>
+              <a:t>mzIdentML</a:t>
+            </a:r>
+            <a:r>
+              <a:rPr lang="en-GB" sz="1400" dirty="0" smtClean="0"/>
+              <a:t>, they will be represented by different </a:t>
+            </a:r>
+            <a:r>
+              <a:rPr lang="en-GB" sz="1400" dirty="0" err="1" smtClean="0"/>
+              <a:t>ProteinDetectionHypothesis</a:t>
+            </a:r>
+            <a:r>
+              <a:rPr lang="en-GB" sz="1400" dirty="0" smtClean="0"/>
+              <a:t> (PDH) elements within different </a:t>
+            </a:r>
+            <a:r>
+              <a:rPr lang="en-GB" sz="1400" dirty="0" err="1" smtClean="0"/>
+              <a:t>ProteinAmbiguityGroup</a:t>
+            </a:r>
+            <a:r>
+              <a:rPr lang="en-GB" sz="1400" dirty="0" smtClean="0"/>
+              <a:t> (PAG) elements, sharing the same ID and score. </a:t>
+            </a:r>
+          </a:p>
+          <a:p>
+            <a:endParaRPr lang="en-GB" sz="1400" dirty="0"/>
+          </a:p>
+          <a:p>
+            <a:r>
+              <a:rPr lang="en-GB" sz="1400" dirty="0" smtClean="0"/>
+              <a:t>These CV terms must have a paired structure of </a:t>
+            </a:r>
+            <a:r>
+              <a:rPr lang="en-GB" sz="1400" dirty="0" err="1" smtClean="0"/>
+              <a:t>int_ID.a|b:POS|null:SCORE_OR_VALUE:PASS_THRESHOLD</a:t>
+            </a:r>
+            <a:endParaRPr lang="en-GB" sz="1400" dirty="0"/>
+          </a:p>
+        </p:txBody>
+      </p:sp>
+      <p:sp>
+        <p:nvSpPr>
+          <p:cNvPr id="24" name="TextBox 23"/>
+          <p:cNvSpPr txBox="1"/>
+          <p:nvPr/>
+        </p:nvSpPr>
+        <p:spPr>
+          <a:xfrm>
+            <a:off x="383312" y="2927616"/>
+            <a:ext cx="3801019" cy="646331"/>
+          </a:xfrm>
+          <a:prstGeom prst="rect">
+            <a:avLst/>
+          </a:prstGeom>
+        </p:spPr>
+        <p:style>
+          <a:lnRef idx="1">
+            <a:schemeClr val="accent1"/>
+          </a:lnRef>
+          <a:fillRef idx="2">
+            <a:schemeClr val="accent1"/>
+          </a:fillRef>
+          <a:effectRef idx="1">
+            <a:schemeClr val="accent1"/>
+          </a:effectRef>
+          <a:fontRef idx="minor">
+            <a:schemeClr val="dk1"/>
+          </a:fontRef>
+        </p:style>
+        <p:txBody>
+          <a:bodyPr wrap="square" rtlCol="0">
+            <a:spAutoFit/>
+          </a:bodyPr>
+          <a:lstStyle/>
+          <a:p>
+            <a:r>
+              <a:rPr lang="en-GB" sz="1200" dirty="0" smtClean="0"/>
+              <a:t>PDH 2.1</a:t>
+            </a:r>
+          </a:p>
+          <a:p>
+            <a:r>
+              <a:rPr lang="en-GB" sz="1200" dirty="0" smtClean="0"/>
+              <a:t> accession = </a:t>
+            </a:r>
+            <a:r>
+              <a:rPr lang="en-GB" sz="1200" dirty="0" err="1" smtClean="0"/>
+              <a:t>Prot</a:t>
+            </a:r>
+            <a:r>
+              <a:rPr lang="en-GB" sz="1200" dirty="0" smtClean="0"/>
+              <a:t> B.1</a:t>
+            </a:r>
+          </a:p>
+          <a:p>
+            <a:r>
+              <a:rPr lang="en-GB" sz="1200" dirty="0" smtClean="0"/>
+              <a:t> name=“interaction FDR” value=“1001.b:135:0.001:TRUE</a:t>
+            </a:r>
+            <a:endParaRPr lang="en-GB" sz="1200" dirty="0"/>
+          </a:p>
+        </p:txBody>
+      </p:sp>
+      <p:sp>
+        <p:nvSpPr>
+          <p:cNvPr id="25" name="Rectangle 24"/>
+          <p:cNvSpPr/>
+          <p:nvPr/>
+        </p:nvSpPr>
+        <p:spPr>
+          <a:xfrm>
+            <a:off x="117507" y="3794871"/>
+            <a:ext cx="4166461" cy="1133819"/>
+          </a:xfrm>
+          <a:prstGeom prst="rect">
+            <a:avLst/>
+          </a:prstGeom>
+        </p:spPr>
+        <p:style>
+          <a:lnRef idx="2">
+            <a:schemeClr val="accent1">
+              <a:shade val="50000"/>
+            </a:schemeClr>
+          </a:lnRef>
+          <a:fillRef idx="1">
+            <a:schemeClr val="accent1"/>
+          </a:fillRef>
+          <a:effectRef idx="0">
+            <a:schemeClr val="accent1"/>
+          </a:effectRef>
+          <a:fontRef idx="minor">
+            <a:schemeClr val="lt1"/>
+          </a:fontRef>
+        </p:style>
+        <p:txBody>
+          <a:bodyPr rtlCol="0" anchor="t" anchorCtr="0"/>
+          <a:lstStyle/>
+          <a:p>
+            <a:r>
+              <a:rPr lang="en-GB" dirty="0" smtClean="0">
+                <a:solidFill>
+                  <a:schemeClr val="bg1"/>
+                </a:solidFill>
+              </a:rPr>
+              <a:t>PAG 3</a:t>
+            </a:r>
+          </a:p>
+          <a:p>
+            <a:r>
+              <a:rPr lang="en-GB" dirty="0">
+                <a:solidFill>
+                  <a:schemeClr val="bg1"/>
+                </a:solidFill>
+              </a:rPr>
+              <a:t> </a:t>
+            </a:r>
+            <a:r>
+              <a:rPr lang="en-GB" dirty="0" smtClean="0">
+                <a:solidFill>
+                  <a:schemeClr val="bg1"/>
+                </a:solidFill>
+              </a:rPr>
+              <a:t>     </a:t>
+            </a:r>
+            <a:endParaRPr lang="en-GB" dirty="0">
+              <a:solidFill>
+                <a:schemeClr val="bg1"/>
+              </a:solidFill>
+            </a:endParaRPr>
+          </a:p>
+        </p:txBody>
+      </p:sp>
+      <p:sp>
+        <p:nvSpPr>
+          <p:cNvPr id="26" name="TextBox 25"/>
+          <p:cNvSpPr txBox="1"/>
+          <p:nvPr/>
+        </p:nvSpPr>
+        <p:spPr>
+          <a:xfrm>
+            <a:off x="368892" y="4151752"/>
+            <a:ext cx="3801019" cy="646331"/>
+          </a:xfrm>
+          <a:prstGeom prst="rect">
+            <a:avLst/>
+          </a:prstGeom>
+        </p:spPr>
+        <p:style>
+          <a:lnRef idx="1">
+            <a:schemeClr val="accent1"/>
+          </a:lnRef>
+          <a:fillRef idx="2">
+            <a:schemeClr val="accent1"/>
+          </a:fillRef>
+          <a:effectRef idx="1">
+            <a:schemeClr val="accent1"/>
+          </a:effectRef>
+          <a:fontRef idx="minor">
+            <a:schemeClr val="dk1"/>
+          </a:fontRef>
+        </p:style>
+        <p:txBody>
+          <a:bodyPr wrap="square" rtlCol="0">
+            <a:spAutoFit/>
+          </a:bodyPr>
+          <a:lstStyle/>
+          <a:p>
+            <a:r>
+              <a:rPr lang="en-GB" sz="1200" dirty="0" smtClean="0"/>
+              <a:t>PDH 1.1</a:t>
+            </a:r>
+          </a:p>
+          <a:p>
+            <a:r>
+              <a:rPr lang="en-GB" sz="1200" dirty="0" smtClean="0"/>
+              <a:t> accession = </a:t>
+            </a:r>
+            <a:r>
+              <a:rPr lang="en-GB" sz="1200" dirty="0" err="1" smtClean="0"/>
+              <a:t>Prot</a:t>
+            </a:r>
+            <a:r>
+              <a:rPr lang="en-GB" sz="1200" dirty="0" smtClean="0"/>
+              <a:t> A.1</a:t>
+            </a:r>
+          </a:p>
+          <a:p>
+            <a:r>
+              <a:rPr lang="en-GB" sz="1200" dirty="0" smtClean="0"/>
+              <a:t> name=“interaction FDR” value=“1002.b:135:0.07:FALSE</a:t>
+            </a:r>
+            <a:endParaRPr lang="en-GB" sz="1200" dirty="0"/>
+          </a:p>
+        </p:txBody>
+      </p:sp>
+      <p:sp>
+        <p:nvSpPr>
+          <p:cNvPr id="27" name="TextBox 26"/>
+          <p:cNvSpPr txBox="1"/>
+          <p:nvPr/>
+        </p:nvSpPr>
+        <p:spPr>
+          <a:xfrm>
+            <a:off x="395536" y="1581383"/>
+            <a:ext cx="3801019" cy="830997"/>
+          </a:xfrm>
+          <a:prstGeom prst="rect">
+            <a:avLst/>
+          </a:prstGeom>
+        </p:spPr>
+        <p:style>
+          <a:lnRef idx="1">
+            <a:schemeClr val="accent1"/>
+          </a:lnRef>
+          <a:fillRef idx="2">
+            <a:schemeClr val="accent1"/>
+          </a:fillRef>
+          <a:effectRef idx="1">
+            <a:schemeClr val="accent1"/>
+          </a:effectRef>
+          <a:fontRef idx="minor">
+            <a:schemeClr val="dk1"/>
+          </a:fontRef>
+        </p:style>
+        <p:txBody>
+          <a:bodyPr wrap="square" rtlCol="0">
+            <a:spAutoFit/>
+          </a:bodyPr>
+          <a:lstStyle/>
+          <a:p>
+            <a:r>
+              <a:rPr lang="en-GB" sz="1200" dirty="0" smtClean="0"/>
+              <a:t>PDH 1.2</a:t>
+            </a:r>
+          </a:p>
+          <a:p>
+            <a:r>
+              <a:rPr lang="en-GB" sz="1200" dirty="0" smtClean="0"/>
+              <a:t> accession = </a:t>
+            </a:r>
+            <a:r>
+              <a:rPr lang="en-GB" sz="1200" dirty="0" err="1" smtClean="0"/>
+              <a:t>Prot</a:t>
+            </a:r>
+            <a:r>
+              <a:rPr lang="en-GB" sz="1200" dirty="0" smtClean="0"/>
+              <a:t> A.2</a:t>
+            </a:r>
+          </a:p>
+          <a:p>
+            <a:r>
+              <a:rPr lang="en-GB" sz="1200" dirty="0" smtClean="0"/>
+              <a:t> name=“interaction FDR” value=“1001.a:258:0.001:TRUE</a:t>
+            </a:r>
+          </a:p>
+          <a:p>
+            <a:r>
+              <a:rPr lang="en-GB" sz="1200" dirty="0" smtClean="0"/>
+              <a:t> name</a:t>
+            </a:r>
+            <a:r>
+              <a:rPr lang="en-GB" sz="1200" dirty="0"/>
+              <a:t>=“interaction FDR” value=“</a:t>
+            </a:r>
+            <a:r>
+              <a:rPr lang="en-GB" sz="1200" dirty="0" smtClean="0"/>
+              <a:t>1002.a:480:0.07:TRUE</a:t>
+            </a:r>
+            <a:endParaRPr lang="en-GB" sz="1200" dirty="0"/>
+          </a:p>
+        </p:txBody>
+      </p:sp>
+      <p:sp>
+        <p:nvSpPr>
+          <p:cNvPr id="28" name="Down Arrow 27"/>
+          <p:cNvSpPr/>
+          <p:nvPr/>
+        </p:nvSpPr>
+        <p:spPr>
+          <a:xfrm flipV="1">
+            <a:off x="4644008" y="6084788"/>
+            <a:ext cx="309959" cy="240556"/>
+          </a:xfrm>
+          <a:prstGeom prst="downArrow">
+            <a:avLst/>
+          </a:prstGeom>
+        </p:spPr>
+        <p:style>
+          <a:lnRef idx="0">
+            <a:schemeClr val="dk1"/>
+          </a:lnRef>
+          <a:fillRef idx="3">
+            <a:schemeClr val="dk1"/>
+          </a:fillRef>
+          <a:effectRef idx="3">
+            <a:schemeClr val="dk1"/>
+          </a:effectRef>
+          <a:fontRef idx="minor">
+            <a:schemeClr val="lt1"/>
+          </a:fontRef>
+        </p:style>
+        <p:txBody>
+          <a:bodyPr wrap="square" rtlCol="0" anchor="ctr">
+            <a:spAutoFit/>
+          </a:bodyPr>
+          <a:lstStyle/>
+          <a:p>
+            <a:pPr algn="ctr"/>
+            <a:endParaRPr lang="en-GB" sz="800" dirty="0" smtClean="0">
+              <a:latin typeface="Courier New" pitchFamily="49" charset="0"/>
+              <a:cs typeface="Courier New" pitchFamily="49" charset="0"/>
+            </a:endParaRPr>
+          </a:p>
+        </p:txBody>
+      </p:sp>
+      <p:sp>
+        <p:nvSpPr>
+          <p:cNvPr id="29" name="Down Arrow 28"/>
+          <p:cNvSpPr/>
+          <p:nvPr/>
+        </p:nvSpPr>
+        <p:spPr>
+          <a:xfrm flipV="1">
+            <a:off x="5253938" y="6096114"/>
+            <a:ext cx="309959" cy="240556"/>
+          </a:xfrm>
+          <a:prstGeom prst="downArrow">
+            <a:avLst/>
+          </a:prstGeom>
+        </p:spPr>
+        <p:style>
+          <a:lnRef idx="0">
+            <a:schemeClr val="dk1"/>
+          </a:lnRef>
+          <a:fillRef idx="3">
+            <a:schemeClr val="dk1"/>
+          </a:fillRef>
+          <a:effectRef idx="3">
+            <a:schemeClr val="dk1"/>
+          </a:effectRef>
+          <a:fontRef idx="minor">
+            <a:schemeClr val="lt1"/>
+          </a:fontRef>
+        </p:style>
+        <p:txBody>
+          <a:bodyPr wrap="square" rtlCol="0" anchor="ctr">
+            <a:spAutoFit/>
+          </a:bodyPr>
+          <a:lstStyle/>
+          <a:p>
+            <a:pPr algn="ctr"/>
+            <a:endParaRPr lang="en-GB" sz="800" dirty="0" smtClean="0">
+              <a:latin typeface="Courier New" pitchFamily="49" charset="0"/>
+              <a:cs typeface="Courier New" pitchFamily="49" charset="0"/>
+            </a:endParaRPr>
+          </a:p>
+        </p:txBody>
+      </p:sp>
+      <p:sp>
+        <p:nvSpPr>
+          <p:cNvPr id="30" name="Down Arrow 29"/>
+          <p:cNvSpPr/>
+          <p:nvPr/>
+        </p:nvSpPr>
+        <p:spPr>
+          <a:xfrm flipV="1">
+            <a:off x="6535287" y="6107440"/>
+            <a:ext cx="309959" cy="240556"/>
+          </a:xfrm>
+          <a:prstGeom prst="downArrow">
+            <a:avLst/>
+          </a:prstGeom>
+        </p:spPr>
+        <p:style>
+          <a:lnRef idx="0">
+            <a:schemeClr val="dk1"/>
+          </a:lnRef>
+          <a:fillRef idx="3">
+            <a:schemeClr val="dk1"/>
+          </a:fillRef>
+          <a:effectRef idx="3">
+            <a:schemeClr val="dk1"/>
+          </a:effectRef>
+          <a:fontRef idx="minor">
+            <a:schemeClr val="lt1"/>
+          </a:fontRef>
+        </p:style>
+        <p:txBody>
+          <a:bodyPr wrap="square" rtlCol="0" anchor="ctr">
+            <a:spAutoFit/>
+          </a:bodyPr>
+          <a:lstStyle/>
+          <a:p>
+            <a:pPr algn="ctr"/>
+            <a:endParaRPr lang="en-GB" sz="800" dirty="0" smtClean="0">
+              <a:latin typeface="Courier New" pitchFamily="49" charset="0"/>
+              <a:cs typeface="Courier New" pitchFamily="49" charset="0"/>
+            </a:endParaRPr>
+          </a:p>
+        </p:txBody>
+      </p:sp>
+      <p:sp>
+        <p:nvSpPr>
+          <p:cNvPr id="31" name="Down Arrow 30"/>
+          <p:cNvSpPr/>
+          <p:nvPr/>
+        </p:nvSpPr>
+        <p:spPr>
+          <a:xfrm flipV="1">
+            <a:off x="7999190" y="6084788"/>
+            <a:ext cx="309959" cy="240556"/>
+          </a:xfrm>
+          <a:prstGeom prst="downArrow">
+            <a:avLst/>
+          </a:prstGeom>
+        </p:spPr>
+        <p:style>
+          <a:lnRef idx="0">
+            <a:schemeClr val="dk1"/>
+          </a:lnRef>
+          <a:fillRef idx="3">
+            <a:schemeClr val="dk1"/>
+          </a:fillRef>
+          <a:effectRef idx="3">
+            <a:schemeClr val="dk1"/>
+          </a:effectRef>
+          <a:fontRef idx="minor">
+            <a:schemeClr val="lt1"/>
+          </a:fontRef>
+        </p:style>
+        <p:txBody>
+          <a:bodyPr wrap="square" rtlCol="0" anchor="ctr">
+            <a:spAutoFit/>
+          </a:bodyPr>
+          <a:lstStyle/>
+          <a:p>
+            <a:pPr algn="ctr"/>
+            <a:endParaRPr lang="en-GB" sz="800" dirty="0" smtClean="0">
+              <a:latin typeface="Courier New" pitchFamily="49" charset="0"/>
+              <a:cs typeface="Courier New" pitchFamily="49" charset="0"/>
+            </a:endParaRPr>
+          </a:p>
+        </p:txBody>
+      </p:sp>
+      <p:sp>
+        <p:nvSpPr>
+          <p:cNvPr id="32" name="TextBox 31"/>
+          <p:cNvSpPr txBox="1"/>
+          <p:nvPr/>
+        </p:nvSpPr>
+        <p:spPr>
+          <a:xfrm>
+            <a:off x="35496" y="5076676"/>
+            <a:ext cx="4337482" cy="2677656"/>
+          </a:xfrm>
+          <a:prstGeom prst="rect">
+            <a:avLst/>
+          </a:prstGeom>
+          <a:noFill/>
+        </p:spPr>
+        <p:txBody>
+          <a:bodyPr wrap="square" rtlCol="0">
+            <a:spAutoFit/>
+          </a:bodyPr>
+          <a:lstStyle/>
+          <a:p>
+            <a:pPr marL="228600" indent="-228600">
+              <a:buAutoNum type="arabicParenR"/>
+            </a:pPr>
+            <a:r>
+              <a:rPr lang="en-GB" sz="1200" dirty="0" smtClean="0">
+                <a:latin typeface="+mj-lt"/>
+                <a:cs typeface="Courier New" pitchFamily="49" charset="0"/>
+              </a:rPr>
+              <a:t>The two partners in the interaction share the same </a:t>
+            </a:r>
+            <a:r>
+              <a:rPr lang="en-GB" sz="1200" i="1" dirty="0" smtClean="0">
+                <a:latin typeface="+mj-lt"/>
+                <a:cs typeface="Courier New" pitchFamily="49" charset="0"/>
+              </a:rPr>
+              <a:t>integer</a:t>
+            </a:r>
+            <a:r>
+              <a:rPr lang="en-GB" sz="1200" dirty="0" smtClean="0">
+                <a:latin typeface="+mj-lt"/>
+                <a:cs typeface="Courier New" pitchFamily="49" charset="0"/>
+              </a:rPr>
+              <a:t> value for ID followed by </a:t>
+            </a:r>
+            <a:r>
+              <a:rPr lang="en-GB" sz="1200" i="1" dirty="0" smtClean="0">
+                <a:latin typeface="+mj-lt"/>
+                <a:cs typeface="Courier New" pitchFamily="49" charset="0"/>
+              </a:rPr>
+              <a:t>a </a:t>
+            </a:r>
+            <a:r>
+              <a:rPr lang="en-GB" sz="1200" dirty="0" smtClean="0">
+                <a:latin typeface="+mj-lt"/>
+                <a:cs typeface="Courier New" pitchFamily="49" charset="0"/>
+              </a:rPr>
+              <a:t>or </a:t>
+            </a:r>
+            <a:r>
+              <a:rPr lang="en-GB" sz="1200" i="1" dirty="0" smtClean="0">
+                <a:latin typeface="+mj-lt"/>
+                <a:cs typeface="Courier New" pitchFamily="49" charset="0"/>
+              </a:rPr>
+              <a:t>b. </a:t>
+            </a:r>
+            <a:r>
+              <a:rPr lang="en-GB" sz="1200" dirty="0" smtClean="0">
+                <a:latin typeface="+mj-lt"/>
+                <a:cs typeface="Courier New" pitchFamily="49" charset="0"/>
+              </a:rPr>
+              <a:t>If there is ambiguity in protein identification, two different </a:t>
+            </a:r>
+            <a:r>
+              <a:rPr lang="en-GB" sz="1200" dirty="0" err="1" smtClean="0">
+                <a:latin typeface="+mj-lt"/>
+                <a:cs typeface="Courier New" pitchFamily="49" charset="0"/>
+              </a:rPr>
+              <a:t>ProteinDetectionHypothesis</a:t>
+            </a:r>
+            <a:r>
+              <a:rPr lang="en-GB" sz="1200" dirty="0" smtClean="0">
+                <a:latin typeface="+mj-lt"/>
+                <a:cs typeface="Courier New" pitchFamily="49" charset="0"/>
+              </a:rPr>
+              <a:t> (PDH) elements, within the same </a:t>
+            </a:r>
+            <a:r>
+              <a:rPr lang="en-GB" sz="1200" dirty="0" err="1" smtClean="0">
+                <a:latin typeface="+mj-lt"/>
+                <a:cs typeface="Courier New" pitchFamily="49" charset="0"/>
+              </a:rPr>
+              <a:t>ProteinAmbiguityGroup</a:t>
+            </a:r>
+            <a:r>
+              <a:rPr lang="en-GB" sz="1200" dirty="0" smtClean="0">
+                <a:latin typeface="+mj-lt"/>
+                <a:cs typeface="Courier New" pitchFamily="49" charset="0"/>
+              </a:rPr>
+              <a:t> (PAG), MAY share the same ID and suffix (a or b). A given identifier (integer and suffix) value MUST NOT be used in more than PAG.</a:t>
+            </a:r>
+          </a:p>
+          <a:p>
+            <a:pPr marL="228600" indent="-228600">
+              <a:buAutoNum type="arabicParenR"/>
+            </a:pPr>
+            <a:r>
+              <a:rPr lang="en-GB" sz="1200" dirty="0" smtClean="0">
+                <a:latin typeface="+mj-lt"/>
+                <a:cs typeface="Courier New" pitchFamily="49" charset="0"/>
+              </a:rPr>
+              <a:t>The export software MAY indicate the general position of the interaction (potentially taking on board multiple pairs of cross-linked peptides), with respect to the protein sequence – using a 1-based counting system. A “null” MAY be used if the export software does not wish to include a value.</a:t>
+            </a:r>
+          </a:p>
+          <a:p>
+            <a:pPr marL="228600" indent="-228600">
+              <a:buAutoNum type="arabicParenR"/>
+            </a:pPr>
+            <a:r>
+              <a:rPr lang="en-GB" sz="1200" dirty="0" smtClean="0">
+                <a:latin typeface="+mj-lt"/>
+                <a:cs typeface="Courier New" pitchFamily="49" charset="0"/>
+              </a:rPr>
+              <a:t>The score or statistical value for the interaction.</a:t>
+            </a:r>
+          </a:p>
+          <a:p>
+            <a:pPr marL="228600" indent="-228600">
+              <a:buAutoNum type="arabicParenR"/>
+            </a:pPr>
+            <a:r>
+              <a:rPr lang="en-GB" sz="1200" dirty="0" smtClean="0">
+                <a:latin typeface="+mj-lt"/>
+                <a:cs typeface="Courier New" pitchFamily="49" charset="0"/>
+              </a:rPr>
+              <a:t>“true” or “false” to indicate whether the score or value has passed a reported threshold in the file.</a:t>
+            </a:r>
+          </a:p>
+        </p:txBody>
+      </p:sp>
+      <p:sp>
+        <p:nvSpPr>
+          <p:cNvPr id="33" name="TextBox 32"/>
+          <p:cNvSpPr txBox="1"/>
+          <p:nvPr/>
+        </p:nvSpPr>
+        <p:spPr>
+          <a:xfrm>
+            <a:off x="4639403" y="6327439"/>
+            <a:ext cx="309700" cy="276999"/>
+          </a:xfrm>
+          <a:prstGeom prst="rect">
+            <a:avLst/>
+          </a:prstGeom>
+          <a:noFill/>
+        </p:spPr>
+        <p:txBody>
+          <a:bodyPr wrap="none" rtlCol="0">
+            <a:spAutoFit/>
+          </a:bodyPr>
+          <a:lstStyle/>
+          <a:p>
+            <a:r>
+              <a:rPr lang="en-GB" sz="1200" dirty="0" smtClean="0">
+                <a:cs typeface="Courier New" pitchFamily="49" charset="0"/>
+              </a:rPr>
+              <a:t>1)</a:t>
+            </a:r>
+          </a:p>
+        </p:txBody>
+      </p:sp>
+      <p:sp>
+        <p:nvSpPr>
+          <p:cNvPr id="34" name="TextBox 33"/>
+          <p:cNvSpPr txBox="1"/>
+          <p:nvPr/>
+        </p:nvSpPr>
+        <p:spPr>
+          <a:xfrm>
+            <a:off x="5249074" y="6336670"/>
+            <a:ext cx="309700" cy="276999"/>
+          </a:xfrm>
+          <a:prstGeom prst="rect">
+            <a:avLst/>
+          </a:prstGeom>
+          <a:noFill/>
+        </p:spPr>
+        <p:txBody>
+          <a:bodyPr wrap="none" rtlCol="0">
+            <a:spAutoFit/>
+          </a:bodyPr>
+          <a:lstStyle/>
+          <a:p>
+            <a:r>
+              <a:rPr lang="en-GB" sz="1200" dirty="0" smtClean="0">
+                <a:cs typeface="Courier New" pitchFamily="49" charset="0"/>
+              </a:rPr>
+              <a:t>2)</a:t>
+            </a:r>
+          </a:p>
+        </p:txBody>
+      </p:sp>
+      <p:sp>
+        <p:nvSpPr>
+          <p:cNvPr id="35" name="TextBox 34"/>
+          <p:cNvSpPr txBox="1"/>
+          <p:nvPr/>
+        </p:nvSpPr>
+        <p:spPr>
+          <a:xfrm>
+            <a:off x="6543919" y="6352063"/>
+            <a:ext cx="309700" cy="276999"/>
+          </a:xfrm>
+          <a:prstGeom prst="rect">
+            <a:avLst/>
+          </a:prstGeom>
+          <a:noFill/>
+        </p:spPr>
+        <p:txBody>
+          <a:bodyPr wrap="none" rtlCol="0">
+            <a:spAutoFit/>
+          </a:bodyPr>
+          <a:lstStyle/>
+          <a:p>
+            <a:r>
+              <a:rPr lang="en-GB" sz="1200" dirty="0" smtClean="0">
+                <a:cs typeface="Courier New" pitchFamily="49" charset="0"/>
+              </a:rPr>
+              <a:t>3)</a:t>
+            </a:r>
+          </a:p>
+        </p:txBody>
+      </p:sp>
+      <p:sp>
+        <p:nvSpPr>
+          <p:cNvPr id="36" name="TextBox 35"/>
+          <p:cNvSpPr txBox="1"/>
+          <p:nvPr/>
+        </p:nvSpPr>
+        <p:spPr>
+          <a:xfrm>
+            <a:off x="7999319" y="6329272"/>
+            <a:ext cx="309700" cy="276999"/>
+          </a:xfrm>
+          <a:prstGeom prst="rect">
+            <a:avLst/>
+          </a:prstGeom>
+          <a:noFill/>
+        </p:spPr>
+        <p:txBody>
+          <a:bodyPr wrap="none" rtlCol="0">
+            <a:spAutoFit/>
+          </a:bodyPr>
+          <a:lstStyle/>
+          <a:p>
+            <a:r>
+              <a:rPr lang="en-GB" sz="1200" dirty="0" smtClean="0">
+                <a:cs typeface="Courier New" pitchFamily="49" charset="0"/>
+              </a:rPr>
+              <a:t>4)</a:t>
+            </a:r>
+          </a:p>
+        </p:txBody>
+      </p:sp>
+      <p:sp>
+        <p:nvSpPr>
+          <p:cNvPr id="17" name="TextBox 16"/>
+          <p:cNvSpPr txBox="1"/>
+          <p:nvPr/>
+        </p:nvSpPr>
+        <p:spPr>
+          <a:xfrm>
+            <a:off x="962498" y="7763818"/>
+            <a:ext cx="4465710" cy="276999"/>
+          </a:xfrm>
+          <a:prstGeom prst="rect">
+            <a:avLst/>
+          </a:prstGeom>
+          <a:noFill/>
+        </p:spPr>
+        <p:txBody>
+          <a:bodyPr wrap="none" rtlCol="0">
+            <a:spAutoFit/>
+          </a:bodyPr>
+          <a:lstStyle/>
+          <a:p>
+            <a:r>
+              <a:rPr lang="en-GB" sz="1200" b="1" dirty="0" smtClean="0">
+                <a:cs typeface="Courier New" pitchFamily="49" charset="0"/>
+              </a:rPr>
+              <a:t>Note: Need XML example of this and at least one genuine CV term</a:t>
+            </a:r>
+            <a:endParaRPr lang="en-GB" sz="1200" b="1" dirty="0" smtClean="0">
+              <a:cs typeface="Courier New" pitchFamily="49" charset="0"/>
+            </a:endParaRPr>
+          </a:p>
+        </p:txBody>
+      </p:sp>
+    </p:spTree>
+    <p:extLst>
+      <p:ext uri="{BB962C8B-B14F-4D97-AF65-F5344CB8AC3E}">
+        <p14:creationId xmlns:p14="http://schemas.microsoft.com/office/powerpoint/2010/main" val="4105399555"/>
+      </p:ext>
+    </p:extLst>
+  </p:cSld>
+  <p:clrMapOvr>
+    <a:masterClrMapping/>
+  </p:clrMapOvr>
+</p:sld>
+</file>
+
+<file path=ppt/slides/slide7.xml><?xml version="1.0" encoding="utf-8"?>
 <p:sld xmlns:a="http://schemas.openxmlformats.org/drawingml/2006/main" xmlns:r="http://schemas.openxmlformats.org/officeDocument/2006/relationships" xmlns:p="http://schemas.openxmlformats.org/presentationml/2006/main">
   <p:cSld>
     <p:spTree>
@@ -10932,33 +12608,22 @@
                 <a:latin typeface="+mj-lt"/>
                 <a:cs typeface="Courier New" pitchFamily="49" charset="0"/>
               </a:rPr>
-              <a:t>Guidelines for </a:t>
+              <a:t>Guidelines for encoding </a:t>
+            </a:r>
+            <a:r>
+              <a:rPr lang="en-GB" sz="1600" b="1" dirty="0" err="1" smtClean="0">
+                <a:latin typeface="+mj-lt"/>
+                <a:cs typeface="Courier New" pitchFamily="49" charset="0"/>
+              </a:rPr>
+              <a:t>proteogenomics</a:t>
             </a:r>
             <a:r>
               <a:rPr lang="en-GB" sz="1600" b="1" dirty="0" smtClean="0">
                 <a:latin typeface="+mj-lt"/>
                 <a:cs typeface="Courier New" pitchFamily="49" charset="0"/>
               </a:rPr>
-              <a:t>encoding </a:t>
-            </a:r>
-            <a:r>
-              <a:rPr lang="en-GB" sz="1600" b="1" dirty="0" err="1" smtClean="0">
-                <a:latin typeface="+mj-lt"/>
-                <a:cs typeface="Courier New" pitchFamily="49" charset="0"/>
-              </a:rPr>
-              <a:t>proteogenomics</a:t>
-            </a:r>
-            <a:r>
-              <a:rPr lang="en-GB" sz="1600" b="1" dirty="0" smtClean="0">
-                <a:latin typeface="+mj-lt"/>
-                <a:cs typeface="Courier New" pitchFamily="49" charset="0"/>
-              </a:rPr>
               <a:t> results</a:t>
             </a:r>
-            <a:endParaRPr lang="en-GB" sz="1600" b="1" dirty="0" smtClean="0">
-              <a:latin typeface="+mj-lt"/>
-              <a:cs typeface="Courier New" pitchFamily="49" charset="0"/>
-            </a:endParaRPr>
           </a:p>
         </p:txBody>
       </p:sp>
@@ -11785,10 +13450,6 @@
               </a:rPr>
               <a:t>&gt;</a:t>
             </a:r>
-            <a:endParaRPr lang="en-GB" sz="800" dirty="0">
-              <a:latin typeface="Courier New" pitchFamily="49" charset="0"/>
-              <a:cs typeface="Courier New" pitchFamily="49" charset="0"/>
-            </a:endParaRPr>
           </a:p>
         </p:txBody>
       </p:sp>
@@ -12235,11 +13896,7 @@
                       </a:r>
                       <a:r>
                         <a:rPr lang="en-GB" sz="1200" dirty="0" smtClean="0"/>
-                        <a:t> </a:t>
-                      </a:r>
-                      <a:r>
-                        <a:rPr lang="en-GB" sz="1200" dirty="0" smtClean="0"/>
-                        <a:t>search </a:t>
+                        <a:t> search </a:t>
                       </a:r>
                       <a:r>
                         <a:rPr lang="en-GB" sz="1200" baseline="0" dirty="0" smtClean="0"/>
@@ -12251,11 +13908,7 @@
                       </a:r>
                       <a:r>
                         <a:rPr lang="en-GB" sz="1200" baseline="0" dirty="0" smtClean="0"/>
-                        <a:t> MUST be present</a:t>
-                      </a:r>
-                      <a:r>
-                        <a:rPr lang="en-GB" sz="1200" baseline="0" dirty="0" smtClean="0"/>
-                        <a:t>.</a:t>
+                        <a:t> MUST be present.</a:t>
                       </a:r>
                       <a:endParaRPr lang="en-GB" sz="1200" dirty="0"/>
                     </a:p>
@@ -12431,11 +14084,6 @@
                         </a:rPr>
                         <a:t>STILL UNDER DISCUSSION.</a:t>
                       </a:r>
-                      <a:endParaRPr lang="en-GB" sz="1200" i="0" baseline="0" dirty="0" smtClean="0">
-                        <a:solidFill>
-                          <a:srgbClr val="C00000"/>
-                        </a:solidFill>
-                      </a:endParaRPr>
                     </a:p>
                   </a:txBody>
                   <a:tcPr/>

</xml_diff>

<commit_message>
Clean up various parts of spec doc following recent discussions on calls
</commit_message>
<xml_diff>
--- a/specification_document/specdoc1_2/NewFeaturesInMzid12.pptx
+++ b/specification_document/specdoc1_2/NewFeaturesInMzid12.pptx
@@ -215,7 +215,7 @@
             <a:fld id="{943B0BE5-311A-4B0A-9A39-DE24DD4BA79D}" type="datetimeFigureOut">
               <a:rPr lang="en-GB" smtClean="0"/>
               <a:pPr/>
-              <a:t>04/05/2016</a:t>
+              <a:t>18/05/2016</a:t>
             </a:fld>
             <a:endParaRPr lang="en-GB"/>
           </a:p>
@@ -760,7 +760,7 @@
             <a:fld id="{A71EF3F3-5BE8-4F69-8C8F-88D570AA2740}" type="datetimeFigureOut">
               <a:rPr lang="en-GB" smtClean="0"/>
               <a:pPr/>
-              <a:t>04/05/2016</a:t>
+              <a:t>18/05/2016</a:t>
             </a:fld>
             <a:endParaRPr lang="en-GB"/>
           </a:p>
@@ -927,7 +927,7 @@
             <a:fld id="{A71EF3F3-5BE8-4F69-8C8F-88D570AA2740}" type="datetimeFigureOut">
               <a:rPr lang="en-GB" smtClean="0"/>
               <a:pPr/>
-              <a:t>04/05/2016</a:t>
+              <a:t>18/05/2016</a:t>
             </a:fld>
             <a:endParaRPr lang="en-GB"/>
           </a:p>
@@ -1104,7 +1104,7 @@
             <a:fld id="{A71EF3F3-5BE8-4F69-8C8F-88D570AA2740}" type="datetimeFigureOut">
               <a:rPr lang="en-GB" smtClean="0"/>
               <a:pPr/>
-              <a:t>04/05/2016</a:t>
+              <a:t>18/05/2016</a:t>
             </a:fld>
             <a:endParaRPr lang="en-GB"/>
           </a:p>
@@ -1271,7 +1271,7 @@
             <a:fld id="{A71EF3F3-5BE8-4F69-8C8F-88D570AA2740}" type="datetimeFigureOut">
               <a:rPr lang="en-GB" smtClean="0"/>
               <a:pPr/>
-              <a:t>04/05/2016</a:t>
+              <a:t>18/05/2016</a:t>
             </a:fld>
             <a:endParaRPr lang="en-GB"/>
           </a:p>
@@ -1514,7 +1514,7 @@
             <a:fld id="{A71EF3F3-5BE8-4F69-8C8F-88D570AA2740}" type="datetimeFigureOut">
               <a:rPr lang="en-GB" smtClean="0"/>
               <a:pPr/>
-              <a:t>04/05/2016</a:t>
+              <a:t>18/05/2016</a:t>
             </a:fld>
             <a:endParaRPr lang="en-GB"/>
           </a:p>
@@ -1799,7 +1799,7 @@
             <a:fld id="{A71EF3F3-5BE8-4F69-8C8F-88D570AA2740}" type="datetimeFigureOut">
               <a:rPr lang="en-GB" smtClean="0"/>
               <a:pPr/>
-              <a:t>04/05/2016</a:t>
+              <a:t>18/05/2016</a:t>
             </a:fld>
             <a:endParaRPr lang="en-GB"/>
           </a:p>
@@ -2218,7 +2218,7 @@
             <a:fld id="{A71EF3F3-5BE8-4F69-8C8F-88D570AA2740}" type="datetimeFigureOut">
               <a:rPr lang="en-GB" smtClean="0"/>
               <a:pPr/>
-              <a:t>04/05/2016</a:t>
+              <a:t>18/05/2016</a:t>
             </a:fld>
             <a:endParaRPr lang="en-GB"/>
           </a:p>
@@ -2333,7 +2333,7 @@
             <a:fld id="{A71EF3F3-5BE8-4F69-8C8F-88D570AA2740}" type="datetimeFigureOut">
               <a:rPr lang="en-GB" smtClean="0"/>
               <a:pPr/>
-              <a:t>04/05/2016</a:t>
+              <a:t>18/05/2016</a:t>
             </a:fld>
             <a:endParaRPr lang="en-GB"/>
           </a:p>
@@ -2425,7 +2425,7 @@
             <a:fld id="{A71EF3F3-5BE8-4F69-8C8F-88D570AA2740}" type="datetimeFigureOut">
               <a:rPr lang="en-GB" smtClean="0"/>
               <a:pPr/>
-              <a:t>04/05/2016</a:t>
+              <a:t>18/05/2016</a:t>
             </a:fld>
             <a:endParaRPr lang="en-GB"/>
           </a:p>
@@ -2699,7 +2699,7 @@
             <a:fld id="{A71EF3F3-5BE8-4F69-8C8F-88D570AA2740}" type="datetimeFigureOut">
               <a:rPr lang="en-GB" smtClean="0"/>
               <a:pPr/>
-              <a:t>04/05/2016</a:t>
+              <a:t>18/05/2016</a:t>
             </a:fld>
             <a:endParaRPr lang="en-GB"/>
           </a:p>
@@ -2949,7 +2949,7 @@
             <a:fld id="{A71EF3F3-5BE8-4F69-8C8F-88D570AA2740}" type="datetimeFigureOut">
               <a:rPr lang="en-GB" smtClean="0"/>
               <a:pPr/>
-              <a:t>04/05/2016</a:t>
+              <a:t>18/05/2016</a:t>
             </a:fld>
             <a:endParaRPr lang="en-GB"/>
           </a:p>
@@ -3159,7 +3159,7 @@
             <a:fld id="{A71EF3F3-5BE8-4F69-8C8F-88D570AA2740}" type="datetimeFigureOut">
               <a:rPr lang="en-GB" smtClean="0"/>
               <a:pPr/>
-              <a:t>04/05/2016</a:t>
+              <a:t>18/05/2016</a:t>
             </a:fld>
             <a:endParaRPr lang="en-GB"/>
           </a:p>
@@ -8992,11 +8992,18 @@
               <a:t>monoisotopicMassDelta</a:t>
             </a:r>
             <a:r>
-              <a:rPr lang="en-GB" sz="800" dirty="0" smtClean="0">
-                <a:latin typeface="Courier New" pitchFamily="49" charset="0"/>
-                <a:cs typeface="Courier New" pitchFamily="49" charset="0"/>
-              </a:rPr>
-              <a:t>="142.0931769836"  location="5"&gt;</a:t>
+              <a:rPr lang="en-GB" sz="800" smtClean="0">
+                <a:latin typeface="Courier New" pitchFamily="49" charset="0"/>
+                <a:cs typeface="Courier New" pitchFamily="49" charset="0"/>
+              </a:rPr>
+              <a:t>="138.0680796"  </a:t>
+            </a:r>
+            <a:r>
+              <a:rPr lang="en-GB" sz="800" dirty="0" smtClean="0">
+                <a:latin typeface="Courier New" pitchFamily="49" charset="0"/>
+                <a:cs typeface="Courier New" pitchFamily="49" charset="0"/>
+              </a:rPr>
+              <a:t>location="5"&gt;</a:t>
             </a:r>
           </a:p>
           <a:p>
@@ -9392,6 +9399,27 @@
               <a:t>experimentalMassToCharge</a:t>
             </a:r>
             <a:r>
+              <a:rPr lang="en-GB" sz="800" dirty="0">
+                <a:latin typeface="Courier New" pitchFamily="49" charset="0"/>
+                <a:cs typeface="Courier New" pitchFamily="49" charset="0"/>
+              </a:rPr>
+              <a:t>= </a:t>
+            </a:r>
+            <a:r>
+              <a:rPr lang="en-GB" sz="800" dirty="0" smtClean="0">
+                <a:latin typeface="Courier New" pitchFamily="49" charset="0"/>
+                <a:cs typeface="Courier New" pitchFamily="49" charset="0"/>
+              </a:rPr>
+              <a:t>"569.7912" </a:t>
+            </a:r>
+            <a:r>
+              <a:rPr lang="en-GB" sz="800" dirty="0" err="1" smtClean="0">
+                <a:latin typeface="Courier New" pitchFamily="49" charset="0"/>
+                <a:cs typeface="Courier New" pitchFamily="49" charset="0"/>
+              </a:rPr>
+              <a:t>calculatedMassToCharge</a:t>
+            </a:r>
+            <a:r>
               <a:rPr lang="en-GB" sz="800" dirty="0" smtClean="0">
                 <a:latin typeface="Courier New" pitchFamily="49" charset="0"/>
                 <a:cs typeface="Courier New" pitchFamily="49" charset="0"/>
@@ -9410,41 +9438,13 @@
                 <a:latin typeface="Courier New" pitchFamily="49" charset="0"/>
                 <a:cs typeface="Courier New" pitchFamily="49" charset="0"/>
               </a:rPr>
-              <a:t>“XXX" </a:t>
+              <a:t>"569.79054" </a:t>
             </a:r>
             <a:r>
               <a:rPr lang="en-GB" sz="800" dirty="0" err="1" smtClean="0">
                 <a:latin typeface="Courier New" pitchFamily="49" charset="0"/>
                 <a:cs typeface="Courier New" pitchFamily="49" charset="0"/>
               </a:rPr>
-              <a:t>calculatedMassToCharge</a:t>
-            </a:r>
-            <a:r>
-              <a:rPr lang="en-GB" sz="800" dirty="0" smtClean="0">
-                <a:latin typeface="Courier New" pitchFamily="49" charset="0"/>
-                <a:cs typeface="Courier New" pitchFamily="49" charset="0"/>
-              </a:rPr>
-              <a:t>=“</a:t>
-            </a:r>
-            <a:r>
-              <a:rPr lang="en-GB" sz="800" b="1" dirty="0" smtClean="0">
-                <a:latin typeface="Courier New" pitchFamily="49" charset="0"/>
-                <a:cs typeface="Courier New" pitchFamily="49" charset="0"/>
-              </a:rPr>
-              <a:t>XXX</a:t>
-            </a:r>
-            <a:r>
-              <a:rPr lang="en-GB" sz="800" dirty="0" smtClean="0">
-                <a:latin typeface="Courier New" pitchFamily="49" charset="0"/>
-                <a:cs typeface="Courier New" pitchFamily="49" charset="0"/>
-              </a:rPr>
-              <a:t>" </a:t>
-            </a:r>
-            <a:r>
-              <a:rPr lang="en-GB" sz="800" dirty="0" err="1" smtClean="0">
-                <a:latin typeface="Courier New" pitchFamily="49" charset="0"/>
-                <a:cs typeface="Courier New" pitchFamily="49" charset="0"/>
-              </a:rPr>
               <a:t>chargeState</a:t>
             </a:r>
             <a:r>
@@ -9452,7 +9452,7 @@
                 <a:latin typeface="Courier New" pitchFamily="49" charset="0"/>
                 <a:cs typeface="Courier New" pitchFamily="49" charset="0"/>
               </a:rPr>
-              <a:t>=“X" </a:t>
+              <a:t>=“4" </a:t>
             </a:r>
             <a:r>
               <a:rPr lang="en-GB" sz="800" dirty="0" smtClean="0">
@@ -9686,28 +9686,18 @@
               <a:t>experimentalMassToCharge</a:t>
             </a:r>
             <a:r>
-              <a:rPr lang="en-GB" sz="800" dirty="0" smtClean="0">
-                <a:latin typeface="Courier New" pitchFamily="49" charset="0"/>
-                <a:cs typeface="Courier New" pitchFamily="49" charset="0"/>
-              </a:rPr>
-              <a:t>=“</a:t>
-            </a:r>
-            <a:r>
-              <a:rPr lang="en-GB" sz="800" dirty="0" smtClean="0">
-                <a:solidFill>
-                  <a:srgbClr val="FF0000"/>
-                </a:solidFill>
-                <a:latin typeface="Courier New" pitchFamily="49" charset="0"/>
-                <a:cs typeface="Courier New" pitchFamily="49" charset="0"/>
-              </a:rPr>
-              <a:t>XXX</a:t>
-            </a:r>
-            <a:r>
-              <a:rPr lang="en-GB" sz="800" dirty="0" smtClean="0">
-                <a:latin typeface="Courier New" pitchFamily="49" charset="0"/>
-                <a:cs typeface="Courier New" pitchFamily="49" charset="0"/>
-              </a:rPr>
-              <a:t>“ </a:t>
+              <a:rPr lang="en-GB" sz="800" dirty="0">
+                <a:latin typeface="Courier New" pitchFamily="49" charset="0"/>
+                <a:cs typeface="Courier New" pitchFamily="49" charset="0"/>
+              </a:rPr>
+              <a:t>= </a:t>
+            </a:r>
+            <a:r>
+              <a:rPr lang="en-GB" sz="800" dirty="0" smtClean="0">
+                <a:latin typeface="Courier New" pitchFamily="49" charset="0"/>
+                <a:cs typeface="Courier New" pitchFamily="49" charset="0"/>
+              </a:rPr>
+              <a:t>"569.7912" </a:t>
             </a:r>
             <a:r>
               <a:rPr lang="en-GB" sz="800" dirty="0" err="1" smtClean="0">
@@ -9717,25 +9707,18 @@
               <a:t>calculatedMassToCharge</a:t>
             </a:r>
             <a:r>
-              <a:rPr lang="en-GB" sz="800" dirty="0" smtClean="0">
-                <a:latin typeface="Courier New" pitchFamily="49" charset="0"/>
-                <a:cs typeface="Courier New" pitchFamily="49" charset="0"/>
-              </a:rPr>
-              <a:t>=“</a:t>
-            </a:r>
-            <a:r>
-              <a:rPr lang="en-GB" sz="800" b="1" dirty="0" smtClean="0">
-                <a:latin typeface="Courier New" pitchFamily="49" charset="0"/>
-                <a:cs typeface="Courier New" pitchFamily="49" charset="0"/>
-              </a:rPr>
-              <a:t>XXX</a:t>
-            </a:r>
-            <a:r>
-              <a:rPr lang="en-GB" sz="800" dirty="0" smtClean="0">
-                <a:latin typeface="Courier New" pitchFamily="49" charset="0"/>
-                <a:cs typeface="Courier New" pitchFamily="49" charset="0"/>
-              </a:rPr>
-              <a:t>" </a:t>
+              <a:rPr lang="en-GB" sz="800" dirty="0">
+                <a:latin typeface="Courier New" pitchFamily="49" charset="0"/>
+                <a:cs typeface="Courier New" pitchFamily="49" charset="0"/>
+              </a:rPr>
+              <a:t>= </a:t>
+            </a:r>
+            <a:r>
+              <a:rPr lang="en-GB" sz="800" dirty="0" smtClean="0">
+                <a:latin typeface="Courier New" pitchFamily="49" charset="0"/>
+                <a:cs typeface="Courier New" pitchFamily="49" charset="0"/>
+              </a:rPr>
+              <a:t>"569.79054" </a:t>
             </a:r>
             <a:r>
               <a:rPr lang="en-GB" sz="800" dirty="0" err="1" smtClean="0">
@@ -9749,7 +9732,7 @@
                 <a:latin typeface="Courier New" pitchFamily="49" charset="0"/>
                 <a:cs typeface="Courier New" pitchFamily="49" charset="0"/>
               </a:rPr>
-              <a:t>=“X" </a:t>
+              <a:t>=“4" </a:t>
             </a:r>
             <a:r>
               <a:rPr lang="en-GB" sz="800" dirty="0" smtClean="0">
@@ -10331,7 +10314,7 @@
         </p:nvSpPr>
         <p:spPr>
           <a:xfrm>
-            <a:off x="5436096" y="478036"/>
+            <a:off x="5568751" y="1075586"/>
             <a:ext cx="327334" cy="369332"/>
           </a:xfrm>
           <a:prstGeom prst="rect">
@@ -10451,14 +10434,14 @@
           <p:nvPr>
             <p:extLst>
               <p:ext uri="{D42A27DB-BD31-4B8C-83A1-F6EECF244321}">
-                <p14:modId xmlns:p14="http://schemas.microsoft.com/office/powerpoint/2010/main" val="3903563875"/>
+                <p14:modId xmlns:p14="http://schemas.microsoft.com/office/powerpoint/2010/main" val="1519167819"/>
               </p:ext>
             </p:extLst>
           </p:nvPr>
         </p:nvGraphicFramePr>
         <p:xfrm>
           <a:off x="395536" y="6220093"/>
-          <a:ext cx="6516217" cy="5679440"/>
+          <a:ext cx="6516217" cy="4947920"/>
         </p:xfrm>
         <a:graphic>
           <a:graphicData uri="http://schemas.openxmlformats.org/drawingml/2006/table">
@@ -10614,19 +10597,11 @@
                     <a:p>
                       <a:r>
                         <a:rPr lang="en-GB" sz="1200" dirty="0" smtClean="0"/>
-                        <a:t>The </a:t>
-                      </a:r>
-                      <a:r>
-                        <a:rPr lang="en-GB" sz="1200" dirty="0" smtClean="0"/>
-                        <a:t>cross-link</a:t>
+                        <a:t>The cross-link</a:t>
                       </a:r>
                       <a:r>
                         <a:rPr lang="en-GB" sz="1200" baseline="0" dirty="0" smtClean="0"/>
-                        <a:t> </a:t>
-                      </a:r>
-                      <a:r>
-                        <a:rPr lang="en-GB" sz="1200" baseline="0" dirty="0" smtClean="0"/>
-                        <a:t>donor peptide’s Modification element  MUST have a suitably sourced </a:t>
+                        <a:t> donor peptide’s Modification element  MUST have a suitably sourced </a:t>
                       </a:r>
                       <a:r>
                         <a:rPr lang="en-GB" sz="1200" baseline="0" dirty="0" err="1" smtClean="0"/>
@@ -10634,15 +10609,7 @@
                       </a:r>
                       <a:r>
                         <a:rPr lang="en-GB" sz="1200" baseline="0" dirty="0" smtClean="0"/>
-                        <a:t> for the crosslink. The </a:t>
-                      </a:r>
-                      <a:r>
-                        <a:rPr lang="en-GB" sz="1200" baseline="0" dirty="0" smtClean="0"/>
-                        <a:t>cross-link acceptor </a:t>
-                      </a:r>
-                      <a:r>
-                        <a:rPr lang="en-GB" sz="1200" baseline="0" dirty="0" smtClean="0"/>
-                        <a:t>peptide’s Modification element  MUST not have a </a:t>
+                        <a:t> for the crosslink. The cross-link acceptor peptide’s Modification element  MUST not have a </a:t>
                       </a:r>
                       <a:r>
                         <a:rPr lang="en-GB" sz="1200" baseline="0" dirty="0" err="1" smtClean="0"/>
@@ -10688,19 +10655,7 @@
                       </a:r>
                       <a:r>
                         <a:rPr lang="en-GB" sz="1200" i="0" baseline="0" dirty="0" smtClean="0"/>
-                        <a:t> </a:t>
-                      </a:r>
-                      <a:r>
-                        <a:rPr lang="en-GB" sz="1200" i="0" baseline="0" smtClean="0"/>
-                        <a:t>a </a:t>
-                      </a:r>
-                      <a:r>
-                        <a:rPr lang="en-GB" sz="1200" i="0" baseline="0" smtClean="0"/>
-                        <a:t>cross-linked </a:t>
-                      </a:r>
-                      <a:r>
-                        <a:rPr lang="en-GB" sz="1200" i="0" baseline="0" dirty="0" smtClean="0"/>
-                        <a:t>pair of peptides has been identified, there MUST be two &lt;</a:t>
+                        <a:t> a cross-linked pair of peptides has been identified, there MUST be two &lt;</a:t>
                       </a:r>
                       <a:r>
                         <a:rPr lang="en-GB" sz="1200" i="0" baseline="0" dirty="0" err="1" smtClean="0"/>
@@ -10726,29 +10681,22 @@
                         <a:rPr lang="en-GB" sz="1200" i="0" baseline="0" dirty="0" smtClean="0"/>
                         <a:t>&gt; to group these two elements together. </a:t>
                       </a:r>
-                    </a:p>
-                    <a:p>
-                      <a:endParaRPr lang="en-GB" sz="1200" i="0" baseline="0" dirty="0" smtClean="0"/>
-                    </a:p>
-                    <a:p>
+                      <a:r>
+                        <a:rPr lang="en-GB" sz="1200" i="0" baseline="0" dirty="0" smtClean="0"/>
+                        <a:t> </a:t>
+                      </a:r>
                       <a:r>
                         <a:rPr lang="en-GB" sz="1200" i="0" baseline="0" dirty="0" smtClean="0">
                           <a:solidFill>
-                            <a:srgbClr val="FF0000"/>
+                            <a:schemeClr val="tx1"/>
                           </a:solidFill>
                         </a:rPr>
-                        <a:t>New proposal 04/05/2016:</a:t>
-                      </a:r>
-                    </a:p>
-                    <a:p>
-                      <a:pPr marL="171450" indent="-171450">
-                        <a:buFontTx/>
-                        <a:buChar char="-"/>
-                      </a:pPr>
+                        <a:t>The </a:t>
+                      </a:r>
                       <a:r>
                         <a:rPr lang="en-GB" sz="1200" i="0" baseline="0" dirty="0" err="1" smtClean="0">
                           <a:solidFill>
-                            <a:srgbClr val="C00000"/>
+                            <a:schemeClr val="tx1"/>
                           </a:solidFill>
                         </a:rPr>
                         <a:t>experimentalMassToCharge</a:t>
@@ -10756,7 +10704,7 @@
                       <a:r>
                         <a:rPr lang="en-GB" sz="1200" i="0" baseline="0" dirty="0" smtClean="0">
                           <a:solidFill>
-                            <a:srgbClr val="C00000"/>
+                            <a:schemeClr val="tx1"/>
                           </a:solidFill>
                         </a:rPr>
                         <a:t>, </a:t>
@@ -10764,7 +10712,7 @@
                       <a:r>
                         <a:rPr lang="en-GB" sz="1200" i="0" baseline="0" dirty="0" err="1" smtClean="0">
                           <a:solidFill>
-                            <a:srgbClr val="C00000"/>
+                            <a:schemeClr val="tx1"/>
                           </a:solidFill>
                         </a:rPr>
                         <a:t>calculateMassToCharge</a:t>
@@ -10772,7 +10720,7 @@
                       <a:r>
                         <a:rPr lang="en-GB" sz="1200" i="0" baseline="0" dirty="0" smtClean="0">
                           <a:solidFill>
-                            <a:srgbClr val="C00000"/>
+                            <a:schemeClr val="tx1"/>
                           </a:solidFill>
                         </a:rPr>
                         <a:t> and </a:t>
@@ -10780,7 +10728,7 @@
                       <a:r>
                         <a:rPr lang="en-GB" sz="1200" i="0" baseline="0" dirty="0" err="1" smtClean="0">
                           <a:solidFill>
-                            <a:srgbClr val="C00000"/>
+                            <a:schemeClr val="tx1"/>
                           </a:solidFill>
                         </a:rPr>
                         <a:t>chargeState</a:t>
@@ -10788,30 +10736,19 @@
                       <a:r>
                         <a:rPr lang="en-GB" sz="1200" i="0" baseline="0" dirty="0" smtClean="0">
                           <a:solidFill>
-                            <a:srgbClr val="C00000"/>
+                            <a:schemeClr val="tx1"/>
                           </a:solidFill>
                         </a:rPr>
-                        <a:t> MUST be identical over both SII elements, indicating the overall values for the pair.</a:t>
-                      </a:r>
-                    </a:p>
-                    <a:p>
-                      <a:pPr marL="171450" indent="-171450">
-                        <a:buFontTx/>
-                        <a:buChar char="-"/>
-                      </a:pPr>
+                        <a:t> MUST be identical over both SII elements, indicating the overall values for the pair</a:t>
+                      </a:r>
                       <a:r>
                         <a:rPr lang="en-GB" sz="1200" i="0" baseline="0" dirty="0" smtClean="0">
                           <a:solidFill>
-                            <a:srgbClr val="C00000"/>
+                            <a:schemeClr val="tx1"/>
                           </a:solidFill>
                         </a:rPr>
-                        <a:t>Add optional CV term for “calculated peptide chain neutral mass” – this could actually be put on Peptide or on SII</a:t>
-                      </a:r>
-                      <a:endParaRPr lang="en-GB" sz="1200" i="0" baseline="0" dirty="0" smtClean="0">
-                        <a:solidFill>
-                          <a:srgbClr val="C00000"/>
-                        </a:solidFill>
-                      </a:endParaRPr>
+                        <a:t>.</a:t>
+                      </a:r>
                     </a:p>
                   </a:txBody>
                   <a:tcPr/>
@@ -10946,7 +10883,7 @@
         </p:nvSpPr>
         <p:spPr>
           <a:xfrm>
-            <a:off x="251520" y="324148"/>
+            <a:off x="360140" y="120730"/>
             <a:ext cx="3923575" cy="338554"/>
           </a:xfrm>
           <a:prstGeom prst="rect">
@@ -11075,6 +11012,119 @@
             <a:endParaRPr lang="en-GB" sz="800" dirty="0" smtClean="0">
               <a:latin typeface="Courier New" pitchFamily="49" charset="0"/>
               <a:cs typeface="Courier New" pitchFamily="49" charset="0"/>
+            </a:endParaRPr>
+          </a:p>
+        </p:txBody>
+      </p:sp>
+      <p:sp>
+        <p:nvSpPr>
+          <p:cNvPr id="17" name="Rectangle 2"/>
+          <p:cNvSpPr>
+            <a:spLocks noChangeArrowheads="1"/>
+          </p:cNvSpPr>
+          <p:nvPr/>
+        </p:nvSpPr>
+        <p:spPr bwMode="auto">
+          <a:xfrm>
+            <a:off x="0" y="0"/>
+            <a:ext cx="9144000" cy="457200"/>
+          </a:xfrm>
+          <a:prstGeom prst="rect">
+            <a:avLst/>
+          </a:prstGeom>
+          <a:noFill/>
+          <a:ln>
+            <a:noFill/>
+          </a:ln>
+          <a:effectLst/>
+          <a:extLst>
+            <a:ext uri="{909E8E84-426E-40DD-AFC4-6F175D3DCCD1}">
+              <a14:hiddenFill xmlns:a14="http://schemas.microsoft.com/office/drawing/2010/main">
+                <a:solidFill>
+                  <a:schemeClr val="accent1"/>
+                </a:solidFill>
+              </a14:hiddenFill>
+            </a:ext>
+            <a:ext uri="{91240B29-F687-4F45-9708-019B960494DF}">
+              <a14:hiddenLine xmlns:a14="http://schemas.microsoft.com/office/drawing/2010/main" w="9525">
+                <a:solidFill>
+                  <a:schemeClr val="tx1"/>
+                </a:solidFill>
+                <a:miter lim="800000"/>
+                <a:headEnd/>
+                <a:tailEnd/>
+              </a14:hiddenLine>
+            </a:ext>
+            <a:ext uri="{AF507438-7753-43E0-B8FC-AC1667EBCBE1}">
+              <a14:hiddenEffects xmlns:a14="http://schemas.microsoft.com/office/drawing/2010/main">
+                <a:effectLst>
+                  <a:outerShdw dist="35921" dir="2700000" algn="ctr" rotWithShape="0">
+                    <a:schemeClr val="bg2"/>
+                  </a:outerShdw>
+                </a:effectLst>
+              </a14:hiddenEffects>
+            </a:ext>
+          </a:extLst>
+        </p:spPr>
+        <p:txBody>
+          <a:bodyPr vert="horz" wrap="none" lIns="91440" tIns="45720" rIns="91440" bIns="45720" numCol="1" anchor="ctr" anchorCtr="0" compatLnSpc="1">
+            <a:prstTxWarp prst="textNoShape">
+              <a:avLst/>
+            </a:prstTxWarp>
+            <a:spAutoFit/>
+          </a:bodyPr>
+          <a:lstStyle/>
+          <a:p>
+            <a:pPr marL="0" marR="0" lvl="0" indent="0" algn="l" defTabSz="914400" rtl="0" eaLnBrk="0" fontAlgn="base" latinLnBrk="0" hangingPunct="0">
+              <a:lnSpc>
+                <a:spcPct val="100000"/>
+              </a:lnSpc>
+              <a:spcBef>
+                <a:spcPct val="0"/>
+              </a:spcBef>
+              <a:spcAft>
+                <a:spcPct val="0"/>
+              </a:spcAft>
+              <a:buClrTx/>
+              <a:buSzTx/>
+              <a:buFontTx/>
+              <a:buNone/>
+              <a:tabLst/>
+            </a:pPr>
+            <a:r>
+              <a:rPr kumimoji="0" lang="en-US" altLang="en-US" sz="1000" b="1" i="0" u="none" strike="noStrike" cap="none" normalizeH="0" baseline="0" smtClean="0">
+                <a:ln>
+                  <a:noFill/>
+                </a:ln>
+                <a:solidFill>
+                  <a:schemeClr val="tx1"/>
+                </a:solidFill>
+                <a:effectLst/>
+                <a:latin typeface="Arial Unicode MS" panose="020B0604020202020204" pitchFamily="34" charset="-128"/>
+              </a:rPr>
+              <a:t>569.79054</a:t>
+            </a:r>
+            <a:r>
+              <a:rPr kumimoji="0" lang="en-US" altLang="en-US" sz="600" b="0" i="0" u="none" strike="noStrike" cap="none" normalizeH="0" baseline="0" smtClean="0">
+                <a:ln>
+                  <a:noFill/>
+                </a:ln>
+                <a:solidFill>
+                  <a:schemeClr val="tx1"/>
+                </a:solidFill>
+                <a:effectLst/>
+              </a:rPr>
+              <a:t> </a:t>
+            </a:r>
+            <a:endParaRPr kumimoji="0" lang="en-US" altLang="en-US" sz="1800" b="0" i="0" u="none" strike="noStrike" cap="none" normalizeH="0" baseline="0" smtClean="0">
+              <a:ln>
+                <a:noFill/>
+              </a:ln>
+              <a:solidFill>
+                <a:schemeClr val="tx1"/>
+              </a:solidFill>
+              <a:effectLst/>
+              <a:latin typeface="Arial" panose="020B0604020202020204" pitchFamily="34" charset="0"/>
             </a:endParaRPr>
           </a:p>
         </p:txBody>
@@ -12261,7 +12311,7 @@
         <p:spPr>
           <a:xfrm>
             <a:off x="35496" y="5076676"/>
-            <a:ext cx="4337482" cy="2677656"/>
+            <a:ext cx="4337482" cy="2862322"/>
           </a:xfrm>
           <a:prstGeom prst="rect">
             <a:avLst/>
@@ -12388,7 +12438,17 @@
                 <a:latin typeface="+mj-lt"/>
                 <a:cs typeface="Courier New" pitchFamily="49" charset="0"/>
               </a:rPr>
-              <a:t>“true” or “false” to indicate whether the score or value has passed a reported threshold in the file.</a:t>
+              <a:t>“true” or “false” to indicate whether the score or value has passed a reported threshold in the file. </a:t>
+            </a:r>
+            <a:r>
+              <a:rPr lang="en-GB" sz="1200" dirty="0" smtClean="0">
+                <a:solidFill>
+                  <a:srgbClr val="FF0000"/>
+                </a:solidFill>
+                <a:latin typeface="+mj-lt"/>
+                <a:cs typeface="Courier New" pitchFamily="49" charset="0"/>
+              </a:rPr>
+              <a:t>If no threshold, then PASS_THRESHOLD is always true.</a:t>
             </a:r>
           </a:p>
         </p:txBody>
@@ -12525,7 +12585,7 @@
         </p:nvSpPr>
         <p:spPr>
           <a:xfrm>
-            <a:off x="962498" y="7763818"/>
+            <a:off x="1093064" y="8245028"/>
             <a:ext cx="4465710" cy="276999"/>
           </a:xfrm>
           <a:prstGeom prst="rect">
@@ -12545,9 +12605,6 @@
               </a:rPr>
               <a:t>Note: Need XML example of this and at least one genuine CV term</a:t>
             </a:r>
-            <a:endParaRPr lang="en-GB" sz="1200" b="1" dirty="0" smtClean="0">
-              <a:cs typeface="Courier New" pitchFamily="49" charset="0"/>
-            </a:endParaRPr>
           </a:p>
         </p:txBody>
       </p:sp>

</xml_diff>

<commit_message>
Updates to proteogenomics part
</commit_message>
<xml_diff>
--- a/specification_document/specdoc1_2/NewFeaturesInMzid12.pptx
+++ b/specification_document/specdoc1_2/NewFeaturesInMzid12.pptx
@@ -215,7 +215,7 @@
             <a:fld id="{943B0BE5-311A-4B0A-9A39-DE24DD4BA79D}" type="datetimeFigureOut">
               <a:rPr lang="en-GB" smtClean="0"/>
               <a:pPr/>
-              <a:t>18/05/2016</a:t>
+              <a:t>20/05/2016</a:t>
             </a:fld>
             <a:endParaRPr lang="en-GB"/>
           </a:p>
@@ -760,7 +760,7 @@
             <a:fld id="{A71EF3F3-5BE8-4F69-8C8F-88D570AA2740}" type="datetimeFigureOut">
               <a:rPr lang="en-GB" smtClean="0"/>
               <a:pPr/>
-              <a:t>18/05/2016</a:t>
+              <a:t>20/05/2016</a:t>
             </a:fld>
             <a:endParaRPr lang="en-GB"/>
           </a:p>
@@ -927,7 +927,7 @@
             <a:fld id="{A71EF3F3-5BE8-4F69-8C8F-88D570AA2740}" type="datetimeFigureOut">
               <a:rPr lang="en-GB" smtClean="0"/>
               <a:pPr/>
-              <a:t>18/05/2016</a:t>
+              <a:t>20/05/2016</a:t>
             </a:fld>
             <a:endParaRPr lang="en-GB"/>
           </a:p>
@@ -1104,7 +1104,7 @@
             <a:fld id="{A71EF3F3-5BE8-4F69-8C8F-88D570AA2740}" type="datetimeFigureOut">
               <a:rPr lang="en-GB" smtClean="0"/>
               <a:pPr/>
-              <a:t>18/05/2016</a:t>
+              <a:t>20/05/2016</a:t>
             </a:fld>
             <a:endParaRPr lang="en-GB"/>
           </a:p>
@@ -1271,7 +1271,7 @@
             <a:fld id="{A71EF3F3-5BE8-4F69-8C8F-88D570AA2740}" type="datetimeFigureOut">
               <a:rPr lang="en-GB" smtClean="0"/>
               <a:pPr/>
-              <a:t>18/05/2016</a:t>
+              <a:t>20/05/2016</a:t>
             </a:fld>
             <a:endParaRPr lang="en-GB"/>
           </a:p>
@@ -1514,7 +1514,7 @@
             <a:fld id="{A71EF3F3-5BE8-4F69-8C8F-88D570AA2740}" type="datetimeFigureOut">
               <a:rPr lang="en-GB" smtClean="0"/>
               <a:pPr/>
-              <a:t>18/05/2016</a:t>
+              <a:t>20/05/2016</a:t>
             </a:fld>
             <a:endParaRPr lang="en-GB"/>
           </a:p>
@@ -1799,7 +1799,7 @@
             <a:fld id="{A71EF3F3-5BE8-4F69-8C8F-88D570AA2740}" type="datetimeFigureOut">
               <a:rPr lang="en-GB" smtClean="0"/>
               <a:pPr/>
-              <a:t>18/05/2016</a:t>
+              <a:t>20/05/2016</a:t>
             </a:fld>
             <a:endParaRPr lang="en-GB"/>
           </a:p>
@@ -2218,7 +2218,7 @@
             <a:fld id="{A71EF3F3-5BE8-4F69-8C8F-88D570AA2740}" type="datetimeFigureOut">
               <a:rPr lang="en-GB" smtClean="0"/>
               <a:pPr/>
-              <a:t>18/05/2016</a:t>
+              <a:t>20/05/2016</a:t>
             </a:fld>
             <a:endParaRPr lang="en-GB"/>
           </a:p>
@@ -2333,7 +2333,7 @@
             <a:fld id="{A71EF3F3-5BE8-4F69-8C8F-88D570AA2740}" type="datetimeFigureOut">
               <a:rPr lang="en-GB" smtClean="0"/>
               <a:pPr/>
-              <a:t>18/05/2016</a:t>
+              <a:t>20/05/2016</a:t>
             </a:fld>
             <a:endParaRPr lang="en-GB"/>
           </a:p>
@@ -2425,7 +2425,7 @@
             <a:fld id="{A71EF3F3-5BE8-4F69-8C8F-88D570AA2740}" type="datetimeFigureOut">
               <a:rPr lang="en-GB" smtClean="0"/>
               <a:pPr/>
-              <a:t>18/05/2016</a:t>
+              <a:t>20/05/2016</a:t>
             </a:fld>
             <a:endParaRPr lang="en-GB"/>
           </a:p>
@@ -2699,7 +2699,7 @@
             <a:fld id="{A71EF3F3-5BE8-4F69-8C8F-88D570AA2740}" type="datetimeFigureOut">
               <a:rPr lang="en-GB" smtClean="0"/>
               <a:pPr/>
-              <a:t>18/05/2016</a:t>
+              <a:t>20/05/2016</a:t>
             </a:fld>
             <a:endParaRPr lang="en-GB"/>
           </a:p>
@@ -2949,7 +2949,7 @@
             <a:fld id="{A71EF3F3-5BE8-4F69-8C8F-88D570AA2740}" type="datetimeFigureOut">
               <a:rPr lang="en-GB" smtClean="0"/>
               <a:pPr/>
-              <a:t>18/05/2016</a:t>
+              <a:t>20/05/2016</a:t>
             </a:fld>
             <a:endParaRPr lang="en-GB"/>
           </a:p>
@@ -3159,7 +3159,7 @@
             <a:fld id="{A71EF3F3-5BE8-4F69-8C8F-88D570AA2740}" type="datetimeFigureOut">
               <a:rPr lang="en-GB" smtClean="0"/>
               <a:pPr/>
-              <a:t>18/05/2016</a:t>
+              <a:t>20/05/2016</a:t>
             </a:fld>
             <a:endParaRPr lang="en-GB"/>
           </a:p>
@@ -7051,38 +7051,31 @@
                 <a:latin typeface="Courier New" pitchFamily="49" charset="0"/>
                 <a:cs typeface="Courier New" pitchFamily="49" charset="0"/>
               </a:rPr>
-              <a:t>      </a:t>
-            </a:r>
-            <a:r>
-              <a:rPr lang="en-GB" sz="800" dirty="0">
-                <a:latin typeface="Courier New" pitchFamily="49" charset="0"/>
-                <a:cs typeface="Courier New" pitchFamily="49" charset="0"/>
-              </a:rPr>
-              <a:t>&lt;</a:t>
-            </a:r>
-            <a:r>
-              <a:rPr lang="en-GB" sz="800" dirty="0" err="1">
+              <a:t>      &lt;</a:t>
+            </a:r>
+            <a:r>
+              <a:rPr lang="en-GB" sz="800" dirty="0" err="1" smtClean="0">
                 <a:latin typeface="Courier New" pitchFamily="49" charset="0"/>
                 <a:cs typeface="Courier New" pitchFamily="49" charset="0"/>
               </a:rPr>
               <a:t>cvParam</a:t>
             </a:r>
             <a:r>
-              <a:rPr lang="en-GB" sz="800" dirty="0">
+              <a:rPr lang="en-GB" sz="800" dirty="0" smtClean="0">
                 <a:latin typeface="Courier New" pitchFamily="49" charset="0"/>
                 <a:cs typeface="Courier New" pitchFamily="49" charset="0"/>
               </a:rPr>
               <a:t> accession="MS:1002504" </a:t>
             </a:r>
             <a:r>
-              <a:rPr lang="en-GB" sz="800" dirty="0" err="1">
+              <a:rPr lang="en-GB" sz="800" dirty="0" err="1" smtClean="0">
                 <a:latin typeface="Courier New" pitchFamily="49" charset="0"/>
                 <a:cs typeface="Courier New" pitchFamily="49" charset="0"/>
               </a:rPr>
               <a:t>cvRef</a:t>
             </a:r>
             <a:r>
-              <a:rPr lang="en-GB" sz="800" dirty="0">
+              <a:rPr lang="en-GB" sz="800" dirty="0" smtClean="0">
                 <a:latin typeface="Courier New" pitchFamily="49" charset="0"/>
                 <a:cs typeface="Courier New" pitchFamily="49" charset="0"/>
               </a:rPr>
@@ -7252,21 +7245,7 @@
                 <a:latin typeface="Courier New" pitchFamily="49" charset="0"/>
                 <a:cs typeface="Courier New" pitchFamily="49" charset="0"/>
               </a:rPr>
-              <a:t>="PSI-MS" name</a:t>
-            </a:r>
-            <a:r>
-              <a:rPr lang="en-GB" sz="800" dirty="0">
-                <a:latin typeface="Courier New" pitchFamily="49" charset="0"/>
-                <a:cs typeface="Courier New" pitchFamily="49" charset="0"/>
-              </a:rPr>
-              <a:t>="modification index" </a:t>
-            </a:r>
-            <a:r>
-              <a:rPr lang="en-GB" sz="800" dirty="0" smtClean="0">
-                <a:latin typeface="Courier New" pitchFamily="49" charset="0"/>
-                <a:cs typeface="Courier New" pitchFamily="49" charset="0"/>
-              </a:rPr>
-              <a:t>value="1"/&gt;</a:t>
+              <a:t>="PSI-MS" name="modification index" value="1"/&gt;</a:t>
             </a:r>
           </a:p>
           <a:p>
@@ -9452,14 +9431,7 @@
                 <a:latin typeface="Courier New" pitchFamily="49" charset="0"/>
                 <a:cs typeface="Courier New" pitchFamily="49" charset="0"/>
               </a:rPr>
-              <a:t>=“4" </a:t>
-            </a:r>
-            <a:r>
-              <a:rPr lang="en-GB" sz="800" dirty="0" smtClean="0">
-                <a:latin typeface="Courier New" pitchFamily="49" charset="0"/>
-                <a:cs typeface="Courier New" pitchFamily="49" charset="0"/>
-              </a:rPr>
-              <a:t>id="SII_1_1"&gt;</a:t>
+              <a:t>=“4" id="SII_1_1"&gt;</a:t>
             </a:r>
           </a:p>
           <a:p>
@@ -9732,14 +9704,7 @@
                 <a:latin typeface="Courier New" pitchFamily="49" charset="0"/>
                 <a:cs typeface="Courier New" pitchFamily="49" charset="0"/>
               </a:rPr>
-              <a:t>=“4" </a:t>
-            </a:r>
-            <a:r>
-              <a:rPr lang="en-GB" sz="800" dirty="0" smtClean="0">
-                <a:latin typeface="Courier New" pitchFamily="49" charset="0"/>
-                <a:cs typeface="Courier New" pitchFamily="49" charset="0"/>
-              </a:rPr>
-              <a:t>id="SII_1_2"&gt;</a:t>
+              <a:t>=“4" id="SII_1_2"&gt;</a:t>
             </a:r>
           </a:p>
           <a:p>
@@ -10679,11 +10644,7 @@
                       </a:r>
                       <a:r>
                         <a:rPr lang="en-GB" sz="1200" i="0" baseline="0" dirty="0" smtClean="0"/>
-                        <a:t>&gt; to group these two elements together. </a:t>
-                      </a:r>
-                      <a:r>
-                        <a:rPr lang="en-GB" sz="1200" i="0" baseline="0" dirty="0" smtClean="0"/>
-                        <a:t> </a:t>
+                        <a:t>&gt; to group these two elements together.  </a:t>
                       </a:r>
                       <a:r>
                         <a:rPr lang="en-GB" sz="1200" i="0" baseline="0" dirty="0" smtClean="0">
@@ -10739,15 +10700,7 @@
                             <a:schemeClr val="tx1"/>
                           </a:solidFill>
                         </a:rPr>
-                        <a:t> MUST be identical over both SII elements, indicating the overall values for the pair</a:t>
-                      </a:r>
-                      <a:r>
-                        <a:rPr lang="en-GB" sz="1200" i="0" baseline="0" dirty="0" smtClean="0">
-                          <a:solidFill>
-                            <a:schemeClr val="tx1"/>
-                          </a:solidFill>
-                        </a:rPr>
-                        <a:t>.</a:t>
+                        <a:t> MUST be identical over both SII elements, indicating the overall values for the pair.</a:t>
                       </a:r>
                     </a:p>
                   </a:txBody>
@@ -11012,119 +10965,6 @@
             <a:endParaRPr lang="en-GB" sz="800" dirty="0" smtClean="0">
               <a:latin typeface="Courier New" pitchFamily="49" charset="0"/>
               <a:cs typeface="Courier New" pitchFamily="49" charset="0"/>
-            </a:endParaRPr>
-          </a:p>
-        </p:txBody>
-      </p:sp>
-      <p:sp>
-        <p:nvSpPr>
-          <p:cNvPr id="17" name="Rectangle 2"/>
-          <p:cNvSpPr>
-            <a:spLocks noChangeArrowheads="1"/>
-          </p:cNvSpPr>
-          <p:nvPr/>
-        </p:nvSpPr>
-        <p:spPr bwMode="auto">
-          <a:xfrm>
-            <a:off x="0" y="0"/>
-            <a:ext cx="9144000" cy="457200"/>
-          </a:xfrm>
-          <a:prstGeom prst="rect">
-            <a:avLst/>
-          </a:prstGeom>
-          <a:noFill/>
-          <a:ln>
-            <a:noFill/>
-          </a:ln>
-          <a:effectLst/>
-          <a:extLst>
-            <a:ext uri="{909E8E84-426E-40DD-AFC4-6F175D3DCCD1}">
-              <a14:hiddenFill xmlns:a14="http://schemas.microsoft.com/office/drawing/2010/main">
-                <a:solidFill>
-                  <a:schemeClr val="accent1"/>
-                </a:solidFill>
-              </a14:hiddenFill>
-            </a:ext>
-            <a:ext uri="{91240B29-F687-4F45-9708-019B960494DF}">
-              <a14:hiddenLine xmlns:a14="http://schemas.microsoft.com/office/drawing/2010/main" w="9525">
-                <a:solidFill>
-                  <a:schemeClr val="tx1"/>
-                </a:solidFill>
-                <a:miter lim="800000"/>
-                <a:headEnd/>
-                <a:tailEnd/>
-              </a14:hiddenLine>
-            </a:ext>
-            <a:ext uri="{AF507438-7753-43E0-B8FC-AC1667EBCBE1}">
-              <a14:hiddenEffects xmlns:a14="http://schemas.microsoft.com/office/drawing/2010/main">
-                <a:effectLst>
-                  <a:outerShdw dist="35921" dir="2700000" algn="ctr" rotWithShape="0">
-                    <a:schemeClr val="bg2"/>
-                  </a:outerShdw>
-                </a:effectLst>
-              </a14:hiddenEffects>
-            </a:ext>
-          </a:extLst>
-        </p:spPr>
-        <p:txBody>
-          <a:bodyPr vert="horz" wrap="none" lIns="91440" tIns="45720" rIns="91440" bIns="45720" numCol="1" anchor="ctr" anchorCtr="0" compatLnSpc="1">
-            <a:prstTxWarp prst="textNoShape">
-              <a:avLst/>
-            </a:prstTxWarp>
-            <a:spAutoFit/>
-          </a:bodyPr>
-          <a:lstStyle/>
-          <a:p>
-            <a:pPr marL="0" marR="0" lvl="0" indent="0" algn="l" defTabSz="914400" rtl="0" eaLnBrk="0" fontAlgn="base" latinLnBrk="0" hangingPunct="0">
-              <a:lnSpc>
-                <a:spcPct val="100000"/>
-              </a:lnSpc>
-              <a:spcBef>
-                <a:spcPct val="0"/>
-              </a:spcBef>
-              <a:spcAft>
-                <a:spcPct val="0"/>
-              </a:spcAft>
-              <a:buClrTx/>
-              <a:buSzTx/>
-              <a:buFontTx/>
-              <a:buNone/>
-              <a:tabLst/>
-            </a:pPr>
-            <a:r>
-              <a:rPr kumimoji="0" lang="en-US" altLang="en-US" sz="1000" b="1" i="0" u="none" strike="noStrike" cap="none" normalizeH="0" baseline="0" smtClean="0">
-                <a:ln>
-                  <a:noFill/>
-                </a:ln>
-                <a:solidFill>
-                  <a:schemeClr val="tx1"/>
-                </a:solidFill>
-                <a:effectLst/>
-                <a:latin typeface="Arial Unicode MS" panose="020B0604020202020204" pitchFamily="34" charset="-128"/>
-              </a:rPr>
-              <a:t>569.79054</a:t>
-            </a:r>
-            <a:r>
-              <a:rPr kumimoji="0" lang="en-US" altLang="en-US" sz="600" b="0" i="0" u="none" strike="noStrike" cap="none" normalizeH="0" baseline="0" smtClean="0">
-                <a:ln>
-                  <a:noFill/>
-                </a:ln>
-                <a:solidFill>
-                  <a:schemeClr val="tx1"/>
-                </a:solidFill>
-                <a:effectLst/>
-              </a:rPr>
-              <a:t> </a:t>
-            </a:r>
-            <a:endParaRPr kumimoji="0" lang="en-US" altLang="en-US" sz="1800" b="0" i="0" u="none" strike="noStrike" cap="none" normalizeH="0" baseline="0" smtClean="0">
-              <a:ln>
-                <a:noFill/>
-              </a:ln>
-              <a:solidFill>
-                <a:schemeClr val="tx1"/>
-              </a:solidFill>
-              <a:effectLst/>
-              <a:latin typeface="Arial" panose="020B0604020202020204" pitchFamily="34" charset="0"/>
             </a:endParaRPr>
           </a:p>
         </p:txBody>
@@ -12693,7 +12533,7 @@
         <p:spPr>
           <a:xfrm>
             <a:off x="395536" y="819493"/>
-            <a:ext cx="5958408" cy="1446550"/>
+            <a:ext cx="5760640" cy="1446550"/>
           </a:xfrm>
           <a:prstGeom prst="rect">
             <a:avLst/>
@@ -13121,7 +12961,7 @@
         <p:spPr>
           <a:xfrm>
             <a:off x="395536" y="2367082"/>
-            <a:ext cx="6657442" cy="1446550"/>
+            <a:ext cx="6657442" cy="1077218"/>
           </a:xfrm>
           <a:prstGeom prst="rect">
             <a:avLst/>
@@ -13141,63 +12981,63 @@
           <a:lstStyle/>
           <a:p>
             <a:r>
-              <a:rPr lang="en-GB" sz="800" dirty="0">
+              <a:rPr lang="en-GB" sz="800" dirty="0" smtClean="0">
                 <a:latin typeface="Courier New" panose="02070309020205020404" pitchFamily="49" charset="0"/>
                 <a:cs typeface="Courier New" panose="02070309020205020404" pitchFamily="49" charset="0"/>
               </a:rPr>
               <a:t> &lt;</a:t>
             </a:r>
             <a:r>
-              <a:rPr lang="en-GB" sz="800" dirty="0" err="1">
+              <a:rPr lang="en-GB" sz="800" dirty="0" err="1" smtClean="0">
                 <a:latin typeface="Courier New" panose="02070309020205020404" pitchFamily="49" charset="0"/>
                 <a:cs typeface="Courier New" panose="02070309020205020404" pitchFamily="49" charset="0"/>
               </a:rPr>
               <a:t>PeptideEvidence</a:t>
             </a:r>
             <a:r>
-              <a:rPr lang="en-GB" sz="800" dirty="0">
+              <a:rPr lang="en-GB" sz="800" dirty="0" smtClean="0">
                 <a:latin typeface="Courier New" panose="02070309020205020404" pitchFamily="49" charset="0"/>
                 <a:cs typeface="Courier New" panose="02070309020205020404" pitchFamily="49" charset="0"/>
               </a:rPr>
               <a:t> </a:t>
             </a:r>
             <a:r>
-              <a:rPr lang="en-GB" sz="800" dirty="0" err="1">
+              <a:rPr lang="en-GB" sz="800" dirty="0" err="1" smtClean="0">
                 <a:latin typeface="Courier New" panose="02070309020205020404" pitchFamily="49" charset="0"/>
                 <a:cs typeface="Courier New" panose="02070309020205020404" pitchFamily="49" charset="0"/>
               </a:rPr>
               <a:t>dBSequence_ref</a:t>
             </a:r>
             <a:r>
-              <a:rPr lang="en-GB" sz="800" dirty="0">
+              <a:rPr lang="en-GB" sz="800" dirty="0" smtClean="0">
                 <a:latin typeface="Courier New" panose="02070309020205020404" pitchFamily="49" charset="0"/>
                 <a:cs typeface="Courier New" panose="02070309020205020404" pitchFamily="49" charset="0"/>
               </a:rPr>
               <a:t>="dbseq_generic|A_ENSP00000354925|" </a:t>
             </a:r>
             <a:r>
-              <a:rPr lang="en-GB" sz="800" dirty="0" err="1">
+              <a:rPr lang="en-GB" sz="800" dirty="0" err="1" smtClean="0">
                 <a:latin typeface="Courier New" panose="02070309020205020404" pitchFamily="49" charset="0"/>
                 <a:cs typeface="Courier New" panose="02070309020205020404" pitchFamily="49" charset="0"/>
               </a:rPr>
               <a:t>peptide_ref</a:t>
             </a:r>
             <a:r>
-              <a:rPr lang="en-GB" sz="800" dirty="0">
+              <a:rPr lang="en-GB" sz="800" dirty="0" smtClean="0">
                 <a:latin typeface="Courier New" panose="02070309020205020404" pitchFamily="49" charset="0"/>
                 <a:cs typeface="Courier New" panose="02070309020205020404" pitchFamily="49" charset="0"/>
               </a:rPr>
               <a:t>="DVLEGDSSEDR_" start="23" end="33" pre="A" post="A" </a:t>
             </a:r>
             <a:r>
-              <a:rPr lang="en-GB" sz="800" dirty="0" err="1">
+              <a:rPr lang="en-GB" sz="800" dirty="0" err="1" smtClean="0">
                 <a:latin typeface="Courier New" panose="02070309020205020404" pitchFamily="49" charset="0"/>
                 <a:cs typeface="Courier New" panose="02070309020205020404" pitchFamily="49" charset="0"/>
               </a:rPr>
               <a:t>isDecoy</a:t>
             </a:r>
             <a:r>
-              <a:rPr lang="en-GB" sz="800" dirty="0">
+              <a:rPr lang="en-GB" sz="800" dirty="0" smtClean="0">
                 <a:latin typeface="Courier New" panose="02070309020205020404" pitchFamily="49" charset="0"/>
                 <a:cs typeface="Courier New" panose="02070309020205020404" pitchFamily="49" charset="0"/>
               </a:rPr>
@@ -13205,308 +13045,179 @@
             </a:r>
           </a:p>
           <a:p>
-            <a:r>
-              <a:rPr lang="en-GB" sz="800" b="1" dirty="0">
-                <a:latin typeface="Courier New" panose="02070309020205020404" pitchFamily="49" charset="0"/>
-                <a:cs typeface="Courier New" panose="02070309020205020404" pitchFamily="49" charset="0"/>
-              </a:rPr>
-              <a:t>    &lt;</a:t>
-            </a:r>
-            <a:r>
-              <a:rPr lang="en-GB" sz="800" b="1" dirty="0" err="1">
-                <a:latin typeface="Courier New" panose="02070309020205020404" pitchFamily="49" charset="0"/>
-                <a:cs typeface="Courier New" panose="02070309020205020404" pitchFamily="49" charset="0"/>
-              </a:rPr>
-              <a:t>cvParam</a:t>
-            </a:r>
-            <a:r>
-              <a:rPr lang="en-GB" sz="800" b="1" dirty="0">
-                <a:latin typeface="Courier New" panose="02070309020205020404" pitchFamily="49" charset="0"/>
-                <a:cs typeface="Courier New" panose="02070309020205020404" pitchFamily="49" charset="0"/>
-              </a:rPr>
-              <a:t> </a:t>
-            </a:r>
-            <a:r>
-              <a:rPr lang="en-GB" sz="800" b="1" dirty="0" err="1">
-                <a:latin typeface="Courier New" panose="02070309020205020404" pitchFamily="49" charset="0"/>
-                <a:cs typeface="Courier New" panose="02070309020205020404" pitchFamily="49" charset="0"/>
-              </a:rPr>
-              <a:t>cvRef</a:t>
-            </a:r>
-            <a:r>
-              <a:rPr lang="en-GB" sz="800" b="1" dirty="0">
-                <a:latin typeface="Courier New" panose="02070309020205020404" pitchFamily="49" charset="0"/>
-                <a:cs typeface="Courier New" panose="02070309020205020404" pitchFamily="49" charset="0"/>
-              </a:rPr>
-              <a:t>="PSI-MS" accession="MS:1002637" name="chromosome name" value="1"/&gt;</a:t>
-            </a:r>
-          </a:p>
-          <a:p>
-            <a:r>
-              <a:rPr lang="en-GB" sz="800" b="1" dirty="0">
-                <a:latin typeface="Courier New" panose="02070309020205020404" pitchFamily="49" charset="0"/>
-                <a:cs typeface="Courier New" panose="02070309020205020404" pitchFamily="49" charset="0"/>
-              </a:rPr>
-              <a:t>    &lt;</a:t>
-            </a:r>
-            <a:r>
-              <a:rPr lang="en-GB" sz="800" b="1" dirty="0" err="1">
-                <a:latin typeface="Courier New" panose="02070309020205020404" pitchFamily="49" charset="0"/>
-                <a:cs typeface="Courier New" panose="02070309020205020404" pitchFamily="49" charset="0"/>
-              </a:rPr>
-              <a:t>cvParam</a:t>
-            </a:r>
-            <a:r>
-              <a:rPr lang="en-GB" sz="800" b="1" dirty="0">
-                <a:latin typeface="Courier New" panose="02070309020205020404" pitchFamily="49" charset="0"/>
-                <a:cs typeface="Courier New" panose="02070309020205020404" pitchFamily="49" charset="0"/>
-              </a:rPr>
-              <a:t> </a:t>
-            </a:r>
-            <a:r>
-              <a:rPr lang="en-GB" sz="800" b="1" dirty="0" err="1">
-                <a:latin typeface="Courier New" panose="02070309020205020404" pitchFamily="49" charset="0"/>
-                <a:cs typeface="Courier New" panose="02070309020205020404" pitchFamily="49" charset="0"/>
-              </a:rPr>
-              <a:t>cvRef</a:t>
-            </a:r>
-            <a:r>
-              <a:rPr lang="en-GB" sz="800" b="1" dirty="0">
-                <a:latin typeface="Courier New" panose="02070309020205020404" pitchFamily="49" charset="0"/>
-                <a:cs typeface="Courier New" panose="02070309020205020404" pitchFamily="49" charset="0"/>
-              </a:rPr>
-              <a:t>="PSI-MS" accession="MS:1002638" name="chromosome strand" value="+"/&gt;</a:t>
-            </a:r>
-          </a:p>
-          <a:p>
-            <a:r>
-              <a:rPr lang="en-GB" sz="800" b="1" dirty="0">
-                <a:latin typeface="Courier New" panose="02070309020205020404" pitchFamily="49" charset="0"/>
-                <a:cs typeface="Courier New" panose="02070309020205020404" pitchFamily="49" charset="0"/>
-              </a:rPr>
-              <a:t>    &lt;</a:t>
-            </a:r>
-            <a:r>
-              <a:rPr lang="en-GB" sz="800" b="1" dirty="0" err="1">
-                <a:latin typeface="Courier New" panose="02070309020205020404" pitchFamily="49" charset="0"/>
-                <a:cs typeface="Courier New" panose="02070309020205020404" pitchFamily="49" charset="0"/>
-              </a:rPr>
-              <a:t>cvParam</a:t>
-            </a:r>
-            <a:r>
-              <a:rPr lang="en-GB" sz="800" b="1" dirty="0">
-                <a:latin typeface="Courier New" panose="02070309020205020404" pitchFamily="49" charset="0"/>
-                <a:cs typeface="Courier New" panose="02070309020205020404" pitchFamily="49" charset="0"/>
-              </a:rPr>
-              <a:t> </a:t>
-            </a:r>
-            <a:r>
-              <a:rPr lang="en-GB" sz="800" b="1" dirty="0" err="1">
-                <a:latin typeface="Courier New" panose="02070309020205020404" pitchFamily="49" charset="0"/>
-                <a:cs typeface="Courier New" panose="02070309020205020404" pitchFamily="49" charset="0"/>
-              </a:rPr>
-              <a:t>cvRef</a:t>
-            </a:r>
-            <a:r>
-              <a:rPr lang="en-GB" sz="800" b="1" dirty="0">
-                <a:latin typeface="Courier New" panose="02070309020205020404" pitchFamily="49" charset="0"/>
-                <a:cs typeface="Courier New" panose="02070309020205020404" pitchFamily="49" charset="0"/>
-              </a:rPr>
-              <a:t>="PSI-MS" accession="MS:1002639" name="peptide start on chromosome" value="156646123"/&gt;</a:t>
-            </a:r>
-          </a:p>
-          <a:p>
-            <a:r>
-              <a:rPr lang="en-GB" sz="800" b="1" dirty="0">
-                <a:latin typeface="Courier New" panose="02070309020205020404" pitchFamily="49" charset="0"/>
-                <a:cs typeface="Courier New" panose="02070309020205020404" pitchFamily="49" charset="0"/>
-              </a:rPr>
-              <a:t>    &lt;</a:t>
-            </a:r>
-            <a:r>
-              <a:rPr lang="en-GB" sz="800" b="1" dirty="0" err="1">
-                <a:latin typeface="Courier New" panose="02070309020205020404" pitchFamily="49" charset="0"/>
-                <a:cs typeface="Courier New" panose="02070309020205020404" pitchFamily="49" charset="0"/>
-              </a:rPr>
-              <a:t>cvParam</a:t>
-            </a:r>
-            <a:r>
-              <a:rPr lang="en-GB" sz="800" b="1" dirty="0">
-                <a:latin typeface="Courier New" panose="02070309020205020404" pitchFamily="49" charset="0"/>
-                <a:cs typeface="Courier New" panose="02070309020205020404" pitchFamily="49" charset="0"/>
-              </a:rPr>
-              <a:t> </a:t>
-            </a:r>
-            <a:r>
-              <a:rPr lang="en-GB" sz="800" b="1" dirty="0" err="1">
-                <a:latin typeface="Courier New" panose="02070309020205020404" pitchFamily="49" charset="0"/>
-                <a:cs typeface="Courier New" panose="02070309020205020404" pitchFamily="49" charset="0"/>
-              </a:rPr>
-              <a:t>cvRef</a:t>
-            </a:r>
-            <a:r>
-              <a:rPr lang="en-GB" sz="800" b="1" dirty="0">
-                <a:latin typeface="Courier New" panose="02070309020205020404" pitchFamily="49" charset="0"/>
-                <a:cs typeface="Courier New" panose="02070309020205020404" pitchFamily="49" charset="0"/>
-              </a:rPr>
-              <a:t>="PSI-MS" accession="MS:1002640" name="peptide end on chromosome" value="156646808"/&gt;</a:t>
-            </a:r>
-          </a:p>
-          <a:p>
-            <a:r>
-              <a:rPr lang="en-GB" sz="800" b="1" dirty="0">
-                <a:latin typeface="Courier New" panose="02070309020205020404" pitchFamily="49" charset="0"/>
-                <a:cs typeface="Courier New" panose="02070309020205020404" pitchFamily="49" charset="0"/>
-              </a:rPr>
-              <a:t>    &lt;</a:t>
-            </a:r>
-            <a:r>
-              <a:rPr lang="en-GB" sz="800" b="1" dirty="0" err="1">
-                <a:latin typeface="Courier New" panose="02070309020205020404" pitchFamily="49" charset="0"/>
-                <a:cs typeface="Courier New" panose="02070309020205020404" pitchFamily="49" charset="0"/>
-              </a:rPr>
-              <a:t>cvParam</a:t>
-            </a:r>
-            <a:r>
-              <a:rPr lang="en-GB" sz="800" b="1" dirty="0">
-                <a:latin typeface="Courier New" panose="02070309020205020404" pitchFamily="49" charset="0"/>
-                <a:cs typeface="Courier New" panose="02070309020205020404" pitchFamily="49" charset="0"/>
-              </a:rPr>
-              <a:t> </a:t>
-            </a:r>
-            <a:r>
-              <a:rPr lang="en-GB" sz="800" b="1" dirty="0" err="1">
-                <a:latin typeface="Courier New" panose="02070309020205020404" pitchFamily="49" charset="0"/>
-                <a:cs typeface="Courier New" panose="02070309020205020404" pitchFamily="49" charset="0"/>
-              </a:rPr>
-              <a:t>cvRef</a:t>
-            </a:r>
-            <a:r>
-              <a:rPr lang="en-GB" sz="800" b="1" dirty="0">
-                <a:latin typeface="Courier New" panose="02070309020205020404" pitchFamily="49" charset="0"/>
-                <a:cs typeface="Courier New" panose="02070309020205020404" pitchFamily="49" charset="0"/>
-              </a:rPr>
-              <a:t>="PSI-MS" accession="MS:1002641" name="peptide exon count" value="2"/&gt;</a:t>
-            </a:r>
-          </a:p>
-          <a:p>
-            <a:r>
-              <a:rPr lang="en-GB" sz="800" b="1" dirty="0">
-                <a:latin typeface="Courier New" panose="02070309020205020404" pitchFamily="49" charset="0"/>
-                <a:cs typeface="Courier New" panose="02070309020205020404" pitchFamily="49" charset="0"/>
-              </a:rPr>
-              <a:t>    &lt;</a:t>
-            </a:r>
-            <a:r>
-              <a:rPr lang="en-GB" sz="800" b="1" dirty="0" err="1">
-                <a:latin typeface="Courier New" panose="02070309020205020404" pitchFamily="49" charset="0"/>
-                <a:cs typeface="Courier New" panose="02070309020205020404" pitchFamily="49" charset="0"/>
-              </a:rPr>
-              <a:t>cvParam</a:t>
-            </a:r>
-            <a:r>
-              <a:rPr lang="en-GB" sz="800" b="1" dirty="0">
-                <a:latin typeface="Courier New" panose="02070309020205020404" pitchFamily="49" charset="0"/>
-                <a:cs typeface="Courier New" panose="02070309020205020404" pitchFamily="49" charset="0"/>
-              </a:rPr>
-              <a:t> </a:t>
-            </a:r>
-            <a:r>
-              <a:rPr lang="en-GB" sz="800" b="1" dirty="0" err="1">
-                <a:latin typeface="Courier New" panose="02070309020205020404" pitchFamily="49" charset="0"/>
-                <a:cs typeface="Courier New" panose="02070309020205020404" pitchFamily="49" charset="0"/>
-              </a:rPr>
-              <a:t>cvRef</a:t>
-            </a:r>
-            <a:r>
-              <a:rPr lang="en-GB" sz="800" b="1" dirty="0">
-                <a:latin typeface="Courier New" panose="02070309020205020404" pitchFamily="49" charset="0"/>
-                <a:cs typeface="Courier New" panose="02070309020205020404" pitchFamily="49" charset="0"/>
-              </a:rPr>
-              <a:t>="PSI-MS" accession="MS:1002642" name="peptide exon nucleotide sizes" value="</a:t>
-            </a:r>
             <a:r>
               <a:rPr lang="en-GB" sz="800" b="1" dirty="0" smtClean="0">
                 <a:latin typeface="Courier New" panose="02070309020205020404" pitchFamily="49" charset="0"/>
                 <a:cs typeface="Courier New" panose="02070309020205020404" pitchFamily="49" charset="0"/>
               </a:rPr>
-              <a:t>25,8"/&gt;</a:t>
-            </a:r>
-            <a:endParaRPr lang="en-GB" sz="800" b="1" dirty="0">
+              <a:t>    &lt;</a:t>
+            </a:r>
+            <a:r>
+              <a:rPr lang="en-GB" sz="800" b="1" dirty="0" err="1" smtClean="0">
+                <a:latin typeface="Courier New" panose="02070309020205020404" pitchFamily="49" charset="0"/>
+                <a:cs typeface="Courier New" panose="02070309020205020404" pitchFamily="49" charset="0"/>
+              </a:rPr>
+              <a:t>cvParam</a:t>
+            </a:r>
+            <a:r>
+              <a:rPr lang="en-GB" sz="800" b="1" dirty="0" smtClean="0">
+                <a:latin typeface="Courier New" panose="02070309020205020404" pitchFamily="49" charset="0"/>
+                <a:cs typeface="Courier New" panose="02070309020205020404" pitchFamily="49" charset="0"/>
+              </a:rPr>
+              <a:t> </a:t>
+            </a:r>
+            <a:r>
+              <a:rPr lang="en-GB" sz="800" b="1" dirty="0" err="1" smtClean="0">
+                <a:latin typeface="Courier New" panose="02070309020205020404" pitchFamily="49" charset="0"/>
+                <a:cs typeface="Courier New" panose="02070309020205020404" pitchFamily="49" charset="0"/>
+              </a:rPr>
+              <a:t>cvRef</a:t>
+            </a:r>
+            <a:r>
+              <a:rPr lang="en-GB" sz="800" b="1" dirty="0" smtClean="0">
+                <a:latin typeface="Courier New" panose="02070309020205020404" pitchFamily="49" charset="0"/>
+                <a:cs typeface="Courier New" panose="02070309020205020404" pitchFamily="49" charset="0"/>
+              </a:rPr>
+              <a:t>="PSI-MS" accession="MS:1002640" name="peptide end on chromosome" value="156646808"/&gt;</a:t>
+            </a:r>
+          </a:p>
+          <a:p>
+            <a:r>
+              <a:rPr lang="en-GB" sz="800" b="1" dirty="0" smtClean="0">
+                <a:latin typeface="Courier New" panose="02070309020205020404" pitchFamily="49" charset="0"/>
+                <a:cs typeface="Courier New" panose="02070309020205020404" pitchFamily="49" charset="0"/>
+              </a:rPr>
+              <a:t>    &lt;</a:t>
+            </a:r>
+            <a:r>
+              <a:rPr lang="en-GB" sz="800" b="1" dirty="0" err="1" smtClean="0">
+                <a:latin typeface="Courier New" panose="02070309020205020404" pitchFamily="49" charset="0"/>
+                <a:cs typeface="Courier New" panose="02070309020205020404" pitchFamily="49" charset="0"/>
+              </a:rPr>
+              <a:t>cvParam</a:t>
+            </a:r>
+            <a:r>
+              <a:rPr lang="en-GB" sz="800" b="1" dirty="0" smtClean="0">
+                <a:latin typeface="Courier New" panose="02070309020205020404" pitchFamily="49" charset="0"/>
+                <a:cs typeface="Courier New" panose="02070309020205020404" pitchFamily="49" charset="0"/>
+              </a:rPr>
+              <a:t> </a:t>
+            </a:r>
+            <a:r>
+              <a:rPr lang="en-GB" sz="800" b="1" dirty="0" err="1" smtClean="0">
+                <a:latin typeface="Courier New" panose="02070309020205020404" pitchFamily="49" charset="0"/>
+                <a:cs typeface="Courier New" panose="02070309020205020404" pitchFamily="49" charset="0"/>
+              </a:rPr>
+              <a:t>cvRef</a:t>
+            </a:r>
+            <a:r>
+              <a:rPr lang="en-GB" sz="800" b="1" dirty="0" smtClean="0">
+                <a:latin typeface="Courier New" panose="02070309020205020404" pitchFamily="49" charset="0"/>
+                <a:cs typeface="Courier New" panose="02070309020205020404" pitchFamily="49" charset="0"/>
+              </a:rPr>
+              <a:t>="PSI-MS" accession="MS:1002641" name="peptide exon count" value="2"/&gt;</a:t>
+            </a:r>
+          </a:p>
+          <a:p>
+            <a:r>
+              <a:rPr lang="en-GB" sz="800" b="1" dirty="0" smtClean="0">
+                <a:latin typeface="Courier New" panose="02070309020205020404" pitchFamily="49" charset="0"/>
+                <a:cs typeface="Courier New" panose="02070309020205020404" pitchFamily="49" charset="0"/>
+              </a:rPr>
+              <a:t>    &lt;</a:t>
+            </a:r>
+            <a:r>
+              <a:rPr lang="en-GB" sz="800" b="1" dirty="0" err="1" smtClean="0">
+                <a:latin typeface="Courier New" panose="02070309020205020404" pitchFamily="49" charset="0"/>
+                <a:cs typeface="Courier New" panose="02070309020205020404" pitchFamily="49" charset="0"/>
+              </a:rPr>
+              <a:t>cvParam</a:t>
+            </a:r>
+            <a:r>
+              <a:rPr lang="en-GB" sz="800" b="1" dirty="0" smtClean="0">
+                <a:latin typeface="Courier New" panose="02070309020205020404" pitchFamily="49" charset="0"/>
+                <a:cs typeface="Courier New" panose="02070309020205020404" pitchFamily="49" charset="0"/>
+              </a:rPr>
+              <a:t> </a:t>
+            </a:r>
+            <a:r>
+              <a:rPr lang="en-GB" sz="800" b="1" dirty="0" err="1" smtClean="0">
+                <a:latin typeface="Courier New" panose="02070309020205020404" pitchFamily="49" charset="0"/>
+                <a:cs typeface="Courier New" panose="02070309020205020404" pitchFamily="49" charset="0"/>
+              </a:rPr>
+              <a:t>cvRef</a:t>
+            </a:r>
+            <a:r>
+              <a:rPr lang="en-GB" sz="800" b="1" dirty="0" smtClean="0">
+                <a:latin typeface="Courier New" panose="02070309020205020404" pitchFamily="49" charset="0"/>
+                <a:cs typeface="Courier New" panose="02070309020205020404" pitchFamily="49" charset="0"/>
+              </a:rPr>
+              <a:t>="PSI-MS" accession="MS:1002642" name="peptide exon nucleotide sizes" value="25,8"/&gt;</a:t>
+            </a:r>
+          </a:p>
+          <a:p>
+            <a:r>
+              <a:rPr lang="en-GB" sz="800" b="1" dirty="0" smtClean="0">
+                <a:latin typeface="Courier New" panose="02070309020205020404" pitchFamily="49" charset="0"/>
+                <a:cs typeface="Courier New" panose="02070309020205020404" pitchFamily="49" charset="0"/>
+              </a:rPr>
+              <a:t>    &lt;</a:t>
+            </a:r>
+            <a:r>
+              <a:rPr lang="en-GB" sz="800" b="1" dirty="0" err="1" smtClean="0">
+                <a:latin typeface="Courier New" panose="02070309020205020404" pitchFamily="49" charset="0"/>
+                <a:cs typeface="Courier New" panose="02070309020205020404" pitchFamily="49" charset="0"/>
+              </a:rPr>
+              <a:t>cvParam</a:t>
+            </a:r>
+            <a:r>
+              <a:rPr lang="en-GB" sz="800" b="1" dirty="0" smtClean="0">
+                <a:latin typeface="Courier New" panose="02070309020205020404" pitchFamily="49" charset="0"/>
+                <a:cs typeface="Courier New" panose="02070309020205020404" pitchFamily="49" charset="0"/>
+              </a:rPr>
+              <a:t> </a:t>
+            </a:r>
+            <a:r>
+              <a:rPr lang="en-GB" sz="800" b="1" dirty="0" err="1" smtClean="0">
+                <a:latin typeface="Courier New" panose="02070309020205020404" pitchFamily="49" charset="0"/>
+                <a:cs typeface="Courier New" panose="02070309020205020404" pitchFamily="49" charset="0"/>
+              </a:rPr>
+              <a:t>cvRef</a:t>
+            </a:r>
+            <a:r>
+              <a:rPr lang="en-GB" sz="800" b="1" dirty="0" smtClean="0">
+                <a:latin typeface="Courier New" panose="02070309020205020404" pitchFamily="49" charset="0"/>
+                <a:cs typeface="Courier New" panose="02070309020205020404" pitchFamily="49" charset="0"/>
+              </a:rPr>
+              <a:t>="PSI-MS" accession="MS:1002643" name="peptide start positions on chromosome" value="156646122,156646800"/&gt;</a:t>
+            </a:r>
+          </a:p>
+          <a:p>
+            <a:r>
+              <a:rPr lang="en-GB" sz="800" dirty="0" smtClean="0">
+                <a:latin typeface="Courier New" panose="02070309020205020404" pitchFamily="49" charset="0"/>
+                <a:cs typeface="Courier New" panose="02070309020205020404" pitchFamily="49" charset="0"/>
+              </a:rPr>
+              <a:t>  &lt;/</a:t>
+            </a:r>
+            <a:r>
+              <a:rPr lang="en-GB" sz="800" dirty="0" err="1" smtClean="0">
+                <a:latin typeface="Courier New" panose="02070309020205020404" pitchFamily="49" charset="0"/>
+                <a:cs typeface="Courier New" panose="02070309020205020404" pitchFamily="49" charset="0"/>
+              </a:rPr>
+              <a:t>PeptideEvidence</a:t>
+            </a:r>
+            <a:r>
+              <a:rPr lang="en-GB" sz="800" dirty="0" smtClean="0">
+                <a:latin typeface="Courier New" panose="02070309020205020404" pitchFamily="49" charset="0"/>
+                <a:cs typeface="Courier New" panose="02070309020205020404" pitchFamily="49" charset="0"/>
+              </a:rPr>
+              <a:t>&gt;</a:t>
+            </a:r>
+            <a:endParaRPr lang="en-GB" sz="800" dirty="0">
               <a:latin typeface="Courier New" panose="02070309020205020404" pitchFamily="49" charset="0"/>
               <a:cs typeface="Courier New" panose="02070309020205020404" pitchFamily="49" charset="0"/>
             </a:endParaRPr>
-          </a:p>
-          <a:p>
-            <a:r>
-              <a:rPr lang="en-GB" sz="800" b="1" dirty="0">
-                <a:latin typeface="Courier New" panose="02070309020205020404" pitchFamily="49" charset="0"/>
-                <a:cs typeface="Courier New" panose="02070309020205020404" pitchFamily="49" charset="0"/>
-              </a:rPr>
-              <a:t>    &lt;</a:t>
-            </a:r>
-            <a:r>
-              <a:rPr lang="en-GB" sz="800" b="1" dirty="0" err="1">
-                <a:latin typeface="Courier New" panose="02070309020205020404" pitchFamily="49" charset="0"/>
-                <a:cs typeface="Courier New" panose="02070309020205020404" pitchFamily="49" charset="0"/>
-              </a:rPr>
-              <a:t>cvParam</a:t>
-            </a:r>
-            <a:r>
-              <a:rPr lang="en-GB" sz="800" b="1" dirty="0">
-                <a:latin typeface="Courier New" panose="02070309020205020404" pitchFamily="49" charset="0"/>
-                <a:cs typeface="Courier New" panose="02070309020205020404" pitchFamily="49" charset="0"/>
-              </a:rPr>
-              <a:t> </a:t>
-            </a:r>
-            <a:r>
-              <a:rPr lang="en-GB" sz="800" b="1" dirty="0" err="1">
-                <a:latin typeface="Courier New" panose="02070309020205020404" pitchFamily="49" charset="0"/>
-                <a:cs typeface="Courier New" panose="02070309020205020404" pitchFamily="49" charset="0"/>
-              </a:rPr>
-              <a:t>cvRef</a:t>
-            </a:r>
-            <a:r>
-              <a:rPr lang="en-GB" sz="800" b="1" dirty="0">
-                <a:latin typeface="Courier New" panose="02070309020205020404" pitchFamily="49" charset="0"/>
-                <a:cs typeface="Courier New" panose="02070309020205020404" pitchFamily="49" charset="0"/>
-              </a:rPr>
-              <a:t>="PSI-MS" accession="MS:1002643" name="peptide start positions on chromosome" value="</a:t>
-            </a:r>
-            <a:r>
-              <a:rPr lang="en-GB" sz="800" b="1" dirty="0" smtClean="0">
-                <a:latin typeface="Courier New" panose="02070309020205020404" pitchFamily="49" charset="0"/>
-                <a:cs typeface="Courier New" panose="02070309020205020404" pitchFamily="49" charset="0"/>
-              </a:rPr>
-              <a:t>156646122,156646800"/&gt;</a:t>
-            </a:r>
-            <a:endParaRPr lang="en-GB" sz="800" b="1" dirty="0">
-              <a:latin typeface="Courier New" panose="02070309020205020404" pitchFamily="49" charset="0"/>
-              <a:cs typeface="Courier New" panose="02070309020205020404" pitchFamily="49" charset="0"/>
-            </a:endParaRPr>
-          </a:p>
-          <a:p>
-            <a:r>
-              <a:rPr lang="en-GB" sz="800" dirty="0">
-                <a:latin typeface="Courier New" panose="02070309020205020404" pitchFamily="49" charset="0"/>
-                <a:cs typeface="Courier New" panose="02070309020205020404" pitchFamily="49" charset="0"/>
-              </a:rPr>
-              <a:t>  &lt;/</a:t>
-            </a:r>
-            <a:r>
-              <a:rPr lang="en-GB" sz="800" dirty="0" err="1">
-                <a:latin typeface="Courier New" panose="02070309020205020404" pitchFamily="49" charset="0"/>
-                <a:cs typeface="Courier New" panose="02070309020205020404" pitchFamily="49" charset="0"/>
-              </a:rPr>
-              <a:t>PeptideEvidence</a:t>
-            </a:r>
-            <a:r>
-              <a:rPr lang="en-GB" sz="800" dirty="0">
-                <a:latin typeface="Courier New" panose="02070309020205020404" pitchFamily="49" charset="0"/>
-                <a:cs typeface="Courier New" panose="02070309020205020404" pitchFamily="49" charset="0"/>
-              </a:rPr>
-              <a:t>&gt;</a:t>
-            </a:r>
           </a:p>
         </p:txBody>
       </p:sp>
@@ -13577,8 +13288,8 @@
         </p:nvSpPr>
         <p:spPr>
           <a:xfrm>
-            <a:off x="395536" y="3979228"/>
-            <a:ext cx="6657442" cy="1446550"/>
+            <a:off x="395536" y="3564508"/>
+            <a:ext cx="6657442" cy="954107"/>
           </a:xfrm>
           <a:prstGeom prst="rect">
             <a:avLst/>
@@ -13599,262 +13310,220 @@
           <a:p>
             <a:r>
               <a:rPr lang="en-GB" sz="800" dirty="0">
-                <a:latin typeface="Courier New" panose="02070309020205020404" pitchFamily="49" charset="0"/>
-                <a:cs typeface="Courier New" panose="02070309020205020404" pitchFamily="49" charset="0"/>
-              </a:rPr>
-              <a:t> &lt;</a:t>
+                <a:latin typeface="Courier New" pitchFamily="49" charset="0"/>
+                <a:cs typeface="Courier New" pitchFamily="49" charset="0"/>
+              </a:rPr>
+              <a:t>&lt;</a:t>
             </a:r>
             <a:r>
               <a:rPr lang="en-GB" sz="800" dirty="0" err="1">
-                <a:latin typeface="Courier New" panose="02070309020205020404" pitchFamily="49" charset="0"/>
-                <a:cs typeface="Courier New" panose="02070309020205020404" pitchFamily="49" charset="0"/>
-              </a:rPr>
-              <a:t>SearchDatabase</a:t>
+                <a:latin typeface="Courier New" pitchFamily="49" charset="0"/>
+                <a:cs typeface="Courier New" pitchFamily="49" charset="0"/>
+              </a:rPr>
+              <a:t>DBSequence</a:t>
             </a:r>
             <a:r>
               <a:rPr lang="en-GB" sz="800" dirty="0">
-                <a:latin typeface="Courier New" panose="02070309020205020404" pitchFamily="49" charset="0"/>
-                <a:cs typeface="Courier New" panose="02070309020205020404" pitchFamily="49" charset="0"/>
+                <a:latin typeface="Courier New" pitchFamily="49" charset="0"/>
+                <a:cs typeface="Courier New" pitchFamily="49" charset="0"/>
               </a:rPr>
               <a:t> </a:t>
             </a:r>
             <a:r>
               <a:rPr lang="en-GB" sz="800" dirty="0" err="1">
-                <a:latin typeface="Courier New" panose="02070309020205020404" pitchFamily="49" charset="0"/>
-                <a:cs typeface="Courier New" panose="02070309020205020404" pitchFamily="49" charset="0"/>
-              </a:rPr>
-              <a:t>numDatabaseSequences</a:t>
+                <a:latin typeface="Courier New" pitchFamily="49" charset="0"/>
+                <a:cs typeface="Courier New" pitchFamily="49" charset="0"/>
+              </a:rPr>
+              <a:t>searchDatabase_ref</a:t>
             </a:r>
             <a:r>
               <a:rPr lang="en-GB" sz="800" dirty="0">
-                <a:latin typeface="Courier New" panose="02070309020205020404" pitchFamily="49" charset="0"/>
-                <a:cs typeface="Courier New" panose="02070309020205020404" pitchFamily="49" charset="0"/>
-              </a:rPr>
-              <a:t>="299106" location="PXD000764_34939_combined_concatenated_target_decoy.fasta" id="SearchDB_1"&gt;</a:t>
-            </a:r>
+                <a:latin typeface="Courier New" pitchFamily="49" charset="0"/>
+                <a:cs typeface="Courier New" pitchFamily="49" charset="0"/>
+              </a:rPr>
+              <a:t>="SearchDB_1" accession="generic|A_ENSP00000389898|" id="dbseq_generic|A_ENSP00000389898|"&gt;    </a:t>
+            </a:r>
+            <a:endParaRPr lang="en-GB" sz="800" dirty="0" smtClean="0">
+              <a:latin typeface="Courier New" pitchFamily="49" charset="0"/>
+              <a:cs typeface="Courier New" pitchFamily="49" charset="0"/>
+            </a:endParaRPr>
           </a:p>
           <a:p>
             <a:r>
               <a:rPr lang="en-GB" sz="800" dirty="0">
-                <a:latin typeface="Courier New" panose="02070309020205020404" pitchFamily="49" charset="0"/>
-                <a:cs typeface="Courier New" panose="02070309020205020404" pitchFamily="49" charset="0"/>
-              </a:rPr>
-              <a:t>    &lt;</a:t>
+                <a:latin typeface="Courier New" pitchFamily="49" charset="0"/>
+                <a:cs typeface="Courier New" pitchFamily="49" charset="0"/>
+              </a:rPr>
+              <a:t> </a:t>
+            </a:r>
+            <a:r>
+              <a:rPr lang="en-GB" sz="800" dirty="0" smtClean="0">
+                <a:latin typeface="Courier New" pitchFamily="49" charset="0"/>
+                <a:cs typeface="Courier New" pitchFamily="49" charset="0"/>
+              </a:rPr>
+              <a:t>  &lt;</a:t>
             </a:r>
             <a:r>
               <a:rPr lang="en-GB" sz="800" dirty="0" err="1">
-                <a:latin typeface="Courier New" panose="02070309020205020404" pitchFamily="49" charset="0"/>
-                <a:cs typeface="Courier New" panose="02070309020205020404" pitchFamily="49" charset="0"/>
-              </a:rPr>
-              <a:t>FileFormat</a:t>
+                <a:latin typeface="Courier New" pitchFamily="49" charset="0"/>
+                <a:cs typeface="Courier New" pitchFamily="49" charset="0"/>
+              </a:rPr>
+              <a:t>cvParam</a:t>
             </a:r>
             <a:r>
               <a:rPr lang="en-GB" sz="800" dirty="0">
-                <a:latin typeface="Courier New" panose="02070309020205020404" pitchFamily="49" charset="0"/>
-                <a:cs typeface="Courier New" panose="02070309020205020404" pitchFamily="49" charset="0"/>
-              </a:rPr>
-              <a:t>&gt;</a:t>
-            </a:r>
-          </a:p>
-          <a:p>
+                <a:latin typeface="Courier New" pitchFamily="49" charset="0"/>
+                <a:cs typeface="Courier New" pitchFamily="49" charset="0"/>
+              </a:rPr>
+              <a:t> </a:t>
+            </a:r>
+            <a:r>
+              <a:rPr lang="en-GB" sz="800" dirty="0" err="1">
+                <a:latin typeface="Courier New" pitchFamily="49" charset="0"/>
+                <a:cs typeface="Courier New" pitchFamily="49" charset="0"/>
+              </a:rPr>
+              <a:t>cvRef</a:t>
+            </a:r>
             <a:r>
               <a:rPr lang="en-GB" sz="800" dirty="0">
-                <a:latin typeface="Courier New" panose="02070309020205020404" pitchFamily="49" charset="0"/>
-                <a:cs typeface="Courier New" panose="02070309020205020404" pitchFamily="49" charset="0"/>
-              </a:rPr>
-              <a:t>      &lt;</a:t>
+                <a:latin typeface="Courier New" pitchFamily="49" charset="0"/>
+                <a:cs typeface="Courier New" pitchFamily="49" charset="0"/>
+              </a:rPr>
+              <a:t>="PSI-MS" accession="MS:1002637" name="chromosome name" value="1</a:t>
+            </a:r>
+            <a:r>
+              <a:rPr lang="en-GB" sz="800" dirty="0" smtClean="0">
+                <a:latin typeface="Courier New" pitchFamily="49" charset="0"/>
+                <a:cs typeface="Courier New" pitchFamily="49" charset="0"/>
+              </a:rPr>
+              <a:t>"/&gt;</a:t>
+            </a:r>
+          </a:p>
+          <a:p>
+            <a:r>
+              <a:rPr lang="en-GB" sz="800" dirty="0" smtClean="0">
+                <a:latin typeface="Courier New" pitchFamily="49" charset="0"/>
+                <a:cs typeface="Courier New" pitchFamily="49" charset="0"/>
+              </a:rPr>
+              <a:t>   </a:t>
+            </a:r>
+            <a:r>
+              <a:rPr lang="en-GB" sz="800" dirty="0">
+                <a:latin typeface="Courier New" pitchFamily="49" charset="0"/>
+                <a:cs typeface="Courier New" pitchFamily="49" charset="0"/>
+              </a:rPr>
+              <a:t>&lt;</a:t>
             </a:r>
             <a:r>
               <a:rPr lang="en-GB" sz="800" dirty="0" err="1">
-                <a:latin typeface="Courier New" panose="02070309020205020404" pitchFamily="49" charset="0"/>
-                <a:cs typeface="Courier New" panose="02070309020205020404" pitchFamily="49" charset="0"/>
+                <a:latin typeface="Courier New" pitchFamily="49" charset="0"/>
+                <a:cs typeface="Courier New" pitchFamily="49" charset="0"/>
               </a:rPr>
               <a:t>cvParam</a:t>
             </a:r>
             <a:r>
               <a:rPr lang="en-GB" sz="800" dirty="0">
-                <a:latin typeface="Courier New" panose="02070309020205020404" pitchFamily="49" charset="0"/>
-                <a:cs typeface="Courier New" panose="02070309020205020404" pitchFamily="49" charset="0"/>
+                <a:latin typeface="Courier New" pitchFamily="49" charset="0"/>
+                <a:cs typeface="Courier New" pitchFamily="49" charset="0"/>
               </a:rPr>
               <a:t> </a:t>
             </a:r>
             <a:r>
               <a:rPr lang="en-GB" sz="800" dirty="0" err="1">
-                <a:latin typeface="Courier New" panose="02070309020205020404" pitchFamily="49" charset="0"/>
-                <a:cs typeface="Courier New" panose="02070309020205020404" pitchFamily="49" charset="0"/>
+                <a:latin typeface="Courier New" pitchFamily="49" charset="0"/>
+                <a:cs typeface="Courier New" pitchFamily="49" charset="0"/>
               </a:rPr>
               <a:t>cvRef</a:t>
             </a:r>
             <a:r>
               <a:rPr lang="en-GB" sz="800" dirty="0">
-                <a:latin typeface="Courier New" panose="02070309020205020404" pitchFamily="49" charset="0"/>
-                <a:cs typeface="Courier New" panose="02070309020205020404" pitchFamily="49" charset="0"/>
-              </a:rPr>
-              <a:t>="PSI-MS" accession="MS:1001348" name="FASTA format"/&gt;</a:t>
-            </a:r>
-          </a:p>
-          <a:p>
+                <a:latin typeface="Courier New" pitchFamily="49" charset="0"/>
+                <a:cs typeface="Courier New" pitchFamily="49" charset="0"/>
+              </a:rPr>
+              <a:t>="PSI-MS" accession="MS:1002638" name="chromosome strand" value</a:t>
+            </a:r>
+            <a:r>
+              <a:rPr lang="en-GB" sz="800" dirty="0" smtClean="0">
+                <a:latin typeface="Courier New" pitchFamily="49" charset="0"/>
+                <a:cs typeface="Courier New" pitchFamily="49" charset="0"/>
+              </a:rPr>
+              <a:t>="+"/&gt;</a:t>
+            </a:r>
+          </a:p>
+          <a:p>
+            <a:r>
+              <a:rPr lang="en-GB" sz="800" dirty="0" smtClean="0">
+                <a:latin typeface="Courier New" pitchFamily="49" charset="0"/>
+                <a:cs typeface="Courier New" pitchFamily="49" charset="0"/>
+              </a:rPr>
+              <a:t>   &lt;</a:t>
+            </a:r>
+            <a:r>
+              <a:rPr lang="en-GB" sz="800" dirty="0" err="1" smtClean="0">
+                <a:latin typeface="Courier New" pitchFamily="49" charset="0"/>
+                <a:cs typeface="Courier New" pitchFamily="49" charset="0"/>
+              </a:rPr>
+              <a:t>cvParam</a:t>
+            </a:r>
+            <a:r>
+              <a:rPr lang="en-GB" sz="800" dirty="0" smtClean="0">
+                <a:latin typeface="Courier New" pitchFamily="49" charset="0"/>
+                <a:cs typeface="Courier New" pitchFamily="49" charset="0"/>
+              </a:rPr>
+              <a:t> </a:t>
+            </a:r>
+            <a:r>
+              <a:rPr lang="en-GB" sz="800" dirty="0" err="1">
+                <a:latin typeface="Courier New" pitchFamily="49" charset="0"/>
+                <a:cs typeface="Courier New" pitchFamily="49" charset="0"/>
+              </a:rPr>
+              <a:t>cvRef</a:t>
+            </a:r>
             <a:r>
               <a:rPr lang="en-GB" sz="800" dirty="0">
-                <a:latin typeface="Courier New" panose="02070309020205020404" pitchFamily="49" charset="0"/>
-                <a:cs typeface="Courier New" panose="02070309020205020404" pitchFamily="49" charset="0"/>
-              </a:rPr>
-              <a:t>    &lt;/</a:t>
+                <a:latin typeface="Courier New" pitchFamily="49" charset="0"/>
+                <a:cs typeface="Courier New" pitchFamily="49" charset="0"/>
+              </a:rPr>
+              <a:t>="PSI-MS" accession="MS:1002644" name="genome reference version" value="</a:t>
             </a:r>
             <a:r>
               <a:rPr lang="en-GB" sz="800" dirty="0" err="1">
-                <a:latin typeface="Courier New" panose="02070309020205020404" pitchFamily="49" charset="0"/>
-                <a:cs typeface="Courier New" panose="02070309020205020404" pitchFamily="49" charset="0"/>
-              </a:rPr>
-              <a:t>FileFormat</a:t>
+                <a:latin typeface="Courier New" pitchFamily="49" charset="0"/>
+                <a:cs typeface="Courier New" pitchFamily="49" charset="0"/>
+              </a:rPr>
+              <a:t>Ensembl</a:t>
             </a:r>
             <a:r>
               <a:rPr lang="en-GB" sz="800" dirty="0">
-                <a:latin typeface="Courier New" panose="02070309020205020404" pitchFamily="49" charset="0"/>
-                <a:cs typeface="Courier New" panose="02070309020205020404" pitchFamily="49" charset="0"/>
-              </a:rPr>
-              <a:t>&gt;</a:t>
-            </a:r>
-          </a:p>
-          <a:p>
+                <a:latin typeface="Courier New" pitchFamily="49" charset="0"/>
+                <a:cs typeface="Courier New" pitchFamily="49" charset="0"/>
+              </a:rPr>
+              <a:t> release 84"/&gt;  </a:t>
+            </a:r>
+            <a:endParaRPr lang="en-GB" sz="800" dirty="0" smtClean="0">
+              <a:latin typeface="Courier New" pitchFamily="49" charset="0"/>
+              <a:cs typeface="Courier New" pitchFamily="49" charset="0"/>
+            </a:endParaRPr>
+          </a:p>
+          <a:p>
+            <a:r>
+              <a:rPr lang="en-GB" sz="800" dirty="0" smtClean="0">
+                <a:latin typeface="Courier New" pitchFamily="49" charset="0"/>
+                <a:cs typeface="Courier New" pitchFamily="49" charset="0"/>
+              </a:rPr>
+              <a:t>&lt;/</a:t>
+            </a:r>
+            <a:r>
+              <a:rPr lang="en-GB" sz="800" dirty="0" err="1">
+                <a:latin typeface="Courier New" pitchFamily="49" charset="0"/>
+                <a:cs typeface="Courier New" pitchFamily="49" charset="0"/>
+              </a:rPr>
+              <a:t>DBSequence</a:t>
+            </a:r>
             <a:r>
               <a:rPr lang="en-GB" sz="800" dirty="0">
-                <a:latin typeface="Courier New" panose="02070309020205020404" pitchFamily="49" charset="0"/>
-                <a:cs typeface="Courier New" panose="02070309020205020404" pitchFamily="49" charset="0"/>
-              </a:rPr>
-              <a:t>    &lt;</a:t>
-            </a:r>
-            <a:r>
-              <a:rPr lang="en-GB" sz="800" dirty="0" err="1">
-                <a:latin typeface="Courier New" panose="02070309020205020404" pitchFamily="49" charset="0"/>
-                <a:cs typeface="Courier New" panose="02070309020205020404" pitchFamily="49" charset="0"/>
-              </a:rPr>
-              <a:t>DatabaseName</a:t>
-            </a:r>
-            <a:r>
-              <a:rPr lang="en-GB" sz="800" dirty="0">
-                <a:latin typeface="Courier New" panose="02070309020205020404" pitchFamily="49" charset="0"/>
-                <a:cs typeface="Courier New" panose="02070309020205020404" pitchFamily="49" charset="0"/>
-              </a:rPr>
-              <a:t>&gt;</a:t>
-            </a:r>
-          </a:p>
-          <a:p>
-            <a:r>
-              <a:rPr lang="en-GB" sz="800" dirty="0">
-                <a:latin typeface="Courier New" panose="02070309020205020404" pitchFamily="49" charset="0"/>
-                <a:cs typeface="Courier New" panose="02070309020205020404" pitchFamily="49" charset="0"/>
-              </a:rPr>
-              <a:t>      &lt;</a:t>
-            </a:r>
-            <a:r>
-              <a:rPr lang="en-GB" sz="800" dirty="0" err="1">
-                <a:latin typeface="Courier New" panose="02070309020205020404" pitchFamily="49" charset="0"/>
-                <a:cs typeface="Courier New" panose="02070309020205020404" pitchFamily="49" charset="0"/>
-              </a:rPr>
-              <a:t>userParam</a:t>
-            </a:r>
-            <a:r>
-              <a:rPr lang="en-GB" sz="800" dirty="0">
-                <a:latin typeface="Courier New" panose="02070309020205020404" pitchFamily="49" charset="0"/>
-                <a:cs typeface="Courier New" panose="02070309020205020404" pitchFamily="49" charset="0"/>
-              </a:rPr>
-              <a:t> name="PXD000764_34939_combined_concatenated_target_decoy.fasta"&gt;&lt;/</a:t>
-            </a:r>
-            <a:r>
-              <a:rPr lang="en-GB" sz="800" dirty="0" err="1">
-                <a:latin typeface="Courier New" panose="02070309020205020404" pitchFamily="49" charset="0"/>
-                <a:cs typeface="Courier New" panose="02070309020205020404" pitchFamily="49" charset="0"/>
-              </a:rPr>
-              <a:t>userParam</a:t>
-            </a:r>
-            <a:r>
-              <a:rPr lang="en-GB" sz="800" dirty="0">
-                <a:latin typeface="Courier New" panose="02070309020205020404" pitchFamily="49" charset="0"/>
-                <a:cs typeface="Courier New" panose="02070309020205020404" pitchFamily="49" charset="0"/>
-              </a:rPr>
-              <a:t>&gt;      </a:t>
-            </a:r>
-          </a:p>
-          <a:p>
-            <a:r>
-              <a:rPr lang="en-GB" sz="800" dirty="0">
-                <a:latin typeface="Courier New" panose="02070309020205020404" pitchFamily="49" charset="0"/>
-                <a:cs typeface="Courier New" panose="02070309020205020404" pitchFamily="49" charset="0"/>
-              </a:rPr>
-              <a:t>    &lt;/</a:t>
-            </a:r>
-            <a:r>
-              <a:rPr lang="en-GB" sz="800" dirty="0" err="1">
-                <a:latin typeface="Courier New" panose="02070309020205020404" pitchFamily="49" charset="0"/>
-                <a:cs typeface="Courier New" panose="02070309020205020404" pitchFamily="49" charset="0"/>
-              </a:rPr>
-              <a:t>DatabaseName</a:t>
-            </a:r>
-            <a:r>
-              <a:rPr lang="en-GB" sz="800" dirty="0">
-                <a:latin typeface="Courier New" panose="02070309020205020404" pitchFamily="49" charset="0"/>
-                <a:cs typeface="Courier New" panose="02070309020205020404" pitchFamily="49" charset="0"/>
-              </a:rPr>
-              <a:t>&gt;</a:t>
-            </a:r>
-          </a:p>
-          <a:p>
-            <a:r>
-              <a:rPr lang="en-GB" sz="800" b="1" dirty="0">
-                <a:latin typeface="Courier New" panose="02070309020205020404" pitchFamily="49" charset="0"/>
-                <a:cs typeface="Courier New" panose="02070309020205020404" pitchFamily="49" charset="0"/>
-              </a:rPr>
-              <a:t>    &lt;</a:t>
-            </a:r>
-            <a:r>
-              <a:rPr lang="en-GB" sz="800" b="1" dirty="0" err="1">
-                <a:latin typeface="Courier New" panose="02070309020205020404" pitchFamily="49" charset="0"/>
-                <a:cs typeface="Courier New" panose="02070309020205020404" pitchFamily="49" charset="0"/>
-              </a:rPr>
-              <a:t>cvParam</a:t>
-            </a:r>
-            <a:r>
-              <a:rPr lang="en-GB" sz="800" b="1" dirty="0">
-                <a:latin typeface="Courier New" panose="02070309020205020404" pitchFamily="49" charset="0"/>
-                <a:cs typeface="Courier New" panose="02070309020205020404" pitchFamily="49" charset="0"/>
-              </a:rPr>
-              <a:t> </a:t>
-            </a:r>
-            <a:r>
-              <a:rPr lang="en-GB" sz="800" b="1" dirty="0" err="1">
-                <a:latin typeface="Courier New" panose="02070309020205020404" pitchFamily="49" charset="0"/>
-                <a:cs typeface="Courier New" panose="02070309020205020404" pitchFamily="49" charset="0"/>
-              </a:rPr>
-              <a:t>cvRef</a:t>
-            </a:r>
-            <a:r>
-              <a:rPr lang="en-GB" sz="800" b="1" dirty="0">
-                <a:latin typeface="Courier New" panose="02070309020205020404" pitchFamily="49" charset="0"/>
-                <a:cs typeface="Courier New" panose="02070309020205020404" pitchFamily="49" charset="0"/>
-              </a:rPr>
-              <a:t>="PSI-MS" accession="MS:1002644" name="genome reference version" value="Homo_sapiens.GRCh38.77.gff3"/&gt;</a:t>
-            </a:r>
-          </a:p>
-          <a:p>
-            <a:r>
-              <a:rPr lang="en-GB" sz="800" dirty="0">
-                <a:latin typeface="Courier New" panose="02070309020205020404" pitchFamily="49" charset="0"/>
-                <a:cs typeface="Courier New" panose="02070309020205020404" pitchFamily="49" charset="0"/>
-              </a:rPr>
-              <a:t>  &lt;/</a:t>
-            </a:r>
-            <a:r>
-              <a:rPr lang="en-GB" sz="800" dirty="0" err="1">
-                <a:latin typeface="Courier New" panose="02070309020205020404" pitchFamily="49" charset="0"/>
-                <a:cs typeface="Courier New" panose="02070309020205020404" pitchFamily="49" charset="0"/>
-              </a:rPr>
-              <a:t>SearchDatabase</a:t>
-            </a:r>
-            <a:r>
-              <a:rPr lang="en-GB" sz="800" dirty="0">
-                <a:latin typeface="Courier New" panose="02070309020205020404" pitchFamily="49" charset="0"/>
-                <a:cs typeface="Courier New" panose="02070309020205020404" pitchFamily="49" charset="0"/>
+                <a:latin typeface="Courier New" pitchFamily="49" charset="0"/>
+                <a:cs typeface="Courier New" pitchFamily="49" charset="0"/>
               </a:rPr>
               <a:t>&gt;</a:t>
             </a:r>
@@ -13874,14 +13543,14 @@
           <p:nvPr>
             <p:extLst>
               <p:ext uri="{D42A27DB-BD31-4B8C-83A1-F6EECF244321}">
-                <p14:modId xmlns:p14="http://schemas.microsoft.com/office/powerpoint/2010/main" val="1636924488"/>
+                <p14:modId xmlns:p14="http://schemas.microsoft.com/office/powerpoint/2010/main" val="1547081707"/>
               </p:ext>
             </p:extLst>
           </p:nvPr>
         </p:nvGraphicFramePr>
         <p:xfrm>
-          <a:off x="395536" y="5559128"/>
-          <a:ext cx="6657442" cy="2941320"/>
+          <a:off x="419944" y="4665037"/>
+          <a:ext cx="6657442" cy="3017746"/>
         </p:xfrm>
         <a:graphic>
           <a:graphicData uri="http://schemas.openxmlformats.org/drawingml/2006/table">
@@ -13893,7 +13562,7 @@
                 <a:gridCol w="698385"/>
                 <a:gridCol w="5959057"/>
               </a:tblGrid>
-              <a:tr h="370840">
+              <a:tr h="365873">
                 <a:tc>
                   <a:txBody>
                     <a:bodyPr/>
@@ -13923,7 +13592,7 @@
                   <a:tcPr/>
                 </a:tc>
               </a:tr>
-              <a:tr h="370840">
+              <a:tr h="365873">
                 <a:tc>
                   <a:txBody>
                     <a:bodyPr/>
@@ -13973,7 +13642,7 @@
                   <a:tcPr/>
                 </a:tc>
               </a:tr>
-              <a:tr h="370840">
+              <a:tr h="1172798">
                 <a:tc>
                   <a:txBody>
                     <a:bodyPr/>
@@ -14007,7 +13676,19 @@
                         <a:rPr lang="en-GB" sz="1200" baseline="0" dirty="0" smtClean="0">
                           <a:latin typeface="+mj-lt"/>
                         </a:rPr>
-                        <a:t> seven cv terms MUST be present on every </a:t>
+                        <a:t> </a:t>
+                      </a:r>
+                      <a:r>
+                        <a:rPr lang="en-GB" sz="1200" baseline="0" dirty="0" smtClean="0">
+                          <a:latin typeface="+mj-lt"/>
+                        </a:rPr>
+                        <a:t>cv </a:t>
+                      </a:r>
+                      <a:r>
+                        <a:rPr lang="en-GB" sz="1200" baseline="0" dirty="0" smtClean="0">
+                          <a:latin typeface="+mj-lt"/>
+                        </a:rPr>
+                        <a:t>terms MUST be present on every </a:t>
                       </a:r>
                       <a:r>
                         <a:rPr lang="en-GB" sz="1200" baseline="0" dirty="0" err="1" smtClean="0">
@@ -14055,7 +13736,7 @@
                   <a:tcPr/>
                 </a:tc>
               </a:tr>
-              <a:tr h="370840">
+              <a:tr h="631507">
                 <a:tc>
                   <a:txBody>
                     <a:bodyPr/>
@@ -14101,7 +13782,7 @@
                   <a:tcPr/>
                 </a:tc>
               </a:tr>
-              <a:tr h="370840">
+              <a:tr h="365873">
                 <a:tc>
                   <a:txBody>
                     <a:bodyPr/>
@@ -14123,24 +13804,29 @@
                     <a:p>
                       <a:r>
                         <a:rPr lang="en-GB" sz="1200" i="0" baseline="0" dirty="0" smtClean="0"/>
-                        <a:t>The </a:t>
+                        <a:t>Each </a:t>
                       </a:r>
                       <a:r>
                         <a:rPr lang="en-GB" sz="1200" i="0" baseline="0" dirty="0" err="1" smtClean="0"/>
-                        <a:t>SearchDatabase</a:t>
+                        <a:t>DBSequence</a:t>
                       </a:r>
                       <a:r>
                         <a:rPr lang="en-GB" sz="1200" i="0" baseline="0" dirty="0" smtClean="0"/>
-                        <a:t> MUST store the genome reference version. </a:t>
-                      </a:r>
-                      <a:r>
-                        <a:rPr lang="en-GB" sz="1200" i="0" baseline="0" dirty="0" smtClean="0">
-                          <a:solidFill>
-                            <a:srgbClr val="C00000"/>
-                          </a:solidFill>
-                        </a:rPr>
-                        <a:t>STILL UNDER DISCUSSION.</a:t>
-                      </a:r>
+                        <a:t> value MUST </a:t>
+                      </a:r>
+                      <a:r>
+                        <a:rPr lang="en-GB" sz="1200" i="0" baseline="0" dirty="0" smtClean="0"/>
+                        <a:t>store the genome reference </a:t>
+                      </a:r>
+                      <a:r>
+                        <a:rPr lang="en-GB" sz="1200" i="0" baseline="0" dirty="0" smtClean="0"/>
+                        <a:t>version, chromosome name and strand. </a:t>
+                      </a:r>
+                      <a:endParaRPr lang="en-GB" sz="1200" i="0" baseline="0" dirty="0" smtClean="0">
+                        <a:solidFill>
+                          <a:srgbClr val="C00000"/>
+                        </a:solidFill>
+                      </a:endParaRPr>
                     </a:p>
                   </a:txBody>
                   <a:tcPr/>
@@ -14158,7 +13844,7 @@
         </p:nvSpPr>
         <p:spPr>
           <a:xfrm>
-            <a:off x="6413723" y="3476546"/>
+            <a:off x="6397638" y="3130294"/>
             <a:ext cx="309700" cy="369332"/>
           </a:xfrm>
           <a:prstGeom prst="rect">
@@ -14188,7 +13874,7 @@
         </p:nvSpPr>
         <p:spPr>
           <a:xfrm>
-            <a:off x="6404906" y="3989894"/>
+            <a:off x="6388821" y="4165940"/>
             <a:ext cx="327334" cy="369332"/>
           </a:xfrm>
           <a:prstGeom prst="rect">
@@ -14219,14 +13905,14 @@
           <p:nvPr>
             <p:extLst>
               <p:ext uri="{D42A27DB-BD31-4B8C-83A1-F6EECF244321}">
-                <p14:modId xmlns:p14="http://schemas.microsoft.com/office/powerpoint/2010/main" val="33994465"/>
+                <p14:modId xmlns:p14="http://schemas.microsoft.com/office/powerpoint/2010/main" val="4060796121"/>
               </p:ext>
             </p:extLst>
           </p:nvPr>
         </p:nvGraphicFramePr>
         <p:xfrm>
-          <a:off x="395536" y="8643074"/>
-          <a:ext cx="6624736" cy="4312920"/>
+          <a:off x="419944" y="7812548"/>
+          <a:ext cx="6624736" cy="3672840"/>
         </p:xfrm>
         <a:graphic>
           <a:graphicData uri="http://schemas.openxmlformats.org/drawingml/2006/table">
@@ -14364,72 +14050,6 @@
                         <a:t>The strand (‘+’ or ‘-’) to which the peptide has been mapped.</a:t>
                       </a:r>
                       <a:endParaRPr lang="en-GB" sz="1200" dirty="0"/>
-                    </a:p>
-                  </a:txBody>
-                  <a:tcPr/>
-                </a:tc>
-              </a:tr>
-              <a:tr h="370840">
-                <a:tc>
-                  <a:txBody>
-                    <a:bodyPr/>
-                    <a:lstStyle/>
-                    <a:p>
-                      <a:r>
-                        <a:rPr lang="en-GB" sz="1200" b="0" kern="1200" dirty="0" smtClean="0">
-                          <a:solidFill>
-                            <a:schemeClr val="dk1"/>
-                          </a:solidFill>
-                          <a:latin typeface="+mn-lt"/>
-                          <a:ea typeface="+mn-ea"/>
-                          <a:cs typeface="Courier New" panose="02070309020205020404" pitchFamily="49" charset="0"/>
-                        </a:rPr>
-                        <a:t>peptide start on chromosome</a:t>
-                      </a:r>
-                      <a:endParaRPr lang="en-GB" sz="1200" dirty="0"/>
-                    </a:p>
-                  </a:txBody>
-                  <a:tcPr/>
-                </a:tc>
-                <a:tc>
-                  <a:txBody>
-                    <a:bodyPr/>
-                    <a:lstStyle/>
-                    <a:p>
-                      <a:pPr marL="0" marR="0" indent="0" algn="l" defTabSz="914400" rtl="0" eaLnBrk="1" fontAlgn="auto" latinLnBrk="0" hangingPunct="1">
-                        <a:lnSpc>
-                          <a:spcPct val="100000"/>
-                        </a:lnSpc>
-                        <a:spcBef>
-                          <a:spcPts val="0"/>
-                        </a:spcBef>
-                        <a:spcAft>
-                          <a:spcPts val="0"/>
-                        </a:spcAft>
-                        <a:buClrTx/>
-                        <a:buSzTx/>
-                        <a:buFontTx/>
-                        <a:buNone/>
-                        <a:tabLst/>
-                        <a:defRPr/>
-                      </a:pPr>
-                      <a:r>
-                        <a:rPr lang="en-GB" sz="1200" dirty="0" smtClean="0"/>
-                        <a:t>The overall start position on the chromosome to which a peptide has been mapped i.e. the position of the first base of the first codon, using a zero-based counting system. </a:t>
-                      </a:r>
-                      <a:r>
-                        <a:rPr lang="en-GB" sz="1200" dirty="0" smtClean="0">
-                          <a:solidFill>
-                            <a:srgbClr val="C00000"/>
-                          </a:solidFill>
-                        </a:rPr>
-                        <a:t>MAY BE DELETED AS REDUNDANT</a:t>
-                      </a:r>
-                      <a:endParaRPr lang="en-GB" sz="1200" dirty="0">
-                        <a:solidFill>
-                          <a:srgbClr val="C00000"/>
-                        </a:solidFill>
-                      </a:endParaRPr>
                     </a:p>
                   </a:txBody>
                   <a:tcPr/>

</xml_diff>

<commit_message>
General cleaning of spec doc and figures
</commit_message>
<xml_diff>
--- a/specification_document/specdoc1_2/NewFeaturesInMzid12.pptx
+++ b/specification_document/specdoc1_2/NewFeaturesInMzid12.pptx
@@ -215,7 +215,7 @@
             <a:fld id="{943B0BE5-311A-4B0A-9A39-DE24DD4BA79D}" type="datetimeFigureOut">
               <a:rPr lang="en-GB" smtClean="0"/>
               <a:pPr/>
-              <a:t>20/05/2016</a:t>
+              <a:t>09/06/2016</a:t>
             </a:fld>
             <a:endParaRPr lang="en-GB"/>
           </a:p>
@@ -760,7 +760,7 @@
             <a:fld id="{A71EF3F3-5BE8-4F69-8C8F-88D570AA2740}" type="datetimeFigureOut">
               <a:rPr lang="en-GB" smtClean="0"/>
               <a:pPr/>
-              <a:t>20/05/2016</a:t>
+              <a:t>09/06/2016</a:t>
             </a:fld>
             <a:endParaRPr lang="en-GB"/>
           </a:p>
@@ -927,7 +927,7 @@
             <a:fld id="{A71EF3F3-5BE8-4F69-8C8F-88D570AA2740}" type="datetimeFigureOut">
               <a:rPr lang="en-GB" smtClean="0"/>
               <a:pPr/>
-              <a:t>20/05/2016</a:t>
+              <a:t>09/06/2016</a:t>
             </a:fld>
             <a:endParaRPr lang="en-GB"/>
           </a:p>
@@ -1104,7 +1104,7 @@
             <a:fld id="{A71EF3F3-5BE8-4F69-8C8F-88D570AA2740}" type="datetimeFigureOut">
               <a:rPr lang="en-GB" smtClean="0"/>
               <a:pPr/>
-              <a:t>20/05/2016</a:t>
+              <a:t>09/06/2016</a:t>
             </a:fld>
             <a:endParaRPr lang="en-GB"/>
           </a:p>
@@ -1271,7 +1271,7 @@
             <a:fld id="{A71EF3F3-5BE8-4F69-8C8F-88D570AA2740}" type="datetimeFigureOut">
               <a:rPr lang="en-GB" smtClean="0"/>
               <a:pPr/>
-              <a:t>20/05/2016</a:t>
+              <a:t>09/06/2016</a:t>
             </a:fld>
             <a:endParaRPr lang="en-GB"/>
           </a:p>
@@ -1514,7 +1514,7 @@
             <a:fld id="{A71EF3F3-5BE8-4F69-8C8F-88D570AA2740}" type="datetimeFigureOut">
               <a:rPr lang="en-GB" smtClean="0"/>
               <a:pPr/>
-              <a:t>20/05/2016</a:t>
+              <a:t>09/06/2016</a:t>
             </a:fld>
             <a:endParaRPr lang="en-GB"/>
           </a:p>
@@ -1799,7 +1799,7 @@
             <a:fld id="{A71EF3F3-5BE8-4F69-8C8F-88D570AA2740}" type="datetimeFigureOut">
               <a:rPr lang="en-GB" smtClean="0"/>
               <a:pPr/>
-              <a:t>20/05/2016</a:t>
+              <a:t>09/06/2016</a:t>
             </a:fld>
             <a:endParaRPr lang="en-GB"/>
           </a:p>
@@ -2218,7 +2218,7 @@
             <a:fld id="{A71EF3F3-5BE8-4F69-8C8F-88D570AA2740}" type="datetimeFigureOut">
               <a:rPr lang="en-GB" smtClean="0"/>
               <a:pPr/>
-              <a:t>20/05/2016</a:t>
+              <a:t>09/06/2016</a:t>
             </a:fld>
             <a:endParaRPr lang="en-GB"/>
           </a:p>
@@ -2333,7 +2333,7 @@
             <a:fld id="{A71EF3F3-5BE8-4F69-8C8F-88D570AA2740}" type="datetimeFigureOut">
               <a:rPr lang="en-GB" smtClean="0"/>
               <a:pPr/>
-              <a:t>20/05/2016</a:t>
+              <a:t>09/06/2016</a:t>
             </a:fld>
             <a:endParaRPr lang="en-GB"/>
           </a:p>
@@ -2425,7 +2425,7 @@
             <a:fld id="{A71EF3F3-5BE8-4F69-8C8F-88D570AA2740}" type="datetimeFigureOut">
               <a:rPr lang="en-GB" smtClean="0"/>
               <a:pPr/>
-              <a:t>20/05/2016</a:t>
+              <a:t>09/06/2016</a:t>
             </a:fld>
             <a:endParaRPr lang="en-GB"/>
           </a:p>
@@ -2699,7 +2699,7 @@
             <a:fld id="{A71EF3F3-5BE8-4F69-8C8F-88D570AA2740}" type="datetimeFigureOut">
               <a:rPr lang="en-GB" smtClean="0"/>
               <a:pPr/>
-              <a:t>20/05/2016</a:t>
+              <a:t>09/06/2016</a:t>
             </a:fld>
             <a:endParaRPr lang="en-GB"/>
           </a:p>
@@ -2949,7 +2949,7 @@
             <a:fld id="{A71EF3F3-5BE8-4F69-8C8F-88D570AA2740}" type="datetimeFigureOut">
               <a:rPr lang="en-GB" smtClean="0"/>
               <a:pPr/>
-              <a:t>20/05/2016</a:t>
+              <a:t>09/06/2016</a:t>
             </a:fld>
             <a:endParaRPr lang="en-GB"/>
           </a:p>
@@ -3159,7 +3159,7 @@
             <a:fld id="{A71EF3F3-5BE8-4F69-8C8F-88D570AA2740}" type="datetimeFigureOut">
               <a:rPr lang="en-GB" smtClean="0"/>
               <a:pPr/>
-              <a:t>20/05/2016</a:t>
+              <a:t>09/06/2016</a:t>
             </a:fld>
             <a:endParaRPr lang="en-GB"/>
           </a:p>
@@ -4460,17 +4460,190 @@
           </a:p>
           <a:p>
             <a:r>
-              <a:rPr lang="en-GB" sz="800" dirty="0" smtClean="0">
+              <a:rPr lang="en-GB" sz="800" b="1" dirty="0" smtClean="0">
                 <a:latin typeface="+mj-lt"/>
                 <a:cs typeface="Courier New" pitchFamily="49" charset="0"/>
               </a:rPr>
               <a:t>    &lt;</a:t>
             </a:r>
             <a:r>
+              <a:rPr lang="en-GB" sz="800" b="1" dirty="0" err="1" smtClean="0">
+                <a:latin typeface="+mj-lt"/>
+                <a:cs typeface="Courier New" pitchFamily="49" charset="0"/>
+              </a:rPr>
+              <a:t>cvParam</a:t>
+            </a:r>
+            <a:r>
+              <a:rPr lang="en-GB" sz="800" b="1" dirty="0" smtClean="0">
+                <a:latin typeface="+mj-lt"/>
+                <a:cs typeface="Courier New" pitchFamily="49" charset="0"/>
+              </a:rPr>
+              <a:t> accession="</a:t>
+            </a:r>
+            <a:r>
+              <a:rPr lang="en-GB" sz="800" b="1" dirty="0" smtClean="0"/>
+              <a:t>MS:1002520</a:t>
+            </a:r>
+            <a:r>
+              <a:rPr lang="en-GB" sz="800" b="1" dirty="0" smtClean="0">
+                <a:latin typeface="+mj-lt"/>
+                <a:cs typeface="Courier New" pitchFamily="49" charset="0"/>
+              </a:rPr>
+              <a:t>" </a:t>
+            </a:r>
+            <a:r>
+              <a:rPr lang="en-GB" sz="800" b="1" dirty="0" err="1" smtClean="0">
+                <a:latin typeface="+mj-lt"/>
+                <a:cs typeface="Courier New" pitchFamily="49" charset="0"/>
+              </a:rPr>
+              <a:t>cvRef</a:t>
+            </a:r>
+            <a:r>
+              <a:rPr lang="en-GB" sz="800" b="1" dirty="0" smtClean="0">
+                <a:latin typeface="+mj-lt"/>
+                <a:cs typeface="Courier New" pitchFamily="49" charset="0"/>
+              </a:rPr>
+              <a:t>="PSI-MS" value="SSHAPVPHGVRLWK" name="peptide </a:t>
+            </a:r>
+            <a:r>
+              <a:rPr lang="en-GB" sz="800" b="1" dirty="0">
+                <a:latin typeface="+mj-lt"/>
+                <a:cs typeface="Courier New" pitchFamily="49" charset="0"/>
+              </a:rPr>
+              <a:t>group </a:t>
+            </a:r>
+            <a:r>
+              <a:rPr lang="en-GB" sz="800" b="1" dirty="0" smtClean="0">
+                <a:latin typeface="+mj-lt"/>
+                <a:cs typeface="Courier New" pitchFamily="49" charset="0"/>
+              </a:rPr>
+              <a:t>ID"/&gt;</a:t>
+            </a:r>
+          </a:p>
+          <a:p>
+            <a:r>
+              <a:rPr lang="en-GB" sz="800" b="1" dirty="0" smtClean="0">
+                <a:latin typeface="+mj-lt"/>
+                <a:cs typeface="Courier New" pitchFamily="49" charset="0"/>
+              </a:rPr>
+              <a:t>    &lt;</a:t>
+            </a:r>
+            <a:r>
+              <a:rPr lang="en-GB" sz="800" b="1" dirty="0" err="1" smtClean="0">
+                <a:latin typeface="+mj-lt"/>
+                <a:cs typeface="Courier New" pitchFamily="49" charset="0"/>
+              </a:rPr>
+              <a:t>cvParam</a:t>
+            </a:r>
+            <a:r>
+              <a:rPr lang="en-GB" sz="800" b="1" dirty="0" smtClean="0">
+                <a:latin typeface="+mj-lt"/>
+                <a:cs typeface="Courier New" pitchFamily="49" charset="0"/>
+              </a:rPr>
+              <a:t> accession="MS:1001868" </a:t>
+            </a:r>
+            <a:r>
+              <a:rPr lang="en-GB" sz="800" b="1" dirty="0" err="1" smtClean="0">
+                <a:latin typeface="+mj-lt"/>
+                <a:cs typeface="Courier New" pitchFamily="49" charset="0"/>
+              </a:rPr>
+              <a:t>cvRef</a:t>
+            </a:r>
+            <a:r>
+              <a:rPr lang="en-GB" sz="800" b="1" dirty="0" smtClean="0">
+                <a:latin typeface="+mj-lt"/>
+                <a:cs typeface="Courier New" pitchFamily="49" charset="0"/>
+              </a:rPr>
+              <a:t>="PSI-MS" value</a:t>
+            </a:r>
+            <a:r>
+              <a:rPr lang="en-GB" sz="800" b="1" dirty="0">
+                <a:latin typeface="+mj-lt"/>
+                <a:cs typeface="Courier New" pitchFamily="49" charset="0"/>
+              </a:rPr>
+              <a:t>="distinct peptide-level q-value" </a:t>
+            </a:r>
+            <a:r>
+              <a:rPr lang="en-GB" sz="800" b="1" dirty="0" smtClean="0">
+                <a:latin typeface="+mj-lt"/>
+                <a:cs typeface="Courier New" pitchFamily="49" charset="0"/>
+              </a:rPr>
+              <a:t>name="6.82544339808495E-4"/&gt;</a:t>
+            </a:r>
+          </a:p>
+          <a:p>
+            <a:r>
+              <a:rPr lang="en-GB" sz="800" b="1" dirty="0" smtClean="0">
+                <a:latin typeface="+mj-lt"/>
+                <a:cs typeface="Courier New" pitchFamily="49" charset="0"/>
+              </a:rPr>
+              <a:t>    &lt;</a:t>
+            </a:r>
+            <a:r>
+              <a:rPr lang="en-GB" sz="800" b="1" dirty="0" err="1" smtClean="0">
+                <a:latin typeface="+mj-lt"/>
+                <a:cs typeface="Courier New" pitchFamily="49" charset="0"/>
+              </a:rPr>
+              <a:t>cvParam</a:t>
+            </a:r>
+            <a:r>
+              <a:rPr lang="en-GB" sz="800" b="1" dirty="0" smtClean="0">
+                <a:latin typeface="+mj-lt"/>
+                <a:cs typeface="Courier New" pitchFamily="49" charset="0"/>
+              </a:rPr>
+              <a:t> accession="MS:1002500" </a:t>
+            </a:r>
+            <a:r>
+              <a:rPr lang="en-GB" sz="800" b="1" dirty="0" err="1" smtClean="0">
+                <a:latin typeface="+mj-lt"/>
+                <a:cs typeface="Courier New" pitchFamily="49" charset="0"/>
+              </a:rPr>
+              <a:t>cvRef</a:t>
+            </a:r>
+            <a:r>
+              <a:rPr lang="en-GB" sz="800" b="1" dirty="0" smtClean="0">
+                <a:latin typeface="+mj-lt"/>
+                <a:cs typeface="Courier New" pitchFamily="49" charset="0"/>
+              </a:rPr>
+              <a:t>="PSI-MS" value="peptide passes threshold" name="true"/&gt;</a:t>
+            </a:r>
+          </a:p>
+          <a:p>
+            <a:r>
+              <a:rPr lang="en-GB" sz="800" dirty="0" smtClean="0">
+                <a:latin typeface="+mj-lt"/>
+                <a:cs typeface="Courier New" pitchFamily="49" charset="0"/>
+              </a:rPr>
+              <a:t>  &lt;/</a:t>
+            </a:r>
+            <a:r>
               <a:rPr lang="en-GB" sz="800" dirty="0" err="1" smtClean="0">
                 <a:latin typeface="+mj-lt"/>
                 <a:cs typeface="Courier New" pitchFamily="49" charset="0"/>
               </a:rPr>
+              <a:t>SpectrumIdentificationItem</a:t>
+            </a:r>
+            <a:r>
+              <a:rPr lang="en-GB" sz="800" dirty="0" smtClean="0">
+                <a:latin typeface="+mj-lt"/>
+                <a:cs typeface="Courier New" pitchFamily="49" charset="0"/>
+              </a:rPr>
+              <a:t>&gt;</a:t>
+            </a:r>
+          </a:p>
+          <a:p>
+            <a:r>
+              <a:rPr lang="en-GB" sz="800" dirty="0" smtClean="0">
+                <a:latin typeface="+mj-lt"/>
+                <a:cs typeface="Courier New" pitchFamily="49" charset="0"/>
+              </a:rPr>
+              <a:t>  &lt;</a:t>
+            </a:r>
+            <a:r>
+              <a:rPr lang="en-GB" sz="800" dirty="0" err="1" smtClean="0">
+                <a:latin typeface="+mj-lt"/>
+                <a:cs typeface="Courier New" pitchFamily="49" charset="0"/>
+              </a:rPr>
               <a:t>cvParam</a:t>
             </a:r>
             <a:r>
@@ -4478,18 +4651,7 @@
                 <a:latin typeface="+mj-lt"/>
                 <a:cs typeface="Courier New" pitchFamily="49" charset="0"/>
               </a:rPr>
-              <a:t> accession="</a:t>
-            </a:r>
-            <a:r>
-              <a:rPr lang="en-GB" sz="800" dirty="0" smtClean="0"/>
-              <a:t>MS:1002520</a:t>
-            </a:r>
-            <a:r>
-              <a:rPr lang="en-GB" sz="800" dirty="0" smtClean="0">
-                <a:latin typeface="+mj-lt"/>
-                <a:cs typeface="Courier New" pitchFamily="49" charset="0"/>
-              </a:rPr>
-              <a:t>" </a:t>
+              <a:t> accession="MS:1000796" </a:t>
             </a:r>
             <a:r>
               <a:rPr lang="en-GB" sz="800" dirty="0" err="1" smtClean="0">
@@ -4503,621 +4665,473 @@
                 <a:latin typeface="+mj-lt"/>
                 <a:cs typeface="Courier New" pitchFamily="49" charset="0"/>
               </a:rPr>
+              <a:t>="PSI-MS" value="55.6021.6024.3.dta" name="spectrum title"/&gt;</a:t>
+            </a:r>
+          </a:p>
+          <a:p>
+            <a:r>
+              <a:rPr lang="en-GB" sz="800" dirty="0" smtClean="0">
+                <a:latin typeface="+mj-lt"/>
+                <a:cs typeface="Courier New" pitchFamily="49" charset="0"/>
+              </a:rPr>
+              <a:t>&lt;/</a:t>
+            </a:r>
+            <a:r>
+              <a:rPr lang="en-GB" sz="800" dirty="0" err="1" smtClean="0">
+                <a:latin typeface="+mj-lt"/>
+                <a:cs typeface="Courier New" pitchFamily="49" charset="0"/>
+              </a:rPr>
+              <a:t>SpectrumIdentificationResult</a:t>
+            </a:r>
+            <a:r>
+              <a:rPr lang="en-GB" sz="800" dirty="0" smtClean="0">
+                <a:latin typeface="+mj-lt"/>
+                <a:cs typeface="Courier New" pitchFamily="49" charset="0"/>
+              </a:rPr>
+              <a:t>&gt;</a:t>
+            </a:r>
+          </a:p>
+          <a:p>
+            <a:r>
+              <a:rPr lang="en-GB" sz="800" dirty="0" smtClean="0">
+                <a:latin typeface="+mj-lt"/>
+                <a:cs typeface="Courier New" pitchFamily="49" charset="0"/>
+              </a:rPr>
+              <a:t>&lt;</a:t>
+            </a:r>
+            <a:r>
+              <a:rPr lang="en-GB" sz="800" dirty="0" err="1" smtClean="0">
+                <a:latin typeface="+mj-lt"/>
+                <a:cs typeface="Courier New" pitchFamily="49" charset="0"/>
+              </a:rPr>
+              <a:t>SpectrumIdentificationResult</a:t>
+            </a:r>
+            <a:r>
+              <a:rPr lang="en-GB" sz="800" dirty="0" smtClean="0">
+                <a:latin typeface="+mj-lt"/>
+                <a:cs typeface="Courier New" pitchFamily="49" charset="0"/>
+              </a:rPr>
+              <a:t> </a:t>
+            </a:r>
+            <a:r>
+              <a:rPr lang="en-GB" sz="800" dirty="0" err="1" smtClean="0">
+                <a:latin typeface="+mj-lt"/>
+                <a:cs typeface="Courier New" pitchFamily="49" charset="0"/>
+              </a:rPr>
+              <a:t>spectraData_ref</a:t>
+            </a:r>
+            <a:r>
+              <a:rPr lang="en-GB" sz="800" dirty="0" smtClean="0">
+                <a:latin typeface="+mj-lt"/>
+                <a:cs typeface="Courier New" pitchFamily="49" charset="0"/>
+              </a:rPr>
+              <a:t>="SID_1" </a:t>
+            </a:r>
+            <a:r>
+              <a:rPr lang="en-GB" sz="800" dirty="0" err="1" smtClean="0">
+                <a:latin typeface="+mj-lt"/>
+                <a:cs typeface="Courier New" pitchFamily="49" charset="0"/>
+              </a:rPr>
+              <a:t>spectrumID</a:t>
+            </a:r>
+            <a:r>
+              <a:rPr lang="en-GB" sz="800" dirty="0" smtClean="0">
+                <a:latin typeface="+mj-lt"/>
+                <a:cs typeface="Courier New" pitchFamily="49" charset="0"/>
+              </a:rPr>
+              <a:t>="index=121" id="SIR_6"&gt;</a:t>
+            </a:r>
+          </a:p>
+          <a:p>
+            <a:r>
+              <a:rPr lang="en-GB" sz="800" dirty="0" smtClean="0">
+                <a:latin typeface="+mj-lt"/>
+                <a:cs typeface="Courier New" pitchFamily="49" charset="0"/>
+              </a:rPr>
+              <a:t>  &lt;</a:t>
+            </a:r>
+            <a:r>
+              <a:rPr lang="en-GB" sz="800" dirty="0" err="1" smtClean="0">
+                <a:latin typeface="+mj-lt"/>
+                <a:cs typeface="Courier New" pitchFamily="49" charset="0"/>
+              </a:rPr>
+              <a:t>SpectrumIdentificationItem</a:t>
+            </a:r>
+            <a:r>
+              <a:rPr lang="en-GB" sz="800" dirty="0" smtClean="0">
+                <a:latin typeface="+mj-lt"/>
+                <a:cs typeface="Courier New" pitchFamily="49" charset="0"/>
+              </a:rPr>
+              <a:t> </a:t>
+            </a:r>
+            <a:r>
+              <a:rPr lang="en-GB" sz="800" dirty="0" err="1" smtClean="0">
+                <a:latin typeface="+mj-lt"/>
+                <a:cs typeface="Courier New" pitchFamily="49" charset="0"/>
+              </a:rPr>
+              <a:t>passThreshold</a:t>
+            </a:r>
+            <a:r>
+              <a:rPr lang="en-GB" sz="800" dirty="0" smtClean="0">
+                <a:latin typeface="+mj-lt"/>
+                <a:cs typeface="Courier New" pitchFamily="49" charset="0"/>
+              </a:rPr>
+              <a:t>="false" rank="1" </a:t>
+            </a:r>
+            <a:r>
+              <a:rPr lang="en-GB" sz="800" dirty="0" err="1" smtClean="0">
+                <a:latin typeface="+mj-lt"/>
+                <a:cs typeface="Courier New" pitchFamily="49" charset="0"/>
+              </a:rPr>
+              <a:t>peptide_ref</a:t>
+            </a:r>
+            <a:r>
+              <a:rPr lang="en-GB" sz="800" dirty="0" smtClean="0">
+                <a:latin typeface="+mj-lt"/>
+                <a:cs typeface="Courier New" pitchFamily="49" charset="0"/>
+              </a:rPr>
+              <a:t>="SSHAPVPHGVRLWK" </a:t>
+            </a:r>
+            <a:r>
+              <a:rPr lang="en-GB" sz="800" dirty="0" err="1" smtClean="0">
+                <a:latin typeface="+mj-lt"/>
+                <a:cs typeface="Courier New" pitchFamily="49" charset="0"/>
+              </a:rPr>
+              <a:t>calculatedMassToCharge</a:t>
+            </a:r>
+            <a:r>
+              <a:rPr lang="en-GB" sz="800" dirty="0" smtClean="0">
+                <a:latin typeface="+mj-lt"/>
+                <a:cs typeface="Courier New" pitchFamily="49" charset="0"/>
+              </a:rPr>
+              <a:t>="523.284" </a:t>
+            </a:r>
+            <a:r>
+              <a:rPr lang="en-GB" sz="800" dirty="0" err="1" smtClean="0">
+                <a:latin typeface="+mj-lt"/>
+                <a:cs typeface="Courier New" pitchFamily="49" charset="0"/>
+              </a:rPr>
+              <a:t>experimentalMassToCharge</a:t>
+            </a:r>
+            <a:r>
+              <a:rPr lang="en-GB" sz="800" dirty="0" smtClean="0">
+                <a:latin typeface="+mj-lt"/>
+                <a:cs typeface="Courier New" pitchFamily="49" charset="0"/>
+              </a:rPr>
+              <a:t>="523.194" </a:t>
+            </a:r>
+            <a:r>
+              <a:rPr lang="en-GB" sz="800" dirty="0" err="1" smtClean="0">
+                <a:latin typeface="+mj-lt"/>
+                <a:cs typeface="Courier New" pitchFamily="49" charset="0"/>
+              </a:rPr>
+              <a:t>chargeState</a:t>
+            </a:r>
+            <a:r>
+              <a:rPr lang="en-GB" sz="800" dirty="0" smtClean="0">
+                <a:latin typeface="+mj-lt"/>
+                <a:cs typeface="Courier New" pitchFamily="49" charset="0"/>
+              </a:rPr>
+              <a:t>="3" id="SII_6_1"&gt;</a:t>
+            </a:r>
+          </a:p>
+          <a:p>
+            <a:r>
+              <a:rPr lang="en-GB" sz="800" dirty="0" smtClean="0">
+                <a:latin typeface="+mj-lt"/>
+                <a:cs typeface="Courier New" pitchFamily="49" charset="0"/>
+              </a:rPr>
+              <a:t>    &lt;</a:t>
+            </a:r>
+            <a:r>
+              <a:rPr lang="en-GB" sz="800" dirty="0" err="1" smtClean="0">
+                <a:latin typeface="+mj-lt"/>
+                <a:cs typeface="Courier New" pitchFamily="49" charset="0"/>
+              </a:rPr>
+              <a:t>PeptideEvidenceRef</a:t>
+            </a:r>
+            <a:r>
+              <a:rPr lang="en-GB" sz="800" dirty="0" smtClean="0">
+                <a:latin typeface="+mj-lt"/>
+                <a:cs typeface="Courier New" pitchFamily="49" charset="0"/>
+              </a:rPr>
+              <a:t> </a:t>
+            </a:r>
+            <a:r>
+              <a:rPr lang="en-GB" sz="800" dirty="0" err="1" smtClean="0">
+                <a:latin typeface="+mj-lt"/>
+                <a:cs typeface="Courier New" pitchFamily="49" charset="0"/>
+              </a:rPr>
+              <a:t>peptideEvidence_ref</a:t>
+            </a:r>
+            <a:r>
+              <a:rPr lang="en-GB" sz="800" dirty="0" smtClean="0">
+                <a:latin typeface="+mj-lt"/>
+                <a:cs typeface="Courier New" pitchFamily="49" charset="0"/>
+              </a:rPr>
+              <a:t>="PE5_2_9"/&gt;</a:t>
+            </a:r>
+          </a:p>
+          <a:p>
+            <a:r>
+              <a:rPr lang="en-GB" sz="800" dirty="0" smtClean="0">
+                <a:latin typeface="+mj-lt"/>
+                <a:cs typeface="Courier New" pitchFamily="49" charset="0"/>
+              </a:rPr>
+              <a:t>    &lt;</a:t>
+            </a:r>
+            <a:r>
+              <a:rPr lang="en-GB" sz="800" dirty="0" err="1" smtClean="0">
+                <a:latin typeface="+mj-lt"/>
+                <a:cs typeface="Courier New" pitchFamily="49" charset="0"/>
+              </a:rPr>
+              <a:t>cvParam</a:t>
+            </a:r>
+            <a:r>
+              <a:rPr lang="en-GB" sz="800" dirty="0" smtClean="0">
+                <a:latin typeface="+mj-lt"/>
+                <a:cs typeface="Courier New" pitchFamily="49" charset="0"/>
+              </a:rPr>
+              <a:t> accession="MS:1001328" </a:t>
+            </a:r>
+            <a:r>
+              <a:rPr lang="en-GB" sz="800" dirty="0" err="1" smtClean="0">
+                <a:latin typeface="+mj-lt"/>
+                <a:cs typeface="Courier New" pitchFamily="49" charset="0"/>
+              </a:rPr>
+              <a:t>cvRef</a:t>
+            </a:r>
+            <a:r>
+              <a:rPr lang="en-GB" sz="800" dirty="0" smtClean="0">
+                <a:latin typeface="+mj-lt"/>
+                <a:cs typeface="Courier New" pitchFamily="49" charset="0"/>
+              </a:rPr>
+              <a:t>="PSI-MS" value="4.05370337630321" name="</a:t>
+            </a:r>
+            <a:r>
+              <a:rPr lang="en-GB" sz="800" dirty="0" err="1" smtClean="0">
+                <a:latin typeface="+mj-lt"/>
+                <a:cs typeface="Courier New" pitchFamily="49" charset="0"/>
+              </a:rPr>
+              <a:t>OMSSA:evalue</a:t>
+            </a:r>
+            <a:r>
+              <a:rPr lang="en-GB" sz="800" dirty="0" smtClean="0">
+                <a:latin typeface="+mj-lt"/>
+                <a:cs typeface="Courier New" pitchFamily="49" charset="0"/>
+              </a:rPr>
+              <a:t>"/&gt;</a:t>
+            </a:r>
+          </a:p>
+          <a:p>
+            <a:r>
+              <a:rPr lang="en-GB" sz="800" dirty="0" smtClean="0">
+                <a:latin typeface="+mj-lt"/>
+                <a:cs typeface="Courier New" pitchFamily="49" charset="0"/>
+              </a:rPr>
+              <a:t>    &lt;</a:t>
+            </a:r>
+            <a:r>
+              <a:rPr lang="en-GB" sz="800" dirty="0" err="1" smtClean="0">
+                <a:latin typeface="+mj-lt"/>
+                <a:cs typeface="Courier New" pitchFamily="49" charset="0"/>
+              </a:rPr>
+              <a:t>cvParam</a:t>
+            </a:r>
+            <a:r>
+              <a:rPr lang="en-GB" sz="800" dirty="0" smtClean="0">
+                <a:latin typeface="+mj-lt"/>
+                <a:cs typeface="Courier New" pitchFamily="49" charset="0"/>
+              </a:rPr>
+              <a:t> accession="MS:1001329" </a:t>
+            </a:r>
+            <a:r>
+              <a:rPr lang="en-GB" sz="800" dirty="0" err="1" smtClean="0">
+                <a:latin typeface="+mj-lt"/>
+                <a:cs typeface="Courier New" pitchFamily="49" charset="0"/>
+              </a:rPr>
+              <a:t>cvRef</a:t>
+            </a:r>
+            <a:r>
+              <a:rPr lang="en-GB" sz="800" dirty="0" smtClean="0">
+                <a:latin typeface="+mj-lt"/>
+                <a:cs typeface="Courier New" pitchFamily="49" charset="0"/>
+              </a:rPr>
+              <a:t>="PSI-MS" value="7.82544339808495E-4" name="</a:t>
+            </a:r>
+            <a:r>
+              <a:rPr lang="en-GB" sz="800" dirty="0" err="1" smtClean="0">
+                <a:latin typeface="+mj-lt"/>
+                <a:cs typeface="Courier New" pitchFamily="49" charset="0"/>
+              </a:rPr>
+              <a:t>OMSSA:pvalue</a:t>
+            </a:r>
+            <a:r>
+              <a:rPr lang="en-GB" sz="800" dirty="0" smtClean="0">
+                <a:latin typeface="+mj-lt"/>
+                <a:cs typeface="Courier New" pitchFamily="49" charset="0"/>
+              </a:rPr>
+              <a:t>"/&gt;</a:t>
+            </a:r>
+          </a:p>
+          <a:p>
+            <a:r>
+              <a:rPr lang="en-GB" sz="800" b="1" dirty="0" smtClean="0">
+                <a:latin typeface="+mj-lt"/>
+                <a:cs typeface="Courier New" pitchFamily="49" charset="0"/>
+              </a:rPr>
+              <a:t>    &lt;</a:t>
+            </a:r>
+            <a:r>
+              <a:rPr lang="en-GB" sz="800" b="1" dirty="0" err="1" smtClean="0">
+                <a:latin typeface="+mj-lt"/>
+                <a:cs typeface="Courier New" pitchFamily="49" charset="0"/>
+              </a:rPr>
+              <a:t>cvParam</a:t>
+            </a:r>
+            <a:r>
+              <a:rPr lang="en-GB" sz="800" b="1" dirty="0" smtClean="0">
+                <a:latin typeface="+mj-lt"/>
+                <a:cs typeface="Courier New" pitchFamily="49" charset="0"/>
+              </a:rPr>
+              <a:t> accession="MS:1002520" </a:t>
+            </a:r>
+            <a:r>
+              <a:rPr lang="en-GB" sz="800" b="1" dirty="0" err="1" smtClean="0">
+                <a:latin typeface="+mj-lt"/>
+                <a:cs typeface="Courier New" pitchFamily="49" charset="0"/>
+              </a:rPr>
+              <a:t>cvRef</a:t>
+            </a:r>
+            <a:r>
+              <a:rPr lang="en-GB" sz="800" b="1" dirty="0" smtClean="0">
+                <a:latin typeface="+mj-lt"/>
+                <a:cs typeface="Courier New" pitchFamily="49" charset="0"/>
+              </a:rPr>
               <a:t>="PSI-MS" value="SSHAPVPHGVRLWK" name="peptide </a:t>
             </a:r>
             <a:r>
-              <a:rPr lang="en-GB" sz="800" dirty="0">
+              <a:rPr lang="en-GB" sz="800" b="1" dirty="0">
                 <a:latin typeface="+mj-lt"/>
                 <a:cs typeface="Courier New" pitchFamily="49" charset="0"/>
               </a:rPr>
               <a:t>group </a:t>
             </a:r>
             <a:r>
-              <a:rPr lang="en-GB" sz="800" dirty="0" smtClean="0">
-                <a:latin typeface="+mj-lt"/>
-                <a:cs typeface="Courier New" pitchFamily="49" charset="0"/>
-              </a:rPr>
-              <a:t>ID"/&gt;</a:t>
-            </a:r>
-          </a:p>
-          <a:p>
-            <a:r>
-              <a:rPr lang="en-GB" sz="800" dirty="0" smtClean="0">
+              <a:rPr lang="en-GB" sz="800" b="1" dirty="0" smtClean="0">
+                <a:latin typeface="+mj-lt"/>
+                <a:cs typeface="Courier New" pitchFamily="49" charset="0"/>
+              </a:rPr>
+              <a:t>ID"/&gt; </a:t>
+            </a:r>
+            <a:r>
+              <a:rPr lang="en-GB" sz="800" dirty="0" smtClean="0">
+                <a:latin typeface="+mj-lt"/>
+                <a:cs typeface="Courier New" pitchFamily="49" charset="0"/>
+              </a:rPr>
+              <a:t>          </a:t>
+            </a:r>
+          </a:p>
+          <a:p>
+            <a:r>
+              <a:rPr lang="en-GB" sz="800" dirty="0" smtClean="0">
+                <a:latin typeface="+mj-lt"/>
+                <a:cs typeface="Courier New" pitchFamily="49" charset="0"/>
+              </a:rPr>
+              <a:t>    </a:t>
+            </a:r>
+            <a:r>
+              <a:rPr lang="en-GB" sz="800" b="1" dirty="0" smtClean="0">
+                <a:latin typeface="+mj-lt"/>
+                <a:cs typeface="Courier New" pitchFamily="49" charset="0"/>
+              </a:rPr>
+              <a:t>&lt;</a:t>
+            </a:r>
+            <a:r>
+              <a:rPr lang="en-GB" sz="800" b="1" dirty="0" err="1" smtClean="0">
+                <a:latin typeface="+mj-lt"/>
+                <a:cs typeface="Courier New" pitchFamily="49" charset="0"/>
+              </a:rPr>
+              <a:t>cvParam</a:t>
+            </a:r>
+            <a:r>
+              <a:rPr lang="en-GB" sz="800" b="1" dirty="0" smtClean="0">
+                <a:latin typeface="+mj-lt"/>
+                <a:cs typeface="Courier New" pitchFamily="49" charset="0"/>
+              </a:rPr>
+              <a:t> accession="MS:1001868" </a:t>
+            </a:r>
+            <a:r>
+              <a:rPr lang="en-GB" sz="800" b="1" dirty="0" err="1" smtClean="0">
+                <a:latin typeface="+mj-lt"/>
+                <a:cs typeface="Courier New" pitchFamily="49" charset="0"/>
+              </a:rPr>
+              <a:t>cvRef</a:t>
+            </a:r>
+            <a:r>
+              <a:rPr lang="en-GB" sz="800" b="1" dirty="0" smtClean="0">
+                <a:latin typeface="+mj-lt"/>
+                <a:cs typeface="Courier New" pitchFamily="49" charset="0"/>
+              </a:rPr>
+              <a:t>="PSI-MS" value="</a:t>
+            </a:r>
+            <a:r>
+              <a:rPr lang="en-GB" sz="800" b="1" dirty="0" smtClean="0">
+                <a:latin typeface="+mj-lt"/>
+              </a:rPr>
+              <a:t>distinct </a:t>
+            </a:r>
+            <a:r>
+              <a:rPr lang="en-GB" sz="800" b="1" dirty="0">
+                <a:latin typeface="+mj-lt"/>
+              </a:rPr>
+              <a:t>peptide-level </a:t>
+            </a:r>
+            <a:r>
+              <a:rPr lang="en-GB" sz="800" b="1" dirty="0" smtClean="0">
+                <a:latin typeface="+mj-lt"/>
+              </a:rPr>
+              <a:t>q-value</a:t>
+            </a:r>
+            <a:r>
+              <a:rPr lang="en-GB" sz="800" b="1" dirty="0" smtClean="0">
+                <a:latin typeface="+mj-lt"/>
+                <a:cs typeface="Courier New" pitchFamily="49" charset="0"/>
+              </a:rPr>
+              <a:t>" name="6.82544339808495E-4"/&gt;</a:t>
+            </a:r>
+          </a:p>
+          <a:p>
+            <a:r>
+              <a:rPr lang="en-GB" sz="800" b="1" dirty="0" smtClean="0">
                 <a:latin typeface="+mj-lt"/>
                 <a:cs typeface="Courier New" pitchFamily="49" charset="0"/>
               </a:rPr>
               <a:t>    &lt;</a:t>
             </a:r>
             <a:r>
-              <a:rPr lang="en-GB" sz="800" dirty="0" err="1" smtClean="0">
+              <a:rPr lang="en-GB" sz="800" b="1" dirty="0" err="1" smtClean="0">
                 <a:latin typeface="+mj-lt"/>
                 <a:cs typeface="Courier New" pitchFamily="49" charset="0"/>
               </a:rPr>
               <a:t>cvParam</a:t>
             </a:r>
             <a:r>
-              <a:rPr lang="en-GB" sz="800" dirty="0" smtClean="0">
-                <a:latin typeface="+mj-lt"/>
-                <a:cs typeface="Courier New" pitchFamily="49" charset="0"/>
-              </a:rPr>
-              <a:t> accession="MS:1001868" </a:t>
-            </a:r>
-            <a:r>
-              <a:rPr lang="en-GB" sz="800" dirty="0" err="1" smtClean="0">
+              <a:rPr lang="en-GB" sz="800" b="1" dirty="0" smtClean="0">
+                <a:latin typeface="+mj-lt"/>
+                <a:cs typeface="Courier New" pitchFamily="49" charset="0"/>
+              </a:rPr>
+              <a:t> accession="MS:1002500" </a:t>
+            </a:r>
+            <a:r>
+              <a:rPr lang="en-GB" sz="800" b="1" dirty="0" err="1" smtClean="0">
                 <a:latin typeface="+mj-lt"/>
                 <a:cs typeface="Courier New" pitchFamily="49" charset="0"/>
               </a:rPr>
               <a:t>cvRef</a:t>
             </a:r>
             <a:r>
-              <a:rPr lang="en-GB" sz="800" dirty="0" smtClean="0">
-                <a:latin typeface="+mj-lt"/>
-                <a:cs typeface="Courier New" pitchFamily="49" charset="0"/>
-              </a:rPr>
-              <a:t>="PSI-MS" value</a:t>
-            </a:r>
-            <a:r>
-              <a:rPr lang="en-GB" sz="800" dirty="0">
-                <a:latin typeface="+mj-lt"/>
-                <a:cs typeface="Courier New" pitchFamily="49" charset="0"/>
-              </a:rPr>
-              <a:t>="distinct peptide-level q-value" </a:t>
-            </a:r>
-            <a:r>
-              <a:rPr lang="en-GB" sz="800" dirty="0" smtClean="0">
-                <a:latin typeface="+mj-lt"/>
-                <a:cs typeface="Courier New" pitchFamily="49" charset="0"/>
-              </a:rPr>
-              <a:t>name="6.82544339808495E-4"/&gt;</a:t>
-            </a:r>
-          </a:p>
-          <a:p>
-            <a:r>
-              <a:rPr lang="en-GB" sz="800" dirty="0" smtClean="0">
-                <a:latin typeface="+mj-lt"/>
-                <a:cs typeface="Courier New" pitchFamily="49" charset="0"/>
-              </a:rPr>
-              <a:t>    &lt;</a:t>
-            </a:r>
-            <a:r>
-              <a:rPr lang="en-GB" sz="800" dirty="0" err="1" smtClean="0">
-                <a:latin typeface="+mj-lt"/>
-                <a:cs typeface="Courier New" pitchFamily="49" charset="0"/>
-              </a:rPr>
-              <a:t>cvParam</a:t>
-            </a:r>
-            <a:r>
-              <a:rPr lang="en-GB" sz="800" dirty="0" smtClean="0">
-                <a:latin typeface="+mj-lt"/>
-                <a:cs typeface="Courier New" pitchFamily="49" charset="0"/>
-              </a:rPr>
-              <a:t> accession="MS:1002500" </a:t>
-            </a:r>
-            <a:r>
-              <a:rPr lang="en-GB" sz="800" dirty="0" err="1" smtClean="0">
-                <a:latin typeface="+mj-lt"/>
-                <a:cs typeface="Courier New" pitchFamily="49" charset="0"/>
-              </a:rPr>
-              <a:t>cvRef</a:t>
-            </a:r>
-            <a:r>
-              <a:rPr lang="en-GB" sz="800" dirty="0" smtClean="0">
-                <a:latin typeface="+mj-lt"/>
-                <a:cs typeface="Courier New" pitchFamily="49" charset="0"/>
-              </a:rPr>
-              <a:t>="PSI-MS" value="peptide passes threshold" name="true"/&gt;</a:t>
-            </a:r>
-          </a:p>
-          <a:p>
-            <a:r>
-              <a:rPr lang="en-GB" sz="800" dirty="0" smtClean="0">
-                <a:latin typeface="+mj-lt"/>
-                <a:cs typeface="Courier New" pitchFamily="49" charset="0"/>
-              </a:rPr>
-              <a:t>  &lt;/</a:t>
-            </a:r>
-            <a:r>
-              <a:rPr lang="en-GB" sz="800" dirty="0" err="1" smtClean="0">
-                <a:latin typeface="+mj-lt"/>
-                <a:cs typeface="Courier New" pitchFamily="49" charset="0"/>
-              </a:rPr>
-              <a:t>SpectrumIdentificationItem</a:t>
-            </a:r>
-            <a:r>
-              <a:rPr lang="en-GB" sz="800" dirty="0" smtClean="0">
-                <a:latin typeface="+mj-lt"/>
-                <a:cs typeface="Courier New" pitchFamily="49" charset="0"/>
-              </a:rPr>
-              <a:t>&gt;</a:t>
-            </a:r>
-          </a:p>
-          <a:p>
-            <a:r>
-              <a:rPr lang="en-GB" sz="800" dirty="0" smtClean="0">
-                <a:latin typeface="+mj-lt"/>
-                <a:cs typeface="Courier New" pitchFamily="49" charset="0"/>
-              </a:rPr>
-              <a:t>  &lt;</a:t>
-            </a:r>
-            <a:r>
-              <a:rPr lang="en-GB" sz="800" dirty="0" err="1" smtClean="0">
-                <a:latin typeface="+mj-lt"/>
-                <a:cs typeface="Courier New" pitchFamily="49" charset="0"/>
-              </a:rPr>
-              <a:t>cvParam</a:t>
-            </a:r>
-            <a:r>
-              <a:rPr lang="en-GB" sz="800" dirty="0" smtClean="0">
-                <a:latin typeface="+mj-lt"/>
-                <a:cs typeface="Courier New" pitchFamily="49" charset="0"/>
-              </a:rPr>
-              <a:t> accession="MS:1000796" </a:t>
-            </a:r>
-            <a:r>
-              <a:rPr lang="en-GB" sz="800" dirty="0" err="1" smtClean="0">
-                <a:latin typeface="+mj-lt"/>
-                <a:cs typeface="Courier New" pitchFamily="49" charset="0"/>
-              </a:rPr>
-              <a:t>cvRef</a:t>
-            </a:r>
-            <a:r>
-              <a:rPr lang="en-GB" sz="800" dirty="0" smtClean="0">
-                <a:latin typeface="+mj-lt"/>
-                <a:cs typeface="Courier New" pitchFamily="49" charset="0"/>
-              </a:rPr>
-              <a:t>="PSI-MS" value="55.6021.6024.3.dta" name="spectrum title"/&gt;</a:t>
-            </a:r>
-          </a:p>
-          <a:p>
-            <a:r>
-              <a:rPr lang="en-GB" sz="800" dirty="0" smtClean="0">
-                <a:latin typeface="+mj-lt"/>
-                <a:cs typeface="Courier New" pitchFamily="49" charset="0"/>
-              </a:rPr>
-              <a:t>&lt;/</a:t>
-            </a:r>
-            <a:r>
-              <a:rPr lang="en-GB" sz="800" dirty="0" err="1" smtClean="0">
-                <a:latin typeface="+mj-lt"/>
-                <a:cs typeface="Courier New" pitchFamily="49" charset="0"/>
-              </a:rPr>
-              <a:t>SpectrumIdentificationResult</a:t>
-            </a:r>
-            <a:r>
-              <a:rPr lang="en-GB" sz="800" dirty="0" smtClean="0">
-                <a:latin typeface="+mj-lt"/>
-                <a:cs typeface="Courier New" pitchFamily="49" charset="0"/>
-              </a:rPr>
-              <a:t>&gt;</a:t>
-            </a:r>
-          </a:p>
-          <a:p>
-            <a:r>
-              <a:rPr lang="en-GB" sz="800" dirty="0" smtClean="0">
-                <a:latin typeface="+mj-lt"/>
-                <a:cs typeface="Courier New" pitchFamily="49" charset="0"/>
-              </a:rPr>
-              <a:t>&lt;</a:t>
-            </a:r>
-            <a:r>
-              <a:rPr lang="en-GB" sz="800" dirty="0" err="1" smtClean="0">
-                <a:latin typeface="+mj-lt"/>
-                <a:cs typeface="Courier New" pitchFamily="49" charset="0"/>
-              </a:rPr>
-              <a:t>SpectrumIdentificationResult</a:t>
-            </a:r>
-            <a:r>
-              <a:rPr lang="en-GB" sz="800" dirty="0" smtClean="0">
-                <a:latin typeface="+mj-lt"/>
-                <a:cs typeface="Courier New" pitchFamily="49" charset="0"/>
-              </a:rPr>
-              <a:t> </a:t>
-            </a:r>
-            <a:r>
-              <a:rPr lang="en-GB" sz="800" dirty="0" err="1" smtClean="0">
-                <a:latin typeface="+mj-lt"/>
-                <a:cs typeface="Courier New" pitchFamily="49" charset="0"/>
-              </a:rPr>
-              <a:t>spectraData_ref</a:t>
-            </a:r>
-            <a:r>
-              <a:rPr lang="en-GB" sz="800" dirty="0" smtClean="0">
-                <a:latin typeface="+mj-lt"/>
-                <a:cs typeface="Courier New" pitchFamily="49" charset="0"/>
-              </a:rPr>
-              <a:t>="SID_1" </a:t>
-            </a:r>
-            <a:r>
-              <a:rPr lang="en-GB" sz="800" dirty="0" err="1" smtClean="0">
-                <a:latin typeface="+mj-lt"/>
-                <a:cs typeface="Courier New" pitchFamily="49" charset="0"/>
-              </a:rPr>
-              <a:t>spectrumID</a:t>
-            </a:r>
-            <a:r>
-              <a:rPr lang="en-GB" sz="800" dirty="0" smtClean="0">
-                <a:latin typeface="+mj-lt"/>
-                <a:cs typeface="Courier New" pitchFamily="49" charset="0"/>
-              </a:rPr>
-              <a:t>="index=121" id="SIR_6"&gt;</a:t>
-            </a:r>
-          </a:p>
-          <a:p>
-            <a:r>
-              <a:rPr lang="en-GB" sz="800" dirty="0" smtClean="0">
-                <a:latin typeface="+mj-lt"/>
-                <a:cs typeface="Courier New" pitchFamily="49" charset="0"/>
-              </a:rPr>
-              <a:t>  &lt;</a:t>
-            </a:r>
-            <a:r>
-              <a:rPr lang="en-GB" sz="800" dirty="0" err="1" smtClean="0">
-                <a:latin typeface="+mj-lt"/>
-                <a:cs typeface="Courier New" pitchFamily="49" charset="0"/>
-              </a:rPr>
-              <a:t>SpectrumIdentificationItem</a:t>
-            </a:r>
-            <a:r>
-              <a:rPr lang="en-GB" sz="800" dirty="0" smtClean="0">
-                <a:latin typeface="+mj-lt"/>
-                <a:cs typeface="Courier New" pitchFamily="49" charset="0"/>
-              </a:rPr>
-              <a:t> </a:t>
-            </a:r>
-            <a:r>
-              <a:rPr lang="en-GB" sz="800" dirty="0" err="1" smtClean="0">
-                <a:latin typeface="+mj-lt"/>
-                <a:cs typeface="Courier New" pitchFamily="49" charset="0"/>
-              </a:rPr>
-              <a:t>passThreshold</a:t>
-            </a:r>
-            <a:r>
-              <a:rPr lang="en-GB" sz="800" dirty="0" smtClean="0">
-                <a:latin typeface="+mj-lt"/>
-                <a:cs typeface="Courier New" pitchFamily="49" charset="0"/>
-              </a:rPr>
-              <a:t>="false" rank="1" </a:t>
-            </a:r>
-            <a:r>
-              <a:rPr lang="en-GB" sz="800" dirty="0" err="1" smtClean="0">
-                <a:latin typeface="+mj-lt"/>
-                <a:cs typeface="Courier New" pitchFamily="49" charset="0"/>
-              </a:rPr>
-              <a:t>peptide_ref</a:t>
-            </a:r>
-            <a:r>
-              <a:rPr lang="en-GB" sz="800" dirty="0" smtClean="0">
-                <a:latin typeface="+mj-lt"/>
-                <a:cs typeface="Courier New" pitchFamily="49" charset="0"/>
-              </a:rPr>
-              <a:t>="SSHAPVPHGVRLWK" </a:t>
-            </a:r>
-            <a:r>
-              <a:rPr lang="en-GB" sz="800" dirty="0" err="1" smtClean="0">
-                <a:latin typeface="+mj-lt"/>
-                <a:cs typeface="Courier New" pitchFamily="49" charset="0"/>
-              </a:rPr>
-              <a:t>calculatedMassToCharge</a:t>
-            </a:r>
-            <a:r>
-              <a:rPr lang="en-GB" sz="800" dirty="0" smtClean="0">
-                <a:latin typeface="+mj-lt"/>
-                <a:cs typeface="Courier New" pitchFamily="49" charset="0"/>
-              </a:rPr>
-              <a:t>="523.284" </a:t>
-            </a:r>
-            <a:r>
-              <a:rPr lang="en-GB" sz="800" dirty="0" err="1" smtClean="0">
-                <a:latin typeface="+mj-lt"/>
-                <a:cs typeface="Courier New" pitchFamily="49" charset="0"/>
-              </a:rPr>
-              <a:t>experimentalMassToCharge</a:t>
-            </a:r>
-            <a:r>
-              <a:rPr lang="en-GB" sz="800" dirty="0" smtClean="0">
-                <a:latin typeface="+mj-lt"/>
-                <a:cs typeface="Courier New" pitchFamily="49" charset="0"/>
-              </a:rPr>
-              <a:t>="523.194" </a:t>
-            </a:r>
-            <a:r>
-              <a:rPr lang="en-GB" sz="800" dirty="0" err="1" smtClean="0">
-                <a:latin typeface="+mj-lt"/>
-                <a:cs typeface="Courier New" pitchFamily="49" charset="0"/>
-              </a:rPr>
-              <a:t>chargeState</a:t>
-            </a:r>
-            <a:r>
-              <a:rPr lang="en-GB" sz="800" dirty="0" smtClean="0">
-                <a:latin typeface="+mj-lt"/>
-                <a:cs typeface="Courier New" pitchFamily="49" charset="0"/>
-              </a:rPr>
-              <a:t>="3" id="SII_6_1"&gt;</a:t>
-            </a:r>
-          </a:p>
-          <a:p>
-            <a:r>
-              <a:rPr lang="en-GB" sz="800" dirty="0" smtClean="0">
-                <a:latin typeface="+mj-lt"/>
-                <a:cs typeface="Courier New" pitchFamily="49" charset="0"/>
-              </a:rPr>
-              <a:t>    &lt;</a:t>
-            </a:r>
-            <a:r>
-              <a:rPr lang="en-GB" sz="800" dirty="0" err="1" smtClean="0">
-                <a:latin typeface="+mj-lt"/>
-                <a:cs typeface="Courier New" pitchFamily="49" charset="0"/>
-              </a:rPr>
-              <a:t>PeptideEvidenceRef</a:t>
-            </a:r>
-            <a:r>
-              <a:rPr lang="en-GB" sz="800" dirty="0" smtClean="0">
-                <a:latin typeface="+mj-lt"/>
-                <a:cs typeface="Courier New" pitchFamily="49" charset="0"/>
-              </a:rPr>
-              <a:t> </a:t>
-            </a:r>
-            <a:r>
-              <a:rPr lang="en-GB" sz="800" dirty="0" err="1" smtClean="0">
-                <a:latin typeface="+mj-lt"/>
-                <a:cs typeface="Courier New" pitchFamily="49" charset="0"/>
-              </a:rPr>
-              <a:t>peptideEvidence_ref</a:t>
-            </a:r>
-            <a:r>
-              <a:rPr lang="en-GB" sz="800" dirty="0" smtClean="0">
-                <a:latin typeface="+mj-lt"/>
-                <a:cs typeface="Courier New" pitchFamily="49" charset="0"/>
-              </a:rPr>
-              <a:t>="PE5_2_9"/&gt;</a:t>
-            </a:r>
-          </a:p>
-          <a:p>
-            <a:r>
-              <a:rPr lang="en-GB" sz="800" dirty="0" smtClean="0">
-                <a:latin typeface="+mj-lt"/>
-                <a:cs typeface="Courier New" pitchFamily="49" charset="0"/>
-              </a:rPr>
-              <a:t>    &lt;</a:t>
-            </a:r>
-            <a:r>
-              <a:rPr lang="en-GB" sz="800" dirty="0" err="1" smtClean="0">
-                <a:latin typeface="+mj-lt"/>
-                <a:cs typeface="Courier New" pitchFamily="49" charset="0"/>
-              </a:rPr>
-              <a:t>cvParam</a:t>
-            </a:r>
-            <a:r>
-              <a:rPr lang="en-GB" sz="800" dirty="0" smtClean="0">
-                <a:latin typeface="+mj-lt"/>
-                <a:cs typeface="Courier New" pitchFamily="49" charset="0"/>
-              </a:rPr>
-              <a:t> accession="MS:1001328" </a:t>
-            </a:r>
-            <a:r>
-              <a:rPr lang="en-GB" sz="800" dirty="0" err="1" smtClean="0">
-                <a:latin typeface="+mj-lt"/>
-                <a:cs typeface="Courier New" pitchFamily="49" charset="0"/>
-              </a:rPr>
-              <a:t>cvRef</a:t>
-            </a:r>
-            <a:r>
-              <a:rPr lang="en-GB" sz="800" dirty="0" smtClean="0">
-                <a:latin typeface="+mj-lt"/>
-                <a:cs typeface="Courier New" pitchFamily="49" charset="0"/>
-              </a:rPr>
-              <a:t>="PSI-MS" value="4.05370337630321" name="</a:t>
-            </a:r>
-            <a:r>
-              <a:rPr lang="en-GB" sz="800" dirty="0" err="1" smtClean="0">
-                <a:latin typeface="+mj-lt"/>
-                <a:cs typeface="Courier New" pitchFamily="49" charset="0"/>
-              </a:rPr>
-              <a:t>OMSSA:evalue</a:t>
-            </a:r>
-            <a:r>
-              <a:rPr lang="en-GB" sz="800" dirty="0" smtClean="0">
-                <a:latin typeface="+mj-lt"/>
-                <a:cs typeface="Courier New" pitchFamily="49" charset="0"/>
-              </a:rPr>
-              <a:t>"/&gt;</a:t>
-            </a:r>
-          </a:p>
-          <a:p>
-            <a:r>
-              <a:rPr lang="en-GB" sz="800" dirty="0" smtClean="0">
-                <a:latin typeface="+mj-lt"/>
-                <a:cs typeface="Courier New" pitchFamily="49" charset="0"/>
-              </a:rPr>
-              <a:t>    &lt;</a:t>
-            </a:r>
-            <a:r>
-              <a:rPr lang="en-GB" sz="800" dirty="0" err="1" smtClean="0">
-                <a:latin typeface="+mj-lt"/>
-                <a:cs typeface="Courier New" pitchFamily="49" charset="0"/>
-              </a:rPr>
-              <a:t>cvParam</a:t>
-            </a:r>
-            <a:r>
-              <a:rPr lang="en-GB" sz="800" dirty="0" smtClean="0">
-                <a:latin typeface="+mj-lt"/>
-                <a:cs typeface="Courier New" pitchFamily="49" charset="0"/>
-              </a:rPr>
-              <a:t> accession="MS:1001329" </a:t>
-            </a:r>
-            <a:r>
-              <a:rPr lang="en-GB" sz="800" dirty="0" err="1" smtClean="0">
-                <a:latin typeface="+mj-lt"/>
-                <a:cs typeface="Courier New" pitchFamily="49" charset="0"/>
-              </a:rPr>
-              <a:t>cvRef</a:t>
-            </a:r>
-            <a:r>
-              <a:rPr lang="en-GB" sz="800" dirty="0" smtClean="0">
-                <a:latin typeface="+mj-lt"/>
-                <a:cs typeface="Courier New" pitchFamily="49" charset="0"/>
-              </a:rPr>
-              <a:t>="PSI-MS" value="7.82544339808495E-4" name="</a:t>
-            </a:r>
-            <a:r>
-              <a:rPr lang="en-GB" sz="800" dirty="0" err="1" smtClean="0">
-                <a:latin typeface="+mj-lt"/>
-                <a:cs typeface="Courier New" pitchFamily="49" charset="0"/>
-              </a:rPr>
-              <a:t>OMSSA:pvalue</a:t>
-            </a:r>
-            <a:r>
-              <a:rPr lang="en-GB" sz="800" dirty="0" smtClean="0">
-                <a:latin typeface="+mj-lt"/>
-                <a:cs typeface="Courier New" pitchFamily="49" charset="0"/>
-              </a:rPr>
-              <a:t>"/&gt;</a:t>
-            </a:r>
-          </a:p>
-          <a:p>
-            <a:r>
-              <a:rPr lang="en-GB" sz="800" dirty="0" smtClean="0">
-                <a:latin typeface="+mj-lt"/>
-                <a:cs typeface="Courier New" pitchFamily="49" charset="0"/>
-              </a:rPr>
-              <a:t>    &lt;</a:t>
-            </a:r>
-            <a:r>
-              <a:rPr lang="en-GB" sz="800" dirty="0" err="1" smtClean="0">
-                <a:latin typeface="+mj-lt"/>
-                <a:cs typeface="Courier New" pitchFamily="49" charset="0"/>
-              </a:rPr>
-              <a:t>cvParam</a:t>
-            </a:r>
-            <a:r>
-              <a:rPr lang="en-GB" sz="800" dirty="0" smtClean="0">
-                <a:latin typeface="+mj-lt"/>
-                <a:cs typeface="Courier New" pitchFamily="49" charset="0"/>
-              </a:rPr>
-              <a:t> accession="MS:1002520" </a:t>
-            </a:r>
-            <a:r>
-              <a:rPr lang="en-GB" sz="800" dirty="0" err="1" smtClean="0">
-                <a:latin typeface="+mj-lt"/>
-                <a:cs typeface="Courier New" pitchFamily="49" charset="0"/>
-              </a:rPr>
-              <a:t>cvRef</a:t>
-            </a:r>
-            <a:r>
-              <a:rPr lang="en-GB" sz="800" dirty="0" smtClean="0">
-                <a:latin typeface="+mj-lt"/>
-                <a:cs typeface="Courier New" pitchFamily="49" charset="0"/>
-              </a:rPr>
-              <a:t>="PSI-MS" value="SSHAPVPHGVRLWK" name="peptide </a:t>
-            </a:r>
-            <a:r>
-              <a:rPr lang="en-GB" sz="800" dirty="0">
-                <a:latin typeface="+mj-lt"/>
-                <a:cs typeface="Courier New" pitchFamily="49" charset="0"/>
-              </a:rPr>
-              <a:t>group </a:t>
-            </a:r>
-            <a:r>
-              <a:rPr lang="en-GB" sz="800" dirty="0" smtClean="0">
-                <a:latin typeface="+mj-lt"/>
-                <a:cs typeface="Courier New" pitchFamily="49" charset="0"/>
-              </a:rPr>
-              <a:t>ID"/&gt;           </a:t>
-            </a:r>
-          </a:p>
-          <a:p>
-            <a:r>
-              <a:rPr lang="en-GB" sz="800" dirty="0" smtClean="0">
-                <a:latin typeface="+mj-lt"/>
-                <a:cs typeface="Courier New" pitchFamily="49" charset="0"/>
-              </a:rPr>
-              <a:t>    &lt;</a:t>
-            </a:r>
-            <a:r>
-              <a:rPr lang="en-GB" sz="800" dirty="0" err="1" smtClean="0">
-                <a:latin typeface="+mj-lt"/>
-                <a:cs typeface="Courier New" pitchFamily="49" charset="0"/>
-              </a:rPr>
-              <a:t>cvParam</a:t>
-            </a:r>
-            <a:r>
-              <a:rPr lang="en-GB" sz="800" dirty="0" smtClean="0">
-                <a:latin typeface="+mj-lt"/>
-                <a:cs typeface="Courier New" pitchFamily="49" charset="0"/>
-              </a:rPr>
-              <a:t> accession="MS:1001868" </a:t>
-            </a:r>
-            <a:r>
-              <a:rPr lang="en-GB" sz="800" dirty="0" err="1" smtClean="0">
-                <a:latin typeface="+mj-lt"/>
-                <a:cs typeface="Courier New" pitchFamily="49" charset="0"/>
-              </a:rPr>
-              <a:t>cvRef</a:t>
-            </a:r>
-            <a:r>
-              <a:rPr lang="en-GB" sz="800" dirty="0" smtClean="0">
-                <a:latin typeface="+mj-lt"/>
-                <a:cs typeface="Courier New" pitchFamily="49" charset="0"/>
-              </a:rPr>
-              <a:t>="PSI-MS" value="</a:t>
-            </a:r>
-            <a:r>
-              <a:rPr lang="en-GB" sz="800" dirty="0" smtClean="0">
-                <a:latin typeface="+mj-lt"/>
-              </a:rPr>
-              <a:t>distinct </a:t>
-            </a:r>
-            <a:r>
-              <a:rPr lang="en-GB" sz="800" dirty="0">
-                <a:latin typeface="+mj-lt"/>
-              </a:rPr>
-              <a:t>peptide-level </a:t>
-            </a:r>
-            <a:r>
-              <a:rPr lang="en-GB" sz="800" dirty="0" smtClean="0">
-                <a:latin typeface="+mj-lt"/>
-              </a:rPr>
-              <a:t>q-value</a:t>
-            </a:r>
-            <a:r>
-              <a:rPr lang="en-GB" sz="800" dirty="0" smtClean="0">
-                <a:latin typeface="+mj-lt"/>
-                <a:cs typeface="Courier New" pitchFamily="49" charset="0"/>
-              </a:rPr>
-              <a:t>" name="6.82544339808495E-4"/&gt;</a:t>
-            </a:r>
-          </a:p>
-          <a:p>
-            <a:r>
-              <a:rPr lang="en-GB" sz="800" dirty="0" smtClean="0">
-                <a:latin typeface="+mj-lt"/>
-                <a:cs typeface="Courier New" pitchFamily="49" charset="0"/>
-              </a:rPr>
-              <a:t>    &lt;</a:t>
-            </a:r>
-            <a:r>
-              <a:rPr lang="en-GB" sz="800" dirty="0" err="1" smtClean="0">
-                <a:latin typeface="+mj-lt"/>
-                <a:cs typeface="Courier New" pitchFamily="49" charset="0"/>
-              </a:rPr>
-              <a:t>cvParam</a:t>
-            </a:r>
-            <a:r>
-              <a:rPr lang="en-GB" sz="800" dirty="0" smtClean="0">
-                <a:latin typeface="+mj-lt"/>
-                <a:cs typeface="Courier New" pitchFamily="49" charset="0"/>
-              </a:rPr>
-              <a:t> accession="MS:1002500" </a:t>
-            </a:r>
-            <a:r>
-              <a:rPr lang="en-GB" sz="800" dirty="0" err="1" smtClean="0">
-                <a:latin typeface="+mj-lt"/>
-                <a:cs typeface="Courier New" pitchFamily="49" charset="0"/>
-              </a:rPr>
-              <a:t>cvRef</a:t>
-            </a:r>
-            <a:r>
-              <a:rPr lang="en-GB" sz="800" dirty="0" smtClean="0">
+              <a:rPr lang="en-GB" sz="800" b="1" dirty="0" smtClean="0">
                 <a:latin typeface="+mj-lt"/>
                 <a:cs typeface="Courier New" pitchFamily="49" charset="0"/>
               </a:rPr>
@@ -5210,96 +5224,6 @@
               <a:latin typeface="+mj-lt"/>
               <a:cs typeface="Courier New" pitchFamily="49" charset="0"/>
             </a:endParaRPr>
-          </a:p>
-        </p:txBody>
-      </p:sp>
-      <p:sp>
-        <p:nvSpPr>
-          <p:cNvPr id="31" name="TextBox 30"/>
-          <p:cNvSpPr txBox="1"/>
-          <p:nvPr/>
-        </p:nvSpPr>
-        <p:spPr>
-          <a:xfrm>
-            <a:off x="7989082" y="6430277"/>
-            <a:ext cx="327334" cy="369332"/>
-          </a:xfrm>
-          <a:prstGeom prst="rect">
-            <a:avLst/>
-          </a:prstGeom>
-          <a:noFill/>
-        </p:spPr>
-        <p:txBody>
-          <a:bodyPr wrap="none" rtlCol="0">
-            <a:spAutoFit/>
-          </a:bodyPr>
-          <a:lstStyle/>
-          <a:p>
-            <a:r>
-              <a:rPr lang="en-GB" dirty="0" smtClean="0"/>
-              <a:t>D</a:t>
-            </a:r>
-            <a:endParaRPr lang="en-GB" dirty="0"/>
-          </a:p>
-        </p:txBody>
-      </p:sp>
-      <p:sp>
-        <p:nvSpPr>
-          <p:cNvPr id="32" name="TextBox 31"/>
-          <p:cNvSpPr txBox="1"/>
-          <p:nvPr/>
-        </p:nvSpPr>
-        <p:spPr>
-          <a:xfrm>
-            <a:off x="7001810" y="6579552"/>
-            <a:ext cx="306494" cy="369332"/>
-          </a:xfrm>
-          <a:prstGeom prst="rect">
-            <a:avLst/>
-          </a:prstGeom>
-          <a:noFill/>
-        </p:spPr>
-        <p:txBody>
-          <a:bodyPr wrap="none" rtlCol="0">
-            <a:spAutoFit/>
-          </a:bodyPr>
-          <a:lstStyle/>
-          <a:p>
-            <a:r>
-              <a:rPr lang="en-GB" dirty="0" smtClean="0"/>
-              <a:t>E</a:t>
-            </a:r>
-            <a:endParaRPr lang="en-GB" dirty="0"/>
-          </a:p>
-        </p:txBody>
-      </p:sp>
-      <p:sp>
-        <p:nvSpPr>
-          <p:cNvPr id="33" name="TextBox 32"/>
-          <p:cNvSpPr txBox="1"/>
-          <p:nvPr/>
-        </p:nvSpPr>
-        <p:spPr>
-          <a:xfrm>
-            <a:off x="6116874" y="6799609"/>
-            <a:ext cx="290464" cy="369332"/>
-          </a:xfrm>
-          <a:prstGeom prst="rect">
-            <a:avLst/>
-          </a:prstGeom>
-          <a:noFill/>
-        </p:spPr>
-        <p:txBody>
-          <a:bodyPr wrap="none" rtlCol="0">
-            <a:spAutoFit/>
-          </a:bodyPr>
-          <a:lstStyle/>
-          <a:p>
-            <a:r>
-              <a:rPr lang="en-GB" dirty="0" smtClean="0"/>
-              <a:t>F</a:t>
-            </a:r>
-            <a:endParaRPr lang="en-GB" dirty="0"/>
           </a:p>
         </p:txBody>
       </p:sp>
@@ -5530,7 +5454,13 @@
               <a:rPr lang="en-GB" sz="800" b="1" dirty="0" smtClean="0">
                 <a:cs typeface="Courier New" pitchFamily="49" charset="0"/>
               </a:rPr>
-              <a:t>  &lt;</a:t>
+              <a:t>  </a:t>
+            </a:r>
+            <a:r>
+              <a:rPr lang="en-GB" sz="800" b="1" dirty="0" smtClean="0">
+                <a:cs typeface="Courier New" pitchFamily="49" charset="0"/>
+              </a:rPr>
+              <a:t>       &lt;</a:t>
             </a:r>
             <a:r>
               <a:rPr lang="en-GB" sz="800" b="1" dirty="0" err="1" smtClean="0">
@@ -6175,78 +6105,78 @@
               <a:rPr lang="en-GB" sz="800" dirty="0"/>
             </a:br>
             <a:r>
-              <a:rPr lang="en-GB" sz="800" dirty="0"/>
+              <a:rPr lang="en-GB" sz="800" b="1" dirty="0"/>
               <a:t>            &lt;</a:t>
             </a:r>
             <a:r>
-              <a:rPr lang="en-GB" sz="800" dirty="0" err="1"/>
+              <a:rPr lang="en-GB" sz="800" b="1" dirty="0" err="1"/>
               <a:t>cvParam</a:t>
             </a:r>
             <a:r>
-              <a:rPr lang="en-GB" sz="800" dirty="0"/>
+              <a:rPr lang="en-GB" sz="800" b="1" dirty="0"/>
               <a:t> accession</a:t>
             </a:r>
             <a:r>
-              <a:rPr lang="en-GB" sz="800" dirty="0" smtClean="0"/>
+              <a:rPr lang="en-GB" sz="800" b="1" dirty="0" smtClean="0"/>
               <a:t>="MS:1001868" </a:t>
             </a:r>
             <a:r>
-              <a:rPr lang="en-GB" sz="800" dirty="0" err="1"/>
+              <a:rPr lang="en-GB" sz="800" b="1" dirty="0" err="1"/>
               <a:t>cvRef</a:t>
             </a:r>
             <a:r>
-              <a:rPr lang="en-GB" sz="800" dirty="0"/>
+              <a:rPr lang="en-GB" sz="800" b="1" dirty="0"/>
               <a:t>="PSI-MS" name</a:t>
             </a:r>
             <a:r>
-              <a:rPr lang="en-GB" sz="800" dirty="0" smtClean="0"/>
+              <a:rPr lang="en-GB" sz="800" b="1" dirty="0" smtClean="0"/>
               <a:t>="distinct </a:t>
             </a:r>
             <a:r>
-              <a:rPr lang="en-GB" sz="800" dirty="0"/>
+              <a:rPr lang="en-GB" sz="800" b="1" dirty="0"/>
               <a:t>peptide-level </a:t>
             </a:r>
             <a:r>
-              <a:rPr lang="en-GB" sz="800" dirty="0" smtClean="0"/>
+              <a:rPr lang="en-GB" sz="800" b="1" dirty="0" smtClean="0"/>
               <a:t>q-value" </a:t>
             </a:r>
             <a:r>
-              <a:rPr lang="en-GB" sz="800" dirty="0"/>
+              <a:rPr lang="en-GB" sz="800" b="1" dirty="0"/>
               <a:t>value="0.01</a:t>
             </a:r>
             <a:r>
-              <a:rPr lang="en-GB" sz="800" dirty="0" smtClean="0"/>
+              <a:rPr lang="en-GB" sz="800" b="1" dirty="0" smtClean="0"/>
               <a:t>"/&gt;</a:t>
             </a:r>
             <a:br>
-              <a:rPr lang="en-GB" sz="800" dirty="0" smtClean="0"/>
+              <a:rPr lang="en-GB" sz="800" b="1" dirty="0" smtClean="0"/>
             </a:br>
             <a:r>
-              <a:rPr lang="en-GB" sz="800" dirty="0" smtClean="0"/>
+              <a:rPr lang="en-GB" sz="800" b="1" dirty="0" smtClean="0"/>
               <a:t>            </a:t>
             </a:r>
             <a:r>
-              <a:rPr lang="en-GB" sz="800" dirty="0"/>
+              <a:rPr lang="en-GB" sz="800" b="1" dirty="0"/>
               <a:t>&lt;</a:t>
             </a:r>
             <a:r>
-              <a:rPr lang="en-GB" sz="800" dirty="0" err="1"/>
+              <a:rPr lang="en-GB" sz="800" b="1" dirty="0" err="1"/>
               <a:t>cvParam</a:t>
             </a:r>
             <a:r>
-              <a:rPr lang="en-GB" sz="800" dirty="0"/>
+              <a:rPr lang="en-GB" sz="800" b="1" dirty="0"/>
               <a:t> accession="MS:1002354" </a:t>
             </a:r>
             <a:r>
-              <a:rPr lang="en-GB" sz="800" dirty="0" err="1"/>
+              <a:rPr lang="en-GB" sz="800" b="1" dirty="0" err="1"/>
               <a:t>cvRef</a:t>
             </a:r>
             <a:r>
-              <a:rPr lang="en-GB" sz="800" dirty="0"/>
+              <a:rPr lang="en-GB" sz="800" b="1" dirty="0"/>
               <a:t>="PSI-MS" name="PSM-level q-value" value="0.01"/&gt;</a:t>
             </a:r>
             <a:br>
-              <a:rPr lang="en-GB" sz="800" dirty="0"/>
+              <a:rPr lang="en-GB" sz="800" b="1" dirty="0"/>
             </a:br>
             <a:r>
               <a:rPr lang="en-GB" sz="800" dirty="0"/>
@@ -6311,7 +6241,7 @@
         </p:nvSpPr>
         <p:spPr>
           <a:xfrm>
-            <a:off x="4896544" y="5152691"/>
+            <a:off x="4910372" y="5004668"/>
             <a:ext cx="309700" cy="369332"/>
           </a:xfrm>
           <a:prstGeom prst="rect">
@@ -6341,7 +6271,7 @@
         </p:nvSpPr>
         <p:spPr>
           <a:xfrm>
-            <a:off x="4409728" y="5436715"/>
+            <a:off x="4423556" y="5288692"/>
             <a:ext cx="308098" cy="369332"/>
           </a:xfrm>
           <a:prstGeom prst="rect">
@@ -6371,7 +6301,7 @@
         </p:nvSpPr>
         <p:spPr>
           <a:xfrm>
-            <a:off x="7812360" y="7816988"/>
+            <a:off x="4962066" y="7668964"/>
             <a:ext cx="327334" cy="369332"/>
           </a:xfrm>
           <a:prstGeom prst="rect">
@@ -6401,7 +6331,7 @@
         </p:nvSpPr>
         <p:spPr>
           <a:xfrm>
-            <a:off x="6516216" y="8167736"/>
+            <a:off x="5561650" y="7816988"/>
             <a:ext cx="306494" cy="369332"/>
           </a:xfrm>
           <a:prstGeom prst="rect">
@@ -6431,7 +6361,7 @@
         </p:nvSpPr>
         <p:spPr>
           <a:xfrm>
-            <a:off x="5940152" y="8249036"/>
+            <a:off x="4593080" y="8001654"/>
             <a:ext cx="290464" cy="369332"/>
           </a:xfrm>
           <a:prstGeom prst="rect">
@@ -6843,7 +6773,7 @@
         </p:nvSpPr>
         <p:spPr>
           <a:xfrm>
-            <a:off x="251520" y="324148"/>
+            <a:off x="107172" y="705674"/>
             <a:ext cx="3193503" cy="338554"/>
           </a:xfrm>
           <a:prstGeom prst="rect">
@@ -6864,6 +6794,96 @@
               </a:rPr>
               <a:t>Guidelines for Peptide-level scoring</a:t>
             </a:r>
+          </a:p>
+        </p:txBody>
+      </p:sp>
+      <p:sp>
+        <p:nvSpPr>
+          <p:cNvPr id="15" name="TextBox 14"/>
+          <p:cNvSpPr txBox="1"/>
+          <p:nvPr/>
+        </p:nvSpPr>
+        <p:spPr>
+          <a:xfrm>
+            <a:off x="4962066" y="6337191"/>
+            <a:ext cx="327334" cy="369332"/>
+          </a:xfrm>
+          <a:prstGeom prst="rect">
+            <a:avLst/>
+          </a:prstGeom>
+          <a:noFill/>
+        </p:spPr>
+        <p:txBody>
+          <a:bodyPr wrap="none" rtlCol="0">
+            <a:spAutoFit/>
+          </a:bodyPr>
+          <a:lstStyle/>
+          <a:p>
+            <a:r>
+              <a:rPr lang="en-GB" dirty="0" smtClean="0"/>
+              <a:t>D</a:t>
+            </a:r>
+            <a:endParaRPr lang="en-GB" dirty="0"/>
+          </a:p>
+        </p:txBody>
+      </p:sp>
+      <p:sp>
+        <p:nvSpPr>
+          <p:cNvPr id="16" name="TextBox 15"/>
+          <p:cNvSpPr txBox="1"/>
+          <p:nvPr/>
+        </p:nvSpPr>
+        <p:spPr>
+          <a:xfrm>
+            <a:off x="5561650" y="6485215"/>
+            <a:ext cx="306494" cy="369332"/>
+          </a:xfrm>
+          <a:prstGeom prst="rect">
+            <a:avLst/>
+          </a:prstGeom>
+          <a:noFill/>
+        </p:spPr>
+        <p:txBody>
+          <a:bodyPr wrap="none" rtlCol="0">
+            <a:spAutoFit/>
+          </a:bodyPr>
+          <a:lstStyle/>
+          <a:p>
+            <a:r>
+              <a:rPr lang="en-GB" dirty="0" smtClean="0"/>
+              <a:t>E</a:t>
+            </a:r>
+            <a:endParaRPr lang="en-GB" dirty="0"/>
+          </a:p>
+        </p:txBody>
+      </p:sp>
+      <p:sp>
+        <p:nvSpPr>
+          <p:cNvPr id="17" name="TextBox 16"/>
+          <p:cNvSpPr txBox="1"/>
+          <p:nvPr/>
+        </p:nvSpPr>
+        <p:spPr>
+          <a:xfrm>
+            <a:off x="4593080" y="6669881"/>
+            <a:ext cx="290464" cy="369332"/>
+          </a:xfrm>
+          <a:prstGeom prst="rect">
+            <a:avLst/>
+          </a:prstGeom>
+          <a:noFill/>
+        </p:spPr>
+        <p:txBody>
+          <a:bodyPr wrap="none" rtlCol="0">
+            <a:spAutoFit/>
+          </a:bodyPr>
+          <a:lstStyle/>
+          <a:p>
+            <a:r>
+              <a:rPr lang="en-GB" dirty="0" smtClean="0"/>
+              <a:t>F</a:t>
+            </a:r>
+            <a:endParaRPr lang="en-GB" dirty="0"/>
           </a:p>
         </p:txBody>
       </p:sp>
@@ -6908,7 +6928,7 @@
         <p:spPr>
           <a:xfrm>
             <a:off x="323528" y="2628404"/>
-            <a:ext cx="5832648" cy="2308324"/>
+            <a:ext cx="5832648" cy="2185214"/>
           </a:xfrm>
           <a:prstGeom prst="rect">
             <a:avLst/>
@@ -6928,7 +6948,7 @@
           <a:p>
             <a:r>
               <a:rPr lang="en-GB" sz="800" dirty="0" smtClean="0">
-                <a:latin typeface="Courier New" pitchFamily="49" charset="0"/>
+                <a:latin typeface="Calibri" panose="020F0502020204030204" pitchFamily="34" charset="0"/>
                 <a:cs typeface="Courier New" pitchFamily="49" charset="0"/>
               </a:rPr>
               <a:t> &lt;Peptide id="KYYGNVVYYIGER_p@2|3"&gt;</a:t>
@@ -6937,35 +6957,35 @@
           <a:p>
             <a:r>
               <a:rPr lang="en-GB" sz="800" dirty="0" smtClean="0">
-                <a:latin typeface="Courier New" pitchFamily="49" charset="0"/>
+                <a:latin typeface="Calibri" panose="020F0502020204030204" pitchFamily="34" charset="0"/>
                 <a:cs typeface="Courier New" pitchFamily="49" charset="0"/>
               </a:rPr>
               <a:t>    &lt;</a:t>
             </a:r>
             <a:r>
               <a:rPr lang="en-GB" sz="800" dirty="0" err="1" smtClean="0">
-                <a:latin typeface="Courier New" pitchFamily="49" charset="0"/>
+                <a:latin typeface="Calibri" panose="020F0502020204030204" pitchFamily="34" charset="0"/>
                 <a:cs typeface="Courier New" pitchFamily="49" charset="0"/>
               </a:rPr>
               <a:t>PeptideSequence</a:t>
             </a:r>
             <a:r>
               <a:rPr lang="en-GB" sz="800" dirty="0" smtClean="0">
-                <a:latin typeface="Courier New" pitchFamily="49" charset="0"/>
+                <a:latin typeface="Calibri" panose="020F0502020204030204" pitchFamily="34" charset="0"/>
                 <a:cs typeface="Courier New" pitchFamily="49" charset="0"/>
               </a:rPr>
               <a:t>&gt;KYYGNVVYYIGER&lt;/</a:t>
             </a:r>
             <a:r>
               <a:rPr lang="en-GB" sz="800" dirty="0" err="1" smtClean="0">
-                <a:latin typeface="Courier New" pitchFamily="49" charset="0"/>
+                <a:latin typeface="Calibri" panose="020F0502020204030204" pitchFamily="34" charset="0"/>
                 <a:cs typeface="Courier New" pitchFamily="49" charset="0"/>
               </a:rPr>
               <a:t>PeptideSequence</a:t>
             </a:r>
             <a:r>
               <a:rPr lang="en-GB" sz="800" dirty="0" smtClean="0">
-                <a:latin typeface="Courier New" pitchFamily="49" charset="0"/>
+                <a:latin typeface="Calibri" panose="020F0502020204030204" pitchFamily="34" charset="0"/>
                 <a:cs typeface="Courier New" pitchFamily="49" charset="0"/>
               </a:rPr>
               <a:t>&gt;</a:t>
@@ -6974,21 +6994,21 @@
           <a:p>
             <a:r>
               <a:rPr lang="en-GB" sz="800" dirty="0" smtClean="0">
-                <a:latin typeface="Courier New" pitchFamily="49" charset="0"/>
+                <a:latin typeface="Calibri" panose="020F0502020204030204" pitchFamily="34" charset="0"/>
                 <a:cs typeface="Courier New" pitchFamily="49" charset="0"/>
               </a:rPr>
               <a:t>    &lt;Modification </a:t>
             </a:r>
             <a:r>
               <a:rPr lang="en-GB" sz="800" dirty="0" err="1" smtClean="0">
-                <a:latin typeface="Courier New" pitchFamily="49" charset="0"/>
+                <a:latin typeface="Calibri" panose="020F0502020204030204" pitchFamily="34" charset="0"/>
                 <a:cs typeface="Courier New" pitchFamily="49" charset="0"/>
               </a:rPr>
               <a:t>monoisotopicMassDelta</a:t>
             </a:r>
             <a:r>
               <a:rPr lang="en-GB" sz="800" dirty="0" smtClean="0">
-                <a:latin typeface="Courier New" pitchFamily="49" charset="0"/>
+                <a:latin typeface="Calibri" panose="020F0502020204030204" pitchFamily="34" charset="0"/>
                 <a:cs typeface="Courier New" pitchFamily="49" charset="0"/>
               </a:rPr>
               <a:t>="79.966331" location="2" residues="Y"&gt;</a:t>
@@ -6997,49 +7017,49 @@
           <a:p>
             <a:r>
               <a:rPr lang="en-GB" sz="800" dirty="0" smtClean="0">
-                <a:latin typeface="Courier New" pitchFamily="49" charset="0"/>
+                <a:latin typeface="Calibri" panose="020F0502020204030204" pitchFamily="34" charset="0"/>
                 <a:cs typeface="Courier New" pitchFamily="49" charset="0"/>
               </a:rPr>
               <a:t>      &lt;</a:t>
             </a:r>
             <a:r>
               <a:rPr lang="en-GB" sz="800" dirty="0" err="1" smtClean="0">
-                <a:latin typeface="Courier New" pitchFamily="49" charset="0"/>
+                <a:latin typeface="Calibri" panose="020F0502020204030204" pitchFamily="34" charset="0"/>
                 <a:cs typeface="Courier New" pitchFamily="49" charset="0"/>
               </a:rPr>
               <a:t>cvParam</a:t>
             </a:r>
             <a:r>
               <a:rPr lang="en-GB" sz="800" dirty="0" smtClean="0">
-                <a:latin typeface="Courier New" pitchFamily="49" charset="0"/>
+                <a:latin typeface="Calibri" panose="020F0502020204030204" pitchFamily="34" charset="0"/>
                 <a:cs typeface="Courier New" pitchFamily="49" charset="0"/>
               </a:rPr>
               <a:t> accession="UNIMOD:21" </a:t>
             </a:r>
             <a:r>
               <a:rPr lang="en-GB" sz="800" dirty="0" err="1" smtClean="0">
-                <a:latin typeface="Courier New" pitchFamily="49" charset="0"/>
+                <a:latin typeface="Calibri" panose="020F0502020204030204" pitchFamily="34" charset="0"/>
                 <a:cs typeface="Courier New" pitchFamily="49" charset="0"/>
               </a:rPr>
               <a:t>cvRef</a:t>
             </a:r>
             <a:r>
               <a:rPr lang="en-GB" sz="800" dirty="0" smtClean="0">
-                <a:latin typeface="Courier New" pitchFamily="49" charset="0"/>
+                <a:latin typeface="Calibri" panose="020F0502020204030204" pitchFamily="34" charset="0"/>
                 <a:cs typeface="Courier New" pitchFamily="49" charset="0"/>
               </a:rPr>
               <a:t>="UNIMOD" name="</a:t>
             </a:r>
             <a:r>
               <a:rPr lang="en-GB" sz="800" dirty="0" err="1" smtClean="0">
-                <a:latin typeface="Courier New" pitchFamily="49" charset="0"/>
+                <a:latin typeface="Calibri" panose="020F0502020204030204" pitchFamily="34" charset="0"/>
                 <a:cs typeface="Courier New" pitchFamily="49" charset="0"/>
               </a:rPr>
               <a:t>Phospho</a:t>
             </a:r>
             <a:r>
               <a:rPr lang="en-GB" sz="800" dirty="0" smtClean="0">
-                <a:latin typeface="Courier New" pitchFamily="49" charset="0"/>
+                <a:latin typeface="Calibri" panose="020F0502020204030204" pitchFamily="34" charset="0"/>
                 <a:cs typeface="Courier New" pitchFamily="49" charset="0"/>
               </a:rPr>
               <a:t>"/&gt;</a:t>
@@ -7047,322 +7067,329 @@
           </a:p>
           <a:p>
             <a:r>
-              <a:rPr lang="en-GB" sz="800" dirty="0" smtClean="0">
-                <a:latin typeface="Courier New" pitchFamily="49" charset="0"/>
+              <a:rPr lang="en-GB" sz="800" b="1" dirty="0" smtClean="0">
+                <a:latin typeface="Calibri" panose="020F0502020204030204" pitchFamily="34" charset="0"/>
                 <a:cs typeface="Courier New" pitchFamily="49" charset="0"/>
               </a:rPr>
               <a:t>      &lt;</a:t>
             </a:r>
             <a:r>
+              <a:rPr lang="en-GB" sz="800" b="1" dirty="0" err="1" smtClean="0">
+                <a:latin typeface="Calibri" panose="020F0502020204030204" pitchFamily="34" charset="0"/>
+                <a:cs typeface="Courier New" pitchFamily="49" charset="0"/>
+              </a:rPr>
+              <a:t>cvParam</a:t>
+            </a:r>
+            <a:r>
+              <a:rPr lang="en-GB" sz="800" b="1" dirty="0" smtClean="0">
+                <a:latin typeface="Calibri" panose="020F0502020204030204" pitchFamily="34" charset="0"/>
+                <a:cs typeface="Courier New" pitchFamily="49" charset="0"/>
+              </a:rPr>
+              <a:t> accession="MS:1002504" </a:t>
+            </a:r>
+            <a:r>
+              <a:rPr lang="en-GB" sz="800" b="1" dirty="0" err="1" smtClean="0">
+                <a:latin typeface="Calibri" panose="020F0502020204030204" pitchFamily="34" charset="0"/>
+                <a:cs typeface="Courier New" pitchFamily="49" charset="0"/>
+              </a:rPr>
+              <a:t>cvRef</a:t>
+            </a:r>
+            <a:r>
+              <a:rPr lang="en-GB" sz="800" b="1" dirty="0" smtClean="0">
+                <a:latin typeface="Calibri" panose="020F0502020204030204" pitchFamily="34" charset="0"/>
+                <a:cs typeface="Courier New" pitchFamily="49" charset="0"/>
+              </a:rPr>
+              <a:t>="PSI-MS" name="modification index" value="1"/&gt;    </a:t>
+            </a:r>
+            <a:r>
+              <a:rPr lang="en-GB" sz="800" dirty="0" smtClean="0">
+                <a:latin typeface="Calibri" panose="020F0502020204030204" pitchFamily="34" charset="0"/>
+                <a:cs typeface="Courier New" pitchFamily="49" charset="0"/>
+              </a:rPr>
+              <a:t>&lt;/Modification&gt;    </a:t>
+            </a:r>
+          </a:p>
+          <a:p>
+            <a:r>
+              <a:rPr lang="en-GB" sz="800" dirty="0" smtClean="0">
+                <a:latin typeface="Calibri" panose="020F0502020204030204" pitchFamily="34" charset="0"/>
+                <a:cs typeface="Courier New" pitchFamily="49" charset="0"/>
+              </a:rPr>
+              <a:t>  &lt;/Peptide&gt;  </a:t>
+            </a:r>
+          </a:p>
+          <a:p>
+            <a:r>
+              <a:rPr lang="en-GB" sz="800" dirty="0" smtClean="0">
+                <a:latin typeface="Calibri" panose="020F0502020204030204" pitchFamily="34" charset="0"/>
+                <a:cs typeface="Courier New" pitchFamily="49" charset="0"/>
+              </a:rPr>
+              <a:t>  &lt;Peptide id="KYYGNVVYYIGER_p@2|3_p@8|9"&gt;</a:t>
+            </a:r>
+          </a:p>
+          <a:p>
+            <a:r>
+              <a:rPr lang="en-GB" sz="800" dirty="0" smtClean="0">
+                <a:latin typeface="Calibri" panose="020F0502020204030204" pitchFamily="34" charset="0"/>
+                <a:cs typeface="Courier New" pitchFamily="49" charset="0"/>
+              </a:rPr>
+              <a:t>    &lt;</a:t>
+            </a:r>
+            <a:r>
               <a:rPr lang="en-GB" sz="800" dirty="0" err="1" smtClean="0">
-                <a:latin typeface="Courier New" pitchFamily="49" charset="0"/>
+                <a:latin typeface="Calibri" panose="020F0502020204030204" pitchFamily="34" charset="0"/>
+                <a:cs typeface="Courier New" pitchFamily="49" charset="0"/>
+              </a:rPr>
+              <a:t>PeptideSequence</a:t>
+            </a:r>
+            <a:r>
+              <a:rPr lang="en-GB" sz="800" dirty="0" smtClean="0">
+                <a:latin typeface="Calibri" panose="020F0502020204030204" pitchFamily="34" charset="0"/>
+                <a:cs typeface="Courier New" pitchFamily="49" charset="0"/>
+              </a:rPr>
+              <a:t>&gt;KYYGNVVYYIGER&lt;/</a:t>
+            </a:r>
+            <a:r>
+              <a:rPr lang="en-GB" sz="800" dirty="0" err="1" smtClean="0">
+                <a:latin typeface="Calibri" panose="020F0502020204030204" pitchFamily="34" charset="0"/>
+                <a:cs typeface="Courier New" pitchFamily="49" charset="0"/>
+              </a:rPr>
+              <a:t>PeptideSequence</a:t>
+            </a:r>
+            <a:r>
+              <a:rPr lang="en-GB" sz="800" dirty="0" smtClean="0">
+                <a:latin typeface="Calibri" panose="020F0502020204030204" pitchFamily="34" charset="0"/>
+                <a:cs typeface="Courier New" pitchFamily="49" charset="0"/>
+              </a:rPr>
+              <a:t>&gt;</a:t>
+            </a:r>
+          </a:p>
+          <a:p>
+            <a:r>
+              <a:rPr lang="en-GB" sz="800" dirty="0" smtClean="0">
+                <a:latin typeface="Calibri" panose="020F0502020204030204" pitchFamily="34" charset="0"/>
+                <a:cs typeface="Courier New" pitchFamily="49" charset="0"/>
+              </a:rPr>
+              <a:t>    &lt;Modification </a:t>
+            </a:r>
+            <a:r>
+              <a:rPr lang="en-GB" sz="800" dirty="0" err="1" smtClean="0">
+                <a:latin typeface="Calibri" panose="020F0502020204030204" pitchFamily="34" charset="0"/>
+                <a:cs typeface="Courier New" pitchFamily="49" charset="0"/>
+              </a:rPr>
+              <a:t>monoisotopicMassDelta</a:t>
+            </a:r>
+            <a:r>
+              <a:rPr lang="en-GB" sz="800" dirty="0" smtClean="0">
+                <a:latin typeface="Calibri" panose="020F0502020204030204" pitchFamily="34" charset="0"/>
+                <a:cs typeface="Courier New" pitchFamily="49" charset="0"/>
+              </a:rPr>
+              <a:t>="79.966331" location="2" residues="Y"&gt;</a:t>
+            </a:r>
+          </a:p>
+          <a:p>
+            <a:r>
+              <a:rPr lang="en-GB" sz="800" dirty="0" smtClean="0">
+                <a:latin typeface="Calibri" panose="020F0502020204030204" pitchFamily="34" charset="0"/>
+                <a:cs typeface="Courier New" pitchFamily="49" charset="0"/>
+              </a:rPr>
+              <a:t>      &lt;</a:t>
+            </a:r>
+            <a:r>
+              <a:rPr lang="en-GB" sz="800" dirty="0" err="1" smtClean="0">
+                <a:latin typeface="Calibri" panose="020F0502020204030204" pitchFamily="34" charset="0"/>
                 <a:cs typeface="Courier New" pitchFamily="49" charset="0"/>
               </a:rPr>
               <a:t>cvParam</a:t>
             </a:r>
             <a:r>
               <a:rPr lang="en-GB" sz="800" dirty="0" smtClean="0">
-                <a:latin typeface="Courier New" pitchFamily="49" charset="0"/>
+                <a:latin typeface="Calibri" panose="020F0502020204030204" pitchFamily="34" charset="0"/>
+                <a:cs typeface="Courier New" pitchFamily="49" charset="0"/>
+              </a:rPr>
+              <a:t> accession="UNIMOD:21" </a:t>
+            </a:r>
+            <a:r>
+              <a:rPr lang="en-GB" sz="800" dirty="0" err="1" smtClean="0">
+                <a:latin typeface="Calibri" panose="020F0502020204030204" pitchFamily="34" charset="0"/>
+                <a:cs typeface="Courier New" pitchFamily="49" charset="0"/>
+              </a:rPr>
+              <a:t>cvRef</a:t>
+            </a:r>
+            <a:r>
+              <a:rPr lang="en-GB" sz="800" dirty="0" smtClean="0">
+                <a:latin typeface="Calibri" panose="020F0502020204030204" pitchFamily="34" charset="0"/>
+                <a:cs typeface="Courier New" pitchFamily="49" charset="0"/>
+              </a:rPr>
+              <a:t>="UNIMOD" name="</a:t>
+            </a:r>
+            <a:r>
+              <a:rPr lang="en-GB" sz="800" dirty="0" err="1" smtClean="0">
+                <a:latin typeface="Calibri" panose="020F0502020204030204" pitchFamily="34" charset="0"/>
+                <a:cs typeface="Courier New" pitchFamily="49" charset="0"/>
+              </a:rPr>
+              <a:t>Phospho</a:t>
+            </a:r>
+            <a:r>
+              <a:rPr lang="en-GB" sz="800" dirty="0" smtClean="0">
+                <a:latin typeface="Calibri" panose="020F0502020204030204" pitchFamily="34" charset="0"/>
+                <a:cs typeface="Courier New" pitchFamily="49" charset="0"/>
+              </a:rPr>
+              <a:t>"/&gt;</a:t>
+            </a:r>
+          </a:p>
+          <a:p>
+            <a:r>
+              <a:rPr lang="en-GB" sz="800" b="1" dirty="0" smtClean="0">
+                <a:latin typeface="Calibri" panose="020F0502020204030204" pitchFamily="34" charset="0"/>
+                <a:cs typeface="Courier New" pitchFamily="49" charset="0"/>
+              </a:rPr>
+              <a:t>      &lt;</a:t>
+            </a:r>
+            <a:r>
+              <a:rPr lang="en-GB" sz="800" b="1" dirty="0" err="1" smtClean="0">
+                <a:latin typeface="Calibri" panose="020F0502020204030204" pitchFamily="34" charset="0"/>
+                <a:cs typeface="Courier New" pitchFamily="49" charset="0"/>
+              </a:rPr>
+              <a:t>cvParam</a:t>
+            </a:r>
+            <a:r>
+              <a:rPr lang="en-GB" sz="800" b="1" dirty="0" smtClean="0">
+                <a:latin typeface="Calibri" panose="020F0502020204030204" pitchFamily="34" charset="0"/>
                 <a:cs typeface="Courier New" pitchFamily="49" charset="0"/>
               </a:rPr>
               <a:t> accession="MS:1002504" </a:t>
             </a:r>
             <a:r>
+              <a:rPr lang="en-GB" sz="800" b="1" dirty="0" err="1" smtClean="0">
+                <a:latin typeface="Calibri" panose="020F0502020204030204" pitchFamily="34" charset="0"/>
+                <a:cs typeface="Courier New" pitchFamily="49" charset="0"/>
+              </a:rPr>
+              <a:t>cvRef</a:t>
+            </a:r>
+            <a:r>
+              <a:rPr lang="en-GB" sz="800" b="1" dirty="0" smtClean="0">
+                <a:latin typeface="Calibri" panose="020F0502020204030204" pitchFamily="34" charset="0"/>
+                <a:cs typeface="Courier New" pitchFamily="49" charset="0"/>
+              </a:rPr>
+              <a:t>="PSI-MS" name="modification index" value="1"/&gt;</a:t>
+            </a:r>
+          </a:p>
+          <a:p>
+            <a:r>
+              <a:rPr lang="en-GB" sz="800" dirty="0" smtClean="0">
+                <a:latin typeface="Calibri" panose="020F0502020204030204" pitchFamily="34" charset="0"/>
+                <a:cs typeface="Courier New" pitchFamily="49" charset="0"/>
+              </a:rPr>
+              <a:t>    &lt;/Modification&gt;</a:t>
+            </a:r>
+          </a:p>
+          <a:p>
+            <a:r>
+              <a:rPr lang="en-GB" sz="800" dirty="0" smtClean="0">
+                <a:latin typeface="Calibri" panose="020F0502020204030204" pitchFamily="34" charset="0"/>
+                <a:cs typeface="Courier New" pitchFamily="49" charset="0"/>
+              </a:rPr>
+              <a:t>    &lt;Modification </a:t>
+            </a:r>
+            <a:r>
               <a:rPr lang="en-GB" sz="800" dirty="0" err="1" smtClean="0">
-                <a:latin typeface="Courier New" pitchFamily="49" charset="0"/>
+                <a:latin typeface="Calibri" panose="020F0502020204030204" pitchFamily="34" charset="0"/>
+                <a:cs typeface="Courier New" pitchFamily="49" charset="0"/>
+              </a:rPr>
+              <a:t>monoisotopicMassDelta</a:t>
+            </a:r>
+            <a:r>
+              <a:rPr lang="en-GB" sz="800" dirty="0" smtClean="0">
+                <a:latin typeface="Calibri" panose="020F0502020204030204" pitchFamily="34" charset="0"/>
+                <a:cs typeface="Courier New" pitchFamily="49" charset="0"/>
+              </a:rPr>
+              <a:t>="79.966331" location="8" residues="Y"&gt;</a:t>
+            </a:r>
+          </a:p>
+          <a:p>
+            <a:r>
+              <a:rPr lang="en-GB" sz="800" dirty="0" smtClean="0">
+                <a:latin typeface="Calibri" panose="020F0502020204030204" pitchFamily="34" charset="0"/>
+                <a:cs typeface="Courier New" pitchFamily="49" charset="0"/>
+              </a:rPr>
+              <a:t>      &lt;</a:t>
+            </a:r>
+            <a:r>
+              <a:rPr lang="en-GB" sz="800" dirty="0" err="1" smtClean="0">
+                <a:latin typeface="Calibri" panose="020F0502020204030204" pitchFamily="34" charset="0"/>
+                <a:cs typeface="Courier New" pitchFamily="49" charset="0"/>
+              </a:rPr>
+              <a:t>cvParam</a:t>
+            </a:r>
+            <a:r>
+              <a:rPr lang="en-GB" sz="800" dirty="0" smtClean="0">
+                <a:latin typeface="Calibri" panose="020F0502020204030204" pitchFamily="34" charset="0"/>
+                <a:cs typeface="Courier New" pitchFamily="49" charset="0"/>
+              </a:rPr>
+              <a:t> accession="UNIMOD:21" </a:t>
+            </a:r>
+            <a:r>
+              <a:rPr lang="en-GB" sz="800" dirty="0" err="1" smtClean="0">
+                <a:latin typeface="Calibri" panose="020F0502020204030204" pitchFamily="34" charset="0"/>
                 <a:cs typeface="Courier New" pitchFamily="49" charset="0"/>
               </a:rPr>
               <a:t>cvRef</a:t>
             </a:r>
             <a:r>
               <a:rPr lang="en-GB" sz="800" dirty="0" smtClean="0">
-                <a:latin typeface="Courier New" pitchFamily="49" charset="0"/>
-                <a:cs typeface="Courier New" pitchFamily="49" charset="0"/>
-              </a:rPr>
-              <a:t>="PSI-MS" name="modification index" value="1"/&gt;    &lt;/Modification&gt;    </a:t>
-            </a:r>
-          </a:p>
-          <a:p>
-            <a:r>
-              <a:rPr lang="en-GB" sz="800" dirty="0" smtClean="0">
-                <a:latin typeface="Courier New" pitchFamily="49" charset="0"/>
-                <a:cs typeface="Courier New" pitchFamily="49" charset="0"/>
-              </a:rPr>
-              <a:t>  &lt;/Peptide&gt;  </a:t>
-            </a:r>
-          </a:p>
-          <a:p>
-            <a:r>
-              <a:rPr lang="en-GB" sz="800" dirty="0" smtClean="0">
-                <a:latin typeface="Courier New" pitchFamily="49" charset="0"/>
-                <a:cs typeface="Courier New" pitchFamily="49" charset="0"/>
-              </a:rPr>
-              <a:t>  &lt;Peptide id="KYYGNVVYYIGER_p@2|3_p@8|9"&gt;</a:t>
-            </a:r>
-          </a:p>
-          <a:p>
-            <a:r>
-              <a:rPr lang="en-GB" sz="800" dirty="0" smtClean="0">
-                <a:latin typeface="Courier New" pitchFamily="49" charset="0"/>
-                <a:cs typeface="Courier New" pitchFamily="49" charset="0"/>
-              </a:rPr>
-              <a:t>    &lt;</a:t>
+                <a:latin typeface="Calibri" panose="020F0502020204030204" pitchFamily="34" charset="0"/>
+                <a:cs typeface="Courier New" pitchFamily="49" charset="0"/>
+              </a:rPr>
+              <a:t>="UNIMOD" name="</a:t>
             </a:r>
             <a:r>
               <a:rPr lang="en-GB" sz="800" dirty="0" err="1" smtClean="0">
-                <a:latin typeface="Courier New" pitchFamily="49" charset="0"/>
-                <a:cs typeface="Courier New" pitchFamily="49" charset="0"/>
-              </a:rPr>
-              <a:t>PeptideSequence</a:t>
-            </a:r>
-            <a:r>
-              <a:rPr lang="en-GB" sz="800" dirty="0" smtClean="0">
-                <a:latin typeface="Courier New" pitchFamily="49" charset="0"/>
-                <a:cs typeface="Courier New" pitchFamily="49" charset="0"/>
-              </a:rPr>
-              <a:t>&gt;KYYGNVVYYIGER&lt;/</a:t>
-            </a:r>
-            <a:r>
-              <a:rPr lang="en-GB" sz="800" dirty="0" err="1" smtClean="0">
-                <a:latin typeface="Courier New" pitchFamily="49" charset="0"/>
-                <a:cs typeface="Courier New" pitchFamily="49" charset="0"/>
-              </a:rPr>
-              <a:t>PeptideSequence</a:t>
-            </a:r>
-            <a:r>
-              <a:rPr lang="en-GB" sz="800" dirty="0" smtClean="0">
-                <a:latin typeface="Courier New" pitchFamily="49" charset="0"/>
-                <a:cs typeface="Courier New" pitchFamily="49" charset="0"/>
-              </a:rPr>
-              <a:t>&gt;</a:t>
-            </a:r>
-          </a:p>
-          <a:p>
-            <a:r>
-              <a:rPr lang="en-GB" sz="800" dirty="0" smtClean="0">
-                <a:latin typeface="Courier New" pitchFamily="49" charset="0"/>
-                <a:cs typeface="Courier New" pitchFamily="49" charset="0"/>
-              </a:rPr>
-              <a:t>    &lt;Modification </a:t>
-            </a:r>
-            <a:r>
-              <a:rPr lang="en-GB" sz="800" dirty="0" err="1" smtClean="0">
-                <a:latin typeface="Courier New" pitchFamily="49" charset="0"/>
-                <a:cs typeface="Courier New" pitchFamily="49" charset="0"/>
-              </a:rPr>
-              <a:t>monoisotopicMassDelta</a:t>
-            </a:r>
-            <a:r>
-              <a:rPr lang="en-GB" sz="800" dirty="0" smtClean="0">
-                <a:latin typeface="Courier New" pitchFamily="49" charset="0"/>
-                <a:cs typeface="Courier New" pitchFamily="49" charset="0"/>
-              </a:rPr>
-              <a:t>="79.966331" location="2" residues="Y"&gt;</a:t>
-            </a:r>
-          </a:p>
-          <a:p>
-            <a:r>
-              <a:rPr lang="en-GB" sz="800" dirty="0" smtClean="0">
-                <a:latin typeface="Courier New" pitchFamily="49" charset="0"/>
+                <a:latin typeface="Calibri" panose="020F0502020204030204" pitchFamily="34" charset="0"/>
+                <a:cs typeface="Courier New" pitchFamily="49" charset="0"/>
+              </a:rPr>
+              <a:t>Phospho</a:t>
+            </a:r>
+            <a:r>
+              <a:rPr lang="en-GB" sz="800" dirty="0" smtClean="0">
+                <a:latin typeface="Calibri" panose="020F0502020204030204" pitchFamily="34" charset="0"/>
+                <a:cs typeface="Courier New" pitchFamily="49" charset="0"/>
+              </a:rPr>
+              <a:t>"/&gt;</a:t>
+            </a:r>
+          </a:p>
+          <a:p>
+            <a:r>
+              <a:rPr lang="en-GB" sz="800" b="1" dirty="0" smtClean="0">
+                <a:latin typeface="Calibri" panose="020F0502020204030204" pitchFamily="34" charset="0"/>
                 <a:cs typeface="Courier New" pitchFamily="49" charset="0"/>
               </a:rPr>
               <a:t>      &lt;</a:t>
             </a:r>
             <a:r>
-              <a:rPr lang="en-GB" sz="800" dirty="0" err="1" smtClean="0">
-                <a:latin typeface="Courier New" pitchFamily="49" charset="0"/>
+              <a:rPr lang="en-GB" sz="800" b="1" dirty="0" err="1" smtClean="0">
+                <a:latin typeface="Calibri" panose="020F0502020204030204" pitchFamily="34" charset="0"/>
                 <a:cs typeface="Courier New" pitchFamily="49" charset="0"/>
               </a:rPr>
               <a:t>cvParam</a:t>
             </a:r>
             <a:r>
-              <a:rPr lang="en-GB" sz="800" dirty="0" smtClean="0">
-                <a:latin typeface="Courier New" pitchFamily="49" charset="0"/>
-                <a:cs typeface="Courier New" pitchFamily="49" charset="0"/>
-              </a:rPr>
-              <a:t> accession="UNIMOD:21" </a:t>
-            </a:r>
-            <a:r>
-              <a:rPr lang="en-GB" sz="800" dirty="0" err="1" smtClean="0">
-                <a:latin typeface="Courier New" pitchFamily="49" charset="0"/>
+              <a:rPr lang="en-GB" sz="800" b="1" dirty="0" smtClean="0">
+                <a:latin typeface="Calibri" panose="020F0502020204030204" pitchFamily="34" charset="0"/>
+                <a:cs typeface="Courier New" pitchFamily="49" charset="0"/>
+              </a:rPr>
+              <a:t> accession="MS:1002504" </a:t>
+            </a:r>
+            <a:r>
+              <a:rPr lang="en-GB" sz="800" b="1" dirty="0" err="1" smtClean="0">
+                <a:latin typeface="Calibri" panose="020F0502020204030204" pitchFamily="34" charset="0"/>
                 <a:cs typeface="Courier New" pitchFamily="49" charset="0"/>
               </a:rPr>
               <a:t>cvRef</a:t>
             </a:r>
             <a:r>
-              <a:rPr lang="en-GB" sz="800" dirty="0" smtClean="0">
-                <a:latin typeface="Courier New" pitchFamily="49" charset="0"/>
-                <a:cs typeface="Courier New" pitchFamily="49" charset="0"/>
-              </a:rPr>
-              <a:t>="UNIMOD" name="</a:t>
-            </a:r>
-            <a:r>
-              <a:rPr lang="en-GB" sz="800" dirty="0" err="1" smtClean="0">
-                <a:latin typeface="Courier New" pitchFamily="49" charset="0"/>
-                <a:cs typeface="Courier New" pitchFamily="49" charset="0"/>
-              </a:rPr>
-              <a:t>Phospho</a:t>
-            </a:r>
-            <a:r>
-              <a:rPr lang="en-GB" sz="800" dirty="0" smtClean="0">
-                <a:latin typeface="Courier New" pitchFamily="49" charset="0"/>
-                <a:cs typeface="Courier New" pitchFamily="49" charset="0"/>
-              </a:rPr>
-              <a:t>"/&gt;</a:t>
-            </a:r>
-          </a:p>
-          <a:p>
-            <a:r>
-              <a:rPr lang="en-GB" sz="800" dirty="0" smtClean="0">
-                <a:latin typeface="Courier New" pitchFamily="49" charset="0"/>
-                <a:cs typeface="Courier New" pitchFamily="49" charset="0"/>
-              </a:rPr>
-              <a:t>      &lt;</a:t>
-            </a:r>
-            <a:r>
-              <a:rPr lang="en-GB" sz="800" dirty="0" err="1" smtClean="0">
-                <a:latin typeface="Courier New" pitchFamily="49" charset="0"/>
-                <a:cs typeface="Courier New" pitchFamily="49" charset="0"/>
-              </a:rPr>
-              <a:t>cvParam</a:t>
-            </a:r>
-            <a:r>
-              <a:rPr lang="en-GB" sz="800" dirty="0" smtClean="0">
-                <a:latin typeface="Courier New" pitchFamily="49" charset="0"/>
-                <a:cs typeface="Courier New" pitchFamily="49" charset="0"/>
-              </a:rPr>
-              <a:t> accession="MS:1002504" </a:t>
-            </a:r>
-            <a:r>
-              <a:rPr lang="en-GB" sz="800" dirty="0" err="1" smtClean="0">
-                <a:latin typeface="Courier New" pitchFamily="49" charset="0"/>
-                <a:cs typeface="Courier New" pitchFamily="49" charset="0"/>
-              </a:rPr>
-              <a:t>cvRef</a:t>
-            </a:r>
-            <a:r>
-              <a:rPr lang="en-GB" sz="800" dirty="0" smtClean="0">
-                <a:latin typeface="Courier New" pitchFamily="49" charset="0"/>
-                <a:cs typeface="Courier New" pitchFamily="49" charset="0"/>
-              </a:rPr>
-              <a:t>="PSI-MS" name="modification index" value="1"/&gt;</a:t>
-            </a:r>
-          </a:p>
-          <a:p>
-            <a:r>
-              <a:rPr lang="en-GB" sz="800" dirty="0" smtClean="0">
-                <a:latin typeface="Courier New" pitchFamily="49" charset="0"/>
-                <a:cs typeface="Courier New" pitchFamily="49" charset="0"/>
-              </a:rPr>
-              <a:t>    &lt;/Modification&gt;</a:t>
-            </a:r>
-          </a:p>
-          <a:p>
-            <a:r>
-              <a:rPr lang="en-GB" sz="800" dirty="0" smtClean="0">
-                <a:latin typeface="Courier New" pitchFamily="49" charset="0"/>
-                <a:cs typeface="Courier New" pitchFamily="49" charset="0"/>
-              </a:rPr>
-              <a:t>    &lt;Modification </a:t>
-            </a:r>
-            <a:r>
-              <a:rPr lang="en-GB" sz="800" dirty="0" err="1" smtClean="0">
-                <a:latin typeface="Courier New" pitchFamily="49" charset="0"/>
-                <a:cs typeface="Courier New" pitchFamily="49" charset="0"/>
-              </a:rPr>
-              <a:t>monoisotopicMassDelta</a:t>
-            </a:r>
-            <a:r>
-              <a:rPr lang="en-GB" sz="800" dirty="0" smtClean="0">
-                <a:latin typeface="Courier New" pitchFamily="49" charset="0"/>
-                <a:cs typeface="Courier New" pitchFamily="49" charset="0"/>
-              </a:rPr>
-              <a:t>="79.966331" location="8" residues="Y"&gt;</a:t>
-            </a:r>
-          </a:p>
-          <a:p>
-            <a:r>
-              <a:rPr lang="en-GB" sz="800" dirty="0" smtClean="0">
-                <a:latin typeface="Courier New" pitchFamily="49" charset="0"/>
-                <a:cs typeface="Courier New" pitchFamily="49" charset="0"/>
-              </a:rPr>
-              <a:t>      &lt;</a:t>
-            </a:r>
-            <a:r>
-              <a:rPr lang="en-GB" sz="800" dirty="0" err="1" smtClean="0">
-                <a:latin typeface="Courier New" pitchFamily="49" charset="0"/>
-                <a:cs typeface="Courier New" pitchFamily="49" charset="0"/>
-              </a:rPr>
-              <a:t>cvParam</a:t>
-            </a:r>
-            <a:r>
-              <a:rPr lang="en-GB" sz="800" dirty="0" smtClean="0">
-                <a:latin typeface="Courier New" pitchFamily="49" charset="0"/>
-                <a:cs typeface="Courier New" pitchFamily="49" charset="0"/>
-              </a:rPr>
-              <a:t> accession="UNIMOD:21" </a:t>
-            </a:r>
-            <a:r>
-              <a:rPr lang="en-GB" sz="800" dirty="0" err="1" smtClean="0">
-                <a:latin typeface="Courier New" pitchFamily="49" charset="0"/>
-                <a:cs typeface="Courier New" pitchFamily="49" charset="0"/>
-              </a:rPr>
-              <a:t>cvRef</a:t>
-            </a:r>
-            <a:r>
-              <a:rPr lang="en-GB" sz="800" dirty="0" smtClean="0">
-                <a:latin typeface="Courier New" pitchFamily="49" charset="0"/>
-                <a:cs typeface="Courier New" pitchFamily="49" charset="0"/>
-              </a:rPr>
-              <a:t>="UNIMOD" name="</a:t>
-            </a:r>
-            <a:r>
-              <a:rPr lang="en-GB" sz="800" dirty="0" err="1" smtClean="0">
-                <a:latin typeface="Courier New" pitchFamily="49" charset="0"/>
-                <a:cs typeface="Courier New" pitchFamily="49" charset="0"/>
-              </a:rPr>
-              <a:t>Phospho</a:t>
-            </a:r>
-            <a:r>
-              <a:rPr lang="en-GB" sz="800" dirty="0" smtClean="0">
-                <a:latin typeface="Courier New" pitchFamily="49" charset="0"/>
-                <a:cs typeface="Courier New" pitchFamily="49" charset="0"/>
-              </a:rPr>
-              <a:t>"/&gt;</a:t>
-            </a:r>
-          </a:p>
-          <a:p>
-            <a:r>
-              <a:rPr lang="en-GB" sz="800" dirty="0" smtClean="0">
-                <a:latin typeface="Courier New" pitchFamily="49" charset="0"/>
-                <a:cs typeface="Courier New" pitchFamily="49" charset="0"/>
-              </a:rPr>
-              <a:t>      &lt;</a:t>
-            </a:r>
-            <a:r>
-              <a:rPr lang="en-GB" sz="800" dirty="0" err="1" smtClean="0">
-                <a:latin typeface="Courier New" pitchFamily="49" charset="0"/>
-                <a:cs typeface="Courier New" pitchFamily="49" charset="0"/>
-              </a:rPr>
-              <a:t>cvParam</a:t>
-            </a:r>
-            <a:r>
-              <a:rPr lang="en-GB" sz="800" dirty="0" smtClean="0">
-                <a:latin typeface="Courier New" pitchFamily="49" charset="0"/>
-                <a:cs typeface="Courier New" pitchFamily="49" charset="0"/>
-              </a:rPr>
-              <a:t> accession="MS:1002504" </a:t>
-            </a:r>
-            <a:r>
-              <a:rPr lang="en-GB" sz="800" dirty="0" err="1" smtClean="0">
-                <a:latin typeface="Courier New" pitchFamily="49" charset="0"/>
-                <a:cs typeface="Courier New" pitchFamily="49" charset="0"/>
-              </a:rPr>
-              <a:t>cvRef</a:t>
-            </a:r>
-            <a:r>
-              <a:rPr lang="en-GB" sz="800" dirty="0" smtClean="0">
-                <a:latin typeface="Courier New" pitchFamily="49" charset="0"/>
+              <a:rPr lang="en-GB" sz="800" b="1" dirty="0" smtClean="0">
+                <a:latin typeface="Calibri" panose="020F0502020204030204" pitchFamily="34" charset="0"/>
                 <a:cs typeface="Courier New" pitchFamily="49" charset="0"/>
               </a:rPr>
               <a:t>="PSI-MS" name="modification index" value="2"/&gt;</a:t>
@@ -7371,7 +7398,7 @@
           <a:p>
             <a:r>
               <a:rPr lang="en-GB" sz="800" dirty="0" smtClean="0">
-                <a:latin typeface="Courier New" pitchFamily="49" charset="0"/>
+                <a:latin typeface="Calibri" panose="020F0502020204030204" pitchFamily="34" charset="0"/>
                 <a:cs typeface="Courier New" pitchFamily="49" charset="0"/>
               </a:rPr>
               <a:t>    &lt;/Modification&gt;     </a:t>
@@ -7380,13 +7407,13 @@
           <a:p>
             <a:r>
               <a:rPr lang="en-GB" sz="800" dirty="0" smtClean="0">
-                <a:latin typeface="Courier New" pitchFamily="49" charset="0"/>
+                <a:latin typeface="Calibri" panose="020F0502020204030204" pitchFamily="34" charset="0"/>
                 <a:cs typeface="Courier New" pitchFamily="49" charset="0"/>
               </a:rPr>
               <a:t>  &lt;/Peptide&gt;</a:t>
             </a:r>
             <a:endParaRPr lang="en-GB" sz="800" dirty="0">
-              <a:latin typeface="Courier New" pitchFamily="49" charset="0"/>
+              <a:latin typeface="Calibri" panose="020F0502020204030204" pitchFamily="34" charset="0"/>
               <a:cs typeface="Courier New" pitchFamily="49" charset="0"/>
             </a:endParaRPr>
           </a:p>
@@ -7400,7 +7427,7 @@
         </p:nvSpPr>
         <p:spPr>
           <a:xfrm>
-            <a:off x="323528" y="5071105"/>
+            <a:off x="323528" y="4932660"/>
             <a:ext cx="6408712" cy="2062103"/>
           </a:xfrm>
           <a:prstGeom prst="rect">
@@ -7539,91 +7566,91 @@
           </a:p>
           <a:p>
             <a:r>
-              <a:rPr lang="en-GB" sz="800" dirty="0"/>
+              <a:rPr lang="en-GB" sz="800" b="1" dirty="0"/>
               <a:t>    &lt;</a:t>
             </a:r>
             <a:r>
-              <a:rPr lang="en-GB" sz="800" dirty="0" err="1"/>
+              <a:rPr lang="en-GB" sz="800" b="1" dirty="0" err="1"/>
               <a:t>cvParam</a:t>
             </a:r>
             <a:r>
-              <a:rPr lang="en-GB" sz="800" dirty="0"/>
+              <a:rPr lang="en-GB" sz="800" b="1" dirty="0"/>
               <a:t> </a:t>
             </a:r>
             <a:r>
-              <a:rPr lang="en-GB" sz="800" dirty="0" err="1"/>
+              <a:rPr lang="en-GB" sz="800" b="1" dirty="0" err="1"/>
               <a:t>cvRef</a:t>
             </a:r>
             <a:r>
-              <a:rPr lang="en-GB" sz="800" dirty="0"/>
+              <a:rPr lang="en-GB" sz="800" b="1" dirty="0"/>
               <a:t>="PSI-MS" accession="MS:1001969" name="</a:t>
             </a:r>
             <a:r>
-              <a:rPr lang="en-GB" sz="800" dirty="0" err="1"/>
+              <a:rPr lang="en-GB" sz="800" b="1" dirty="0" err="1"/>
               <a:t>phosphoRS</a:t>
             </a:r>
             <a:r>
-              <a:rPr lang="en-GB" sz="800" dirty="0"/>
+              <a:rPr lang="en-GB" sz="800" b="1" dirty="0"/>
               <a:t> score" value="1:66.66666666:5:false"/&gt;</a:t>
             </a:r>
           </a:p>
           <a:p>
             <a:r>
-              <a:rPr lang="en-GB" sz="800" dirty="0"/>
+              <a:rPr lang="en-GB" sz="800" b="1" dirty="0"/>
               <a:t>    &lt;</a:t>
             </a:r>
             <a:r>
-              <a:rPr lang="en-GB" sz="800" dirty="0" err="1"/>
+              <a:rPr lang="en-GB" sz="800" b="1" dirty="0" err="1"/>
               <a:t>cvParam</a:t>
             </a:r>
             <a:r>
-              <a:rPr lang="en-GB" sz="800" dirty="0"/>
+              <a:rPr lang="en-GB" sz="800" b="1" dirty="0"/>
               <a:t> </a:t>
             </a:r>
             <a:r>
-              <a:rPr lang="en-GB" sz="800" dirty="0" err="1"/>
+              <a:rPr lang="en-GB" sz="800" b="1" dirty="0" err="1"/>
               <a:t>cvRef</a:t>
             </a:r>
             <a:r>
-              <a:rPr lang="en-GB" sz="800" dirty="0"/>
+              <a:rPr lang="en-GB" sz="800" b="1" dirty="0"/>
               <a:t>="PSI-MS" accession="MS:1001969" name="</a:t>
             </a:r>
             <a:r>
-              <a:rPr lang="en-GB" sz="800" dirty="0" err="1"/>
+              <a:rPr lang="en-GB" sz="800" b="1" dirty="0" err="1"/>
               <a:t>phosphoRS</a:t>
             </a:r>
             <a:r>
-              <a:rPr lang="en-GB" sz="800" dirty="0"/>
+              <a:rPr lang="en-GB" sz="800" b="1" dirty="0"/>
               <a:t> score" value="1:66.66666666:8:false"/&gt;</a:t>
             </a:r>
           </a:p>
           <a:p>
             <a:r>
-              <a:rPr lang="en-GB" sz="800" dirty="0"/>
+              <a:rPr lang="en-GB" sz="800" b="1" dirty="0"/>
               <a:t>    &lt;</a:t>
             </a:r>
             <a:r>
-              <a:rPr lang="en-GB" sz="800" dirty="0" err="1"/>
+              <a:rPr lang="en-GB" sz="800" b="1" dirty="0" err="1"/>
               <a:t>cvParam</a:t>
             </a:r>
             <a:r>
-              <a:rPr lang="en-GB" sz="800" dirty="0"/>
+              <a:rPr lang="en-GB" sz="800" b="1" dirty="0"/>
               <a:t> </a:t>
             </a:r>
             <a:r>
-              <a:rPr lang="en-GB" sz="800" dirty="0" err="1"/>
+              <a:rPr lang="en-GB" sz="800" b="1" dirty="0" err="1"/>
               <a:t>cvRef</a:t>
             </a:r>
             <a:r>
-              <a:rPr lang="en-GB" sz="800" dirty="0"/>
+              <a:rPr lang="en-GB" sz="800" b="1" dirty="0"/>
               <a:t>="PSI-MS" accession="MS:1001969" name="</a:t>
             </a:r>
             <a:r>
-              <a:rPr lang="en-GB" sz="800" dirty="0" err="1"/>
+              <a:rPr lang="en-GB" sz="800" b="1" dirty="0" err="1"/>
               <a:t>phosphoRS</a:t>
             </a:r>
             <a:r>
-              <a:rPr lang="en-GB" sz="800" dirty="0"/>
+              <a:rPr lang="en-GB" sz="800" b="1" dirty="0"/>
               <a:t> score" value="1:66.66666666:9:false"/&gt;</a:t>
             </a:r>
           </a:p>
@@ -7635,71 +7662,71 @@
           </a:p>
           <a:p>
             <a:r>
-              <a:rPr lang="en-GB" sz="800" dirty="0"/>
+              <a:rPr lang="en-GB" sz="800" b="1" dirty="0"/>
               <a:t> </a:t>
             </a:r>
             <a:r>
-              <a:rPr lang="en-GB" sz="800" dirty="0" smtClean="0"/>
+              <a:rPr lang="en-GB" sz="800" b="1" dirty="0" smtClean="0"/>
               <a:t>   &lt;</a:t>
             </a:r>
             <a:r>
-              <a:rPr lang="en-GB" sz="800" dirty="0" err="1"/>
+              <a:rPr lang="en-GB" sz="800" b="1" dirty="0" err="1"/>
               <a:t>cvParam</a:t>
             </a:r>
             <a:r>
-              <a:rPr lang="en-GB" sz="800" dirty="0"/>
+              <a:rPr lang="en-GB" sz="800" b="1" dirty="0"/>
               <a:t> </a:t>
             </a:r>
             <a:r>
-              <a:rPr lang="en-GB" sz="800" dirty="0" err="1"/>
+              <a:rPr lang="en-GB" sz="800" b="1" dirty="0" err="1"/>
               <a:t>cvRef</a:t>
             </a:r>
             <a:r>
-              <a:rPr lang="en-GB" sz="800" dirty="0"/>
+              <a:rPr lang="en-GB" sz="800" b="1" dirty="0"/>
               <a:t>="PSI-MS" accession="MS:1002539" name="D-score" value="1:62.37587272987858:5:false"/&gt;</a:t>
             </a:r>
           </a:p>
           <a:p>
             <a:r>
-              <a:rPr lang="en-GB" sz="800" dirty="0"/>
+              <a:rPr lang="en-GB" sz="800" b="1" dirty="0"/>
               <a:t>    &lt;</a:t>
             </a:r>
             <a:r>
-              <a:rPr lang="en-GB" sz="800" dirty="0" err="1"/>
+              <a:rPr lang="en-GB" sz="800" b="1" dirty="0" err="1"/>
               <a:t>cvParam</a:t>
             </a:r>
             <a:r>
-              <a:rPr lang="en-GB" sz="800" dirty="0"/>
+              <a:rPr lang="en-GB" sz="800" b="1" dirty="0"/>
               <a:t> </a:t>
             </a:r>
             <a:r>
-              <a:rPr lang="en-GB" sz="800" dirty="0" err="1"/>
+              <a:rPr lang="en-GB" sz="800" b="1" dirty="0" err="1"/>
               <a:t>cvRef</a:t>
             </a:r>
             <a:r>
-              <a:rPr lang="en-GB" sz="800" dirty="0"/>
+              <a:rPr lang="en-GB" sz="800" b="1" dirty="0"/>
               <a:t>="PSI-MS" accession="MS:1002539" name="D-score" value="1:14.141586139372523:8:false"/&gt;</a:t>
             </a:r>
           </a:p>
           <a:p>
             <a:r>
-              <a:rPr lang="en-GB" sz="800" dirty="0"/>
+              <a:rPr lang="en-GB" sz="800" b="1" dirty="0"/>
               <a:t>    &lt;</a:t>
             </a:r>
             <a:r>
-              <a:rPr lang="en-GB" sz="800" dirty="0" err="1"/>
+              <a:rPr lang="en-GB" sz="800" b="1" dirty="0" err="1"/>
               <a:t>cvParam</a:t>
             </a:r>
             <a:r>
-              <a:rPr lang="en-GB" sz="800" dirty="0"/>
+              <a:rPr lang="en-GB" sz="800" b="1" dirty="0"/>
               <a:t> </a:t>
             </a:r>
             <a:r>
-              <a:rPr lang="en-GB" sz="800" dirty="0" err="1"/>
+              <a:rPr lang="en-GB" sz="800" b="1" dirty="0" err="1"/>
               <a:t>cvRef</a:t>
             </a:r>
             <a:r>
-              <a:rPr lang="en-GB" sz="800" dirty="0"/>
+              <a:rPr lang="en-GB" sz="800" b="1" dirty="0"/>
               <a:t>="PSI-MS" accession="MS:1002539" name="D-score" value="1:36.626793239964236:9:false"/&gt;</a:t>
             </a:r>
           </a:p>
@@ -7754,13 +7781,13 @@
           <p:nvPr>
             <p:extLst>
               <p:ext uri="{D42A27DB-BD31-4B8C-83A1-F6EECF244321}">
-                <p14:modId xmlns:p14="http://schemas.microsoft.com/office/powerpoint/2010/main" val="978503157"/>
+                <p14:modId xmlns:p14="http://schemas.microsoft.com/office/powerpoint/2010/main" val="2193397795"/>
               </p:ext>
             </p:extLst>
           </p:nvPr>
         </p:nvGraphicFramePr>
         <p:xfrm>
-          <a:off x="423291" y="8104034"/>
+          <a:off x="423291" y="7965589"/>
           <a:ext cx="6516217" cy="5405120"/>
         </p:xfrm>
         <a:graphic>
@@ -8209,49 +8236,49 @@
           <a:p>
             <a:r>
               <a:rPr lang="en-GB" sz="800" dirty="0" smtClean="0">
-                <a:latin typeface="Courier New" pitchFamily="49" charset="0"/>
+                <a:latin typeface="Calibri" panose="020F0502020204030204" pitchFamily="34" charset="0"/>
                 <a:cs typeface="Courier New" pitchFamily="49" charset="0"/>
               </a:rPr>
               <a:t>&lt;</a:t>
             </a:r>
             <a:r>
               <a:rPr lang="en-GB" sz="800" dirty="0" err="1" smtClean="0">
-                <a:latin typeface="Courier New" pitchFamily="49" charset="0"/>
+                <a:latin typeface="Calibri" panose="020F0502020204030204" pitchFamily="34" charset="0"/>
                 <a:cs typeface="Courier New" pitchFamily="49" charset="0"/>
               </a:rPr>
               <a:t>SpectrumIdentificationProtocol</a:t>
             </a:r>
             <a:r>
               <a:rPr lang="en-GB" sz="800" dirty="0" smtClean="0">
-                <a:latin typeface="Courier New" pitchFamily="49" charset="0"/>
+                <a:latin typeface="Calibri" panose="020F0502020204030204" pitchFamily="34" charset="0"/>
                 <a:cs typeface="Courier New" pitchFamily="49" charset="0"/>
               </a:rPr>
               <a:t> </a:t>
             </a:r>
             <a:r>
               <a:rPr lang="en-GB" sz="800" dirty="0" err="1" smtClean="0">
-                <a:latin typeface="Courier New" pitchFamily="49" charset="0"/>
+                <a:latin typeface="Calibri" panose="020F0502020204030204" pitchFamily="34" charset="0"/>
                 <a:cs typeface="Courier New" pitchFamily="49" charset="0"/>
               </a:rPr>
               <a:t>analysisSoftware_ref</a:t>
             </a:r>
             <a:r>
               <a:rPr lang="en-GB" sz="800" dirty="0" smtClean="0">
-                <a:latin typeface="Courier New" pitchFamily="49" charset="0"/>
+                <a:latin typeface="Calibri" panose="020F0502020204030204" pitchFamily="34" charset="0"/>
                 <a:cs typeface="Courier New" pitchFamily="49" charset="0"/>
               </a:rPr>
               <a:t>="</a:t>
             </a:r>
             <a:r>
               <a:rPr lang="en-GB" sz="800" dirty="0" err="1" smtClean="0">
-                <a:latin typeface="Courier New" pitchFamily="49" charset="0"/>
+                <a:latin typeface="Calibri" panose="020F0502020204030204" pitchFamily="34" charset="0"/>
                 <a:cs typeface="Courier New" pitchFamily="49" charset="0"/>
               </a:rPr>
               <a:t>ID_software</a:t>
             </a:r>
             <a:r>
               <a:rPr lang="en-GB" sz="800" dirty="0" smtClean="0">
-                <a:latin typeface="Courier New" pitchFamily="49" charset="0"/>
+                <a:latin typeface="Calibri" panose="020F0502020204030204" pitchFamily="34" charset="0"/>
                 <a:cs typeface="Courier New" pitchFamily="49" charset="0"/>
               </a:rPr>
               <a:t>" id="SearchProtocol_1"&gt;</a:t>
@@ -8260,21 +8287,21 @@
           <a:p>
             <a:r>
               <a:rPr lang="en-GB" sz="800" dirty="0" smtClean="0">
-                <a:latin typeface="Courier New" pitchFamily="49" charset="0"/>
+                <a:latin typeface="Calibri" panose="020F0502020204030204" pitchFamily="34" charset="0"/>
                 <a:cs typeface="Courier New" pitchFamily="49" charset="0"/>
               </a:rPr>
               <a:t>    &lt;</a:t>
             </a:r>
             <a:r>
               <a:rPr lang="en-GB" sz="800" dirty="0" err="1" smtClean="0">
-                <a:latin typeface="Courier New" pitchFamily="49" charset="0"/>
+                <a:latin typeface="Calibri" panose="020F0502020204030204" pitchFamily="34" charset="0"/>
                 <a:cs typeface="Courier New" pitchFamily="49" charset="0"/>
               </a:rPr>
               <a:t>SearchType</a:t>
             </a:r>
             <a:r>
               <a:rPr lang="en-GB" sz="800" dirty="0" smtClean="0">
-                <a:latin typeface="Courier New" pitchFamily="49" charset="0"/>
+                <a:latin typeface="Calibri" panose="020F0502020204030204" pitchFamily="34" charset="0"/>
                 <a:cs typeface="Courier New" pitchFamily="49" charset="0"/>
               </a:rPr>
               <a:t>&gt;</a:t>
@@ -8283,35 +8310,35 @@
           <a:p>
             <a:r>
               <a:rPr lang="en-GB" sz="800" dirty="0" smtClean="0">
-                <a:latin typeface="Courier New" pitchFamily="49" charset="0"/>
+                <a:latin typeface="Calibri" panose="020F0502020204030204" pitchFamily="34" charset="0"/>
                 <a:cs typeface="Courier New" pitchFamily="49" charset="0"/>
               </a:rPr>
               <a:t>      &lt;</a:t>
             </a:r>
             <a:r>
               <a:rPr lang="en-GB" sz="800" dirty="0" err="1" smtClean="0">
-                <a:latin typeface="Courier New" pitchFamily="49" charset="0"/>
+                <a:latin typeface="Calibri" panose="020F0502020204030204" pitchFamily="34" charset="0"/>
                 <a:cs typeface="Courier New" pitchFamily="49" charset="0"/>
               </a:rPr>
               <a:t>cvParam</a:t>
             </a:r>
             <a:r>
               <a:rPr lang="en-GB" sz="800" dirty="0" smtClean="0">
-                <a:latin typeface="Courier New" pitchFamily="49" charset="0"/>
+                <a:latin typeface="Calibri" panose="020F0502020204030204" pitchFamily="34" charset="0"/>
                 <a:cs typeface="Courier New" pitchFamily="49" charset="0"/>
               </a:rPr>
               <a:t> accession="MS:1001083" </a:t>
             </a:r>
             <a:r>
               <a:rPr lang="en-GB" sz="800" dirty="0" err="1" smtClean="0">
-                <a:latin typeface="Courier New" pitchFamily="49" charset="0"/>
+                <a:latin typeface="Calibri" panose="020F0502020204030204" pitchFamily="34" charset="0"/>
                 <a:cs typeface="Courier New" pitchFamily="49" charset="0"/>
               </a:rPr>
               <a:t>cvRef</a:t>
             </a:r>
             <a:r>
               <a:rPr lang="en-GB" sz="800" dirty="0" smtClean="0">
-                <a:latin typeface="Courier New" pitchFamily="49" charset="0"/>
+                <a:latin typeface="Calibri" panose="020F0502020204030204" pitchFamily="34" charset="0"/>
                 <a:cs typeface="Courier New" pitchFamily="49" charset="0"/>
               </a:rPr>
               <a:t>="PSI-MS" name="ms-ms search"/&gt;</a:t>
@@ -8320,21 +8347,21 @@
           <a:p>
             <a:r>
               <a:rPr lang="en-GB" sz="800" dirty="0" smtClean="0">
-                <a:latin typeface="Courier New" pitchFamily="49" charset="0"/>
+                <a:latin typeface="Calibri" panose="020F0502020204030204" pitchFamily="34" charset="0"/>
                 <a:cs typeface="Courier New" pitchFamily="49" charset="0"/>
               </a:rPr>
               <a:t>    &lt;/</a:t>
             </a:r>
             <a:r>
               <a:rPr lang="en-GB" sz="800" dirty="0" err="1" smtClean="0">
-                <a:latin typeface="Courier New" pitchFamily="49" charset="0"/>
+                <a:latin typeface="Calibri" panose="020F0502020204030204" pitchFamily="34" charset="0"/>
                 <a:cs typeface="Courier New" pitchFamily="49" charset="0"/>
               </a:rPr>
               <a:t>SearchType</a:t>
             </a:r>
             <a:r>
               <a:rPr lang="en-GB" sz="800" dirty="0" smtClean="0">
-                <a:latin typeface="Courier New" pitchFamily="49" charset="0"/>
+                <a:latin typeface="Calibri" panose="020F0502020204030204" pitchFamily="34" charset="0"/>
                 <a:cs typeface="Courier New" pitchFamily="49" charset="0"/>
               </a:rPr>
               <a:t>&gt;</a:t>
@@ -8343,21 +8370,21 @@
           <a:p>
             <a:r>
               <a:rPr lang="en-GB" sz="800" dirty="0" smtClean="0">
-                <a:latin typeface="Courier New" pitchFamily="49" charset="0"/>
+                <a:latin typeface="Calibri" panose="020F0502020204030204" pitchFamily="34" charset="0"/>
                 <a:cs typeface="Courier New" pitchFamily="49" charset="0"/>
               </a:rPr>
               <a:t>    &lt;</a:t>
             </a:r>
             <a:r>
               <a:rPr lang="en-GB" sz="800" dirty="0" err="1" smtClean="0">
-                <a:latin typeface="Courier New" pitchFamily="49" charset="0"/>
+                <a:latin typeface="Calibri" panose="020F0502020204030204" pitchFamily="34" charset="0"/>
                 <a:cs typeface="Courier New" pitchFamily="49" charset="0"/>
               </a:rPr>
               <a:t>AdditionalSearchParams</a:t>
             </a:r>
             <a:r>
               <a:rPr lang="en-GB" sz="800" dirty="0" smtClean="0">
-                <a:latin typeface="Courier New" pitchFamily="49" charset="0"/>
+                <a:latin typeface="Calibri" panose="020F0502020204030204" pitchFamily="34" charset="0"/>
                 <a:cs typeface="Courier New" pitchFamily="49" charset="0"/>
               </a:rPr>
               <a:t>&gt;</a:t>
@@ -8366,35 +8393,35 @@
           <a:p>
             <a:r>
               <a:rPr lang="en-GB" sz="800" dirty="0" smtClean="0">
-                <a:latin typeface="Courier New" pitchFamily="49" charset="0"/>
+                <a:latin typeface="Calibri" panose="020F0502020204030204" pitchFamily="34" charset="0"/>
                 <a:cs typeface="Courier New" pitchFamily="49" charset="0"/>
               </a:rPr>
               <a:t>      &lt;</a:t>
             </a:r>
             <a:r>
               <a:rPr lang="en-GB" sz="800" dirty="0" err="1" smtClean="0">
-                <a:latin typeface="Courier New" pitchFamily="49" charset="0"/>
+                <a:latin typeface="Calibri" panose="020F0502020204030204" pitchFamily="34" charset="0"/>
                 <a:cs typeface="Courier New" pitchFamily="49" charset="0"/>
               </a:rPr>
               <a:t>cvParam</a:t>
             </a:r>
             <a:r>
               <a:rPr lang="en-GB" sz="800" dirty="0" smtClean="0">
-                <a:latin typeface="Courier New" pitchFamily="49" charset="0"/>
+                <a:latin typeface="Calibri" panose="020F0502020204030204" pitchFamily="34" charset="0"/>
                 <a:cs typeface="Courier New" pitchFamily="49" charset="0"/>
               </a:rPr>
               <a:t> accession="MS:1001211" </a:t>
             </a:r>
             <a:r>
               <a:rPr lang="en-GB" sz="800" dirty="0" err="1" smtClean="0">
-                <a:latin typeface="Courier New" pitchFamily="49" charset="0"/>
+                <a:latin typeface="Calibri" panose="020F0502020204030204" pitchFamily="34" charset="0"/>
                 <a:cs typeface="Courier New" pitchFamily="49" charset="0"/>
               </a:rPr>
               <a:t>cvRef</a:t>
             </a:r>
             <a:r>
               <a:rPr lang="en-GB" sz="800" dirty="0" smtClean="0">
-                <a:latin typeface="Courier New" pitchFamily="49" charset="0"/>
+                <a:latin typeface="Calibri" panose="020F0502020204030204" pitchFamily="34" charset="0"/>
                 <a:cs typeface="Courier New" pitchFamily="49" charset="0"/>
               </a:rPr>
               <a:t>="PSI-MS" name="parent mass type mono"/&gt;</a:t>
@@ -8403,35 +8430,35 @@
           <a:p>
             <a:r>
               <a:rPr lang="en-GB" sz="800" dirty="0" smtClean="0">
-                <a:latin typeface="Courier New" pitchFamily="49" charset="0"/>
+                <a:latin typeface="Calibri" panose="020F0502020204030204" pitchFamily="34" charset="0"/>
                 <a:cs typeface="Courier New" pitchFamily="49" charset="0"/>
               </a:rPr>
               <a:t>      &lt;</a:t>
             </a:r>
             <a:r>
               <a:rPr lang="en-GB" sz="800" dirty="0" err="1" smtClean="0">
-                <a:latin typeface="Courier New" pitchFamily="49" charset="0"/>
+                <a:latin typeface="Calibri" panose="020F0502020204030204" pitchFamily="34" charset="0"/>
                 <a:cs typeface="Courier New" pitchFamily="49" charset="0"/>
               </a:rPr>
               <a:t>cvParam</a:t>
             </a:r>
             <a:r>
               <a:rPr lang="en-GB" sz="800" dirty="0" smtClean="0">
-                <a:latin typeface="Courier New" pitchFamily="49" charset="0"/>
+                <a:latin typeface="Calibri" panose="020F0502020204030204" pitchFamily="34" charset="0"/>
                 <a:cs typeface="Courier New" pitchFamily="49" charset="0"/>
               </a:rPr>
               <a:t> accession="MS:1001256" </a:t>
             </a:r>
             <a:r>
               <a:rPr lang="en-GB" sz="800" dirty="0" err="1" smtClean="0">
-                <a:latin typeface="Courier New" pitchFamily="49" charset="0"/>
+                <a:latin typeface="Calibri" panose="020F0502020204030204" pitchFamily="34" charset="0"/>
                 <a:cs typeface="Courier New" pitchFamily="49" charset="0"/>
               </a:rPr>
               <a:t>cvRef</a:t>
             </a:r>
             <a:r>
               <a:rPr lang="en-GB" sz="800" dirty="0" smtClean="0">
-                <a:latin typeface="Courier New" pitchFamily="49" charset="0"/>
+                <a:latin typeface="Calibri" panose="020F0502020204030204" pitchFamily="34" charset="0"/>
                 <a:cs typeface="Courier New" pitchFamily="49" charset="0"/>
               </a:rPr>
               <a:t>="PSI-MS" name="fragment mass type mono"/&gt;</a:t>
@@ -8439,199 +8466,199 @@
           </a:p>
           <a:p>
             <a:r>
+              <a:rPr lang="en-GB" sz="800" b="1" dirty="0">
+                <a:latin typeface="Calibri" panose="020F0502020204030204" pitchFamily="34" charset="0"/>
+                <a:cs typeface="Courier New" pitchFamily="49" charset="0"/>
+              </a:rPr>
+              <a:t>      &lt;</a:t>
+            </a:r>
+            <a:r>
+              <a:rPr lang="en-GB" sz="800" b="1" dirty="0" err="1">
+                <a:latin typeface="Calibri" panose="020F0502020204030204" pitchFamily="34" charset="0"/>
+                <a:cs typeface="Courier New" pitchFamily="49" charset="0"/>
+              </a:rPr>
+              <a:t>cvParam</a:t>
+            </a:r>
+            <a:r>
+              <a:rPr lang="en-GB" sz="800" b="1" dirty="0">
+                <a:latin typeface="Calibri" panose="020F0502020204030204" pitchFamily="34" charset="0"/>
+                <a:cs typeface="Courier New" pitchFamily="49" charset="0"/>
+              </a:rPr>
+              <a:t> accession="</a:t>
+            </a:r>
+            <a:r>
+              <a:rPr lang="en-GB" sz="800" b="1" dirty="0" smtClean="0">
+                <a:latin typeface="Calibri" panose="020F0502020204030204" pitchFamily="34" charset="0"/>
+                <a:cs typeface="Courier New" pitchFamily="49" charset="0"/>
+              </a:rPr>
+              <a:t>MS:1002491" </a:t>
+            </a:r>
+            <a:r>
+              <a:rPr lang="en-GB" sz="800" b="1" dirty="0" err="1" smtClean="0">
+                <a:latin typeface="Calibri" panose="020F0502020204030204" pitchFamily="34" charset="0"/>
+                <a:cs typeface="Courier New" pitchFamily="49" charset="0"/>
+              </a:rPr>
+              <a:t>cvRef</a:t>
+            </a:r>
+            <a:r>
+              <a:rPr lang="en-GB" sz="800" b="1" dirty="0" smtClean="0">
+                <a:latin typeface="Calibri" panose="020F0502020204030204" pitchFamily="34" charset="0"/>
+                <a:cs typeface="Courier New" pitchFamily="49" charset="0"/>
+              </a:rPr>
+              <a:t>="PSI-MS" name="Modification localization scoring"/&gt;</a:t>
+            </a:r>
+          </a:p>
+          <a:p>
+            <a:r>
+              <a:rPr lang="en-GB" sz="800" dirty="0" smtClean="0">
+                <a:latin typeface="Calibri" panose="020F0502020204030204" pitchFamily="34" charset="0"/>
+                <a:cs typeface="Courier New" pitchFamily="49" charset="0"/>
+              </a:rPr>
+              <a:t>    &lt;/</a:t>
+            </a:r>
+            <a:r>
+              <a:rPr lang="en-GB" sz="800" dirty="0" err="1" smtClean="0">
+                <a:latin typeface="Calibri" panose="020F0502020204030204" pitchFamily="34" charset="0"/>
+                <a:cs typeface="Courier New" pitchFamily="49" charset="0"/>
+              </a:rPr>
+              <a:t>AdditionalSearchParams</a:t>
+            </a:r>
+            <a:r>
+              <a:rPr lang="en-GB" sz="800" dirty="0" smtClean="0">
+                <a:latin typeface="Calibri" panose="020F0502020204030204" pitchFamily="34" charset="0"/>
+                <a:cs typeface="Courier New" pitchFamily="49" charset="0"/>
+              </a:rPr>
+              <a:t>&gt;</a:t>
+            </a:r>
+          </a:p>
+          <a:p>
+            <a:r>
+              <a:rPr lang="en-GB" sz="800" dirty="0" smtClean="0">
+                <a:latin typeface="Calibri" panose="020F0502020204030204" pitchFamily="34" charset="0"/>
+                <a:cs typeface="Courier New" pitchFamily="49" charset="0"/>
+              </a:rPr>
+              <a:t>    ....</a:t>
+            </a:r>
+          </a:p>
+          <a:p>
+            <a:r>
+              <a:rPr lang="en-GB" sz="800" dirty="0" smtClean="0">
+                <a:latin typeface="Calibri" panose="020F0502020204030204" pitchFamily="34" charset="0"/>
+                <a:cs typeface="Courier New" pitchFamily="49" charset="0"/>
+              </a:rPr>
+              <a:t>    &lt;</a:t>
+            </a:r>
+            <a:r>
               <a:rPr lang="en-GB" sz="800" dirty="0">
-                <a:latin typeface="Courier New" pitchFamily="49" charset="0"/>
-                <a:cs typeface="Courier New" pitchFamily="49" charset="0"/>
-              </a:rPr>
-              <a:t>      &lt;</a:t>
-            </a:r>
-            <a:r>
-              <a:rPr lang="en-GB" sz="800" dirty="0" err="1">
-                <a:latin typeface="Courier New" pitchFamily="49" charset="0"/>
-                <a:cs typeface="Courier New" pitchFamily="49" charset="0"/>
-              </a:rPr>
-              <a:t>cvParam</a:t>
-            </a:r>
-            <a:r>
-              <a:rPr lang="en-GB" sz="800" dirty="0">
-                <a:latin typeface="Courier New" pitchFamily="49" charset="0"/>
-                <a:cs typeface="Courier New" pitchFamily="49" charset="0"/>
-              </a:rPr>
-              <a:t> accession="</a:t>
-            </a:r>
-            <a:r>
-              <a:rPr lang="en-GB" sz="800" dirty="0" smtClean="0">
-                <a:latin typeface="Courier New" pitchFamily="49" charset="0"/>
-                <a:cs typeface="Courier New" pitchFamily="49" charset="0"/>
-              </a:rPr>
-              <a:t>MS:1002491" </a:t>
-            </a:r>
-            <a:r>
-              <a:rPr lang="en-GB" sz="800" dirty="0" err="1" smtClean="0">
-                <a:latin typeface="Courier New" pitchFamily="49" charset="0"/>
-                <a:cs typeface="Courier New" pitchFamily="49" charset="0"/>
-              </a:rPr>
-              <a:t>cvRef</a:t>
-            </a:r>
-            <a:r>
-              <a:rPr lang="en-GB" sz="800" dirty="0" smtClean="0">
-                <a:latin typeface="Courier New" pitchFamily="49" charset="0"/>
-                <a:cs typeface="Courier New" pitchFamily="49" charset="0"/>
-              </a:rPr>
-              <a:t>="PSI-MS" name="Modification localization scoring"/&gt;</a:t>
-            </a:r>
-          </a:p>
-          <a:p>
-            <a:r>
-              <a:rPr lang="en-GB" sz="800" dirty="0" smtClean="0">
-                <a:latin typeface="Courier New" pitchFamily="49" charset="0"/>
-                <a:cs typeface="Courier New" pitchFamily="49" charset="0"/>
-              </a:rPr>
-              <a:t>    &lt;/</a:t>
-            </a:r>
-            <a:r>
-              <a:rPr lang="en-GB" sz="800" dirty="0" err="1" smtClean="0">
-                <a:latin typeface="Courier New" pitchFamily="49" charset="0"/>
-                <a:cs typeface="Courier New" pitchFamily="49" charset="0"/>
-              </a:rPr>
-              <a:t>AdditionalSearchParams</a:t>
-            </a:r>
-            <a:r>
-              <a:rPr lang="en-GB" sz="800" dirty="0" smtClean="0">
-                <a:latin typeface="Courier New" pitchFamily="49" charset="0"/>
-                <a:cs typeface="Courier New" pitchFamily="49" charset="0"/>
-              </a:rPr>
-              <a:t>&gt;</a:t>
-            </a:r>
-          </a:p>
-          <a:p>
-            <a:r>
-              <a:rPr lang="en-GB" sz="800" dirty="0" smtClean="0">
-                <a:latin typeface="Courier New" pitchFamily="49" charset="0"/>
-                <a:cs typeface="Courier New" pitchFamily="49" charset="0"/>
-              </a:rPr>
-              <a:t>    ....</a:t>
-            </a:r>
-          </a:p>
-          <a:p>
-            <a:r>
-              <a:rPr lang="en-GB" sz="800" dirty="0" smtClean="0">
-                <a:latin typeface="Courier New" pitchFamily="49" charset="0"/>
-                <a:cs typeface="Courier New" pitchFamily="49" charset="0"/>
-              </a:rPr>
-              <a:t>    &lt;</a:t>
-            </a:r>
-            <a:r>
-              <a:rPr lang="en-GB" sz="800" dirty="0">
-                <a:latin typeface="Courier New" pitchFamily="49" charset="0"/>
+                <a:latin typeface="Calibri" panose="020F0502020204030204" pitchFamily="34" charset="0"/>
                 <a:cs typeface="Courier New" pitchFamily="49" charset="0"/>
               </a:rPr>
               <a:t>Threshold&gt;</a:t>
             </a:r>
             <a:br>
               <a:rPr lang="en-GB" sz="800" dirty="0">
-                <a:latin typeface="Courier New" pitchFamily="49" charset="0"/>
+                <a:latin typeface="Calibri" panose="020F0502020204030204" pitchFamily="34" charset="0"/>
                 <a:cs typeface="Courier New" pitchFamily="49" charset="0"/>
               </a:rPr>
             </a:br>
             <a:r>
               <a:rPr lang="en-GB" sz="800" dirty="0" smtClean="0">
-                <a:latin typeface="Courier New" pitchFamily="49" charset="0"/>
+                <a:latin typeface="Calibri" panose="020F0502020204030204" pitchFamily="34" charset="0"/>
                 <a:cs typeface="Courier New" pitchFamily="49" charset="0"/>
               </a:rPr>
               <a:t>      &lt;</a:t>
             </a:r>
             <a:r>
               <a:rPr lang="en-GB" sz="800" dirty="0" err="1">
-                <a:latin typeface="Courier New" pitchFamily="49" charset="0"/>
+                <a:latin typeface="Calibri" panose="020F0502020204030204" pitchFamily="34" charset="0"/>
                 <a:cs typeface="Courier New" pitchFamily="49" charset="0"/>
               </a:rPr>
               <a:t>cvParam</a:t>
             </a:r>
             <a:r>
               <a:rPr lang="en-GB" sz="800" dirty="0">
-                <a:latin typeface="Courier New" pitchFamily="49" charset="0"/>
+                <a:latin typeface="Calibri" panose="020F0502020204030204" pitchFamily="34" charset="0"/>
                 <a:cs typeface="Courier New" pitchFamily="49" charset="0"/>
               </a:rPr>
               <a:t> accession="MS:1002354" </a:t>
             </a:r>
             <a:r>
               <a:rPr lang="en-GB" sz="800" dirty="0" err="1">
-                <a:latin typeface="Courier New" pitchFamily="49" charset="0"/>
+                <a:latin typeface="Calibri" panose="020F0502020204030204" pitchFamily="34" charset="0"/>
                 <a:cs typeface="Courier New" pitchFamily="49" charset="0"/>
               </a:rPr>
               <a:t>cvRef</a:t>
             </a:r>
             <a:r>
               <a:rPr lang="en-GB" sz="800" dirty="0">
-                <a:latin typeface="Courier New" pitchFamily="49" charset="0"/>
+                <a:latin typeface="Calibri" panose="020F0502020204030204" pitchFamily="34" charset="0"/>
                 <a:cs typeface="Courier New" pitchFamily="49" charset="0"/>
               </a:rPr>
               <a:t>="PSI-MS" name="PSM-level q-value" value="0.01"/&gt;</a:t>
             </a:r>
             <a:br>
               <a:rPr lang="en-GB" sz="800" dirty="0">
-                <a:latin typeface="Courier New" pitchFamily="49" charset="0"/>
+                <a:latin typeface="Calibri" panose="020F0502020204030204" pitchFamily="34" charset="0"/>
                 <a:cs typeface="Courier New" pitchFamily="49" charset="0"/>
               </a:rPr>
             </a:br>
             <a:r>
               <a:rPr lang="en-GB" sz="800" dirty="0" smtClean="0">
-                <a:latin typeface="Courier New" pitchFamily="49" charset="0"/>
+                <a:latin typeface="Calibri" panose="020F0502020204030204" pitchFamily="34" charset="0"/>
                 <a:cs typeface="Courier New" pitchFamily="49" charset="0"/>
               </a:rPr>
               <a:t>      &lt;</a:t>
             </a:r>
             <a:r>
               <a:rPr lang="en-GB" sz="800" dirty="0" err="1">
-                <a:latin typeface="Courier New" pitchFamily="49" charset="0"/>
+                <a:latin typeface="Calibri" panose="020F0502020204030204" pitchFamily="34" charset="0"/>
                 <a:cs typeface="Courier New" pitchFamily="49" charset="0"/>
               </a:rPr>
               <a:t>cvParam</a:t>
             </a:r>
             <a:r>
               <a:rPr lang="en-GB" sz="800" dirty="0">
-                <a:latin typeface="Courier New" pitchFamily="49" charset="0"/>
+                <a:latin typeface="Calibri" panose="020F0502020204030204" pitchFamily="34" charset="0"/>
                 <a:cs typeface="Courier New" pitchFamily="49" charset="0"/>
               </a:rPr>
               <a:t> accession="MS:1002380" </a:t>
             </a:r>
             <a:r>
               <a:rPr lang="en-GB" sz="800" dirty="0" err="1">
-                <a:latin typeface="Courier New" pitchFamily="49" charset="0"/>
+                <a:latin typeface="Calibri" panose="020F0502020204030204" pitchFamily="34" charset="0"/>
                 <a:cs typeface="Courier New" pitchFamily="49" charset="0"/>
               </a:rPr>
               <a:t>cvRef</a:t>
             </a:r>
             <a:r>
               <a:rPr lang="en-GB" sz="800" dirty="0">
-                <a:latin typeface="Courier New" pitchFamily="49" charset="0"/>
+                <a:latin typeface="Calibri" panose="020F0502020204030204" pitchFamily="34" charset="0"/>
                 <a:cs typeface="Courier New" pitchFamily="49" charset="0"/>
               </a:rPr>
               <a:t>="PSI-MS" name="false localization rate" value="0.05"/&gt;</a:t>
             </a:r>
             <a:br>
               <a:rPr lang="en-GB" sz="800" dirty="0">
-                <a:latin typeface="Courier New" pitchFamily="49" charset="0"/>
+                <a:latin typeface="Calibri" panose="020F0502020204030204" pitchFamily="34" charset="0"/>
                 <a:cs typeface="Courier New" pitchFamily="49" charset="0"/>
               </a:rPr>
             </a:br>
             <a:r>
               <a:rPr lang="en-GB" sz="800" dirty="0" smtClean="0">
-                <a:latin typeface="Courier New" pitchFamily="49" charset="0"/>
+                <a:latin typeface="Calibri" panose="020F0502020204030204" pitchFamily="34" charset="0"/>
                 <a:cs typeface="Courier New" pitchFamily="49" charset="0"/>
               </a:rPr>
               <a:t>    &lt;/</a:t>
             </a:r>
             <a:r>
               <a:rPr lang="en-GB" sz="800" dirty="0">
-                <a:latin typeface="Courier New" pitchFamily="49" charset="0"/>
+                <a:latin typeface="Calibri" panose="020F0502020204030204" pitchFamily="34" charset="0"/>
                 <a:cs typeface="Courier New" pitchFamily="49" charset="0"/>
               </a:rPr>
               <a:t>Threshold&gt;</a:t>
             </a:r>
             <a:endParaRPr lang="en-GB" sz="800" dirty="0" smtClean="0">
-              <a:latin typeface="Courier New" pitchFamily="49" charset="0"/>
+              <a:latin typeface="Calibri" panose="020F0502020204030204" pitchFamily="34" charset="0"/>
               <a:cs typeface="Courier New" pitchFamily="49" charset="0"/>
             </a:endParaRPr>
           </a:p>
@@ -8704,7 +8731,7 @@
         </p:nvSpPr>
         <p:spPr>
           <a:xfrm>
-            <a:off x="5203308" y="5689363"/>
+            <a:off x="5203308" y="5550918"/>
             <a:ext cx="296876" cy="369332"/>
           </a:xfrm>
           <a:prstGeom prst="rect">
@@ -8734,7 +8761,7 @@
         </p:nvSpPr>
         <p:spPr>
           <a:xfrm>
-            <a:off x="2507143" y="6723568"/>
+            <a:off x="2507143" y="6585123"/>
             <a:ext cx="296876" cy="369332"/>
           </a:xfrm>
           <a:prstGeom prst="rect">
@@ -8794,7 +8821,7 @@
         </p:nvSpPr>
         <p:spPr>
           <a:xfrm>
-            <a:off x="318257" y="26740"/>
+            <a:off x="302273" y="417642"/>
             <a:ext cx="3317639" cy="338554"/>
           </a:xfrm>
           <a:prstGeom prst="rect">
@@ -8835,7 +8862,7 @@
         </p:blipFill>
         <p:spPr bwMode="auto">
           <a:xfrm>
-            <a:off x="395536" y="7234363"/>
+            <a:off x="395536" y="7095918"/>
             <a:ext cx="4520091" cy="768516"/>
           </a:xfrm>
           <a:prstGeom prst="rect">
@@ -10836,7 +10863,7 @@
         </p:nvSpPr>
         <p:spPr>
           <a:xfrm>
-            <a:off x="360140" y="120730"/>
+            <a:off x="314687" y="506200"/>
             <a:ext cx="3923575" cy="338554"/>
           </a:xfrm>
           <a:prstGeom prst="rect">
@@ -13259,7 +13286,7 @@
         </p:nvSpPr>
         <p:spPr>
           <a:xfrm>
-            <a:off x="6422540" y="2511098"/>
+            <a:off x="6710572" y="2511098"/>
             <a:ext cx="309700" cy="369332"/>
           </a:xfrm>
           <a:prstGeom prst="rect">
@@ -13350,49 +13377,49 @@
           </a:p>
           <a:p>
             <a:r>
-              <a:rPr lang="en-GB" sz="800" dirty="0">
+              <a:rPr lang="en-GB" sz="800" b="1" dirty="0">
                 <a:latin typeface="Courier New" pitchFamily="49" charset="0"/>
                 <a:cs typeface="Courier New" pitchFamily="49" charset="0"/>
               </a:rPr>
               <a:t> </a:t>
             </a:r>
             <a:r>
-              <a:rPr lang="en-GB" sz="800" dirty="0" smtClean="0">
+              <a:rPr lang="en-GB" sz="800" b="1" dirty="0" smtClean="0">
                 <a:latin typeface="Courier New" pitchFamily="49" charset="0"/>
                 <a:cs typeface="Courier New" pitchFamily="49" charset="0"/>
               </a:rPr>
               <a:t>  &lt;</a:t>
             </a:r>
             <a:r>
-              <a:rPr lang="en-GB" sz="800" dirty="0" err="1">
+              <a:rPr lang="en-GB" sz="800" b="1" dirty="0" err="1">
                 <a:latin typeface="Courier New" pitchFamily="49" charset="0"/>
                 <a:cs typeface="Courier New" pitchFamily="49" charset="0"/>
               </a:rPr>
               <a:t>cvParam</a:t>
             </a:r>
             <a:r>
-              <a:rPr lang="en-GB" sz="800" dirty="0">
+              <a:rPr lang="en-GB" sz="800" b="1" dirty="0">
                 <a:latin typeface="Courier New" pitchFamily="49" charset="0"/>
                 <a:cs typeface="Courier New" pitchFamily="49" charset="0"/>
               </a:rPr>
               <a:t> </a:t>
             </a:r>
             <a:r>
-              <a:rPr lang="en-GB" sz="800" dirty="0" err="1">
+              <a:rPr lang="en-GB" sz="800" b="1" dirty="0" err="1">
                 <a:latin typeface="Courier New" pitchFamily="49" charset="0"/>
                 <a:cs typeface="Courier New" pitchFamily="49" charset="0"/>
               </a:rPr>
               <a:t>cvRef</a:t>
             </a:r>
             <a:r>
-              <a:rPr lang="en-GB" sz="800" dirty="0">
+              <a:rPr lang="en-GB" sz="800" b="1" dirty="0">
                 <a:latin typeface="Courier New" pitchFamily="49" charset="0"/>
                 <a:cs typeface="Courier New" pitchFamily="49" charset="0"/>
               </a:rPr>
               <a:t>="PSI-MS" accession="MS:1002637" name="chromosome name" value="1</a:t>
             </a:r>
             <a:r>
-              <a:rPr lang="en-GB" sz="800" dirty="0" smtClean="0">
+              <a:rPr lang="en-GB" sz="800" b="1" dirty="0" smtClean="0">
                 <a:latin typeface="Courier New" pitchFamily="49" charset="0"/>
                 <a:cs typeface="Courier New" pitchFamily="49" charset="0"/>
               </a:rPr>
@@ -13401,49 +13428,49 @@
           </a:p>
           <a:p>
             <a:r>
-              <a:rPr lang="en-GB" sz="800" dirty="0" smtClean="0">
+              <a:rPr lang="en-GB" sz="800" b="1" dirty="0" smtClean="0">
                 <a:latin typeface="Courier New" pitchFamily="49" charset="0"/>
                 <a:cs typeface="Courier New" pitchFamily="49" charset="0"/>
               </a:rPr>
               <a:t>   </a:t>
             </a:r>
             <a:r>
-              <a:rPr lang="en-GB" sz="800" dirty="0">
+              <a:rPr lang="en-GB" sz="800" b="1" dirty="0">
                 <a:latin typeface="Courier New" pitchFamily="49" charset="0"/>
                 <a:cs typeface="Courier New" pitchFamily="49" charset="0"/>
               </a:rPr>
               <a:t>&lt;</a:t>
             </a:r>
             <a:r>
-              <a:rPr lang="en-GB" sz="800" dirty="0" err="1">
+              <a:rPr lang="en-GB" sz="800" b="1" dirty="0" err="1">
                 <a:latin typeface="Courier New" pitchFamily="49" charset="0"/>
                 <a:cs typeface="Courier New" pitchFamily="49" charset="0"/>
               </a:rPr>
               <a:t>cvParam</a:t>
             </a:r>
             <a:r>
-              <a:rPr lang="en-GB" sz="800" dirty="0">
+              <a:rPr lang="en-GB" sz="800" b="1" dirty="0">
                 <a:latin typeface="Courier New" pitchFamily="49" charset="0"/>
                 <a:cs typeface="Courier New" pitchFamily="49" charset="0"/>
               </a:rPr>
               <a:t> </a:t>
             </a:r>
             <a:r>
-              <a:rPr lang="en-GB" sz="800" dirty="0" err="1">
+              <a:rPr lang="en-GB" sz="800" b="1" dirty="0" err="1">
                 <a:latin typeface="Courier New" pitchFamily="49" charset="0"/>
                 <a:cs typeface="Courier New" pitchFamily="49" charset="0"/>
               </a:rPr>
               <a:t>cvRef</a:t>
             </a:r>
             <a:r>
-              <a:rPr lang="en-GB" sz="800" dirty="0">
+              <a:rPr lang="en-GB" sz="800" b="1" dirty="0">
                 <a:latin typeface="Courier New" pitchFamily="49" charset="0"/>
                 <a:cs typeface="Courier New" pitchFamily="49" charset="0"/>
               </a:rPr>
               <a:t>="PSI-MS" accession="MS:1002638" name="chromosome strand" value</a:t>
             </a:r>
             <a:r>
-              <a:rPr lang="en-GB" sz="800" dirty="0" smtClean="0">
+              <a:rPr lang="en-GB" sz="800" b="1" dirty="0" smtClean="0">
                 <a:latin typeface="Courier New" pitchFamily="49" charset="0"/>
                 <a:cs typeface="Courier New" pitchFamily="49" charset="0"/>
               </a:rPr>
@@ -13452,55 +13479,55 @@
           </a:p>
           <a:p>
             <a:r>
-              <a:rPr lang="en-GB" sz="800" dirty="0" smtClean="0">
+              <a:rPr lang="en-GB" sz="800" b="1" dirty="0" smtClean="0">
                 <a:latin typeface="Courier New" pitchFamily="49" charset="0"/>
                 <a:cs typeface="Courier New" pitchFamily="49" charset="0"/>
               </a:rPr>
               <a:t>   &lt;</a:t>
             </a:r>
             <a:r>
-              <a:rPr lang="en-GB" sz="800" dirty="0" err="1" smtClean="0">
+              <a:rPr lang="en-GB" sz="800" b="1" dirty="0" err="1" smtClean="0">
                 <a:latin typeface="Courier New" pitchFamily="49" charset="0"/>
                 <a:cs typeface="Courier New" pitchFamily="49" charset="0"/>
               </a:rPr>
               <a:t>cvParam</a:t>
             </a:r>
             <a:r>
-              <a:rPr lang="en-GB" sz="800" dirty="0" smtClean="0">
+              <a:rPr lang="en-GB" sz="800" b="1" dirty="0" smtClean="0">
                 <a:latin typeface="Courier New" pitchFamily="49" charset="0"/>
                 <a:cs typeface="Courier New" pitchFamily="49" charset="0"/>
               </a:rPr>
               <a:t> </a:t>
             </a:r>
             <a:r>
-              <a:rPr lang="en-GB" sz="800" dirty="0" err="1">
+              <a:rPr lang="en-GB" sz="800" b="1" dirty="0" err="1">
                 <a:latin typeface="Courier New" pitchFamily="49" charset="0"/>
                 <a:cs typeface="Courier New" pitchFamily="49" charset="0"/>
               </a:rPr>
               <a:t>cvRef</a:t>
             </a:r>
             <a:r>
-              <a:rPr lang="en-GB" sz="800" dirty="0">
+              <a:rPr lang="en-GB" sz="800" b="1" dirty="0">
                 <a:latin typeface="Courier New" pitchFamily="49" charset="0"/>
                 <a:cs typeface="Courier New" pitchFamily="49" charset="0"/>
               </a:rPr>
               <a:t>="PSI-MS" accession="MS:1002644" name="genome reference version" value="</a:t>
             </a:r>
             <a:r>
-              <a:rPr lang="en-GB" sz="800" dirty="0" err="1">
+              <a:rPr lang="en-GB" sz="800" b="1" dirty="0" err="1">
                 <a:latin typeface="Courier New" pitchFamily="49" charset="0"/>
                 <a:cs typeface="Courier New" pitchFamily="49" charset="0"/>
               </a:rPr>
               <a:t>Ensembl</a:t>
             </a:r>
             <a:r>
-              <a:rPr lang="en-GB" sz="800" dirty="0">
+              <a:rPr lang="en-GB" sz="800" b="1" dirty="0">
                 <a:latin typeface="Courier New" pitchFamily="49" charset="0"/>
                 <a:cs typeface="Courier New" pitchFamily="49" charset="0"/>
               </a:rPr>
               <a:t> release 84"/&gt;  </a:t>
             </a:r>
-            <a:endParaRPr lang="en-GB" sz="800" dirty="0" smtClean="0">
+            <a:endParaRPr lang="en-GB" sz="800" b="1" dirty="0" smtClean="0">
               <a:latin typeface="Courier New" pitchFamily="49" charset="0"/>
               <a:cs typeface="Courier New" pitchFamily="49" charset="0"/>
             </a:endParaRPr>
@@ -13543,7 +13570,7 @@
           <p:nvPr>
             <p:extLst>
               <p:ext uri="{D42A27DB-BD31-4B8C-83A1-F6EECF244321}">
-                <p14:modId xmlns:p14="http://schemas.microsoft.com/office/powerpoint/2010/main" val="1547081707"/>
+                <p14:modId xmlns:p14="http://schemas.microsoft.com/office/powerpoint/2010/main" val="3234962061"/>
               </p:ext>
             </p:extLst>
           </p:nvPr>
@@ -13670,25 +13697,13 @@
                         <a:rPr lang="en-GB" sz="1200" dirty="0" smtClean="0">
                           <a:latin typeface="+mj-lt"/>
                         </a:rPr>
-                        <a:t>These</a:t>
+                        <a:t>The</a:t>
                       </a:r>
                       <a:r>
                         <a:rPr lang="en-GB" sz="1200" baseline="0" dirty="0" smtClean="0">
                           <a:latin typeface="+mj-lt"/>
                         </a:rPr>
-                        <a:t> </a:t>
-                      </a:r>
-                      <a:r>
-                        <a:rPr lang="en-GB" sz="1200" baseline="0" dirty="0" smtClean="0">
-                          <a:latin typeface="+mj-lt"/>
-                        </a:rPr>
-                        <a:t>cv </a:t>
-                      </a:r>
-                      <a:r>
-                        <a:rPr lang="en-GB" sz="1200" baseline="0" dirty="0" smtClean="0">
-                          <a:latin typeface="+mj-lt"/>
-                        </a:rPr>
-                        <a:t>terms MUST be present on every </a:t>
+                        <a:t> cv terms in bold MUST be present on every </a:t>
                       </a:r>
                       <a:r>
                         <a:rPr lang="en-GB" sz="1200" baseline="0" dirty="0" err="1" smtClean="0">
@@ -13812,15 +13827,7 @@
                       </a:r>
                       <a:r>
                         <a:rPr lang="en-GB" sz="1200" i="0" baseline="0" dirty="0" smtClean="0"/>
-                        <a:t> value MUST </a:t>
-                      </a:r>
-                      <a:r>
-                        <a:rPr lang="en-GB" sz="1200" i="0" baseline="0" dirty="0" smtClean="0"/>
-                        <a:t>store the genome reference </a:t>
-                      </a:r>
-                      <a:r>
-                        <a:rPr lang="en-GB" sz="1200" i="0" baseline="0" dirty="0" smtClean="0"/>
-                        <a:t>version, chromosome name and strand. </a:t>
+                        <a:t> value MUST store the genome reference version, chromosome name and strand. </a:t>
                       </a:r>
                       <a:endParaRPr lang="en-GB" sz="1200" i="0" baseline="0" dirty="0" smtClean="0">
                         <a:solidFill>
@@ -13844,7 +13851,7 @@
         </p:nvSpPr>
         <p:spPr>
           <a:xfrm>
-            <a:off x="6397638" y="3130294"/>
+            <a:off x="6701755" y="3130294"/>
             <a:ext cx="309700" cy="369332"/>
           </a:xfrm>
           <a:prstGeom prst="rect">
@@ -13874,7 +13881,7 @@
         </p:nvSpPr>
         <p:spPr>
           <a:xfrm>
-            <a:off x="6388821" y="4165940"/>
+            <a:off x="6692938" y="4165940"/>
             <a:ext cx="327334" cy="369332"/>
           </a:xfrm>
           <a:prstGeom prst="rect">
@@ -13905,14 +13912,14 @@
           <p:nvPr>
             <p:extLst>
               <p:ext uri="{D42A27DB-BD31-4B8C-83A1-F6EECF244321}">
-                <p14:modId xmlns:p14="http://schemas.microsoft.com/office/powerpoint/2010/main" val="4060796121"/>
+                <p14:modId xmlns:p14="http://schemas.microsoft.com/office/powerpoint/2010/main" val="1784363513"/>
               </p:ext>
             </p:extLst>
           </p:nvPr>
         </p:nvGraphicFramePr>
         <p:xfrm>
           <a:off x="419944" y="7812548"/>
-          <a:ext cx="6624736" cy="3672840"/>
+          <a:ext cx="6624736" cy="4130040"/>
         </p:xfrm>
         <a:graphic>
           <a:graphicData uri="http://schemas.openxmlformats.org/drawingml/2006/table">
@@ -14048,6 +14055,61 @@
                       <a:r>
                         <a:rPr lang="en-GB" sz="1200" dirty="0" smtClean="0"/>
                         <a:t>The strand (‘+’ or ‘-’) to which the peptide has been mapped.</a:t>
+                      </a:r>
+                      <a:endParaRPr lang="en-GB" sz="1200" dirty="0"/>
+                    </a:p>
+                  </a:txBody>
+                  <a:tcPr/>
+                </a:tc>
+              </a:tr>
+              <a:tr h="370840">
+                <a:tc>
+                  <a:txBody>
+                    <a:bodyPr/>
+                    <a:lstStyle/>
+                    <a:p>
+                      <a:r>
+                        <a:rPr lang="en-GB" sz="1200" dirty="0" smtClean="0"/>
+                        <a:t>Genome reference version</a:t>
+                      </a:r>
+                      <a:endParaRPr lang="en-GB" sz="1200" dirty="0"/>
+                    </a:p>
+                  </a:txBody>
+                  <a:tcPr/>
+                </a:tc>
+                <a:tc>
+                  <a:txBody>
+                    <a:bodyPr/>
+                    <a:lstStyle/>
+                    <a:p>
+                      <a:pPr marL="0" marR="0" indent="0" algn="l" defTabSz="914400" rtl="0" eaLnBrk="1" fontAlgn="auto" latinLnBrk="0" hangingPunct="1">
+                        <a:lnSpc>
+                          <a:spcPct val="100000"/>
+                        </a:lnSpc>
+                        <a:spcBef>
+                          <a:spcPts val="0"/>
+                        </a:spcBef>
+                        <a:spcAft>
+                          <a:spcPts val="0"/>
+                        </a:spcAft>
+                        <a:buClrTx/>
+                        <a:buSzTx/>
+                        <a:buFontTx/>
+                        <a:buNone/>
+                        <a:tabLst/>
+                        <a:defRPr/>
+                      </a:pPr>
+                      <a:r>
+                        <a:rPr lang="en-GB" sz="1200" dirty="0" smtClean="0"/>
+                        <a:t>The genome reference version to which the peptides have</a:t>
+                      </a:r>
+                      <a:r>
+                        <a:rPr lang="en-GB" sz="1200" baseline="0" dirty="0" smtClean="0"/>
+                        <a:t> </a:t>
+                      </a:r>
+                      <a:r>
+                        <a:rPr lang="en-GB" sz="1200" baseline="0" smtClean="0"/>
+                        <a:t>been mapped</a:t>
                       </a:r>
                       <a:endParaRPr lang="en-GB" sz="1200" dirty="0"/>
                     </a:p>

</xml_diff>

<commit_message>
Clean-up of spec doc. A few minor comments to solve before submission
</commit_message>
<xml_diff>
--- a/specification_document/specdoc1_2/NewFeaturesInMzid12.pptx
+++ b/specification_document/specdoc1_2/NewFeaturesInMzid12.pptx
@@ -215,7 +215,7 @@
             <a:fld id="{943B0BE5-311A-4B0A-9A39-DE24DD4BA79D}" type="datetimeFigureOut">
               <a:rPr lang="en-GB" smtClean="0"/>
               <a:pPr/>
-              <a:t>09/06/2016</a:t>
+              <a:t>18/07/2016</a:t>
             </a:fld>
             <a:endParaRPr lang="en-GB"/>
           </a:p>
@@ -760,7 +760,7 @@
             <a:fld id="{A71EF3F3-5BE8-4F69-8C8F-88D570AA2740}" type="datetimeFigureOut">
               <a:rPr lang="en-GB" smtClean="0"/>
               <a:pPr/>
-              <a:t>09/06/2016</a:t>
+              <a:t>18/07/2016</a:t>
             </a:fld>
             <a:endParaRPr lang="en-GB"/>
           </a:p>
@@ -927,7 +927,7 @@
             <a:fld id="{A71EF3F3-5BE8-4F69-8C8F-88D570AA2740}" type="datetimeFigureOut">
               <a:rPr lang="en-GB" smtClean="0"/>
               <a:pPr/>
-              <a:t>09/06/2016</a:t>
+              <a:t>18/07/2016</a:t>
             </a:fld>
             <a:endParaRPr lang="en-GB"/>
           </a:p>
@@ -1104,7 +1104,7 @@
             <a:fld id="{A71EF3F3-5BE8-4F69-8C8F-88D570AA2740}" type="datetimeFigureOut">
               <a:rPr lang="en-GB" smtClean="0"/>
               <a:pPr/>
-              <a:t>09/06/2016</a:t>
+              <a:t>18/07/2016</a:t>
             </a:fld>
             <a:endParaRPr lang="en-GB"/>
           </a:p>
@@ -1271,7 +1271,7 @@
             <a:fld id="{A71EF3F3-5BE8-4F69-8C8F-88D570AA2740}" type="datetimeFigureOut">
               <a:rPr lang="en-GB" smtClean="0"/>
               <a:pPr/>
-              <a:t>09/06/2016</a:t>
+              <a:t>18/07/2016</a:t>
             </a:fld>
             <a:endParaRPr lang="en-GB"/>
           </a:p>
@@ -1514,7 +1514,7 @@
             <a:fld id="{A71EF3F3-5BE8-4F69-8C8F-88D570AA2740}" type="datetimeFigureOut">
               <a:rPr lang="en-GB" smtClean="0"/>
               <a:pPr/>
-              <a:t>09/06/2016</a:t>
+              <a:t>18/07/2016</a:t>
             </a:fld>
             <a:endParaRPr lang="en-GB"/>
           </a:p>
@@ -1799,7 +1799,7 @@
             <a:fld id="{A71EF3F3-5BE8-4F69-8C8F-88D570AA2740}" type="datetimeFigureOut">
               <a:rPr lang="en-GB" smtClean="0"/>
               <a:pPr/>
-              <a:t>09/06/2016</a:t>
+              <a:t>18/07/2016</a:t>
             </a:fld>
             <a:endParaRPr lang="en-GB"/>
           </a:p>
@@ -2218,7 +2218,7 @@
             <a:fld id="{A71EF3F3-5BE8-4F69-8C8F-88D570AA2740}" type="datetimeFigureOut">
               <a:rPr lang="en-GB" smtClean="0"/>
               <a:pPr/>
-              <a:t>09/06/2016</a:t>
+              <a:t>18/07/2016</a:t>
             </a:fld>
             <a:endParaRPr lang="en-GB"/>
           </a:p>
@@ -2333,7 +2333,7 @@
             <a:fld id="{A71EF3F3-5BE8-4F69-8C8F-88D570AA2740}" type="datetimeFigureOut">
               <a:rPr lang="en-GB" smtClean="0"/>
               <a:pPr/>
-              <a:t>09/06/2016</a:t>
+              <a:t>18/07/2016</a:t>
             </a:fld>
             <a:endParaRPr lang="en-GB"/>
           </a:p>
@@ -2425,7 +2425,7 @@
             <a:fld id="{A71EF3F3-5BE8-4F69-8C8F-88D570AA2740}" type="datetimeFigureOut">
               <a:rPr lang="en-GB" smtClean="0"/>
               <a:pPr/>
-              <a:t>09/06/2016</a:t>
+              <a:t>18/07/2016</a:t>
             </a:fld>
             <a:endParaRPr lang="en-GB"/>
           </a:p>
@@ -2699,7 +2699,7 @@
             <a:fld id="{A71EF3F3-5BE8-4F69-8C8F-88D570AA2740}" type="datetimeFigureOut">
               <a:rPr lang="en-GB" smtClean="0"/>
               <a:pPr/>
-              <a:t>09/06/2016</a:t>
+              <a:t>18/07/2016</a:t>
             </a:fld>
             <a:endParaRPr lang="en-GB"/>
           </a:p>
@@ -2949,7 +2949,7 @@
             <a:fld id="{A71EF3F3-5BE8-4F69-8C8F-88D570AA2740}" type="datetimeFigureOut">
               <a:rPr lang="en-GB" smtClean="0"/>
               <a:pPr/>
-              <a:t>09/06/2016</a:t>
+              <a:t>18/07/2016</a:t>
             </a:fld>
             <a:endParaRPr lang="en-GB"/>
           </a:p>
@@ -3159,7 +3159,7 @@
             <a:fld id="{A71EF3F3-5BE8-4F69-8C8F-88D570AA2740}" type="datetimeFigureOut">
               <a:rPr lang="en-GB" smtClean="0"/>
               <a:pPr/>
-              <a:t>09/06/2016</a:t>
+              <a:t>18/07/2016</a:t>
             </a:fld>
             <a:endParaRPr lang="en-GB"/>
           </a:p>
@@ -5454,13 +5454,7 @@
               <a:rPr lang="en-GB" sz="800" b="1" dirty="0" smtClean="0">
                 <a:cs typeface="Courier New" pitchFamily="49" charset="0"/>
               </a:rPr>
-              <a:t>  </a:t>
-            </a:r>
-            <a:r>
-              <a:rPr lang="en-GB" sz="800" b="1" dirty="0" smtClean="0">
-                <a:cs typeface="Courier New" pitchFamily="49" charset="0"/>
-              </a:rPr>
-              <a:t>       &lt;</a:t>
+              <a:t>         &lt;</a:t>
             </a:r>
             <a:r>
               <a:rPr lang="en-GB" sz="800" b="1" dirty="0" err="1" smtClean="0">
@@ -11036,8 +11030,8 @@
         </p:nvSpPr>
         <p:spPr>
           <a:xfrm>
-            <a:off x="132911" y="309165"/>
-            <a:ext cx="4166461" cy="2179193"/>
+            <a:off x="66008" y="440487"/>
+            <a:ext cx="4433984" cy="2179193"/>
           </a:xfrm>
           <a:prstGeom prst="rect">
             <a:avLst/>
@@ -11089,7 +11083,7 @@
         </p:nvSpPr>
         <p:spPr>
           <a:xfrm>
-            <a:off x="5718638" y="1034842"/>
+            <a:off x="5790646" y="1166164"/>
             <a:ext cx="720080" cy="936104"/>
           </a:xfrm>
           <a:prstGeom prst="ellipse">
@@ -11127,7 +11121,7 @@
         </p:nvSpPr>
         <p:spPr>
           <a:xfrm>
-            <a:off x="6613838" y="731372"/>
+            <a:off x="6685846" y="862694"/>
             <a:ext cx="720080" cy="936104"/>
           </a:xfrm>
           <a:prstGeom prst="ellipse">
@@ -11165,7 +11159,7 @@
         </p:nvSpPr>
         <p:spPr>
           <a:xfrm>
-            <a:off x="4504744" y="925618"/>
+            <a:off x="4576752" y="1056940"/>
             <a:ext cx="1557414" cy="646331"/>
           </a:xfrm>
           <a:prstGeom prst="rect">
@@ -11205,7 +11199,7 @@
         </p:nvSpPr>
         <p:spPr>
           <a:xfrm>
-            <a:off x="7223018" y="1482810"/>
+            <a:off x="7295026" y="1614132"/>
             <a:ext cx="931152" cy="369332"/>
           </a:xfrm>
           <a:prstGeom prst="rect">
@@ -11239,7 +11233,7 @@
         </p:nvSpPr>
         <p:spPr>
           <a:xfrm>
-            <a:off x="6423517" y="2135528"/>
+            <a:off x="6495525" y="2266850"/>
             <a:ext cx="720080" cy="936104"/>
           </a:xfrm>
           <a:prstGeom prst="ellipse">
@@ -11277,7 +11271,7 @@
         </p:nvSpPr>
         <p:spPr>
           <a:xfrm>
-            <a:off x="6897062" y="2906575"/>
+            <a:off x="6969070" y="3037897"/>
             <a:ext cx="929550" cy="369332"/>
           </a:xfrm>
           <a:prstGeom prst="rect">
@@ -11311,7 +11305,7 @@
         </p:nvCxnSpPr>
         <p:spPr>
           <a:xfrm flipV="1">
-            <a:off x="6181790" y="1100704"/>
+            <a:off x="6253798" y="1232026"/>
             <a:ext cx="601767" cy="332746"/>
           </a:xfrm>
           <a:prstGeom prst="line">
@@ -11341,7 +11335,7 @@
         </p:nvCxnSpPr>
         <p:spPr>
           <a:xfrm flipV="1">
-            <a:off x="6225395" y="1367957"/>
+            <a:off x="6297403" y="1499279"/>
             <a:ext cx="554782" cy="250159"/>
           </a:xfrm>
           <a:prstGeom prst="line">
@@ -11371,7 +11365,7 @@
         </p:nvCxnSpPr>
         <p:spPr>
           <a:xfrm>
-            <a:off x="6078678" y="1832058"/>
+            <a:off x="6150686" y="1963380"/>
             <a:ext cx="535160" cy="656300"/>
           </a:xfrm>
           <a:prstGeom prst="line">
@@ -11403,7 +11397,7 @@
         </p:nvCxnSpPr>
         <p:spPr>
           <a:xfrm>
-            <a:off x="6333265" y="1833857"/>
+            <a:off x="6405273" y="1965179"/>
             <a:ext cx="328966" cy="440559"/>
           </a:xfrm>
           <a:prstGeom prst="line">
@@ -11433,8 +11427,8 @@
         </p:nvSpPr>
         <p:spPr>
           <a:xfrm>
-            <a:off x="410940" y="684188"/>
-            <a:ext cx="3801019" cy="830997"/>
+            <a:off x="179512" y="815510"/>
+            <a:ext cx="4284837" cy="769441"/>
           </a:xfrm>
           <a:prstGeom prst="rect">
             <a:avLst/>
@@ -11461,44 +11455,61 @@
           <a:lstStyle/>
           <a:p>
             <a:r>
-              <a:rPr lang="en-GB" sz="1200" dirty="0" smtClean="0"/>
+              <a:rPr lang="en-GB" sz="1100" dirty="0" smtClean="0"/>
               <a:t>PDH 1.1</a:t>
             </a:r>
           </a:p>
           <a:p>
             <a:r>
-              <a:rPr lang="en-GB" sz="1200" dirty="0" smtClean="0"/>
+              <a:rPr lang="en-GB" sz="1100" dirty="0" smtClean="0"/>
               <a:t> accession = </a:t>
             </a:r>
             <a:r>
-              <a:rPr lang="en-GB" sz="1200" dirty="0" err="1" smtClean="0"/>
+              <a:rPr lang="en-GB" sz="1100" dirty="0" err="1" smtClean="0"/>
               <a:t>Prot</a:t>
             </a:r>
             <a:r>
-              <a:rPr lang="en-GB" sz="1200" dirty="0" smtClean="0"/>
+              <a:rPr lang="en-GB" sz="1100" dirty="0" smtClean="0"/>
               <a:t> A.1</a:t>
             </a:r>
           </a:p>
           <a:p>
             <a:r>
-              <a:rPr lang="en-GB" sz="1200" dirty="0" smtClean="0"/>
-              <a:t> name=“interaction FDR” value=“1001.a:256:0.001:TRUE</a:t>
-            </a:r>
-          </a:p>
-          <a:p>
-            <a:r>
-              <a:rPr lang="en-GB" sz="1200" dirty="0" smtClean="0"/>
+              <a:rPr lang="en-GB" sz="1100" dirty="0" smtClean="0"/>
               <a:t> name</a:t>
             </a:r>
             <a:r>
-              <a:rPr lang="en-GB" sz="1200" dirty="0"/>
-              <a:t>=“interaction FDR” value=“</a:t>
-            </a:r>
-            <a:r>
-              <a:rPr lang="en-GB" sz="1200" dirty="0" smtClean="0"/>
-              <a:t>1002.a:478:0.07:FALSE</a:t>
-            </a:r>
-            <a:endParaRPr lang="en-GB" sz="1200" dirty="0"/>
+              <a:rPr lang="en-GB" sz="1100" dirty="0" smtClean="0"/>
+              <a:t>=“protein-pair-level global FDR” </a:t>
+            </a:r>
+            <a:r>
+              <a:rPr lang="en-GB" sz="1100" dirty="0" smtClean="0"/>
+              <a:t>value=“</a:t>
+            </a:r>
+            <a:r>
+              <a:rPr lang="en-GB" sz="1100" dirty="0" smtClean="0"/>
+              <a:t>1001.a:256:0.001:TRUE”</a:t>
+            </a:r>
+            <a:endParaRPr lang="en-GB" sz="1100" dirty="0" smtClean="0"/>
+          </a:p>
+          <a:p>
+            <a:r>
+              <a:rPr lang="en-GB" sz="1100" dirty="0" smtClean="0"/>
+              <a:t> name</a:t>
+            </a:r>
+            <a:r>
+              <a:rPr lang="en-GB" sz="1100" dirty="0" smtClean="0"/>
+              <a:t>=“protein-pair-level global FDR” </a:t>
+            </a:r>
+            <a:r>
+              <a:rPr lang="en-GB" sz="1100" dirty="0"/>
+              <a:t>value=“</a:t>
+            </a:r>
+            <a:r>
+              <a:rPr lang="en-GB" sz="1100" dirty="0" smtClean="0"/>
+              <a:t>1002.a:478:0.07:FALSE”</a:t>
+            </a:r>
+            <a:endParaRPr lang="en-GB" sz="1100" dirty="0"/>
           </a:p>
         </p:txBody>
       </p:sp>
@@ -11510,7 +11521,7 @@
         </p:nvSpPr>
         <p:spPr>
           <a:xfrm>
-            <a:off x="5622075" y="264834"/>
+            <a:off x="5694083" y="396156"/>
             <a:ext cx="1305165" cy="646331"/>
           </a:xfrm>
           <a:prstGeom prst="rect">
@@ -11546,7 +11557,7 @@
         </p:nvSpPr>
         <p:spPr>
           <a:xfrm>
-            <a:off x="5086512" y="2153723"/>
+            <a:off x="5158520" y="2285045"/>
             <a:ext cx="1188146" cy="646331"/>
           </a:xfrm>
           <a:prstGeom prst="rect">
@@ -11582,8 +11593,8 @@
         </p:nvSpPr>
         <p:spPr>
           <a:xfrm>
-            <a:off x="121924" y="2574705"/>
-            <a:ext cx="4166461" cy="1133819"/>
+            <a:off x="66008" y="2706027"/>
+            <a:ext cx="4433984" cy="1133819"/>
           </a:xfrm>
           <a:prstGeom prst="rect">
             <a:avLst/>
@@ -11651,8 +11662,8 @@
         </p:nvSpPr>
         <p:spPr>
           <a:xfrm>
-            <a:off x="4381351" y="3420492"/>
-            <a:ext cx="4655145" cy="2677656"/>
+            <a:off x="4669383" y="3551814"/>
+            <a:ext cx="4367113" cy="2677656"/>
           </a:xfrm>
           <a:prstGeom prst="rect">
             <a:avLst/>
@@ -11733,8 +11744,8 @@
         </p:nvSpPr>
         <p:spPr>
           <a:xfrm>
-            <a:off x="383312" y="2927616"/>
-            <a:ext cx="3801019" cy="646331"/>
+            <a:off x="179512" y="3058938"/>
+            <a:ext cx="4284837" cy="600164"/>
           </a:xfrm>
           <a:prstGeom prst="rect">
             <a:avLst/>
@@ -11761,30 +11772,42 @@
           <a:lstStyle/>
           <a:p>
             <a:r>
-              <a:rPr lang="en-GB" sz="1200" dirty="0" smtClean="0"/>
+              <a:rPr lang="en-GB" sz="1100" dirty="0" smtClean="0"/>
               <a:t>PDH 2.1</a:t>
             </a:r>
           </a:p>
           <a:p>
             <a:r>
-              <a:rPr lang="en-GB" sz="1200" dirty="0" smtClean="0"/>
+              <a:rPr lang="en-GB" sz="1100" dirty="0" smtClean="0"/>
               <a:t> accession = </a:t>
             </a:r>
             <a:r>
-              <a:rPr lang="en-GB" sz="1200" dirty="0" err="1" smtClean="0"/>
+              <a:rPr lang="en-GB" sz="1100" dirty="0" err="1" smtClean="0"/>
               <a:t>Prot</a:t>
             </a:r>
             <a:r>
-              <a:rPr lang="en-GB" sz="1200" dirty="0" smtClean="0"/>
+              <a:rPr lang="en-GB" sz="1100" dirty="0" smtClean="0"/>
               <a:t> B.1</a:t>
             </a:r>
           </a:p>
           <a:p>
             <a:r>
-              <a:rPr lang="en-GB" sz="1200" dirty="0" smtClean="0"/>
-              <a:t> name=“interaction FDR” value=“1001.b:135:0.001:TRUE</a:t>
-            </a:r>
-            <a:endParaRPr lang="en-GB" sz="1200" dirty="0"/>
+              <a:rPr lang="en-GB" sz="1100" dirty="0" smtClean="0"/>
+              <a:t> name</a:t>
+            </a:r>
+            <a:r>
+              <a:rPr lang="en-GB" sz="1100" dirty="0" smtClean="0"/>
+              <a:t>=“protein-pair-level global FDR” </a:t>
+            </a:r>
+            <a:r>
+              <a:rPr lang="en-GB" sz="1100" dirty="0" smtClean="0"/>
+              <a:t>value=“</a:t>
+            </a:r>
+            <a:r>
+              <a:rPr lang="en-GB" sz="1100" dirty="0" smtClean="0"/>
+              <a:t>1001.b:135:0.001:TRUE”</a:t>
+            </a:r>
+            <a:endParaRPr lang="en-GB" sz="1100" dirty="0"/>
           </a:p>
         </p:txBody>
       </p:sp>
@@ -11796,8 +11819,8 @@
         </p:nvSpPr>
         <p:spPr>
           <a:xfrm>
-            <a:off x="117507" y="3794871"/>
-            <a:ext cx="4166461" cy="1133819"/>
+            <a:off x="61423" y="3926193"/>
+            <a:ext cx="4433984" cy="1133819"/>
           </a:xfrm>
           <a:prstGeom prst="rect">
             <a:avLst/>
@@ -11865,8 +11888,8 @@
         </p:nvSpPr>
         <p:spPr>
           <a:xfrm>
-            <a:off x="368892" y="4151752"/>
-            <a:ext cx="3801019" cy="646331"/>
+            <a:off x="168522" y="4283074"/>
+            <a:ext cx="4284837" cy="600164"/>
           </a:xfrm>
           <a:prstGeom prst="rect">
             <a:avLst/>
@@ -11893,30 +11916,42 @@
           <a:lstStyle/>
           <a:p>
             <a:r>
-              <a:rPr lang="en-GB" sz="1200" dirty="0" smtClean="0"/>
+              <a:rPr lang="en-GB" sz="1100" dirty="0" smtClean="0"/>
               <a:t>PDH 1.1</a:t>
             </a:r>
           </a:p>
           <a:p>
             <a:r>
-              <a:rPr lang="en-GB" sz="1200" dirty="0" smtClean="0"/>
+              <a:rPr lang="en-GB" sz="1100" dirty="0" smtClean="0"/>
               <a:t> accession = </a:t>
             </a:r>
             <a:r>
-              <a:rPr lang="en-GB" sz="1200" dirty="0" err="1" smtClean="0"/>
+              <a:rPr lang="en-GB" sz="1100" dirty="0" err="1" smtClean="0"/>
               <a:t>Prot</a:t>
             </a:r>
             <a:r>
-              <a:rPr lang="en-GB" sz="1200" dirty="0" smtClean="0"/>
+              <a:rPr lang="en-GB" sz="1100" dirty="0" smtClean="0"/>
               <a:t> A.1</a:t>
             </a:r>
           </a:p>
           <a:p>
             <a:r>
-              <a:rPr lang="en-GB" sz="1200" dirty="0" smtClean="0"/>
-              <a:t> name=“interaction FDR” value=“1002.b:135:0.07:FALSE</a:t>
-            </a:r>
-            <a:endParaRPr lang="en-GB" sz="1200" dirty="0"/>
+              <a:rPr lang="en-GB" sz="1100" dirty="0" smtClean="0"/>
+              <a:t> name</a:t>
+            </a:r>
+            <a:r>
+              <a:rPr lang="en-GB" sz="1100" dirty="0" smtClean="0"/>
+              <a:t>=“protein-pair-level global FDR” </a:t>
+            </a:r>
+            <a:r>
+              <a:rPr lang="en-GB" sz="1100" dirty="0" smtClean="0"/>
+              <a:t>value=“</a:t>
+            </a:r>
+            <a:r>
+              <a:rPr lang="en-GB" sz="1100" dirty="0" smtClean="0"/>
+              <a:t>1002.b:135:0.07:FALSE”</a:t>
+            </a:r>
+            <a:endParaRPr lang="en-GB" sz="1100" dirty="0"/>
           </a:p>
         </p:txBody>
       </p:sp>
@@ -11928,8 +11963,8 @@
         </p:nvSpPr>
         <p:spPr>
           <a:xfrm>
-            <a:off x="395536" y="1581383"/>
-            <a:ext cx="3801019" cy="830997"/>
+            <a:off x="179512" y="1712705"/>
+            <a:ext cx="4284837" cy="769441"/>
           </a:xfrm>
           <a:prstGeom prst="rect">
             <a:avLst/>
@@ -11956,44 +11991,61 @@
           <a:lstStyle/>
           <a:p>
             <a:r>
-              <a:rPr lang="en-GB" sz="1200" dirty="0" smtClean="0"/>
+              <a:rPr lang="en-GB" sz="1100" dirty="0" smtClean="0"/>
               <a:t>PDH 1.2</a:t>
             </a:r>
           </a:p>
           <a:p>
             <a:r>
-              <a:rPr lang="en-GB" sz="1200" dirty="0" smtClean="0"/>
+              <a:rPr lang="en-GB" sz="1100" dirty="0" smtClean="0"/>
               <a:t> accession = </a:t>
             </a:r>
             <a:r>
-              <a:rPr lang="en-GB" sz="1200" dirty="0" err="1" smtClean="0"/>
+              <a:rPr lang="en-GB" sz="1100" dirty="0" err="1" smtClean="0"/>
               <a:t>Prot</a:t>
             </a:r>
             <a:r>
-              <a:rPr lang="en-GB" sz="1200" dirty="0" smtClean="0"/>
+              <a:rPr lang="en-GB" sz="1100" dirty="0" smtClean="0"/>
               <a:t> A.2</a:t>
             </a:r>
           </a:p>
           <a:p>
             <a:r>
-              <a:rPr lang="en-GB" sz="1200" dirty="0" smtClean="0"/>
-              <a:t> name=“interaction FDR” value=“1001.a:258:0.001:TRUE</a:t>
-            </a:r>
-          </a:p>
-          <a:p>
-            <a:r>
-              <a:rPr lang="en-GB" sz="1200" dirty="0" smtClean="0"/>
+              <a:rPr lang="en-GB" sz="1100" dirty="0" smtClean="0"/>
               <a:t> name</a:t>
             </a:r>
             <a:r>
-              <a:rPr lang="en-GB" sz="1200" dirty="0"/>
-              <a:t>=“interaction FDR” value=“</a:t>
-            </a:r>
-            <a:r>
-              <a:rPr lang="en-GB" sz="1200" dirty="0" smtClean="0"/>
+              <a:rPr lang="en-GB" sz="1100" dirty="0" smtClean="0"/>
+              <a:t>=“protein-pair-level global FDR” </a:t>
+            </a:r>
+            <a:r>
+              <a:rPr lang="en-GB" sz="1100" dirty="0" smtClean="0"/>
+              <a:t>value=“</a:t>
+            </a:r>
+            <a:r>
+              <a:rPr lang="en-GB" sz="1100" dirty="0" smtClean="0"/>
+              <a:t>1001.a:258:0.001:TRUE”</a:t>
+            </a:r>
+            <a:endParaRPr lang="en-GB" sz="1100" dirty="0" smtClean="0"/>
+          </a:p>
+          <a:p>
+            <a:r>
+              <a:rPr lang="en-GB" sz="1100" dirty="0" smtClean="0"/>
+              <a:t> name</a:t>
+            </a:r>
+            <a:r>
+              <a:rPr lang="en-GB" sz="1100" dirty="0" smtClean="0"/>
+              <a:t>=“protein-pair-level global FDR” </a:t>
+            </a:r>
+            <a:r>
+              <a:rPr lang="en-GB" sz="1100" dirty="0"/>
+              <a:t>value=“</a:t>
+            </a:r>
+            <a:r>
+              <a:rPr lang="en-GB" sz="1100" dirty="0" smtClean="0"/>
               <a:t>1002.a:480:0.07:TRUE</a:t>
             </a:r>
-            <a:endParaRPr lang="en-GB" sz="1200" dirty="0"/>
+            <a:endParaRPr lang="en-GB" sz="1100" dirty="0"/>
           </a:p>
         </p:txBody>
       </p:sp>
@@ -12005,7 +12057,7 @@
         </p:nvSpPr>
         <p:spPr>
           <a:xfrm flipV="1">
-            <a:off x="4644008" y="6084788"/>
+            <a:off x="4932040" y="6216110"/>
             <a:ext cx="309959" cy="240556"/>
           </a:xfrm>
           <a:prstGeom prst="downArrow">
@@ -12048,7 +12100,7 @@
         </p:nvSpPr>
         <p:spPr>
           <a:xfrm flipV="1">
-            <a:off x="5253938" y="6096114"/>
+            <a:off x="5541970" y="6227436"/>
             <a:ext cx="309959" cy="240556"/>
           </a:xfrm>
           <a:prstGeom prst="downArrow">
@@ -12091,7 +12143,7 @@
         </p:nvSpPr>
         <p:spPr>
           <a:xfrm flipV="1">
-            <a:off x="6535287" y="6107440"/>
+            <a:off x="6823319" y="6238762"/>
             <a:ext cx="309959" cy="240556"/>
           </a:xfrm>
           <a:prstGeom prst="downArrow">
@@ -12134,7 +12186,7 @@
         </p:nvSpPr>
         <p:spPr>
           <a:xfrm flipV="1">
-            <a:off x="7999190" y="6084788"/>
+            <a:off x="8287222" y="6216110"/>
             <a:ext cx="309959" cy="240556"/>
           </a:xfrm>
           <a:prstGeom prst="downArrow">
@@ -12177,7 +12229,7 @@
         </p:nvSpPr>
         <p:spPr>
           <a:xfrm>
-            <a:off x="35496" y="5076676"/>
+            <a:off x="-20588" y="5207998"/>
             <a:ext cx="4337482" cy="2862322"/>
           </a:xfrm>
           <a:prstGeom prst="rect">
@@ -12305,17 +12357,21 @@
                 <a:latin typeface="+mj-lt"/>
                 <a:cs typeface="Courier New" pitchFamily="49" charset="0"/>
               </a:rPr>
-              <a:t>“true” or “false” to indicate whether the score or value has passed a reported threshold in the file. </a:t>
+              <a:t>“true” or “false” to indicate whether the score or value has passed a reported threshold in the file. If no </a:t>
             </a:r>
             <a:r>
               <a:rPr lang="en-GB" sz="1200" dirty="0" smtClean="0">
-                <a:solidFill>
-                  <a:srgbClr val="FF0000"/>
-                </a:solidFill>
-                <a:latin typeface="+mj-lt"/>
-                <a:cs typeface="Courier New" pitchFamily="49" charset="0"/>
-              </a:rPr>
-              <a:t>If no threshold, then PASS_THRESHOLD is always true.</a:t>
+                <a:latin typeface="+mj-lt"/>
+                <a:cs typeface="Courier New" pitchFamily="49" charset="0"/>
+              </a:rPr>
+              <a:t>threshold is defined, </a:t>
+            </a:r>
+            <a:r>
+              <a:rPr lang="en-GB" sz="1200" dirty="0" smtClean="0">
+                <a:latin typeface="+mj-lt"/>
+                <a:cs typeface="Courier New" pitchFamily="49" charset="0"/>
+              </a:rPr>
+              <a:t>then PASS_THRESHOLD is always true.</a:t>
             </a:r>
           </a:p>
         </p:txBody>
@@ -12328,7 +12384,7 @@
         </p:nvSpPr>
         <p:spPr>
           <a:xfrm>
-            <a:off x="4639403" y="6327439"/>
+            <a:off x="4799343" y="6458761"/>
             <a:ext cx="309700" cy="276999"/>
           </a:xfrm>
           <a:prstGeom prst="rect">
@@ -12359,7 +12415,7 @@
         </p:nvSpPr>
         <p:spPr>
           <a:xfrm>
-            <a:off x="5249074" y="6336670"/>
+            <a:off x="5409014" y="6467992"/>
             <a:ext cx="309700" cy="276999"/>
           </a:xfrm>
           <a:prstGeom prst="rect">
@@ -12390,7 +12446,7 @@
         </p:nvSpPr>
         <p:spPr>
           <a:xfrm>
-            <a:off x="6543919" y="6352063"/>
+            <a:off x="6703859" y="6483385"/>
             <a:ext cx="309700" cy="276999"/>
           </a:xfrm>
           <a:prstGeom prst="rect">
@@ -12421,7 +12477,7 @@
         </p:nvSpPr>
         <p:spPr>
           <a:xfrm>
-            <a:off x="7999319" y="6329272"/>
+            <a:off x="8159259" y="6460594"/>
             <a:ext cx="309700" cy="276999"/>
           </a:xfrm>
           <a:prstGeom prst="rect">
@@ -12446,14 +12502,911 @@
       </p:sp>
       <p:sp>
         <p:nvSpPr>
-          <p:cNvPr id="17" name="TextBox 16"/>
+          <p:cNvPr id="18" name="Rectangle 17"/>
+          <p:cNvSpPr/>
+          <p:nvPr/>
+        </p:nvSpPr>
+        <p:spPr>
+          <a:xfrm>
+            <a:off x="173483" y="8354843"/>
+            <a:ext cx="8797470" cy="4108817"/>
+          </a:xfrm>
+          <a:prstGeom prst="rect">
+            <a:avLst/>
+          </a:prstGeom>
+        </p:spPr>
+        <p:txBody>
+          <a:bodyPr wrap="square">
+            <a:spAutoFit/>
+          </a:bodyPr>
+          <a:lstStyle/>
+          <a:p>
+            <a:r>
+              <a:rPr lang="en-GB" sz="900" dirty="0">
+                <a:latin typeface="Courier New" panose="02070309020205020404" pitchFamily="49" charset="0"/>
+                <a:cs typeface="Courier New" panose="02070309020205020404" pitchFamily="49" charset="0"/>
+              </a:rPr>
+              <a:t>&lt;</a:t>
+            </a:r>
+            <a:r>
+              <a:rPr lang="en-GB" sz="900" dirty="0" err="1">
+                <a:latin typeface="Courier New" panose="02070309020205020404" pitchFamily="49" charset="0"/>
+                <a:cs typeface="Courier New" panose="02070309020205020404" pitchFamily="49" charset="0"/>
+              </a:rPr>
+              <a:t>ProteinAmbiguityGroup</a:t>
+            </a:r>
+            <a:r>
+              <a:rPr lang="en-GB" sz="900" dirty="0">
+                <a:latin typeface="Courier New" panose="02070309020205020404" pitchFamily="49" charset="0"/>
+                <a:cs typeface="Courier New" panose="02070309020205020404" pitchFamily="49" charset="0"/>
+              </a:rPr>
+              <a:t> id="PAG_0"&gt;</a:t>
+            </a:r>
+          </a:p>
+          <a:p>
+            <a:r>
+              <a:rPr lang="en-GB" sz="900" dirty="0">
+                <a:latin typeface="Courier New" panose="02070309020205020404" pitchFamily="49" charset="0"/>
+                <a:cs typeface="Courier New" panose="02070309020205020404" pitchFamily="49" charset="0"/>
+              </a:rPr>
+              <a:t>    &lt;</a:t>
+            </a:r>
+            <a:r>
+              <a:rPr lang="en-GB" sz="900" dirty="0" err="1">
+                <a:latin typeface="Courier New" panose="02070309020205020404" pitchFamily="49" charset="0"/>
+                <a:cs typeface="Courier New" panose="02070309020205020404" pitchFamily="49" charset="0"/>
+              </a:rPr>
+              <a:t>ProteinDetectionHypothesis</a:t>
+            </a:r>
+            <a:r>
+              <a:rPr lang="en-GB" sz="900" dirty="0">
+                <a:latin typeface="Courier New" panose="02070309020205020404" pitchFamily="49" charset="0"/>
+                <a:cs typeface="Courier New" panose="02070309020205020404" pitchFamily="49" charset="0"/>
+              </a:rPr>
+              <a:t> </a:t>
+            </a:r>
+            <a:r>
+              <a:rPr lang="en-GB" sz="900" dirty="0" err="1">
+                <a:latin typeface="Courier New" panose="02070309020205020404" pitchFamily="49" charset="0"/>
+                <a:cs typeface="Courier New" panose="02070309020205020404" pitchFamily="49" charset="0"/>
+              </a:rPr>
+              <a:t>dBSequence_ref</a:t>
+            </a:r>
+            <a:r>
+              <a:rPr lang="en-GB" sz="900" dirty="0">
+                <a:latin typeface="Courier New" panose="02070309020205020404" pitchFamily="49" charset="0"/>
+                <a:cs typeface="Courier New" panose="02070309020205020404" pitchFamily="49" charset="0"/>
+              </a:rPr>
+              <a:t>="dbseq_P02771" </a:t>
+            </a:r>
+            <a:r>
+              <a:rPr lang="en-GB" sz="900" dirty="0" err="1">
+                <a:latin typeface="Courier New" panose="02070309020205020404" pitchFamily="49" charset="0"/>
+                <a:cs typeface="Courier New" panose="02070309020205020404" pitchFamily="49" charset="0"/>
+              </a:rPr>
+              <a:t>passThreshold</a:t>
+            </a:r>
+            <a:r>
+              <a:rPr lang="en-GB" sz="900" dirty="0">
+                <a:latin typeface="Courier New" panose="02070309020205020404" pitchFamily="49" charset="0"/>
+                <a:cs typeface="Courier New" panose="02070309020205020404" pitchFamily="49" charset="0"/>
+              </a:rPr>
+              <a:t>="true" id="PAG_0_PDH_0"&gt;</a:t>
+            </a:r>
+          </a:p>
+          <a:p>
+            <a:r>
+              <a:rPr lang="en-GB" sz="900" dirty="0">
+                <a:latin typeface="Courier New" panose="02070309020205020404" pitchFamily="49" charset="0"/>
+                <a:cs typeface="Courier New" panose="02070309020205020404" pitchFamily="49" charset="0"/>
+              </a:rPr>
+              <a:t>      &lt;</a:t>
+            </a:r>
+            <a:r>
+              <a:rPr lang="en-GB" sz="900" dirty="0" err="1">
+                <a:latin typeface="Courier New" panose="02070309020205020404" pitchFamily="49" charset="0"/>
+                <a:cs typeface="Courier New" panose="02070309020205020404" pitchFamily="49" charset="0"/>
+              </a:rPr>
+              <a:t>PeptideHypothesis</a:t>
+            </a:r>
+            <a:r>
+              <a:rPr lang="en-GB" sz="900" dirty="0">
+                <a:latin typeface="Courier New" panose="02070309020205020404" pitchFamily="49" charset="0"/>
+                <a:cs typeface="Courier New" panose="02070309020205020404" pitchFamily="49" charset="0"/>
+              </a:rPr>
+              <a:t> </a:t>
+            </a:r>
+            <a:r>
+              <a:rPr lang="en-GB" sz="900" dirty="0" err="1">
+                <a:latin typeface="Courier New" panose="02070309020205020404" pitchFamily="49" charset="0"/>
+                <a:cs typeface="Courier New" panose="02070309020205020404" pitchFamily="49" charset="0"/>
+              </a:rPr>
+              <a:t>peptideEvidence_ref</a:t>
+            </a:r>
+            <a:r>
+              <a:rPr lang="en-GB" sz="900" dirty="0">
+                <a:latin typeface="Courier New" panose="02070309020205020404" pitchFamily="49" charset="0"/>
+                <a:cs typeface="Courier New" panose="02070309020205020404" pitchFamily="49" charset="0"/>
+              </a:rPr>
+              <a:t>="pepevid_psm252637369_pep54601081"&gt;</a:t>
+            </a:r>
+          </a:p>
+          <a:p>
+            <a:r>
+              <a:rPr lang="en-GB" sz="900" dirty="0">
+                <a:latin typeface="Courier New" panose="02070309020205020404" pitchFamily="49" charset="0"/>
+                <a:cs typeface="Courier New" panose="02070309020205020404" pitchFamily="49" charset="0"/>
+              </a:rPr>
+              <a:t>        &lt;</a:t>
+            </a:r>
+            <a:r>
+              <a:rPr lang="en-GB" sz="900" dirty="0" err="1">
+                <a:latin typeface="Courier New" panose="02070309020205020404" pitchFamily="49" charset="0"/>
+                <a:cs typeface="Courier New" panose="02070309020205020404" pitchFamily="49" charset="0"/>
+              </a:rPr>
+              <a:t>SpectrumIdentificationItemRef</a:t>
+            </a:r>
+            <a:r>
+              <a:rPr lang="en-GB" sz="900" dirty="0">
+                <a:latin typeface="Courier New" panose="02070309020205020404" pitchFamily="49" charset="0"/>
+                <a:cs typeface="Courier New" panose="02070309020205020404" pitchFamily="49" charset="0"/>
+              </a:rPr>
+              <a:t> </a:t>
+            </a:r>
+            <a:r>
+              <a:rPr lang="en-GB" sz="900" dirty="0" err="1">
+                <a:latin typeface="Courier New" panose="02070309020205020404" pitchFamily="49" charset="0"/>
+                <a:cs typeface="Courier New" panose="02070309020205020404" pitchFamily="49" charset="0"/>
+              </a:rPr>
+              <a:t>spectrumIdentificationItem_ref</a:t>
+            </a:r>
+            <a:r>
+              <a:rPr lang="en-GB" sz="900" dirty="0">
+                <a:latin typeface="Courier New" panose="02070309020205020404" pitchFamily="49" charset="0"/>
+                <a:cs typeface="Courier New" panose="02070309020205020404" pitchFamily="49" charset="0"/>
+              </a:rPr>
+              <a:t>="SII_1_1"/&gt;</a:t>
+            </a:r>
+          </a:p>
+          <a:p>
+            <a:r>
+              <a:rPr lang="en-GB" sz="900" dirty="0">
+                <a:latin typeface="Courier New" panose="02070309020205020404" pitchFamily="49" charset="0"/>
+                <a:cs typeface="Courier New" panose="02070309020205020404" pitchFamily="49" charset="0"/>
+              </a:rPr>
+              <a:t>      &lt;/</a:t>
+            </a:r>
+            <a:r>
+              <a:rPr lang="en-GB" sz="900" dirty="0" err="1">
+                <a:latin typeface="Courier New" panose="02070309020205020404" pitchFamily="49" charset="0"/>
+                <a:cs typeface="Courier New" panose="02070309020205020404" pitchFamily="49" charset="0"/>
+              </a:rPr>
+              <a:t>PeptideHypothesis</a:t>
+            </a:r>
+            <a:r>
+              <a:rPr lang="en-GB" sz="900" dirty="0">
+                <a:latin typeface="Courier New" panose="02070309020205020404" pitchFamily="49" charset="0"/>
+                <a:cs typeface="Courier New" panose="02070309020205020404" pitchFamily="49" charset="0"/>
+              </a:rPr>
+              <a:t>&gt;</a:t>
+            </a:r>
+          </a:p>
+          <a:p>
+            <a:r>
+              <a:rPr lang="en-GB" sz="900" dirty="0">
+                <a:latin typeface="Courier New" panose="02070309020205020404" pitchFamily="49" charset="0"/>
+                <a:cs typeface="Courier New" panose="02070309020205020404" pitchFamily="49" charset="0"/>
+              </a:rPr>
+              <a:t>    ...  </a:t>
+            </a:r>
+          </a:p>
+          <a:p>
+            <a:r>
+              <a:rPr lang="en-GB" sz="900" dirty="0">
+                <a:latin typeface="Courier New" panose="02070309020205020404" pitchFamily="49" charset="0"/>
+                <a:cs typeface="Courier New" panose="02070309020205020404" pitchFamily="49" charset="0"/>
+              </a:rPr>
+              <a:t>  </a:t>
+            </a:r>
+          </a:p>
+          <a:p>
+            <a:r>
+              <a:rPr lang="en-GB" sz="900" dirty="0">
+                <a:latin typeface="Courier New" panose="02070309020205020404" pitchFamily="49" charset="0"/>
+                <a:cs typeface="Courier New" panose="02070309020205020404" pitchFamily="49" charset="0"/>
+              </a:rPr>
+              <a:t>      &lt;</a:t>
+            </a:r>
+            <a:r>
+              <a:rPr lang="en-GB" sz="900" dirty="0" err="1">
+                <a:latin typeface="Courier New" panose="02070309020205020404" pitchFamily="49" charset="0"/>
+                <a:cs typeface="Courier New" panose="02070309020205020404" pitchFamily="49" charset="0"/>
+              </a:rPr>
+              <a:t>cvParam</a:t>
+            </a:r>
+            <a:r>
+              <a:rPr lang="en-GB" sz="900" dirty="0">
+                <a:latin typeface="Courier New" panose="02070309020205020404" pitchFamily="49" charset="0"/>
+                <a:cs typeface="Courier New" panose="02070309020205020404" pitchFamily="49" charset="0"/>
+              </a:rPr>
+              <a:t> </a:t>
+            </a:r>
+            <a:r>
+              <a:rPr lang="en-GB" sz="900" dirty="0" err="1">
+                <a:latin typeface="Courier New" panose="02070309020205020404" pitchFamily="49" charset="0"/>
+                <a:cs typeface="Courier New" panose="02070309020205020404" pitchFamily="49" charset="0"/>
+              </a:rPr>
+              <a:t>cvRef</a:t>
+            </a:r>
+            <a:r>
+              <a:rPr lang="en-GB" sz="900" dirty="0">
+                <a:latin typeface="Courier New" panose="02070309020205020404" pitchFamily="49" charset="0"/>
+                <a:cs typeface="Courier New" panose="02070309020205020404" pitchFamily="49" charset="0"/>
+              </a:rPr>
+              <a:t>="PSI-MS" accession="MS:1002676" name="protein-pair-level global FDR" value="</a:t>
+            </a:r>
+            <a:r>
+              <a:rPr lang="en-GB" sz="900" dirty="0" smtClean="0">
+                <a:latin typeface="Courier New" panose="02070309020205020404" pitchFamily="49" charset="0"/>
+                <a:cs typeface="Courier New" panose="02070309020205020404" pitchFamily="49" charset="0"/>
+              </a:rPr>
+              <a:t>100.b:null:0.001:true</a:t>
+            </a:r>
+            <a:r>
+              <a:rPr lang="en-GB" sz="900" dirty="0">
+                <a:latin typeface="Courier New" panose="02070309020205020404" pitchFamily="49" charset="0"/>
+                <a:cs typeface="Courier New" panose="02070309020205020404" pitchFamily="49" charset="0"/>
+              </a:rPr>
+              <a:t>"/&gt;</a:t>
+            </a:r>
+          </a:p>
+          <a:p>
+            <a:r>
+              <a:rPr lang="en-GB" sz="900" dirty="0">
+                <a:latin typeface="Courier New" panose="02070309020205020404" pitchFamily="49" charset="0"/>
+                <a:cs typeface="Courier New" panose="02070309020205020404" pitchFamily="49" charset="0"/>
+              </a:rPr>
+              <a:t>      &lt;</a:t>
+            </a:r>
+            <a:r>
+              <a:rPr lang="en-GB" sz="900" dirty="0" err="1">
+                <a:latin typeface="Courier New" panose="02070309020205020404" pitchFamily="49" charset="0"/>
+                <a:cs typeface="Courier New" panose="02070309020205020404" pitchFamily="49" charset="0"/>
+              </a:rPr>
+              <a:t>cvParam</a:t>
+            </a:r>
+            <a:r>
+              <a:rPr lang="en-GB" sz="900" dirty="0">
+                <a:latin typeface="Courier New" panose="02070309020205020404" pitchFamily="49" charset="0"/>
+                <a:cs typeface="Courier New" panose="02070309020205020404" pitchFamily="49" charset="0"/>
+              </a:rPr>
+              <a:t> </a:t>
+            </a:r>
+            <a:r>
+              <a:rPr lang="en-GB" sz="900" dirty="0" err="1">
+                <a:latin typeface="Courier New" panose="02070309020205020404" pitchFamily="49" charset="0"/>
+                <a:cs typeface="Courier New" panose="02070309020205020404" pitchFamily="49" charset="0"/>
+              </a:rPr>
+              <a:t>cvRef</a:t>
+            </a:r>
+            <a:r>
+              <a:rPr lang="en-GB" sz="900" dirty="0">
+                <a:latin typeface="Courier New" panose="02070309020205020404" pitchFamily="49" charset="0"/>
+                <a:cs typeface="Courier New" panose="02070309020205020404" pitchFamily="49" charset="0"/>
+              </a:rPr>
+              <a:t>="PSI-MS" accession="MS:1002677" name="residue-pair-level global FDR" value="</a:t>
+            </a:r>
+            <a:r>
+              <a:rPr lang="en-GB" sz="900" dirty="0" smtClean="0">
+                <a:latin typeface="Courier New" panose="02070309020205020404" pitchFamily="49" charset="0"/>
+                <a:cs typeface="Courier New" panose="02070309020205020404" pitchFamily="49" charset="0"/>
+              </a:rPr>
+              <a:t>106.b:146:0.0294:true</a:t>
+            </a:r>
+            <a:r>
+              <a:rPr lang="en-GB" sz="900" dirty="0">
+                <a:latin typeface="Courier New" panose="02070309020205020404" pitchFamily="49" charset="0"/>
+                <a:cs typeface="Courier New" panose="02070309020205020404" pitchFamily="49" charset="0"/>
+              </a:rPr>
+              <a:t>"/&gt;</a:t>
+            </a:r>
+          </a:p>
+          <a:p>
+            <a:r>
+              <a:rPr lang="en-GB" sz="900" dirty="0">
+                <a:latin typeface="Courier New" panose="02070309020205020404" pitchFamily="49" charset="0"/>
+                <a:cs typeface="Courier New" panose="02070309020205020404" pitchFamily="49" charset="0"/>
+              </a:rPr>
+              <a:t>    &lt;/</a:t>
+            </a:r>
+            <a:r>
+              <a:rPr lang="en-GB" sz="900" dirty="0" err="1">
+                <a:latin typeface="Courier New" panose="02070309020205020404" pitchFamily="49" charset="0"/>
+                <a:cs typeface="Courier New" panose="02070309020205020404" pitchFamily="49" charset="0"/>
+              </a:rPr>
+              <a:t>ProteinDetectionHypothesis</a:t>
+            </a:r>
+            <a:r>
+              <a:rPr lang="en-GB" sz="900" dirty="0">
+                <a:latin typeface="Courier New" panose="02070309020205020404" pitchFamily="49" charset="0"/>
+                <a:cs typeface="Courier New" panose="02070309020205020404" pitchFamily="49" charset="0"/>
+              </a:rPr>
+              <a:t>&gt;</a:t>
+            </a:r>
+          </a:p>
+          <a:p>
+            <a:r>
+              <a:rPr lang="en-GB" sz="900" dirty="0">
+                <a:latin typeface="Courier New" panose="02070309020205020404" pitchFamily="49" charset="0"/>
+                <a:cs typeface="Courier New" panose="02070309020205020404" pitchFamily="49" charset="0"/>
+              </a:rPr>
+              <a:t>    &lt;</a:t>
+            </a:r>
+            <a:r>
+              <a:rPr lang="en-GB" sz="900" dirty="0" err="1">
+                <a:latin typeface="Courier New" panose="02070309020205020404" pitchFamily="49" charset="0"/>
+                <a:cs typeface="Courier New" panose="02070309020205020404" pitchFamily="49" charset="0"/>
+              </a:rPr>
+              <a:t>cvParam</a:t>
+            </a:r>
+            <a:r>
+              <a:rPr lang="en-GB" sz="900" dirty="0">
+                <a:latin typeface="Courier New" panose="02070309020205020404" pitchFamily="49" charset="0"/>
+                <a:cs typeface="Courier New" panose="02070309020205020404" pitchFamily="49" charset="0"/>
+              </a:rPr>
+              <a:t> </a:t>
+            </a:r>
+            <a:r>
+              <a:rPr lang="en-GB" sz="900" dirty="0" err="1">
+                <a:latin typeface="Courier New" panose="02070309020205020404" pitchFamily="49" charset="0"/>
+                <a:cs typeface="Courier New" panose="02070309020205020404" pitchFamily="49" charset="0"/>
+              </a:rPr>
+              <a:t>cvRef</a:t>
+            </a:r>
+            <a:r>
+              <a:rPr lang="en-GB" sz="900" dirty="0">
+                <a:latin typeface="Courier New" panose="02070309020205020404" pitchFamily="49" charset="0"/>
+                <a:cs typeface="Courier New" panose="02070309020205020404" pitchFamily="49" charset="0"/>
+              </a:rPr>
+              <a:t>="PSI-MS" accession="MS:1002415" name="protein group passes threshold" value="true"/&gt;</a:t>
+            </a:r>
+          </a:p>
+          <a:p>
+            <a:r>
+              <a:rPr lang="en-GB" sz="900" dirty="0">
+                <a:latin typeface="Courier New" panose="02070309020205020404" pitchFamily="49" charset="0"/>
+                <a:cs typeface="Courier New" panose="02070309020205020404" pitchFamily="49" charset="0"/>
+              </a:rPr>
+              <a:t>&lt;/</a:t>
+            </a:r>
+            <a:r>
+              <a:rPr lang="en-GB" sz="900" dirty="0" err="1">
+                <a:latin typeface="Courier New" panose="02070309020205020404" pitchFamily="49" charset="0"/>
+                <a:cs typeface="Courier New" panose="02070309020205020404" pitchFamily="49" charset="0"/>
+              </a:rPr>
+              <a:t>ProteinAmbiguityGroup</a:t>
+            </a:r>
+            <a:r>
+              <a:rPr lang="en-GB" sz="900" dirty="0">
+                <a:latin typeface="Courier New" panose="02070309020205020404" pitchFamily="49" charset="0"/>
+                <a:cs typeface="Courier New" panose="02070309020205020404" pitchFamily="49" charset="0"/>
+              </a:rPr>
+              <a:t>&gt;</a:t>
+            </a:r>
+          </a:p>
+          <a:p>
+            <a:r>
+              <a:rPr lang="en-GB" sz="900" dirty="0">
+                <a:latin typeface="Courier New" panose="02070309020205020404" pitchFamily="49" charset="0"/>
+                <a:cs typeface="Courier New" panose="02070309020205020404" pitchFamily="49" charset="0"/>
+              </a:rPr>
+              <a:t>  </a:t>
+            </a:r>
+          </a:p>
+          <a:p>
+            <a:r>
+              <a:rPr lang="en-GB" sz="900" dirty="0">
+                <a:latin typeface="Courier New" panose="02070309020205020404" pitchFamily="49" charset="0"/>
+                <a:cs typeface="Courier New" panose="02070309020205020404" pitchFamily="49" charset="0"/>
+              </a:rPr>
+              <a:t>  </a:t>
+            </a:r>
+          </a:p>
+          <a:p>
+            <a:r>
+              <a:rPr lang="en-GB" sz="900" dirty="0">
+                <a:latin typeface="Courier New" panose="02070309020205020404" pitchFamily="49" charset="0"/>
+                <a:cs typeface="Courier New" panose="02070309020205020404" pitchFamily="49" charset="0"/>
+              </a:rPr>
+              <a:t>&lt;</a:t>
+            </a:r>
+            <a:r>
+              <a:rPr lang="en-GB" sz="900" dirty="0" err="1">
+                <a:latin typeface="Courier New" panose="02070309020205020404" pitchFamily="49" charset="0"/>
+                <a:cs typeface="Courier New" panose="02070309020205020404" pitchFamily="49" charset="0"/>
+              </a:rPr>
+              <a:t>ProteinAmbiguityGroup</a:t>
+            </a:r>
+            <a:r>
+              <a:rPr lang="en-GB" sz="900" dirty="0">
+                <a:latin typeface="Courier New" panose="02070309020205020404" pitchFamily="49" charset="0"/>
+                <a:cs typeface="Courier New" panose="02070309020205020404" pitchFamily="49" charset="0"/>
+              </a:rPr>
+              <a:t> id="PAG_1"&gt;</a:t>
+            </a:r>
+          </a:p>
+          <a:p>
+            <a:r>
+              <a:rPr lang="en-GB" sz="900" dirty="0">
+                <a:latin typeface="Courier New" panose="02070309020205020404" pitchFamily="49" charset="0"/>
+                <a:cs typeface="Courier New" panose="02070309020205020404" pitchFamily="49" charset="0"/>
+              </a:rPr>
+              <a:t>    &lt;</a:t>
+            </a:r>
+            <a:r>
+              <a:rPr lang="en-GB" sz="900" dirty="0" err="1">
+                <a:latin typeface="Courier New" panose="02070309020205020404" pitchFamily="49" charset="0"/>
+                <a:cs typeface="Courier New" panose="02070309020205020404" pitchFamily="49" charset="0"/>
+              </a:rPr>
+              <a:t>ProteinDetectionHypothesis</a:t>
+            </a:r>
+            <a:r>
+              <a:rPr lang="en-GB" sz="900" dirty="0">
+                <a:latin typeface="Courier New" panose="02070309020205020404" pitchFamily="49" charset="0"/>
+                <a:cs typeface="Courier New" panose="02070309020205020404" pitchFamily="49" charset="0"/>
+              </a:rPr>
+              <a:t> </a:t>
+            </a:r>
+            <a:r>
+              <a:rPr lang="en-GB" sz="900" dirty="0" err="1">
+                <a:latin typeface="Courier New" panose="02070309020205020404" pitchFamily="49" charset="0"/>
+                <a:cs typeface="Courier New" panose="02070309020205020404" pitchFamily="49" charset="0"/>
+              </a:rPr>
+              <a:t>dBSequence_ref</a:t>
+            </a:r>
+            <a:r>
+              <a:rPr lang="en-GB" sz="900" dirty="0">
+                <a:latin typeface="Courier New" panose="02070309020205020404" pitchFamily="49" charset="0"/>
+                <a:cs typeface="Courier New" panose="02070309020205020404" pitchFamily="49" charset="0"/>
+              </a:rPr>
+              <a:t>="dbseq_P02768" </a:t>
+            </a:r>
+            <a:r>
+              <a:rPr lang="en-GB" sz="900" dirty="0" err="1">
+                <a:latin typeface="Courier New" panose="02070309020205020404" pitchFamily="49" charset="0"/>
+                <a:cs typeface="Courier New" panose="02070309020205020404" pitchFamily="49" charset="0"/>
+              </a:rPr>
+              <a:t>passThreshold</a:t>
+            </a:r>
+            <a:r>
+              <a:rPr lang="en-GB" sz="900" dirty="0">
+                <a:latin typeface="Courier New" panose="02070309020205020404" pitchFamily="49" charset="0"/>
+                <a:cs typeface="Courier New" panose="02070309020205020404" pitchFamily="49" charset="0"/>
+              </a:rPr>
+              <a:t>="true" id="PAG_1_PDH_0"&gt;</a:t>
+            </a:r>
+          </a:p>
+          <a:p>
+            <a:r>
+              <a:rPr lang="en-GB" sz="900" dirty="0">
+                <a:latin typeface="Courier New" panose="02070309020205020404" pitchFamily="49" charset="0"/>
+                <a:cs typeface="Courier New" panose="02070309020205020404" pitchFamily="49" charset="0"/>
+              </a:rPr>
+              <a:t>      &lt;</a:t>
+            </a:r>
+            <a:r>
+              <a:rPr lang="en-GB" sz="900" dirty="0" err="1">
+                <a:latin typeface="Courier New" panose="02070309020205020404" pitchFamily="49" charset="0"/>
+                <a:cs typeface="Courier New" panose="02070309020205020404" pitchFamily="49" charset="0"/>
+              </a:rPr>
+              <a:t>PeptideHypothesis</a:t>
+            </a:r>
+            <a:r>
+              <a:rPr lang="en-GB" sz="900" dirty="0">
+                <a:latin typeface="Courier New" panose="02070309020205020404" pitchFamily="49" charset="0"/>
+                <a:cs typeface="Courier New" panose="02070309020205020404" pitchFamily="49" charset="0"/>
+              </a:rPr>
+              <a:t> </a:t>
+            </a:r>
+            <a:r>
+              <a:rPr lang="en-GB" sz="900" dirty="0" err="1">
+                <a:latin typeface="Courier New" panose="02070309020205020404" pitchFamily="49" charset="0"/>
+                <a:cs typeface="Courier New" panose="02070309020205020404" pitchFamily="49" charset="0"/>
+              </a:rPr>
+              <a:t>peptideEvidence_ref</a:t>
+            </a:r>
+            <a:r>
+              <a:rPr lang="en-GB" sz="900" dirty="0">
+                <a:latin typeface="Courier New" panose="02070309020205020404" pitchFamily="49" charset="0"/>
+                <a:cs typeface="Courier New" panose="02070309020205020404" pitchFamily="49" charset="0"/>
+              </a:rPr>
+              <a:t>="pepevid_psm252637369_pep54600650"&gt;</a:t>
+            </a:r>
+          </a:p>
+          <a:p>
+            <a:r>
+              <a:rPr lang="en-GB" sz="900" dirty="0">
+                <a:latin typeface="Courier New" panose="02070309020205020404" pitchFamily="49" charset="0"/>
+                <a:cs typeface="Courier New" panose="02070309020205020404" pitchFamily="49" charset="0"/>
+              </a:rPr>
+              <a:t>        &lt;</a:t>
+            </a:r>
+            <a:r>
+              <a:rPr lang="en-GB" sz="900" dirty="0" err="1">
+                <a:latin typeface="Courier New" panose="02070309020205020404" pitchFamily="49" charset="0"/>
+                <a:cs typeface="Courier New" panose="02070309020205020404" pitchFamily="49" charset="0"/>
+              </a:rPr>
+              <a:t>SpectrumIdentificationItemRef</a:t>
+            </a:r>
+            <a:r>
+              <a:rPr lang="en-GB" sz="900" dirty="0">
+                <a:latin typeface="Courier New" panose="02070309020205020404" pitchFamily="49" charset="0"/>
+                <a:cs typeface="Courier New" panose="02070309020205020404" pitchFamily="49" charset="0"/>
+              </a:rPr>
+              <a:t> </a:t>
+            </a:r>
+            <a:r>
+              <a:rPr lang="en-GB" sz="900" dirty="0" err="1">
+                <a:latin typeface="Courier New" panose="02070309020205020404" pitchFamily="49" charset="0"/>
+                <a:cs typeface="Courier New" panose="02070309020205020404" pitchFamily="49" charset="0"/>
+              </a:rPr>
+              <a:t>spectrumIdentificationItem_ref</a:t>
+            </a:r>
+            <a:r>
+              <a:rPr lang="en-GB" sz="900" dirty="0">
+                <a:latin typeface="Courier New" panose="02070309020205020404" pitchFamily="49" charset="0"/>
+                <a:cs typeface="Courier New" panose="02070309020205020404" pitchFamily="49" charset="0"/>
+              </a:rPr>
+              <a:t>="SII_1_2"/&gt;</a:t>
+            </a:r>
+          </a:p>
+          <a:p>
+            <a:r>
+              <a:rPr lang="en-GB" sz="900" dirty="0">
+                <a:latin typeface="Courier New" panose="02070309020205020404" pitchFamily="49" charset="0"/>
+                <a:cs typeface="Courier New" panose="02070309020205020404" pitchFamily="49" charset="0"/>
+              </a:rPr>
+              <a:t>      &lt;/</a:t>
+            </a:r>
+            <a:r>
+              <a:rPr lang="en-GB" sz="900" dirty="0" err="1">
+                <a:latin typeface="Courier New" panose="02070309020205020404" pitchFamily="49" charset="0"/>
+                <a:cs typeface="Courier New" panose="02070309020205020404" pitchFamily="49" charset="0"/>
+              </a:rPr>
+              <a:t>PeptideHypothesis</a:t>
+            </a:r>
+            <a:r>
+              <a:rPr lang="en-GB" sz="900" dirty="0">
+                <a:latin typeface="Courier New" panose="02070309020205020404" pitchFamily="49" charset="0"/>
+                <a:cs typeface="Courier New" panose="02070309020205020404" pitchFamily="49" charset="0"/>
+              </a:rPr>
+              <a:t>&gt;</a:t>
+            </a:r>
+          </a:p>
+          <a:p>
+            <a:r>
+              <a:rPr lang="en-GB" sz="900" dirty="0">
+                <a:latin typeface="Courier New" panose="02070309020205020404" pitchFamily="49" charset="0"/>
+                <a:cs typeface="Courier New" panose="02070309020205020404" pitchFamily="49" charset="0"/>
+              </a:rPr>
+              <a:t>      &lt;</a:t>
+            </a:r>
+            <a:r>
+              <a:rPr lang="en-GB" sz="900" dirty="0" err="1">
+                <a:latin typeface="Courier New" panose="02070309020205020404" pitchFamily="49" charset="0"/>
+                <a:cs typeface="Courier New" panose="02070309020205020404" pitchFamily="49" charset="0"/>
+              </a:rPr>
+              <a:t>PeptideHypothesis</a:t>
+            </a:r>
+            <a:r>
+              <a:rPr lang="en-GB" sz="900" dirty="0">
+                <a:latin typeface="Courier New" panose="02070309020205020404" pitchFamily="49" charset="0"/>
+                <a:cs typeface="Courier New" panose="02070309020205020404" pitchFamily="49" charset="0"/>
+              </a:rPr>
+              <a:t> </a:t>
+            </a:r>
+            <a:r>
+              <a:rPr lang="en-GB" sz="900" dirty="0" err="1">
+                <a:latin typeface="Courier New" panose="02070309020205020404" pitchFamily="49" charset="0"/>
+                <a:cs typeface="Courier New" panose="02070309020205020404" pitchFamily="49" charset="0"/>
+              </a:rPr>
+              <a:t>peptideEvidence_ref</a:t>
+            </a:r>
+            <a:r>
+              <a:rPr lang="en-GB" sz="900" dirty="0">
+                <a:latin typeface="Courier New" panose="02070309020205020404" pitchFamily="49" charset="0"/>
+                <a:cs typeface="Courier New" panose="02070309020205020404" pitchFamily="49" charset="0"/>
+              </a:rPr>
+              <a:t>="pepevid_psm252633422_pep54604445_protP02768-A_target_52"&gt;</a:t>
+            </a:r>
+          </a:p>
+          <a:p>
+            <a:r>
+              <a:rPr lang="en-GB" sz="900" dirty="0">
+                <a:latin typeface="Courier New" panose="02070309020205020404" pitchFamily="49" charset="0"/>
+                <a:cs typeface="Courier New" panose="02070309020205020404" pitchFamily="49" charset="0"/>
+              </a:rPr>
+              <a:t>        &lt;</a:t>
+            </a:r>
+            <a:r>
+              <a:rPr lang="en-GB" sz="900" dirty="0" err="1">
+                <a:latin typeface="Courier New" panose="02070309020205020404" pitchFamily="49" charset="0"/>
+                <a:cs typeface="Courier New" panose="02070309020205020404" pitchFamily="49" charset="0"/>
+              </a:rPr>
+              <a:t>SpectrumIdentificationItemRef</a:t>
+            </a:r>
+            <a:r>
+              <a:rPr lang="en-GB" sz="900" dirty="0">
+                <a:latin typeface="Courier New" panose="02070309020205020404" pitchFamily="49" charset="0"/>
+                <a:cs typeface="Courier New" panose="02070309020205020404" pitchFamily="49" charset="0"/>
+              </a:rPr>
+              <a:t> </a:t>
+            </a:r>
+            <a:r>
+              <a:rPr lang="en-GB" sz="900" dirty="0" err="1">
+                <a:latin typeface="Courier New" panose="02070309020205020404" pitchFamily="49" charset="0"/>
+                <a:cs typeface="Courier New" panose="02070309020205020404" pitchFamily="49" charset="0"/>
+              </a:rPr>
+              <a:t>spectrumIdentificationItem_ref</a:t>
+            </a:r>
+            <a:r>
+              <a:rPr lang="en-GB" sz="900" dirty="0">
+                <a:latin typeface="Courier New" panose="02070309020205020404" pitchFamily="49" charset="0"/>
+                <a:cs typeface="Courier New" panose="02070309020205020404" pitchFamily="49" charset="0"/>
+              </a:rPr>
+              <a:t>="SII_2_1"/&gt;</a:t>
+            </a:r>
+          </a:p>
+          <a:p>
+            <a:r>
+              <a:rPr lang="en-GB" sz="900" dirty="0">
+                <a:latin typeface="Courier New" panose="02070309020205020404" pitchFamily="49" charset="0"/>
+                <a:cs typeface="Courier New" panose="02070309020205020404" pitchFamily="49" charset="0"/>
+              </a:rPr>
+              <a:t>      &lt;/</a:t>
+            </a:r>
+            <a:r>
+              <a:rPr lang="en-GB" sz="900" dirty="0" err="1">
+                <a:latin typeface="Courier New" panose="02070309020205020404" pitchFamily="49" charset="0"/>
+                <a:cs typeface="Courier New" panose="02070309020205020404" pitchFamily="49" charset="0"/>
+              </a:rPr>
+              <a:t>PeptideHypothesis</a:t>
+            </a:r>
+            <a:r>
+              <a:rPr lang="en-GB" sz="900" dirty="0">
+                <a:latin typeface="Courier New" panose="02070309020205020404" pitchFamily="49" charset="0"/>
+                <a:cs typeface="Courier New" panose="02070309020205020404" pitchFamily="49" charset="0"/>
+              </a:rPr>
+              <a:t>&gt;</a:t>
+            </a:r>
+          </a:p>
+          <a:p>
+            <a:r>
+              <a:rPr lang="en-GB" sz="900" dirty="0">
+                <a:latin typeface="Courier New" panose="02070309020205020404" pitchFamily="49" charset="0"/>
+                <a:cs typeface="Courier New" panose="02070309020205020404" pitchFamily="49" charset="0"/>
+              </a:rPr>
+              <a:t>    ....</a:t>
+            </a:r>
+          </a:p>
+          <a:p>
+            <a:r>
+              <a:rPr lang="en-GB" sz="900" dirty="0">
+                <a:latin typeface="Courier New" panose="02070309020205020404" pitchFamily="49" charset="0"/>
+                <a:cs typeface="Courier New" panose="02070309020205020404" pitchFamily="49" charset="0"/>
+              </a:rPr>
+              <a:t>    &lt;</a:t>
+            </a:r>
+            <a:r>
+              <a:rPr lang="en-GB" sz="900" dirty="0" err="1">
+                <a:latin typeface="Courier New" panose="02070309020205020404" pitchFamily="49" charset="0"/>
+                <a:cs typeface="Courier New" panose="02070309020205020404" pitchFamily="49" charset="0"/>
+              </a:rPr>
+              <a:t>cvParam</a:t>
+            </a:r>
+            <a:r>
+              <a:rPr lang="en-GB" sz="900" dirty="0">
+                <a:latin typeface="Courier New" panose="02070309020205020404" pitchFamily="49" charset="0"/>
+                <a:cs typeface="Courier New" panose="02070309020205020404" pitchFamily="49" charset="0"/>
+              </a:rPr>
+              <a:t> </a:t>
+            </a:r>
+            <a:r>
+              <a:rPr lang="en-GB" sz="900" dirty="0" err="1">
+                <a:latin typeface="Courier New" panose="02070309020205020404" pitchFamily="49" charset="0"/>
+                <a:cs typeface="Courier New" panose="02070309020205020404" pitchFamily="49" charset="0"/>
+              </a:rPr>
+              <a:t>cvRef</a:t>
+            </a:r>
+            <a:r>
+              <a:rPr lang="en-GB" sz="900" dirty="0">
+                <a:latin typeface="Courier New" panose="02070309020205020404" pitchFamily="49" charset="0"/>
+                <a:cs typeface="Courier New" panose="02070309020205020404" pitchFamily="49" charset="0"/>
+              </a:rPr>
+              <a:t>="PSI-MS" accession="MS:1002676" name="protein-pair-level global FDR" value="</a:t>
+            </a:r>
+            <a:r>
+              <a:rPr lang="en-GB" sz="900" dirty="0" smtClean="0">
+                <a:latin typeface="Courier New" panose="02070309020205020404" pitchFamily="49" charset="0"/>
+                <a:cs typeface="Courier New" panose="02070309020205020404" pitchFamily="49" charset="0"/>
+              </a:rPr>
+              <a:t>100.a:null:</a:t>
+            </a:r>
+            <a:r>
+              <a:rPr lang="en-GB" sz="900" dirty="0">
+                <a:latin typeface="Courier New" panose="02070309020205020404" pitchFamily="49" charset="0"/>
+                <a:cs typeface="Courier New" panose="02070309020205020404" pitchFamily="49" charset="0"/>
+              </a:rPr>
+              <a:t>0.001</a:t>
+            </a:r>
+            <a:r>
+              <a:rPr lang="en-GB" sz="900" dirty="0" smtClean="0">
+                <a:latin typeface="Courier New" panose="02070309020205020404" pitchFamily="49" charset="0"/>
+                <a:cs typeface="Courier New" panose="02070309020205020404" pitchFamily="49" charset="0"/>
+              </a:rPr>
+              <a:t>:true</a:t>
+            </a:r>
+            <a:r>
+              <a:rPr lang="en-GB" sz="900" dirty="0">
+                <a:latin typeface="Courier New" panose="02070309020205020404" pitchFamily="49" charset="0"/>
+                <a:cs typeface="Courier New" panose="02070309020205020404" pitchFamily="49" charset="0"/>
+              </a:rPr>
+              <a:t>"/&gt;</a:t>
+            </a:r>
+          </a:p>
+          <a:p>
+            <a:r>
+              <a:rPr lang="en-GB" sz="900" dirty="0">
+                <a:latin typeface="Courier New" panose="02070309020205020404" pitchFamily="49" charset="0"/>
+                <a:cs typeface="Courier New" panose="02070309020205020404" pitchFamily="49" charset="0"/>
+              </a:rPr>
+              <a:t>    &lt;</a:t>
+            </a:r>
+            <a:r>
+              <a:rPr lang="en-GB" sz="900" dirty="0" err="1">
+                <a:latin typeface="Courier New" panose="02070309020205020404" pitchFamily="49" charset="0"/>
+                <a:cs typeface="Courier New" panose="02070309020205020404" pitchFamily="49" charset="0"/>
+              </a:rPr>
+              <a:t>cvParam</a:t>
+            </a:r>
+            <a:r>
+              <a:rPr lang="en-GB" sz="900" dirty="0">
+                <a:latin typeface="Courier New" panose="02070309020205020404" pitchFamily="49" charset="0"/>
+                <a:cs typeface="Courier New" panose="02070309020205020404" pitchFamily="49" charset="0"/>
+              </a:rPr>
+              <a:t> </a:t>
+            </a:r>
+            <a:r>
+              <a:rPr lang="en-GB" sz="900" dirty="0" err="1">
+                <a:latin typeface="Courier New" panose="02070309020205020404" pitchFamily="49" charset="0"/>
+                <a:cs typeface="Courier New" panose="02070309020205020404" pitchFamily="49" charset="0"/>
+              </a:rPr>
+              <a:t>cvRef</a:t>
+            </a:r>
+            <a:r>
+              <a:rPr lang="en-GB" sz="900" dirty="0">
+                <a:latin typeface="Courier New" panose="02070309020205020404" pitchFamily="49" charset="0"/>
+                <a:cs typeface="Courier New" panose="02070309020205020404" pitchFamily="49" charset="0"/>
+              </a:rPr>
+              <a:t>="PSI-MS" accession="MS:1002677" name="residue-pair-level global FDR" value="</a:t>
+            </a:r>
+            <a:r>
+              <a:rPr lang="en-GB" sz="900" dirty="0" smtClean="0">
+                <a:latin typeface="Courier New" panose="02070309020205020404" pitchFamily="49" charset="0"/>
+                <a:cs typeface="Courier New" panose="02070309020205020404" pitchFamily="49" charset="0"/>
+              </a:rPr>
+              <a:t>106.a:436:0.0294:true</a:t>
+            </a:r>
+            <a:r>
+              <a:rPr lang="en-GB" sz="900" dirty="0">
+                <a:latin typeface="Courier New" panose="02070309020205020404" pitchFamily="49" charset="0"/>
+                <a:cs typeface="Courier New" panose="02070309020205020404" pitchFamily="49" charset="0"/>
+              </a:rPr>
+              <a:t>"/&gt;</a:t>
+            </a:r>
+          </a:p>
+          <a:p>
+            <a:r>
+              <a:rPr lang="en-GB" sz="900" dirty="0">
+                <a:latin typeface="Courier New" panose="02070309020205020404" pitchFamily="49" charset="0"/>
+                <a:cs typeface="Courier New" panose="02070309020205020404" pitchFamily="49" charset="0"/>
+              </a:rPr>
+              <a:t>  &lt;/</a:t>
+            </a:r>
+            <a:r>
+              <a:rPr lang="en-GB" sz="900" dirty="0" err="1">
+                <a:latin typeface="Courier New" panose="02070309020205020404" pitchFamily="49" charset="0"/>
+                <a:cs typeface="Courier New" panose="02070309020205020404" pitchFamily="49" charset="0"/>
+              </a:rPr>
+              <a:t>ProteinDetectionHypothesis</a:t>
+            </a:r>
+            <a:r>
+              <a:rPr lang="en-GB" sz="900" dirty="0" smtClean="0">
+                <a:latin typeface="Courier New" panose="02070309020205020404" pitchFamily="49" charset="0"/>
+                <a:cs typeface="Courier New" panose="02070309020205020404" pitchFamily="49" charset="0"/>
+              </a:rPr>
+              <a:t>&gt;</a:t>
+            </a:r>
+          </a:p>
+          <a:p>
+            <a:r>
+              <a:rPr lang="en-GB" sz="900" dirty="0">
+                <a:latin typeface="Courier New" panose="02070309020205020404" pitchFamily="49" charset="0"/>
+                <a:cs typeface="Courier New" panose="02070309020205020404" pitchFamily="49" charset="0"/>
+              </a:rPr>
+              <a:t> </a:t>
+            </a:r>
+            <a:r>
+              <a:rPr lang="en-GB" sz="900" dirty="0" smtClean="0">
+                <a:latin typeface="Courier New" panose="02070309020205020404" pitchFamily="49" charset="0"/>
+                <a:cs typeface="Courier New" panose="02070309020205020404" pitchFamily="49" charset="0"/>
+              </a:rPr>
+              <a:t> &lt;</a:t>
+            </a:r>
+            <a:r>
+              <a:rPr lang="en-GB" sz="900" dirty="0" err="1">
+                <a:latin typeface="Courier New" panose="02070309020205020404" pitchFamily="49" charset="0"/>
+                <a:cs typeface="Courier New" panose="02070309020205020404" pitchFamily="49" charset="0"/>
+              </a:rPr>
+              <a:t>cvParam</a:t>
+            </a:r>
+            <a:r>
+              <a:rPr lang="en-GB" sz="900" dirty="0">
+                <a:latin typeface="Courier New" panose="02070309020205020404" pitchFamily="49" charset="0"/>
+                <a:cs typeface="Courier New" panose="02070309020205020404" pitchFamily="49" charset="0"/>
+              </a:rPr>
+              <a:t> </a:t>
+            </a:r>
+            <a:r>
+              <a:rPr lang="en-GB" sz="900" dirty="0" err="1">
+                <a:latin typeface="Courier New" panose="02070309020205020404" pitchFamily="49" charset="0"/>
+                <a:cs typeface="Courier New" panose="02070309020205020404" pitchFamily="49" charset="0"/>
+              </a:rPr>
+              <a:t>cvRef</a:t>
+            </a:r>
+            <a:r>
+              <a:rPr lang="en-GB" sz="900" dirty="0">
+                <a:latin typeface="Courier New" panose="02070309020205020404" pitchFamily="49" charset="0"/>
+                <a:cs typeface="Courier New" panose="02070309020205020404" pitchFamily="49" charset="0"/>
+              </a:rPr>
+              <a:t>="PSI-MS" accession="MS:1002415" name="protein group passes threshold" value="true"/&gt;</a:t>
+            </a:r>
+          </a:p>
+          <a:p>
+            <a:r>
+              <a:rPr lang="en-GB" sz="900" dirty="0">
+                <a:latin typeface="Courier New" panose="02070309020205020404" pitchFamily="49" charset="0"/>
+                <a:cs typeface="Courier New" panose="02070309020205020404" pitchFamily="49" charset="0"/>
+              </a:rPr>
+              <a:t>&lt;/</a:t>
+            </a:r>
+            <a:r>
+              <a:rPr lang="en-GB" sz="900" dirty="0" err="1">
+                <a:latin typeface="Courier New" panose="02070309020205020404" pitchFamily="49" charset="0"/>
+                <a:cs typeface="Courier New" panose="02070309020205020404" pitchFamily="49" charset="0"/>
+              </a:rPr>
+              <a:t>ProteinAmbiguityGroup</a:t>
+            </a:r>
+            <a:r>
+              <a:rPr lang="en-GB" sz="900" dirty="0">
+                <a:latin typeface="Courier New" panose="02070309020205020404" pitchFamily="49" charset="0"/>
+                <a:cs typeface="Courier New" panose="02070309020205020404" pitchFamily="49" charset="0"/>
+              </a:rPr>
+              <a:t>&gt;</a:t>
+            </a:r>
+          </a:p>
+        </p:txBody>
+      </p:sp>
+      <p:sp>
+        <p:nvSpPr>
+          <p:cNvPr id="19" name="TextBox 18"/>
           <p:cNvSpPr txBox="1"/>
           <p:nvPr/>
         </p:nvSpPr>
         <p:spPr>
           <a:xfrm>
-            <a:off x="1093064" y="8245028"/>
-            <a:ext cx="4465710" cy="276999"/>
+            <a:off x="35496" y="108124"/>
+            <a:ext cx="5584793" cy="276999"/>
           </a:xfrm>
           <a:prstGeom prst="rect">
             <a:avLst/>
@@ -12461,17 +13414,58 @@
           <a:noFill/>
         </p:spPr>
         <p:txBody>
-          <a:bodyPr wrap="none" rtlCol="0">
+          <a:bodyPr wrap="square" rtlCol="0">
             <a:spAutoFit/>
           </a:bodyPr>
           <a:lstStyle/>
           <a:p>
             <a:r>
               <a:rPr lang="en-GB" sz="1200" b="1" dirty="0" smtClean="0">
-                <a:cs typeface="Courier New" pitchFamily="49" charset="0"/>
-              </a:rPr>
-              <a:t>Note: Need XML example of this and at least one genuine CV term</a:t>
-            </a:r>
+                <a:latin typeface="Calibri" panose="020F0502020204030204" pitchFamily="34" charset="0"/>
+                <a:cs typeface="Courier New" pitchFamily="49" charset="0"/>
+              </a:rPr>
+              <a:t>Hypothetical/stylized example of  encoding evidence for protein interactions</a:t>
+            </a:r>
+            <a:endParaRPr lang="en-GB" sz="1200" b="1" dirty="0" smtClean="0">
+              <a:latin typeface="Calibri" panose="020F0502020204030204" pitchFamily="34" charset="0"/>
+              <a:cs typeface="Courier New" pitchFamily="49" charset="0"/>
+            </a:endParaRPr>
+          </a:p>
+        </p:txBody>
+      </p:sp>
+      <p:sp>
+        <p:nvSpPr>
+          <p:cNvPr id="37" name="TextBox 36"/>
+          <p:cNvSpPr txBox="1"/>
+          <p:nvPr/>
+        </p:nvSpPr>
+        <p:spPr>
+          <a:xfrm>
+            <a:off x="214407" y="8116321"/>
+            <a:ext cx="4257940" cy="276999"/>
+          </a:xfrm>
+          <a:prstGeom prst="rect">
+            <a:avLst/>
+          </a:prstGeom>
+          <a:noFill/>
+        </p:spPr>
+        <p:txBody>
+          <a:bodyPr wrap="square" rtlCol="0">
+            <a:spAutoFit/>
+          </a:bodyPr>
+          <a:lstStyle/>
+          <a:p>
+            <a:r>
+              <a:rPr lang="en-GB" sz="1200" b="1" i="1" dirty="0" smtClean="0">
+                <a:latin typeface="Calibri" panose="020F0502020204030204" pitchFamily="34" charset="0"/>
+                <a:cs typeface="Courier New" pitchFamily="49" charset="0"/>
+              </a:rPr>
+              <a:t>XML Snippet</a:t>
+            </a:r>
+            <a:endParaRPr lang="en-GB" sz="1200" b="1" i="1" dirty="0" smtClean="0">
+              <a:latin typeface="Calibri" panose="020F0502020204030204" pitchFamily="34" charset="0"/>
+              <a:cs typeface="Courier New" pitchFamily="49" charset="0"/>
+            </a:endParaRPr>
           </a:p>
         </p:txBody>
       </p:sp>

</xml_diff>

<commit_message>
Updated figures in pptx
</commit_message>
<xml_diff>
--- a/specification_document/specdoc1_2/NewFeaturesInMzid12.pptx
+++ b/specification_document/specdoc1_2/NewFeaturesInMzid12.pptx
@@ -215,7 +215,7 @@
             <a:fld id="{943B0BE5-311A-4B0A-9A39-DE24DD4BA79D}" type="datetimeFigureOut">
               <a:rPr lang="en-GB" smtClean="0"/>
               <a:pPr/>
-              <a:t>18/07/2016</a:t>
+              <a:t>19/07/2016</a:t>
             </a:fld>
             <a:endParaRPr lang="en-GB"/>
           </a:p>
@@ -760,7 +760,7 @@
             <a:fld id="{A71EF3F3-5BE8-4F69-8C8F-88D570AA2740}" type="datetimeFigureOut">
               <a:rPr lang="en-GB" smtClean="0"/>
               <a:pPr/>
-              <a:t>18/07/2016</a:t>
+              <a:t>19/07/2016</a:t>
             </a:fld>
             <a:endParaRPr lang="en-GB"/>
           </a:p>
@@ -927,7 +927,7 @@
             <a:fld id="{A71EF3F3-5BE8-4F69-8C8F-88D570AA2740}" type="datetimeFigureOut">
               <a:rPr lang="en-GB" smtClean="0"/>
               <a:pPr/>
-              <a:t>18/07/2016</a:t>
+              <a:t>19/07/2016</a:t>
             </a:fld>
             <a:endParaRPr lang="en-GB"/>
           </a:p>
@@ -1104,7 +1104,7 @@
             <a:fld id="{A71EF3F3-5BE8-4F69-8C8F-88D570AA2740}" type="datetimeFigureOut">
               <a:rPr lang="en-GB" smtClean="0"/>
               <a:pPr/>
-              <a:t>18/07/2016</a:t>
+              <a:t>19/07/2016</a:t>
             </a:fld>
             <a:endParaRPr lang="en-GB"/>
           </a:p>
@@ -1271,7 +1271,7 @@
             <a:fld id="{A71EF3F3-5BE8-4F69-8C8F-88D570AA2740}" type="datetimeFigureOut">
               <a:rPr lang="en-GB" smtClean="0"/>
               <a:pPr/>
-              <a:t>18/07/2016</a:t>
+              <a:t>19/07/2016</a:t>
             </a:fld>
             <a:endParaRPr lang="en-GB"/>
           </a:p>
@@ -1514,7 +1514,7 @@
             <a:fld id="{A71EF3F3-5BE8-4F69-8C8F-88D570AA2740}" type="datetimeFigureOut">
               <a:rPr lang="en-GB" smtClean="0"/>
               <a:pPr/>
-              <a:t>18/07/2016</a:t>
+              <a:t>19/07/2016</a:t>
             </a:fld>
             <a:endParaRPr lang="en-GB"/>
           </a:p>
@@ -1799,7 +1799,7 @@
             <a:fld id="{A71EF3F3-5BE8-4F69-8C8F-88D570AA2740}" type="datetimeFigureOut">
               <a:rPr lang="en-GB" smtClean="0"/>
               <a:pPr/>
-              <a:t>18/07/2016</a:t>
+              <a:t>19/07/2016</a:t>
             </a:fld>
             <a:endParaRPr lang="en-GB"/>
           </a:p>
@@ -2218,7 +2218,7 @@
             <a:fld id="{A71EF3F3-5BE8-4F69-8C8F-88D570AA2740}" type="datetimeFigureOut">
               <a:rPr lang="en-GB" smtClean="0"/>
               <a:pPr/>
-              <a:t>18/07/2016</a:t>
+              <a:t>19/07/2016</a:t>
             </a:fld>
             <a:endParaRPr lang="en-GB"/>
           </a:p>
@@ -2333,7 +2333,7 @@
             <a:fld id="{A71EF3F3-5BE8-4F69-8C8F-88D570AA2740}" type="datetimeFigureOut">
               <a:rPr lang="en-GB" smtClean="0"/>
               <a:pPr/>
-              <a:t>18/07/2016</a:t>
+              <a:t>19/07/2016</a:t>
             </a:fld>
             <a:endParaRPr lang="en-GB"/>
           </a:p>
@@ -2425,7 +2425,7 @@
             <a:fld id="{A71EF3F3-5BE8-4F69-8C8F-88D570AA2740}" type="datetimeFigureOut">
               <a:rPr lang="en-GB" smtClean="0"/>
               <a:pPr/>
-              <a:t>18/07/2016</a:t>
+              <a:t>19/07/2016</a:t>
             </a:fld>
             <a:endParaRPr lang="en-GB"/>
           </a:p>
@@ -2699,7 +2699,7 @@
             <a:fld id="{A71EF3F3-5BE8-4F69-8C8F-88D570AA2740}" type="datetimeFigureOut">
               <a:rPr lang="en-GB" smtClean="0"/>
               <a:pPr/>
-              <a:t>18/07/2016</a:t>
+              <a:t>19/07/2016</a:t>
             </a:fld>
             <a:endParaRPr lang="en-GB"/>
           </a:p>
@@ -2949,7 +2949,7 @@
             <a:fld id="{A71EF3F3-5BE8-4F69-8C8F-88D570AA2740}" type="datetimeFigureOut">
               <a:rPr lang="en-GB" smtClean="0"/>
               <a:pPr/>
-              <a:t>18/07/2016</a:t>
+              <a:t>19/07/2016</a:t>
             </a:fld>
             <a:endParaRPr lang="en-GB"/>
           </a:p>
@@ -3159,7 +3159,7 @@
             <a:fld id="{A71EF3F3-5BE8-4F69-8C8F-88D570AA2740}" type="datetimeFigureOut">
               <a:rPr lang="en-GB" smtClean="0"/>
               <a:pPr/>
-              <a:t>18/07/2016</a:t>
+              <a:t>19/07/2016</a:t>
             </a:fld>
             <a:endParaRPr lang="en-GB"/>
           </a:p>
@@ -11476,30 +11476,13 @@
           <a:p>
             <a:r>
               <a:rPr lang="en-GB" sz="1100" dirty="0" smtClean="0"/>
-              <a:t> name</a:t>
-            </a:r>
+              <a:t> name=“protein-pair-level global FDR” value=“1001.a:256:0.001:TRUE”</a:t>
+            </a:r>
+          </a:p>
+          <a:p>
             <a:r>
               <a:rPr lang="en-GB" sz="1100" dirty="0" smtClean="0"/>
-              <a:t>=“protein-pair-level global FDR” </a:t>
-            </a:r>
-            <a:r>
-              <a:rPr lang="en-GB" sz="1100" dirty="0" smtClean="0"/>
-              <a:t>value=“</a:t>
-            </a:r>
-            <a:r>
-              <a:rPr lang="en-GB" sz="1100" dirty="0" smtClean="0"/>
-              <a:t>1001.a:256:0.001:TRUE”</a:t>
-            </a:r>
-            <a:endParaRPr lang="en-GB" sz="1100" dirty="0" smtClean="0"/>
-          </a:p>
-          <a:p>
-            <a:r>
-              <a:rPr lang="en-GB" sz="1100" dirty="0" smtClean="0"/>
-              <a:t> name</a:t>
-            </a:r>
-            <a:r>
-              <a:rPr lang="en-GB" sz="1100" dirty="0" smtClean="0"/>
-              <a:t>=“protein-pair-level global FDR” </a:t>
+              <a:t> name=“protein-pair-level global FDR” </a:t>
             </a:r>
             <a:r>
               <a:rPr lang="en-GB" sz="1100" dirty="0"/>
@@ -11793,19 +11776,7 @@
           <a:p>
             <a:r>
               <a:rPr lang="en-GB" sz="1100" dirty="0" smtClean="0"/>
-              <a:t> name</a:t>
-            </a:r>
-            <a:r>
-              <a:rPr lang="en-GB" sz="1100" dirty="0" smtClean="0"/>
-              <a:t>=“protein-pair-level global FDR” </a:t>
-            </a:r>
-            <a:r>
-              <a:rPr lang="en-GB" sz="1100" dirty="0" smtClean="0"/>
-              <a:t>value=“</a:t>
-            </a:r>
-            <a:r>
-              <a:rPr lang="en-GB" sz="1100" dirty="0" smtClean="0"/>
-              <a:t>1001.b:135:0.001:TRUE”</a:t>
+              <a:t> name=“protein-pair-level global FDR” value=“1001.b:135:0.001:TRUE”</a:t>
             </a:r>
             <a:endParaRPr lang="en-GB" sz="1100" dirty="0"/>
           </a:p>
@@ -11937,19 +11908,7 @@
           <a:p>
             <a:r>
               <a:rPr lang="en-GB" sz="1100" dirty="0" smtClean="0"/>
-              <a:t> name</a:t>
-            </a:r>
-            <a:r>
-              <a:rPr lang="en-GB" sz="1100" dirty="0" smtClean="0"/>
-              <a:t>=“protein-pair-level global FDR” </a:t>
-            </a:r>
-            <a:r>
-              <a:rPr lang="en-GB" sz="1100" dirty="0" smtClean="0"/>
-              <a:t>value=“</a:t>
-            </a:r>
-            <a:r>
-              <a:rPr lang="en-GB" sz="1100" dirty="0" smtClean="0"/>
-              <a:t>1002.b:135:0.07:FALSE”</a:t>
+              <a:t> name=“protein-pair-level global FDR” value=“1002.b:135:0.07:FALSE”</a:t>
             </a:r>
             <a:endParaRPr lang="en-GB" sz="1100" dirty="0"/>
           </a:p>
@@ -12012,30 +11971,13 @@
           <a:p>
             <a:r>
               <a:rPr lang="en-GB" sz="1100" dirty="0" smtClean="0"/>
-              <a:t> name</a:t>
-            </a:r>
+              <a:t> name=“protein-pair-level global FDR” value=“1001.a:258:0.001:TRUE”</a:t>
+            </a:r>
+          </a:p>
+          <a:p>
             <a:r>
               <a:rPr lang="en-GB" sz="1100" dirty="0" smtClean="0"/>
-              <a:t>=“protein-pair-level global FDR” </a:t>
-            </a:r>
-            <a:r>
-              <a:rPr lang="en-GB" sz="1100" dirty="0" smtClean="0"/>
-              <a:t>value=“</a:t>
-            </a:r>
-            <a:r>
-              <a:rPr lang="en-GB" sz="1100" dirty="0" smtClean="0"/>
-              <a:t>1001.a:258:0.001:TRUE”</a:t>
-            </a:r>
-            <a:endParaRPr lang="en-GB" sz="1100" dirty="0" smtClean="0"/>
-          </a:p>
-          <a:p>
-            <a:r>
-              <a:rPr lang="en-GB" sz="1100" dirty="0" smtClean="0"/>
-              <a:t> name</a:t>
-            </a:r>
-            <a:r>
-              <a:rPr lang="en-GB" sz="1100" dirty="0" smtClean="0"/>
-              <a:t>=“protein-pair-level global FDR” </a:t>
+              <a:t> name=“protein-pair-level global FDR” </a:t>
             </a:r>
             <a:r>
               <a:rPr lang="en-GB" sz="1100" dirty="0"/>
@@ -12357,21 +12299,7 @@
                 <a:latin typeface="+mj-lt"/>
                 <a:cs typeface="Courier New" pitchFamily="49" charset="0"/>
               </a:rPr>
-              <a:t>“true” or “false” to indicate whether the score or value has passed a reported threshold in the file. If no </a:t>
-            </a:r>
-            <a:r>
-              <a:rPr lang="en-GB" sz="1200" dirty="0" smtClean="0">
-                <a:latin typeface="+mj-lt"/>
-                <a:cs typeface="Courier New" pitchFamily="49" charset="0"/>
-              </a:rPr>
-              <a:t>threshold is defined, </a:t>
-            </a:r>
-            <a:r>
-              <a:rPr lang="en-GB" sz="1200" dirty="0" smtClean="0">
-                <a:latin typeface="+mj-lt"/>
-                <a:cs typeface="Courier New" pitchFamily="49" charset="0"/>
-              </a:rPr>
-              <a:t>then PASS_THRESHOLD is always true.</a:t>
+              <a:t>“true” or “false” to indicate whether the score or value has passed a reported threshold in the file. If no threshold is defined, then PASS_THRESHOLD is always true.</a:t>
             </a:r>
           </a:p>
         </p:txBody>
@@ -13426,10 +13354,6 @@
               </a:rPr>
               <a:t>Hypothetical/stylized example of  encoding evidence for protein interactions</a:t>
             </a:r>
-            <a:endParaRPr lang="en-GB" sz="1200" b="1" dirty="0" smtClean="0">
-              <a:latin typeface="Calibri" panose="020F0502020204030204" pitchFamily="34" charset="0"/>
-              <a:cs typeface="Courier New" pitchFamily="49" charset="0"/>
-            </a:endParaRPr>
           </a:p>
         </p:txBody>
       </p:sp>
@@ -13462,10 +13386,6 @@
               </a:rPr>
               <a:t>XML Snippet</a:t>
             </a:r>
-            <a:endParaRPr lang="en-GB" sz="1200" b="1" i="1" dirty="0" smtClean="0">
-              <a:latin typeface="Calibri" panose="020F0502020204030204" pitchFamily="34" charset="0"/>
-              <a:cs typeface="Courier New" pitchFamily="49" charset="0"/>
-            </a:endParaRPr>
           </a:p>
         </p:txBody>
       </p:sp>
@@ -14906,14 +14826,14 @@
           <p:nvPr>
             <p:extLst>
               <p:ext uri="{D42A27DB-BD31-4B8C-83A1-F6EECF244321}">
-                <p14:modId xmlns:p14="http://schemas.microsoft.com/office/powerpoint/2010/main" val="1784363513"/>
+                <p14:modId xmlns:p14="http://schemas.microsoft.com/office/powerpoint/2010/main" val="1694497512"/>
               </p:ext>
             </p:extLst>
           </p:nvPr>
         </p:nvGraphicFramePr>
         <p:xfrm>
           <a:off x="419944" y="7812548"/>
-          <a:ext cx="6624736" cy="4130040"/>
+          <a:ext cx="6624737" cy="4028440"/>
         </p:xfrm>
         <a:graphic>
           <a:graphicData uri="http://schemas.openxmlformats.org/drawingml/2006/table">
@@ -14922,8 +14842,9 @@
                 <a:tableStyleId>{5C22544A-7EE6-4342-B048-85BDC9FD1C3A}</a:tableStyleId>
               </a:tblPr>
               <a:tblGrid>
-                <a:gridCol w="2088233"/>
-                <a:gridCol w="4536503"/>
+                <a:gridCol w="1199728"/>
+                <a:gridCol w="1008112"/>
+                <a:gridCol w="4416897"/>
               </a:tblGrid>
               <a:tr h="370840">
                 <a:tc>
@@ -14932,10 +14853,10 @@
                     <a:lstStyle/>
                     <a:p>
                       <a:r>
-                        <a:rPr lang="en-GB" sz="1200" dirty="0" smtClean="0"/>
+                        <a:rPr lang="en-GB" sz="1100" dirty="0" smtClean="0"/>
                         <a:t>CV term</a:t>
                       </a:r>
-                      <a:endParaRPr lang="en-GB" sz="1200" dirty="0"/>
+                      <a:endParaRPr lang="en-GB" sz="1100" dirty="0"/>
                     </a:p>
                   </a:txBody>
                   <a:tcPr/>
@@ -14946,10 +14867,24 @@
                     <a:lstStyle/>
                     <a:p>
                       <a:r>
-                        <a:rPr lang="en-GB" sz="1200" dirty="0" smtClean="0"/>
+                        <a:rPr lang="en-GB" sz="1100" dirty="0" smtClean="0"/>
+                        <a:t>Accession</a:t>
+                      </a:r>
+                      <a:endParaRPr lang="en-GB" sz="1100" dirty="0"/>
+                    </a:p>
+                  </a:txBody>
+                  <a:tcPr/>
+                </a:tc>
+                <a:tc>
+                  <a:txBody>
+                    <a:bodyPr/>
+                    <a:lstStyle/>
+                    <a:p>
+                      <a:r>
+                        <a:rPr lang="en-GB" sz="1100" dirty="0" smtClean="0"/>
                         <a:t>Definition</a:t>
                       </a:r>
-                      <a:endParaRPr lang="en-GB" sz="1200" dirty="0"/>
+                      <a:endParaRPr lang="en-GB" sz="1100" dirty="0"/>
                     </a:p>
                   </a:txBody>
                   <a:tcPr/>
@@ -14962,7 +14897,7 @@
                     <a:lstStyle/>
                     <a:p>
                       <a:r>
-                        <a:rPr lang="en-GB" sz="1200" kern="1200" baseline="0" dirty="0" smtClean="0">
+                        <a:rPr lang="en-GB" sz="1100" kern="1200" baseline="0" dirty="0" smtClean="0">
                           <a:solidFill>
                             <a:schemeClr val="dk1"/>
                           </a:solidFill>
@@ -14972,7 +14907,21 @@
                         </a:rPr>
                         <a:t>chromosome name </a:t>
                       </a:r>
-                      <a:endParaRPr lang="en-GB" sz="1200" dirty="0"/>
+                      <a:endParaRPr lang="en-GB" sz="1100" dirty="0"/>
+                    </a:p>
+                  </a:txBody>
+                  <a:tcPr/>
+                </a:tc>
+                <a:tc>
+                  <a:txBody>
+                    <a:bodyPr/>
+                    <a:lstStyle/>
+                    <a:p>
+                      <a:r>
+                        <a:rPr lang="en-GB" sz="1100" dirty="0" smtClean="0"/>
+                        <a:t>MS:1002637</a:t>
+                      </a:r>
+                      <a:endParaRPr lang="en-GB" sz="1100" dirty="0"/>
                     </a:p>
                   </a:txBody>
                   <a:tcPr/>
@@ -15000,10 +14949,10 @@
                         <a:defRPr/>
                       </a:pPr>
                       <a:r>
-                        <a:rPr lang="en-GB" sz="1200" dirty="0" smtClean="0"/>
+                        <a:rPr lang="en-GB" sz="1100" dirty="0" smtClean="0"/>
                         <a:t>The name or number of the chromosome to which a given peptide has been mapped.</a:t>
                       </a:r>
-                      <a:endParaRPr lang="en-GB" sz="1200" dirty="0"/>
+                      <a:endParaRPr lang="en-GB" sz="1100" dirty="0"/>
                     </a:p>
                   </a:txBody>
                   <a:tcPr/>
@@ -15016,10 +14965,24 @@
                     <a:lstStyle/>
                     <a:p>
                       <a:r>
-                        <a:rPr lang="en-GB" sz="1200" dirty="0" smtClean="0"/>
+                        <a:rPr lang="en-GB" sz="1100" dirty="0" smtClean="0"/>
                         <a:t>chromosome strand</a:t>
                       </a:r>
-                      <a:endParaRPr lang="en-GB" sz="1200" dirty="0"/>
+                      <a:endParaRPr lang="en-GB" sz="1100" dirty="0"/>
+                    </a:p>
+                  </a:txBody>
+                  <a:tcPr/>
+                </a:tc>
+                <a:tc>
+                  <a:txBody>
+                    <a:bodyPr/>
+                    <a:lstStyle/>
+                    <a:p>
+                      <a:r>
+                        <a:rPr lang="en-GB" sz="1100" dirty="0" smtClean="0"/>
+                        <a:t>MS:1002638</a:t>
+                      </a:r>
+                      <a:endParaRPr lang="en-GB" sz="1100" dirty="0"/>
                     </a:p>
                   </a:txBody>
                   <a:tcPr/>
@@ -15047,10 +15010,10 @@
                         <a:defRPr/>
                       </a:pPr>
                       <a:r>
-                        <a:rPr lang="en-GB" sz="1200" dirty="0" smtClean="0"/>
+                        <a:rPr lang="en-GB" sz="1100" dirty="0" smtClean="0"/>
                         <a:t>The strand (‘+’ or ‘-’) to which the peptide has been mapped.</a:t>
                       </a:r>
-                      <a:endParaRPr lang="en-GB" sz="1200" dirty="0"/>
+                      <a:endParaRPr lang="en-GB" sz="1100" dirty="0"/>
                     </a:p>
                   </a:txBody>
                   <a:tcPr/>
@@ -15063,10 +15026,28 @@
                     <a:lstStyle/>
                     <a:p>
                       <a:r>
-                        <a:rPr lang="en-GB" sz="1200" dirty="0" smtClean="0"/>
-                        <a:t>Genome reference version</a:t>
-                      </a:r>
-                      <a:endParaRPr lang="en-GB" sz="1200" dirty="0"/>
+                        <a:rPr lang="en-GB" sz="1100" dirty="0" smtClean="0"/>
+                        <a:t>genome </a:t>
+                      </a:r>
+                      <a:r>
+                        <a:rPr lang="en-GB" sz="1100" dirty="0" smtClean="0"/>
+                        <a:t>reference version</a:t>
+                      </a:r>
+                      <a:endParaRPr lang="en-GB" sz="1100" dirty="0"/>
+                    </a:p>
+                  </a:txBody>
+                  <a:tcPr/>
+                </a:tc>
+                <a:tc>
+                  <a:txBody>
+                    <a:bodyPr/>
+                    <a:lstStyle/>
+                    <a:p>
+                      <a:r>
+                        <a:rPr lang="en-GB" sz="1100" dirty="0" smtClean="0"/>
+                        <a:t>MS:1002644</a:t>
+                      </a:r>
+                      <a:endParaRPr lang="en-GB" sz="1100" dirty="0"/>
                     </a:p>
                   </a:txBody>
                   <a:tcPr/>
@@ -15094,18 +15075,18 @@
                         <a:defRPr/>
                       </a:pPr>
                       <a:r>
-                        <a:rPr lang="en-GB" sz="1200" dirty="0" smtClean="0"/>
+                        <a:rPr lang="en-GB" sz="1100" dirty="0" smtClean="0"/>
                         <a:t>The genome reference version to which the peptides have</a:t>
                       </a:r>
                       <a:r>
-                        <a:rPr lang="en-GB" sz="1200" baseline="0" dirty="0" smtClean="0"/>
-                        <a:t> </a:t>
-                      </a:r>
-                      <a:r>
-                        <a:rPr lang="en-GB" sz="1200" baseline="0" smtClean="0"/>
-                        <a:t>been mapped</a:t>
-                      </a:r>
-                      <a:endParaRPr lang="en-GB" sz="1200" dirty="0"/>
+                        <a:rPr lang="en-GB" sz="1100" baseline="0" dirty="0" smtClean="0"/>
+                        <a:t> been </a:t>
+                      </a:r>
+                      <a:r>
+                        <a:rPr lang="en-GB" sz="1100" baseline="0" dirty="0" smtClean="0"/>
+                        <a:t>mapped.</a:t>
+                      </a:r>
+                      <a:endParaRPr lang="en-GB" sz="1100" dirty="0"/>
                     </a:p>
                   </a:txBody>
                   <a:tcPr/>
@@ -15118,7 +15099,7 @@
                     <a:lstStyle/>
                     <a:p>
                       <a:r>
-                        <a:rPr lang="en-GB" sz="1200" b="0" kern="1200" dirty="0" smtClean="0">
+                        <a:rPr lang="en-GB" sz="1100" b="0" kern="1200" dirty="0" smtClean="0">
                           <a:solidFill>
                             <a:schemeClr val="dk1"/>
                           </a:solidFill>
@@ -15128,7 +15109,21 @@
                         </a:rPr>
                         <a:t>peptide end on chromosome</a:t>
                       </a:r>
-                      <a:endParaRPr lang="en-GB" sz="1200" dirty="0"/>
+                      <a:endParaRPr lang="en-GB" sz="1100" dirty="0"/>
+                    </a:p>
+                  </a:txBody>
+                  <a:tcPr/>
+                </a:tc>
+                <a:tc>
+                  <a:txBody>
+                    <a:bodyPr/>
+                    <a:lstStyle/>
+                    <a:p>
+                      <a:r>
+                        <a:rPr lang="en-GB" sz="1100" dirty="0" smtClean="0"/>
+                        <a:t>MS:1002640</a:t>
+                      </a:r>
+                      <a:endParaRPr lang="en-GB" sz="1100" dirty="0"/>
                     </a:p>
                   </a:txBody>
                   <a:tcPr/>
@@ -15156,7 +15151,7 @@
                         <a:defRPr/>
                       </a:pPr>
                       <a:r>
-                        <a:rPr lang="en-GB" sz="1200" b="0" kern="1200" dirty="0" smtClean="0">
+                        <a:rPr lang="en-GB" sz="1100" b="0" kern="1200" dirty="0" smtClean="0">
                           <a:solidFill>
                             <a:schemeClr val="dk1"/>
                           </a:solidFill>
@@ -15167,7 +15162,7 @@
                         <a:t>Overall end position on chromosome (zero-based</a:t>
                       </a:r>
                       <a:r>
-                        <a:rPr lang="en-GB" sz="1200" b="0" kern="1200" baseline="0" dirty="0" smtClean="0">
+                        <a:rPr lang="en-GB" sz="1100" b="0" kern="1200" baseline="0" dirty="0" smtClean="0">
                           <a:solidFill>
                             <a:schemeClr val="dk1"/>
                           </a:solidFill>
@@ -15177,7 +15172,7 @@
                         </a:rPr>
                         <a:t> coordinate) i.e. last base of last codon.</a:t>
                       </a:r>
-                      <a:endParaRPr lang="en-GB" sz="1200" dirty="0"/>
+                      <a:endParaRPr lang="en-GB" sz="1100" dirty="0"/>
                     </a:p>
                   </a:txBody>
                   <a:tcPr/>
@@ -15190,10 +15185,10 @@
                     <a:lstStyle/>
                     <a:p>
                       <a:r>
-                        <a:rPr lang="en-GB" sz="1200" dirty="0" smtClean="0"/>
+                        <a:rPr lang="en-GB" sz="1100" dirty="0" smtClean="0"/>
                         <a:t>peptide exon count</a:t>
                       </a:r>
-                      <a:endParaRPr lang="en-GB" sz="1200" dirty="0"/>
+                      <a:endParaRPr lang="en-GB" sz="1100" dirty="0"/>
                     </a:p>
                   </a:txBody>
                   <a:tcPr/>
@@ -15204,10 +15199,24 @@
                     <a:lstStyle/>
                     <a:p>
                       <a:r>
-                        <a:rPr lang="en-GB" sz="1200" dirty="0" smtClean="0"/>
+                        <a:rPr lang="en-GB" sz="1100" dirty="0" smtClean="0"/>
+                        <a:t>MS:1002641</a:t>
+                      </a:r>
+                      <a:endParaRPr lang="en-GB" sz="1100" dirty="0"/>
+                    </a:p>
+                  </a:txBody>
+                  <a:tcPr/>
+                </a:tc>
+                <a:tc>
+                  <a:txBody>
+                    <a:bodyPr/>
+                    <a:lstStyle/>
+                    <a:p>
+                      <a:r>
+                        <a:rPr lang="en-GB" sz="1100" dirty="0" smtClean="0"/>
                         <a:t>The number of exons to which the peptide has been mapped.</a:t>
                       </a:r>
-                      <a:endParaRPr lang="en-GB" sz="1200" dirty="0"/>
+                      <a:endParaRPr lang="en-GB" sz="1100" dirty="0"/>
                     </a:p>
                   </a:txBody>
                   <a:tcPr/>
@@ -15220,10 +15229,10 @@
                     <a:lstStyle/>
                     <a:p>
                       <a:r>
-                        <a:rPr lang="en-GB" sz="1200" dirty="0" smtClean="0"/>
+                        <a:rPr lang="en-GB" sz="1100" dirty="0" smtClean="0"/>
                         <a:t>peptide exon nucleotide sizes</a:t>
                       </a:r>
-                      <a:endParaRPr lang="en-GB" sz="1200" dirty="0"/>
+                      <a:endParaRPr lang="en-GB" sz="1100" dirty="0"/>
                     </a:p>
                   </a:txBody>
                   <a:tcPr/>
@@ -15234,10 +15243,24 @@
                     <a:lstStyle/>
                     <a:p>
                       <a:r>
-                        <a:rPr lang="en-GB" sz="1200" dirty="0" smtClean="0"/>
+                        <a:rPr lang="en-GB" sz="1100" dirty="0" smtClean="0"/>
+                        <a:t>MS:1002642</a:t>
+                      </a:r>
+                      <a:endParaRPr lang="en-GB" sz="1100" dirty="0"/>
+                    </a:p>
+                  </a:txBody>
+                  <a:tcPr/>
+                </a:tc>
+                <a:tc>
+                  <a:txBody>
+                    <a:bodyPr/>
+                    <a:lstStyle/>
+                    <a:p>
+                      <a:r>
+                        <a:rPr lang="en-GB" sz="1100" dirty="0" smtClean="0"/>
                         <a:t>A comma separated list of the number of DNA bases within each exon to which a peptide has been mapped. Assuming standard operation of a search engine, the peptide exon sizes should sum to exactly three times the peptide length.</a:t>
                       </a:r>
-                      <a:endParaRPr lang="en-GB" sz="1200" dirty="0"/>
+                      <a:endParaRPr lang="en-GB" sz="1100" dirty="0"/>
                     </a:p>
                   </a:txBody>
                   <a:tcPr/>
@@ -15250,10 +15273,10 @@
                     <a:lstStyle/>
                     <a:p>
                       <a:r>
-                        <a:rPr lang="en-GB" sz="1200" dirty="0" smtClean="0"/>
+                        <a:rPr lang="en-GB" sz="1100" dirty="0" smtClean="0"/>
                         <a:t>peptide start positions on chromosome</a:t>
                       </a:r>
-                      <a:endParaRPr lang="en-GB" sz="1200" dirty="0"/>
+                      <a:endParaRPr lang="en-GB" sz="1100" dirty="0"/>
                     </a:p>
                   </a:txBody>
                   <a:tcPr/>
@@ -15264,10 +15287,28 @@
                     <a:lstStyle/>
                     <a:p>
                       <a:r>
-                        <a:rPr lang="en-GB" sz="1200" dirty="0" smtClean="0"/>
-                        <a:t>A comma separated list of start positions within exons to which the peptide has been mapped, relative to peptide-chromosome start, assuming a zero-based counting system. The first value MUST match the value in peptide start on chromosome</a:t>
-                      </a:r>
-                      <a:endParaRPr lang="en-GB" sz="1200" dirty="0"/>
+                        <a:rPr lang="en-GB" sz="1100" dirty="0" smtClean="0"/>
+                        <a:t>MS:1002643</a:t>
+                      </a:r>
+                      <a:endParaRPr lang="en-GB" sz="1100" dirty="0"/>
+                    </a:p>
+                  </a:txBody>
+                  <a:tcPr/>
+                </a:tc>
+                <a:tc>
+                  <a:txBody>
+                    <a:bodyPr/>
+                    <a:lstStyle/>
+                    <a:p>
+                      <a:r>
+                        <a:rPr lang="en-GB" sz="1100" dirty="0" smtClean="0"/>
+                        <a:t>A comma separated list of start positions within exons to which the peptide has been mapped, relative to peptide-chromosome start, assuming a zero-based counting system. The first value MUST match the value in peptide start on </a:t>
+                      </a:r>
+                      <a:r>
+                        <a:rPr lang="en-GB" sz="1100" dirty="0" smtClean="0"/>
+                        <a:t>chromosome.</a:t>
+                      </a:r>
+                      <a:endParaRPr lang="en-GB" sz="1100" dirty="0"/>
                     </a:p>
                   </a:txBody>
                   <a:tcPr/>

</xml_diff>

<commit_message>
Updated the spec doc with new proteogenomics terms for unmapped peptide and protein
</commit_message>
<xml_diff>
--- a/specification_document/specdoc1_2/NewFeaturesInMzid12.pptx
+++ b/specification_document/specdoc1_2/NewFeaturesInMzid12.pptx
@@ -215,7 +215,7 @@
             <a:fld id="{943B0BE5-311A-4B0A-9A39-DE24DD4BA79D}" type="datetimeFigureOut">
               <a:rPr lang="en-GB" smtClean="0"/>
               <a:pPr/>
-              <a:t>19/07/2016</a:t>
+              <a:t>03/02/2017</a:t>
             </a:fld>
             <a:endParaRPr lang="en-GB"/>
           </a:p>
@@ -760,7 +760,7 @@
             <a:fld id="{A71EF3F3-5BE8-4F69-8C8F-88D570AA2740}" type="datetimeFigureOut">
               <a:rPr lang="en-GB" smtClean="0"/>
               <a:pPr/>
-              <a:t>19/07/2016</a:t>
+              <a:t>03/02/2017</a:t>
             </a:fld>
             <a:endParaRPr lang="en-GB"/>
           </a:p>
@@ -927,7 +927,7 @@
             <a:fld id="{A71EF3F3-5BE8-4F69-8C8F-88D570AA2740}" type="datetimeFigureOut">
               <a:rPr lang="en-GB" smtClean="0"/>
               <a:pPr/>
-              <a:t>19/07/2016</a:t>
+              <a:t>03/02/2017</a:t>
             </a:fld>
             <a:endParaRPr lang="en-GB"/>
           </a:p>
@@ -1104,7 +1104,7 @@
             <a:fld id="{A71EF3F3-5BE8-4F69-8C8F-88D570AA2740}" type="datetimeFigureOut">
               <a:rPr lang="en-GB" smtClean="0"/>
               <a:pPr/>
-              <a:t>19/07/2016</a:t>
+              <a:t>03/02/2017</a:t>
             </a:fld>
             <a:endParaRPr lang="en-GB"/>
           </a:p>
@@ -1271,7 +1271,7 @@
             <a:fld id="{A71EF3F3-5BE8-4F69-8C8F-88D570AA2740}" type="datetimeFigureOut">
               <a:rPr lang="en-GB" smtClean="0"/>
               <a:pPr/>
-              <a:t>19/07/2016</a:t>
+              <a:t>03/02/2017</a:t>
             </a:fld>
             <a:endParaRPr lang="en-GB"/>
           </a:p>
@@ -1514,7 +1514,7 @@
             <a:fld id="{A71EF3F3-5BE8-4F69-8C8F-88D570AA2740}" type="datetimeFigureOut">
               <a:rPr lang="en-GB" smtClean="0"/>
               <a:pPr/>
-              <a:t>19/07/2016</a:t>
+              <a:t>03/02/2017</a:t>
             </a:fld>
             <a:endParaRPr lang="en-GB"/>
           </a:p>
@@ -1799,7 +1799,7 @@
             <a:fld id="{A71EF3F3-5BE8-4F69-8C8F-88D570AA2740}" type="datetimeFigureOut">
               <a:rPr lang="en-GB" smtClean="0"/>
               <a:pPr/>
-              <a:t>19/07/2016</a:t>
+              <a:t>03/02/2017</a:t>
             </a:fld>
             <a:endParaRPr lang="en-GB"/>
           </a:p>
@@ -2218,7 +2218,7 @@
             <a:fld id="{A71EF3F3-5BE8-4F69-8C8F-88D570AA2740}" type="datetimeFigureOut">
               <a:rPr lang="en-GB" smtClean="0"/>
               <a:pPr/>
-              <a:t>19/07/2016</a:t>
+              <a:t>03/02/2017</a:t>
             </a:fld>
             <a:endParaRPr lang="en-GB"/>
           </a:p>
@@ -2333,7 +2333,7 @@
             <a:fld id="{A71EF3F3-5BE8-4F69-8C8F-88D570AA2740}" type="datetimeFigureOut">
               <a:rPr lang="en-GB" smtClean="0"/>
               <a:pPr/>
-              <a:t>19/07/2016</a:t>
+              <a:t>03/02/2017</a:t>
             </a:fld>
             <a:endParaRPr lang="en-GB"/>
           </a:p>
@@ -2425,7 +2425,7 @@
             <a:fld id="{A71EF3F3-5BE8-4F69-8C8F-88D570AA2740}" type="datetimeFigureOut">
               <a:rPr lang="en-GB" smtClean="0"/>
               <a:pPr/>
-              <a:t>19/07/2016</a:t>
+              <a:t>03/02/2017</a:t>
             </a:fld>
             <a:endParaRPr lang="en-GB"/>
           </a:p>
@@ -2699,7 +2699,7 @@
             <a:fld id="{A71EF3F3-5BE8-4F69-8C8F-88D570AA2740}" type="datetimeFigureOut">
               <a:rPr lang="en-GB" smtClean="0"/>
               <a:pPr/>
-              <a:t>19/07/2016</a:t>
+              <a:t>03/02/2017</a:t>
             </a:fld>
             <a:endParaRPr lang="en-GB"/>
           </a:p>
@@ -2949,7 +2949,7 @@
             <a:fld id="{A71EF3F3-5BE8-4F69-8C8F-88D570AA2740}" type="datetimeFigureOut">
               <a:rPr lang="en-GB" smtClean="0"/>
               <a:pPr/>
-              <a:t>19/07/2016</a:t>
+              <a:t>03/02/2017</a:t>
             </a:fld>
             <a:endParaRPr lang="en-GB"/>
           </a:p>
@@ -3159,7 +3159,7 @@
             <a:fld id="{A71EF3F3-5BE8-4F69-8C8F-88D570AA2740}" type="datetimeFigureOut">
               <a:rPr lang="en-GB" smtClean="0"/>
               <a:pPr/>
-              <a:t>19/07/2016</a:t>
+              <a:t>03/02/2017</a:t>
             </a:fld>
             <a:endParaRPr lang="en-GB"/>
           </a:p>
@@ -14484,14 +14484,14 @@
           <p:nvPr>
             <p:extLst>
               <p:ext uri="{D42A27DB-BD31-4B8C-83A1-F6EECF244321}">
-                <p14:modId xmlns:p14="http://schemas.microsoft.com/office/powerpoint/2010/main" val="3234962061"/>
+                <p14:modId xmlns:p14="http://schemas.microsoft.com/office/powerpoint/2010/main" val="2388294705"/>
               </p:ext>
             </p:extLst>
           </p:nvPr>
         </p:nvGraphicFramePr>
         <p:xfrm>
           <a:off x="419944" y="4665037"/>
-          <a:ext cx="6657442" cy="3017746"/>
+          <a:ext cx="6657442" cy="3566386"/>
         </p:xfrm>
         <a:graphic>
           <a:graphicData uri="http://schemas.openxmlformats.org/drawingml/2006/table">
@@ -14611,13 +14611,7 @@
                         <a:rPr lang="en-GB" sz="1200" dirty="0" smtClean="0">
                           <a:latin typeface="+mj-lt"/>
                         </a:rPr>
-                        <a:t>The</a:t>
-                      </a:r>
-                      <a:r>
-                        <a:rPr lang="en-GB" sz="1200" baseline="0" dirty="0" smtClean="0">
-                          <a:latin typeface="+mj-lt"/>
-                        </a:rPr>
-                        <a:t> cv terms in bold MUST be present on every </a:t>
+                        <a:t>Every </a:t>
                       </a:r>
                       <a:r>
                         <a:rPr lang="en-GB" sz="1200" baseline="0" dirty="0" err="1" smtClean="0">
@@ -14629,7 +14623,7 @@
                         <a:rPr lang="en-GB" sz="1200" baseline="0" dirty="0" smtClean="0">
                           <a:latin typeface="+mj-lt"/>
                         </a:rPr>
-                        <a:t>, unless </a:t>
+                        <a:t> that has </a:t>
                       </a:r>
                       <a:r>
                         <a:rPr lang="en-GB" sz="1200" baseline="0" dirty="0" err="1" smtClean="0">
@@ -14641,7 +14635,74 @@
                         <a:rPr lang="en-GB" sz="1200" baseline="0" dirty="0" smtClean="0">
                           <a:latin typeface="+mj-lt"/>
                         </a:rPr>
-                        <a:t>=“true”, in which case they are optional.  In this example, peptide DVLEGDSSEDR crosses an exon boundary. The N-terminal region of the peptide is mapped to positions 156646123 – </a:t>
+                        <a:t>=“false”, MUST have either MS:1002740 “unmapped peptide” (for cases where a peptide could not be mapped) or t</a:t>
+                      </a:r>
+                      <a:r>
+                        <a:rPr lang="en-GB" sz="1200" dirty="0" smtClean="0">
+                          <a:latin typeface="+mj-lt"/>
+                        </a:rPr>
+                        <a:t>he</a:t>
+                      </a:r>
+                      <a:r>
+                        <a:rPr lang="en-GB" sz="1200" baseline="0" dirty="0" smtClean="0">
+                          <a:latin typeface="+mj-lt"/>
+                        </a:rPr>
+                        <a:t> </a:t>
+                      </a:r>
+                      <a:r>
+                        <a:rPr lang="en-GB" sz="1200" baseline="0" dirty="0" smtClean="0">
+                          <a:latin typeface="+mj-lt"/>
+                        </a:rPr>
+                        <a:t>cv terms in bold MUST be </a:t>
+                      </a:r>
+                      <a:r>
+                        <a:rPr lang="en-GB" sz="1200" baseline="0" dirty="0" smtClean="0">
+                          <a:latin typeface="+mj-lt"/>
+                        </a:rPr>
+                        <a:t>present.  For </a:t>
+                      </a:r>
+                      <a:r>
+                        <a:rPr lang="en-GB" sz="1200" baseline="0" dirty="0" err="1" smtClean="0">
+                          <a:latin typeface="+mj-lt"/>
+                        </a:rPr>
+                        <a:t>PeptideEvidence</a:t>
+                      </a:r>
+                      <a:r>
+                        <a:rPr lang="en-GB" sz="1200" baseline="0" dirty="0" smtClean="0">
+                          <a:latin typeface="+mj-lt"/>
+                        </a:rPr>
+                        <a:t> elements with </a:t>
+                      </a:r>
+                      <a:r>
+                        <a:rPr lang="en-GB" sz="1200" baseline="0" dirty="0" err="1" smtClean="0">
+                          <a:latin typeface="+mj-lt"/>
+                        </a:rPr>
+                        <a:t>isDecoy</a:t>
+                      </a:r>
+                      <a:r>
+                        <a:rPr lang="en-GB" sz="1200" baseline="0" dirty="0" smtClean="0">
+                          <a:latin typeface="+mj-lt"/>
+                        </a:rPr>
+                        <a:t>=“true”, all terms are OPTIONAL.</a:t>
+                      </a:r>
+                    </a:p>
+                    <a:p>
+                      <a:endParaRPr lang="en-GB" sz="1200" baseline="0" dirty="0" smtClean="0">
+                        <a:latin typeface="+mj-lt"/>
+                      </a:endParaRPr>
+                    </a:p>
+                    <a:p>
+                      <a:r>
+                        <a:rPr lang="en-GB" sz="1200" baseline="0" dirty="0" smtClean="0">
+                          <a:latin typeface="+mj-lt"/>
+                        </a:rPr>
+                        <a:t>In </a:t>
+                      </a:r>
+                      <a:r>
+                        <a:rPr lang="en-GB" sz="1200" baseline="0" dirty="0" smtClean="0">
+                          <a:latin typeface="+mj-lt"/>
+                        </a:rPr>
+                        <a:t>this example, peptide DVLEGDSSEDR crosses an exon boundary. The N-terminal region of the peptide is mapped to positions 156646123 – </a:t>
                       </a:r>
                       <a:r>
                         <a:rPr lang="en-GB" sz="1200" b="0" dirty="0" smtClean="0">
@@ -14741,7 +14802,23 @@
                       </a:r>
                       <a:r>
                         <a:rPr lang="en-GB" sz="1200" i="0" baseline="0" dirty="0" smtClean="0"/>
-                        <a:t> value MUST store the genome reference version, chromosome name and strand. </a:t>
+                        <a:t> value MUST </a:t>
+                      </a:r>
+                      <a:r>
+                        <a:rPr lang="en-GB" sz="1200" i="0" baseline="0" dirty="0" smtClean="0"/>
+                        <a:t>store either: 1) </a:t>
+                      </a:r>
+                      <a:r>
+                        <a:rPr lang="en-GB" sz="1200" i="0" baseline="0" dirty="0" smtClean="0"/>
+                        <a:t>the genome reference version, chromosome name and </a:t>
+                      </a:r>
+                      <a:r>
+                        <a:rPr lang="en-GB" sz="1200" i="0" baseline="0" dirty="0" smtClean="0"/>
+                        <a:t>strand or 2) be annotated with the </a:t>
+                      </a:r>
+                      <a:r>
+                        <a:rPr lang="en-GB" sz="1200" i="0" baseline="0" smtClean="0"/>
+                        <a:t>term MS:1002741 “unmapped protein”.</a:t>
                       </a:r>
                       <a:endParaRPr lang="en-GB" sz="1200" i="0" baseline="0" dirty="0" smtClean="0">
                         <a:solidFill>
@@ -14826,13 +14903,13 @@
           <p:nvPr>
             <p:extLst>
               <p:ext uri="{D42A27DB-BD31-4B8C-83A1-F6EECF244321}">
-                <p14:modId xmlns:p14="http://schemas.microsoft.com/office/powerpoint/2010/main" val="1694497512"/>
+                <p14:modId xmlns:p14="http://schemas.microsoft.com/office/powerpoint/2010/main" val="1498491687"/>
               </p:ext>
             </p:extLst>
           </p:nvPr>
         </p:nvGraphicFramePr>
         <p:xfrm>
-          <a:off x="419944" y="7812548"/>
+          <a:off x="419944" y="8605068"/>
           <a:ext cx="6624737" cy="4028440"/>
         </p:xfrm>
         <a:graphic>
@@ -15027,11 +15104,7 @@
                     <a:p>
                       <a:r>
                         <a:rPr lang="en-GB" sz="1100" dirty="0" smtClean="0"/>
-                        <a:t>genome </a:t>
-                      </a:r>
-                      <a:r>
-                        <a:rPr lang="en-GB" sz="1100" dirty="0" smtClean="0"/>
-                        <a:t>reference version</a:t>
+                        <a:t>genome reference version</a:t>
                       </a:r>
                       <a:endParaRPr lang="en-GB" sz="1100" dirty="0"/>
                     </a:p>
@@ -15080,11 +15153,7 @@
                       </a:r>
                       <a:r>
                         <a:rPr lang="en-GB" sz="1100" baseline="0" dirty="0" smtClean="0"/>
-                        <a:t> been </a:t>
-                      </a:r>
-                      <a:r>
-                        <a:rPr lang="en-GB" sz="1100" baseline="0" dirty="0" smtClean="0"/>
-                        <a:t>mapped.</a:t>
+                        <a:t> been mapped.</a:t>
                       </a:r>
                       <a:endParaRPr lang="en-GB" sz="1100" dirty="0"/>
                     </a:p>
@@ -15302,11 +15371,7 @@
                     <a:p>
                       <a:r>
                         <a:rPr lang="en-GB" sz="1100" dirty="0" smtClean="0"/>
-                        <a:t>A comma separated list of start positions within exons to which the peptide has been mapped, relative to peptide-chromosome start, assuming a zero-based counting system. The first value MUST match the value in peptide start on </a:t>
-                      </a:r>
-                      <a:r>
-                        <a:rPr lang="en-GB" sz="1100" dirty="0" smtClean="0"/>
-                        <a:t>chromosome.</a:t>
+                        <a:t>A comma separated list of start positions within exons to which the peptide has been mapped, relative to peptide-chromosome start, assuming a zero-based counting system. The first value MUST match the value in peptide start on chromosome.</a:t>
                       </a:r>
                       <a:endParaRPr lang="en-GB" sz="1100" dirty="0"/>
                     </a:p>

</xml_diff>